<commit_message>
feature: Adicionar status report semanal
</commit_message>
<xml_diff>
--- a/Documentação/EngenhariaDeSoftware/Mod_Status_Report-PI20202.pptx
+++ b/Documentação/EngenhariaDeSoftware/Mod_Status_Report-PI20202.pptx
@@ -7,10 +7,10 @@
     <p:sldMasterId id="2147483665" r:id="rId6"/>
   </p:sldMasterIdLst>
   <p:notesMasterIdLst>
-    <p:notesMasterId r:id="rId12"/>
+    <p:notesMasterId r:id="rId13"/>
   </p:notesMasterIdLst>
   <p:handoutMasterIdLst>
-    <p:handoutMasterId r:id="rId13"/>
+    <p:handoutMasterId r:id="rId14"/>
   </p:handoutMasterIdLst>
   <p:sldIdLst>
     <p:sldId id="256" r:id="rId7"/>
@@ -18,6 +18,7 @@
     <p:sldId id="471" r:id="rId9"/>
     <p:sldId id="472" r:id="rId10"/>
     <p:sldId id="473" r:id="rId11"/>
+    <p:sldId id="474" r:id="rId12"/>
   </p:sldIdLst>
   <p:sldSz cx="13442950" cy="7561263"/>
   <p:notesSz cx="7104063" cy="10234613"/>
@@ -130,6 +131,7 @@
             <p14:sldId id="471"/>
             <p14:sldId id="472"/>
             <p14:sldId id="473"/>
+            <p14:sldId id="474"/>
           </p14:sldIdLst>
         </p14:section>
       </p14:sectionLst>
@@ -243,7 +245,7 @@
             <a:fld id="{C3CD65D1-5C11-455D-9F9A-0E035F00A0DA}" type="datetimeFigureOut">
               <a:rPr lang="pt-BR" smtClean="0"/>
               <a:pPr/>
-              <a:t>02/09/2021</a:t>
+              <a:t>15/09/2021</a:t>
             </a:fld>
             <a:endParaRPr lang="pt-BR"/>
           </a:p>
@@ -411,7 +413,7 @@
             <a:fld id="{A05DA3EF-18EA-43DE-B1BB-402A3C558822}" type="datetimeFigureOut">
               <a:rPr lang="pt-BR" smtClean="0"/>
               <a:pPr/>
-              <a:t>02/09/2021</a:t>
+              <a:t>15/09/2021</a:t>
             </a:fld>
             <a:endParaRPr lang="pt-BR"/>
           </a:p>
@@ -1037,6 +1039,99 @@
     <p:extLst>
       <p:ext uri="{BB962C8B-B14F-4D97-AF65-F5344CB8AC3E}">
         <p14:creationId xmlns:p14="http://schemas.microsoft.com/office/powerpoint/2010/main" val="418380032"/>
+      </p:ext>
+    </p:extLst>
+  </p:cSld>
+  <p:clrMapOvr>
+    <a:masterClrMapping/>
+  </p:clrMapOvr>
+</p:notes>
+</file>
+
+<file path=ppt/notesSlides/notesSlide5.xml><?xml version="1.0" encoding="utf-8"?>
+<p:notes xmlns:a="http://schemas.openxmlformats.org/drawingml/2006/main" xmlns:r="http://schemas.openxmlformats.org/officeDocument/2006/relationships" xmlns:p="http://schemas.openxmlformats.org/presentationml/2006/main">
+  <p:cSld>
+    <p:spTree>
+      <p:nvGrpSpPr>
+        <p:cNvPr id="1" name=""/>
+        <p:cNvGrpSpPr/>
+        <p:nvPr/>
+      </p:nvGrpSpPr>
+      <p:grpSpPr>
+        <a:xfrm>
+          <a:off x="0" y="0"/>
+          <a:ext cx="0" cy="0"/>
+          <a:chOff x="0" y="0"/>
+          <a:chExt cx="0" cy="0"/>
+        </a:xfrm>
+      </p:grpSpPr>
+      <p:sp>
+        <p:nvSpPr>
+          <p:cNvPr id="2" name="Slide Image Placeholder 1"/>
+          <p:cNvSpPr>
+            <a:spLocks noGrp="1" noRot="1" noChangeAspect="1"/>
+          </p:cNvSpPr>
+          <p:nvPr>
+            <p:ph type="sldImg"/>
+          </p:nvPr>
+        </p:nvSpPr>
+        <p:spPr/>
+      </p:sp>
+      <p:sp>
+        <p:nvSpPr>
+          <p:cNvPr id="3" name="Notes Placeholder 2"/>
+          <p:cNvSpPr>
+            <a:spLocks noGrp="1"/>
+          </p:cNvSpPr>
+          <p:nvPr>
+            <p:ph type="body" idx="1"/>
+          </p:nvPr>
+        </p:nvSpPr>
+        <p:spPr/>
+        <p:txBody>
+          <a:bodyPr/>
+          <a:lstStyle/>
+          <a:p>
+            <a:endParaRPr lang="en-US"/>
+          </a:p>
+        </p:txBody>
+      </p:sp>
+      <p:sp>
+        <p:nvSpPr>
+          <p:cNvPr id="4" name="Slide Number Placeholder 3"/>
+          <p:cNvSpPr>
+            <a:spLocks noGrp="1"/>
+          </p:cNvSpPr>
+          <p:nvPr>
+            <p:ph type="sldNum" sz="quarter" idx="10"/>
+          </p:nvPr>
+        </p:nvSpPr>
+        <p:spPr/>
+        <p:txBody>
+          <a:bodyPr/>
+          <a:lstStyle/>
+          <a:p>
+            <a:fld id="{B39AF3DB-B6A1-2444-9DD8-53D016F8E638}" type="slidenum">
+              <a:rPr lang="pt-BR" smtClean="0">
+                <a:solidFill>
+                  <a:prstClr val="black"/>
+                </a:solidFill>
+              </a:rPr>
+              <a:pPr/>
+              <a:t>6</a:t>
+            </a:fld>
+            <a:endParaRPr lang="pt-BR">
+              <a:solidFill>
+                <a:prstClr val="black"/>
+              </a:solidFill>
+            </a:endParaRPr>
+          </a:p>
+        </p:txBody>
+      </p:sp>
+    </p:spTree>
+    <p:extLst>
+      <p:ext uri="{BB962C8B-B14F-4D97-AF65-F5344CB8AC3E}">
+        <p14:creationId xmlns:p14="http://schemas.microsoft.com/office/powerpoint/2010/main" val="789916143"/>
       </p:ext>
     </p:extLst>
   </p:cSld>
@@ -28356,7 +28451,7 @@
         </p:nvSpPr>
         <p:spPr>
           <a:xfrm>
-            <a:off x="6950568" y="1173425"/>
+            <a:off x="6772097" y="1164342"/>
             <a:ext cx="6164295" cy="295915"/>
           </a:xfrm>
           <a:prstGeom prst="rect">
@@ -28382,8 +28477,19 @@
                 <a:latin typeface="Calibri" panose="020F0502020204030204" pitchFamily="34" charset="0"/>
                 <a:cs typeface="Simplon BP Regular"/>
               </a:rPr>
-              <a:t>Maior participação nas reuniões e melhorar a efetividade;</a:t>
+              <a:t>Definir funcionalidades do </a:t>
             </a:r>
+            <a:r>
+              <a:rPr lang="pt-BR" sz="1323" b="1" dirty="0" err="1">
+                <a:latin typeface="Calibri" panose="020F0502020204030204" pitchFamily="34" charset="0"/>
+                <a:cs typeface="Simplon BP Regular"/>
+              </a:rPr>
+              <a:t>backend</a:t>
+            </a:r>
+            <a:endParaRPr lang="pt-BR" sz="1323" b="1" dirty="0">
+              <a:latin typeface="Calibri" panose="020F0502020204030204" pitchFamily="34" charset="0"/>
+              <a:cs typeface="Simplon BP Regular"/>
+            </a:endParaRPr>
           </a:p>
         </p:txBody>
       </p:sp>
@@ -29087,6 +29193,1900 @@
     <p:extLst>
       <p:ext uri="{BB962C8B-B14F-4D97-AF65-F5344CB8AC3E}">
         <p14:creationId xmlns:p14="http://schemas.microsoft.com/office/powerpoint/2010/main" val="1005145614"/>
+      </p:ext>
+    </p:extLst>
+  </p:cSld>
+  <p:clrMapOvr>
+    <a:masterClrMapping/>
+  </p:clrMapOvr>
+</p:sld>
+</file>
+
+<file path=ppt/slides/slide6.xml><?xml version="1.0" encoding="utf-8"?>
+<p:sld xmlns:a="http://schemas.openxmlformats.org/drawingml/2006/main" xmlns:r="http://schemas.openxmlformats.org/officeDocument/2006/relationships" xmlns:p="http://schemas.openxmlformats.org/presentationml/2006/main">
+  <p:cSld>
+    <p:spTree>
+      <p:nvGrpSpPr>
+        <p:cNvPr id="1" name=""/>
+        <p:cNvGrpSpPr/>
+        <p:nvPr/>
+      </p:nvGrpSpPr>
+      <p:grpSpPr>
+        <a:xfrm>
+          <a:off x="0" y="0"/>
+          <a:ext cx="0" cy="0"/>
+          <a:chOff x="0" y="0"/>
+          <a:chExt cx="0" cy="0"/>
+        </a:xfrm>
+      </p:grpSpPr>
+      <p:sp>
+        <p:nvSpPr>
+          <p:cNvPr id="43" name="Rectangle 42"/>
+          <p:cNvSpPr/>
+          <p:nvPr/>
+        </p:nvSpPr>
+        <p:spPr>
+          <a:xfrm>
+            <a:off x="6804883" y="1106495"/>
+            <a:ext cx="6209639" cy="2235805"/>
+          </a:xfrm>
+          <a:prstGeom prst="rect">
+            <a:avLst/>
+          </a:prstGeom>
+          <a:noFill/>
+          <a:ln w="12700">
+            <a:solidFill>
+              <a:schemeClr val="bg1">
+                <a:lumMod val="50000"/>
+              </a:schemeClr>
+            </a:solidFill>
+          </a:ln>
+        </p:spPr>
+        <p:style>
+          <a:lnRef idx="2">
+            <a:schemeClr val="accent4"/>
+          </a:lnRef>
+          <a:fillRef idx="1">
+            <a:schemeClr val="lt1"/>
+          </a:fillRef>
+          <a:effectRef idx="0">
+            <a:schemeClr val="accent4"/>
+          </a:effectRef>
+          <a:fontRef idx="minor">
+            <a:schemeClr val="dk1"/>
+          </a:fontRef>
+        </p:style>
+        <p:txBody>
+          <a:bodyPr tIns="105844" rtlCol="0" anchor="t"/>
+          <a:lstStyle/>
+          <a:p>
+            <a:pPr defTabSz="672130">
+              <a:spcAft>
+                <a:spcPts val="882"/>
+              </a:spcAft>
+            </a:pPr>
+            <a:endParaRPr lang="pt-BR" sz="1470" dirty="0">
+              <a:solidFill>
+                <a:schemeClr val="tx1"/>
+              </a:solidFill>
+              <a:latin typeface="Calibri" panose="020F0502020204030204" pitchFamily="34" charset="0"/>
+              <a:cs typeface="Simplon BP Regular"/>
+            </a:endParaRPr>
+          </a:p>
+        </p:txBody>
+      </p:sp>
+      <p:sp>
+        <p:nvSpPr>
+          <p:cNvPr id="3" name="Title 2"/>
+          <p:cNvSpPr>
+            <a:spLocks noGrp="1"/>
+          </p:cNvSpPr>
+          <p:nvPr>
+            <p:ph type="title"/>
+          </p:nvPr>
+        </p:nvSpPr>
+        <p:spPr>
+          <a:xfrm>
+            <a:off x="469692" y="185232"/>
+            <a:ext cx="12098020" cy="800352"/>
+          </a:xfrm>
+        </p:spPr>
+        <p:txBody>
+          <a:bodyPr vert="horz" wrap="square" lIns="105844" tIns="0" rIns="105844" bIns="0" numCol="1" anchor="t" anchorCtr="0" compatLnSpc="1">
+            <a:prstTxWarp prst="textNoShape">
+              <a:avLst/>
+            </a:prstTxWarp>
+            <a:noAutofit/>
+          </a:bodyPr>
+          <a:lstStyle/>
+          <a:p>
+            <a:pPr algn="l">
+              <a:spcAft>
+                <a:spcPts val="882"/>
+              </a:spcAft>
+            </a:pPr>
+            <a:r>
+              <a:rPr lang="en-US" sz="2646" dirty="0">
+                <a:solidFill>
+                  <a:prstClr val="black"/>
+                </a:solidFill>
+                <a:latin typeface="Simplon Oi Headline"/>
+                <a:cs typeface="Simplon Oi Headline"/>
+              </a:rPr>
+              <a:t>SEMANA 4 - 15/09/2021 – 22/09/2021</a:t>
+            </a:r>
+          </a:p>
+        </p:txBody>
+      </p:sp>
+      <p:sp>
+        <p:nvSpPr>
+          <p:cNvPr id="78" name="TextBox 118"/>
+          <p:cNvSpPr txBox="1"/>
+          <p:nvPr/>
+        </p:nvSpPr>
+        <p:spPr>
+          <a:xfrm>
+            <a:off x="11822773" y="576471"/>
+            <a:ext cx="899678" cy="179824"/>
+          </a:xfrm>
+          <a:prstGeom prst="rect">
+            <a:avLst/>
+          </a:prstGeom>
+          <a:noFill/>
+          <a:ln w="12700">
+            <a:noFill/>
+          </a:ln>
+        </p:spPr>
+        <p:style>
+          <a:lnRef idx="2">
+            <a:schemeClr val="accent4"/>
+          </a:lnRef>
+          <a:fillRef idx="1">
+            <a:schemeClr val="lt1"/>
+          </a:fillRef>
+          <a:effectRef idx="0">
+            <a:schemeClr val="accent4"/>
+          </a:effectRef>
+          <a:fontRef idx="minor">
+            <a:schemeClr val="dk1"/>
+          </a:fontRef>
+        </p:style>
+        <p:txBody>
+          <a:bodyPr wrap="none" lIns="52922" tIns="52922" rIns="52922" bIns="0" rtlCol="0" anchor="b"/>
+          <a:lstStyle>
+            <a:defPPr>
+              <a:defRPr lang="en-US"/>
+            </a:defPPr>
+            <a:lvl1pPr algn="ctr">
+              <a:defRPr sz="1000" b="1">
+                <a:latin typeface="Simplon BP Regular"/>
+                <a:cs typeface="Simplon BP Regular"/>
+              </a:defRPr>
+            </a:lvl1pPr>
+            <a:lvl2pPr>
+              <a:defRPr>
+                <a:solidFill>
+                  <a:schemeClr val="dk1"/>
+                </a:solidFill>
+              </a:defRPr>
+            </a:lvl2pPr>
+            <a:lvl3pPr>
+              <a:defRPr>
+                <a:solidFill>
+                  <a:schemeClr val="dk1"/>
+                </a:solidFill>
+              </a:defRPr>
+            </a:lvl3pPr>
+            <a:lvl4pPr>
+              <a:defRPr>
+                <a:solidFill>
+                  <a:schemeClr val="dk1"/>
+                </a:solidFill>
+              </a:defRPr>
+            </a:lvl4pPr>
+            <a:lvl5pPr>
+              <a:defRPr>
+                <a:solidFill>
+                  <a:schemeClr val="dk1"/>
+                </a:solidFill>
+              </a:defRPr>
+            </a:lvl5pPr>
+            <a:lvl6pPr>
+              <a:defRPr>
+                <a:solidFill>
+                  <a:schemeClr val="dk1"/>
+                </a:solidFill>
+              </a:defRPr>
+            </a:lvl6pPr>
+            <a:lvl7pPr>
+              <a:defRPr>
+                <a:solidFill>
+                  <a:schemeClr val="dk1"/>
+                </a:solidFill>
+              </a:defRPr>
+            </a:lvl7pPr>
+            <a:lvl8pPr>
+              <a:defRPr>
+                <a:solidFill>
+                  <a:schemeClr val="dk1"/>
+                </a:solidFill>
+              </a:defRPr>
+            </a:lvl8pPr>
+            <a:lvl9pPr>
+              <a:defRPr>
+                <a:solidFill>
+                  <a:schemeClr val="dk1"/>
+                </a:solidFill>
+              </a:defRPr>
+            </a:lvl9pPr>
+          </a:lstStyle>
+          <a:p>
+            <a:pPr defTabSz="672130"/>
+            <a:r>
+              <a:rPr lang="pt-BR" sz="1176" b="0" dirty="0">
+                <a:solidFill>
+                  <a:prstClr val="black"/>
+                </a:solidFill>
+                <a:latin typeface="Simplon BP Bold" pitchFamily="2" charset="0"/>
+              </a:rPr>
+              <a:t>Negócios</a:t>
+            </a:r>
+          </a:p>
+        </p:txBody>
+      </p:sp>
+      <p:sp>
+        <p:nvSpPr>
+          <p:cNvPr id="109" name="Oval 120"/>
+          <p:cNvSpPr>
+            <a:spLocks noChangeAspect="1"/>
+          </p:cNvSpPr>
+          <p:nvPr/>
+        </p:nvSpPr>
+        <p:spPr>
+          <a:xfrm>
+            <a:off x="11193898" y="297930"/>
+            <a:ext cx="211404" cy="211689"/>
+          </a:xfrm>
+          <a:prstGeom prst="ellipse">
+            <a:avLst/>
+          </a:prstGeom>
+          <a:solidFill>
+            <a:srgbClr val="00B050"/>
+          </a:solidFill>
+          <a:ln w="12700">
+            <a:solidFill>
+              <a:schemeClr val="accent3"/>
+            </a:solidFill>
+          </a:ln>
+        </p:spPr>
+        <p:style>
+          <a:lnRef idx="2">
+            <a:schemeClr val="accent1">
+              <a:shade val="50000"/>
+            </a:schemeClr>
+          </a:lnRef>
+          <a:fillRef idx="1">
+            <a:schemeClr val="accent1"/>
+          </a:fillRef>
+          <a:effectRef idx="0">
+            <a:schemeClr val="accent1"/>
+          </a:effectRef>
+          <a:fontRef idx="minor">
+            <a:schemeClr val="lt1"/>
+          </a:fontRef>
+        </p:style>
+        <p:txBody>
+          <a:bodyPr wrap="none" lIns="52922" tIns="52922" rIns="52922" rtlCol="0" anchor="ctr"/>
+          <a:lstStyle/>
+          <a:p>
+            <a:pPr algn="ctr" defTabSz="672130"/>
+            <a:endParaRPr lang="en-US" sz="1176" dirty="0">
+              <a:solidFill>
+                <a:prstClr val="black"/>
+              </a:solidFill>
+              <a:latin typeface="Simplon BP Regular"/>
+              <a:cs typeface="Simplon BP Regular"/>
+            </a:endParaRPr>
+          </a:p>
+        </p:txBody>
+      </p:sp>
+      <p:sp>
+        <p:nvSpPr>
+          <p:cNvPr id="80" name="TextBox 123"/>
+          <p:cNvSpPr txBox="1"/>
+          <p:nvPr/>
+        </p:nvSpPr>
+        <p:spPr>
+          <a:xfrm>
+            <a:off x="10852497" y="576471"/>
+            <a:ext cx="899678" cy="179824"/>
+          </a:xfrm>
+          <a:prstGeom prst="rect">
+            <a:avLst/>
+          </a:prstGeom>
+          <a:noFill/>
+          <a:ln w="12700">
+            <a:noFill/>
+          </a:ln>
+        </p:spPr>
+        <p:style>
+          <a:lnRef idx="2">
+            <a:schemeClr val="accent4"/>
+          </a:lnRef>
+          <a:fillRef idx="1">
+            <a:schemeClr val="lt1"/>
+          </a:fillRef>
+          <a:effectRef idx="0">
+            <a:schemeClr val="accent4"/>
+          </a:effectRef>
+          <a:fontRef idx="minor">
+            <a:schemeClr val="dk1"/>
+          </a:fontRef>
+        </p:style>
+        <p:txBody>
+          <a:bodyPr wrap="none" lIns="52922" tIns="52922" rIns="52922" bIns="0" rtlCol="0" anchor="b"/>
+          <a:lstStyle>
+            <a:defPPr>
+              <a:defRPr lang="en-US"/>
+            </a:defPPr>
+            <a:lvl1pPr algn="ctr">
+              <a:defRPr sz="1000" b="1">
+                <a:latin typeface="Simplon BP Regular"/>
+                <a:cs typeface="Simplon BP Regular"/>
+              </a:defRPr>
+            </a:lvl1pPr>
+            <a:lvl2pPr>
+              <a:defRPr>
+                <a:solidFill>
+                  <a:schemeClr val="dk1"/>
+                </a:solidFill>
+              </a:defRPr>
+            </a:lvl2pPr>
+            <a:lvl3pPr>
+              <a:defRPr>
+                <a:solidFill>
+                  <a:schemeClr val="dk1"/>
+                </a:solidFill>
+              </a:defRPr>
+            </a:lvl3pPr>
+            <a:lvl4pPr>
+              <a:defRPr>
+                <a:solidFill>
+                  <a:schemeClr val="dk1"/>
+                </a:solidFill>
+              </a:defRPr>
+            </a:lvl4pPr>
+            <a:lvl5pPr>
+              <a:defRPr>
+                <a:solidFill>
+                  <a:schemeClr val="dk1"/>
+                </a:solidFill>
+              </a:defRPr>
+            </a:lvl5pPr>
+            <a:lvl6pPr>
+              <a:defRPr>
+                <a:solidFill>
+                  <a:schemeClr val="dk1"/>
+                </a:solidFill>
+              </a:defRPr>
+            </a:lvl6pPr>
+            <a:lvl7pPr>
+              <a:defRPr>
+                <a:solidFill>
+                  <a:schemeClr val="dk1"/>
+                </a:solidFill>
+              </a:defRPr>
+            </a:lvl7pPr>
+            <a:lvl8pPr>
+              <a:defRPr>
+                <a:solidFill>
+                  <a:schemeClr val="dk1"/>
+                </a:solidFill>
+              </a:defRPr>
+            </a:lvl8pPr>
+            <a:lvl9pPr>
+              <a:defRPr>
+                <a:solidFill>
+                  <a:schemeClr val="dk1"/>
+                </a:solidFill>
+              </a:defRPr>
+            </a:lvl9pPr>
+          </a:lstStyle>
+          <a:p>
+            <a:pPr defTabSz="672130"/>
+            <a:r>
+              <a:rPr lang="pt-BR" sz="1176" b="0" dirty="0">
+                <a:solidFill>
+                  <a:prstClr val="black"/>
+                </a:solidFill>
+                <a:latin typeface="Simplon BP Bold" pitchFamily="2" charset="0"/>
+              </a:rPr>
+              <a:t>Plataforma</a:t>
+            </a:r>
+          </a:p>
+        </p:txBody>
+      </p:sp>
+      <p:sp>
+        <p:nvSpPr>
+          <p:cNvPr id="82" name="TextBox 128"/>
+          <p:cNvSpPr txBox="1"/>
+          <p:nvPr/>
+        </p:nvSpPr>
+        <p:spPr>
+          <a:xfrm>
+            <a:off x="9854245" y="576471"/>
+            <a:ext cx="899678" cy="179824"/>
+          </a:xfrm>
+          <a:prstGeom prst="rect">
+            <a:avLst/>
+          </a:prstGeom>
+          <a:noFill/>
+          <a:ln w="12700">
+            <a:noFill/>
+          </a:ln>
+        </p:spPr>
+        <p:style>
+          <a:lnRef idx="2">
+            <a:schemeClr val="accent4"/>
+          </a:lnRef>
+          <a:fillRef idx="1">
+            <a:schemeClr val="lt1"/>
+          </a:fillRef>
+          <a:effectRef idx="0">
+            <a:schemeClr val="accent4"/>
+          </a:effectRef>
+          <a:fontRef idx="minor">
+            <a:schemeClr val="dk1"/>
+          </a:fontRef>
+        </p:style>
+        <p:txBody>
+          <a:bodyPr wrap="none" lIns="52922" tIns="52922" rIns="52922" bIns="0" rtlCol="0" anchor="b"/>
+          <a:lstStyle>
+            <a:defPPr>
+              <a:defRPr lang="en-US"/>
+            </a:defPPr>
+            <a:lvl1pPr algn="ctr">
+              <a:defRPr sz="1000" b="1">
+                <a:latin typeface="Simplon BP Regular"/>
+                <a:cs typeface="Simplon BP Regular"/>
+              </a:defRPr>
+            </a:lvl1pPr>
+            <a:lvl2pPr>
+              <a:defRPr>
+                <a:solidFill>
+                  <a:schemeClr val="dk1"/>
+                </a:solidFill>
+              </a:defRPr>
+            </a:lvl2pPr>
+            <a:lvl3pPr>
+              <a:defRPr>
+                <a:solidFill>
+                  <a:schemeClr val="dk1"/>
+                </a:solidFill>
+              </a:defRPr>
+            </a:lvl3pPr>
+            <a:lvl4pPr>
+              <a:defRPr>
+                <a:solidFill>
+                  <a:schemeClr val="dk1"/>
+                </a:solidFill>
+              </a:defRPr>
+            </a:lvl4pPr>
+            <a:lvl5pPr>
+              <a:defRPr>
+                <a:solidFill>
+                  <a:schemeClr val="dk1"/>
+                </a:solidFill>
+              </a:defRPr>
+            </a:lvl5pPr>
+            <a:lvl6pPr>
+              <a:defRPr>
+                <a:solidFill>
+                  <a:schemeClr val="dk1"/>
+                </a:solidFill>
+              </a:defRPr>
+            </a:lvl6pPr>
+            <a:lvl7pPr>
+              <a:defRPr>
+                <a:solidFill>
+                  <a:schemeClr val="dk1"/>
+                </a:solidFill>
+              </a:defRPr>
+            </a:lvl7pPr>
+            <a:lvl8pPr>
+              <a:defRPr>
+                <a:solidFill>
+                  <a:schemeClr val="dk1"/>
+                </a:solidFill>
+              </a:defRPr>
+            </a:lvl8pPr>
+            <a:lvl9pPr>
+              <a:defRPr>
+                <a:solidFill>
+                  <a:schemeClr val="dk1"/>
+                </a:solidFill>
+              </a:defRPr>
+            </a:lvl9pPr>
+          </a:lstStyle>
+          <a:p>
+            <a:pPr defTabSz="672130"/>
+            <a:r>
+              <a:rPr lang="pt-BR" sz="1176" b="0" dirty="0">
+                <a:solidFill>
+                  <a:prstClr val="black"/>
+                </a:solidFill>
+                <a:latin typeface="Simplon BP Bold" pitchFamily="2" charset="0"/>
+              </a:rPr>
+              <a:t>Back</a:t>
+            </a:r>
+          </a:p>
+        </p:txBody>
+      </p:sp>
+      <p:sp>
+        <p:nvSpPr>
+          <p:cNvPr id="84" name="TextBox 133"/>
+          <p:cNvSpPr txBox="1"/>
+          <p:nvPr/>
+        </p:nvSpPr>
+        <p:spPr>
+          <a:xfrm>
+            <a:off x="8934246" y="576471"/>
+            <a:ext cx="899678" cy="179824"/>
+          </a:xfrm>
+          <a:prstGeom prst="rect">
+            <a:avLst/>
+          </a:prstGeom>
+          <a:noFill/>
+          <a:ln w="12700">
+            <a:noFill/>
+          </a:ln>
+        </p:spPr>
+        <p:style>
+          <a:lnRef idx="2">
+            <a:schemeClr val="accent4"/>
+          </a:lnRef>
+          <a:fillRef idx="1">
+            <a:schemeClr val="lt1"/>
+          </a:fillRef>
+          <a:effectRef idx="0">
+            <a:schemeClr val="accent4"/>
+          </a:effectRef>
+          <a:fontRef idx="minor">
+            <a:schemeClr val="dk1"/>
+          </a:fontRef>
+        </p:style>
+        <p:txBody>
+          <a:bodyPr wrap="none" lIns="52922" tIns="52922" rIns="52922" bIns="0" rtlCol="0" anchor="b"/>
+          <a:lstStyle>
+            <a:defPPr>
+              <a:defRPr lang="en-US"/>
+            </a:defPPr>
+            <a:lvl1pPr algn="ctr">
+              <a:defRPr sz="1000" b="1">
+                <a:latin typeface="Simplon BP Regular"/>
+                <a:cs typeface="Simplon BP Regular"/>
+              </a:defRPr>
+            </a:lvl1pPr>
+            <a:lvl2pPr>
+              <a:defRPr>
+                <a:solidFill>
+                  <a:schemeClr val="dk1"/>
+                </a:solidFill>
+              </a:defRPr>
+            </a:lvl2pPr>
+            <a:lvl3pPr>
+              <a:defRPr>
+                <a:solidFill>
+                  <a:schemeClr val="dk1"/>
+                </a:solidFill>
+              </a:defRPr>
+            </a:lvl3pPr>
+            <a:lvl4pPr>
+              <a:defRPr>
+                <a:solidFill>
+                  <a:schemeClr val="dk1"/>
+                </a:solidFill>
+              </a:defRPr>
+            </a:lvl4pPr>
+            <a:lvl5pPr>
+              <a:defRPr>
+                <a:solidFill>
+                  <a:schemeClr val="dk1"/>
+                </a:solidFill>
+              </a:defRPr>
+            </a:lvl5pPr>
+            <a:lvl6pPr>
+              <a:defRPr>
+                <a:solidFill>
+                  <a:schemeClr val="dk1"/>
+                </a:solidFill>
+              </a:defRPr>
+            </a:lvl6pPr>
+            <a:lvl7pPr>
+              <a:defRPr>
+                <a:solidFill>
+                  <a:schemeClr val="dk1"/>
+                </a:solidFill>
+              </a:defRPr>
+            </a:lvl7pPr>
+            <a:lvl8pPr>
+              <a:defRPr>
+                <a:solidFill>
+                  <a:schemeClr val="dk1"/>
+                </a:solidFill>
+              </a:defRPr>
+            </a:lvl8pPr>
+            <a:lvl9pPr>
+              <a:defRPr>
+                <a:solidFill>
+                  <a:schemeClr val="dk1"/>
+                </a:solidFill>
+              </a:defRPr>
+            </a:lvl9pPr>
+          </a:lstStyle>
+          <a:p>
+            <a:pPr defTabSz="672130"/>
+            <a:r>
+              <a:rPr lang="pt-BR" sz="1176" b="0" dirty="0">
+                <a:solidFill>
+                  <a:prstClr val="black"/>
+                </a:solidFill>
+                <a:latin typeface="Simplon BP Bold" pitchFamily="2" charset="0"/>
+              </a:rPr>
+              <a:t>Front</a:t>
+            </a:r>
+          </a:p>
+        </p:txBody>
+      </p:sp>
+      <p:sp>
+        <p:nvSpPr>
+          <p:cNvPr id="88" name="Oval 134"/>
+          <p:cNvSpPr>
+            <a:spLocks noChangeAspect="1"/>
+          </p:cNvSpPr>
+          <p:nvPr/>
+        </p:nvSpPr>
+        <p:spPr>
+          <a:xfrm>
+            <a:off x="8443555" y="282529"/>
+            <a:ext cx="211404" cy="211689"/>
+          </a:xfrm>
+          <a:prstGeom prst="ellipse">
+            <a:avLst/>
+          </a:prstGeom>
+          <a:solidFill>
+            <a:srgbClr val="00B050"/>
+          </a:solidFill>
+          <a:ln w="12700">
+            <a:solidFill>
+              <a:schemeClr val="accent3"/>
+            </a:solidFill>
+          </a:ln>
+        </p:spPr>
+        <p:style>
+          <a:lnRef idx="2">
+            <a:schemeClr val="accent1">
+              <a:shade val="50000"/>
+            </a:schemeClr>
+          </a:lnRef>
+          <a:fillRef idx="1">
+            <a:schemeClr val="accent1"/>
+          </a:fillRef>
+          <a:effectRef idx="0">
+            <a:schemeClr val="accent1"/>
+          </a:effectRef>
+          <a:fontRef idx="minor">
+            <a:schemeClr val="lt1"/>
+          </a:fontRef>
+        </p:style>
+        <p:txBody>
+          <a:bodyPr wrap="none" lIns="52922" tIns="52922" rIns="52922" rtlCol="0" anchor="ctr"/>
+          <a:lstStyle/>
+          <a:p>
+            <a:pPr algn="ctr" defTabSz="672130"/>
+            <a:endParaRPr lang="en-US" sz="1176" dirty="0">
+              <a:solidFill>
+                <a:srgbClr val="FFFF00"/>
+              </a:solidFill>
+              <a:latin typeface="Simplon BP Regular"/>
+              <a:cs typeface="Simplon BP Regular"/>
+            </a:endParaRPr>
+          </a:p>
+        </p:txBody>
+      </p:sp>
+      <p:sp>
+        <p:nvSpPr>
+          <p:cNvPr id="86" name="TextBox 138"/>
+          <p:cNvSpPr txBox="1"/>
+          <p:nvPr/>
+        </p:nvSpPr>
+        <p:spPr>
+          <a:xfrm>
+            <a:off x="8126053" y="576471"/>
+            <a:ext cx="899678" cy="179824"/>
+          </a:xfrm>
+          <a:prstGeom prst="rect">
+            <a:avLst/>
+          </a:prstGeom>
+          <a:noFill/>
+          <a:ln w="12700">
+            <a:noFill/>
+          </a:ln>
+        </p:spPr>
+        <p:style>
+          <a:lnRef idx="2">
+            <a:schemeClr val="accent4"/>
+          </a:lnRef>
+          <a:fillRef idx="1">
+            <a:schemeClr val="lt1"/>
+          </a:fillRef>
+          <a:effectRef idx="0">
+            <a:schemeClr val="accent4"/>
+          </a:effectRef>
+          <a:fontRef idx="minor">
+            <a:schemeClr val="dk1"/>
+          </a:fontRef>
+        </p:style>
+        <p:txBody>
+          <a:bodyPr wrap="none" lIns="52922" tIns="52922" rIns="52922" bIns="0" rtlCol="0" anchor="b"/>
+          <a:lstStyle>
+            <a:defPPr>
+              <a:defRPr lang="en-US"/>
+            </a:defPPr>
+            <a:lvl1pPr algn="ctr">
+              <a:defRPr sz="1000" b="1">
+                <a:latin typeface="Simplon BP Regular"/>
+                <a:cs typeface="Simplon BP Regular"/>
+              </a:defRPr>
+            </a:lvl1pPr>
+            <a:lvl2pPr>
+              <a:defRPr>
+                <a:solidFill>
+                  <a:schemeClr val="dk1"/>
+                </a:solidFill>
+              </a:defRPr>
+            </a:lvl2pPr>
+            <a:lvl3pPr>
+              <a:defRPr>
+                <a:solidFill>
+                  <a:schemeClr val="dk1"/>
+                </a:solidFill>
+              </a:defRPr>
+            </a:lvl3pPr>
+            <a:lvl4pPr>
+              <a:defRPr>
+                <a:solidFill>
+                  <a:schemeClr val="dk1"/>
+                </a:solidFill>
+              </a:defRPr>
+            </a:lvl4pPr>
+            <a:lvl5pPr>
+              <a:defRPr>
+                <a:solidFill>
+                  <a:schemeClr val="dk1"/>
+                </a:solidFill>
+              </a:defRPr>
+            </a:lvl5pPr>
+            <a:lvl6pPr>
+              <a:defRPr>
+                <a:solidFill>
+                  <a:schemeClr val="dk1"/>
+                </a:solidFill>
+              </a:defRPr>
+            </a:lvl6pPr>
+            <a:lvl7pPr>
+              <a:defRPr>
+                <a:solidFill>
+                  <a:schemeClr val="dk1"/>
+                </a:solidFill>
+              </a:defRPr>
+            </a:lvl7pPr>
+            <a:lvl8pPr>
+              <a:defRPr>
+                <a:solidFill>
+                  <a:schemeClr val="dk1"/>
+                </a:solidFill>
+              </a:defRPr>
+            </a:lvl8pPr>
+            <a:lvl9pPr>
+              <a:defRPr>
+                <a:solidFill>
+                  <a:schemeClr val="dk1"/>
+                </a:solidFill>
+              </a:defRPr>
+            </a:lvl9pPr>
+          </a:lstStyle>
+          <a:p>
+            <a:pPr defTabSz="672130"/>
+            <a:r>
+              <a:rPr lang="en-US" sz="1176" b="0" dirty="0" err="1">
+                <a:solidFill>
+                  <a:prstClr val="black"/>
+                </a:solidFill>
+                <a:latin typeface="Simplon BP Bold" pitchFamily="2" charset="0"/>
+              </a:rPr>
+              <a:t>Equipe</a:t>
+            </a:r>
+            <a:endParaRPr lang="en-US" sz="1176" b="0" dirty="0">
+              <a:solidFill>
+                <a:prstClr val="black"/>
+              </a:solidFill>
+              <a:latin typeface="Simplon BP Bold" pitchFamily="2" charset="0"/>
+            </a:endParaRPr>
+          </a:p>
+        </p:txBody>
+      </p:sp>
+      <p:sp>
+        <p:nvSpPr>
+          <p:cNvPr id="64" name="Retângulo 63"/>
+          <p:cNvSpPr/>
+          <p:nvPr/>
+        </p:nvSpPr>
+        <p:spPr>
+          <a:xfrm>
+            <a:off x="512766" y="868345"/>
+            <a:ext cx="6186608" cy="238150"/>
+          </a:xfrm>
+          <a:prstGeom prst="rect">
+            <a:avLst/>
+          </a:prstGeom>
+          <a:solidFill>
+            <a:schemeClr val="bg1">
+              <a:lumMod val="85000"/>
+            </a:schemeClr>
+          </a:solidFill>
+        </p:spPr>
+        <p:txBody>
+          <a:bodyPr vert="horz" lIns="134422" tIns="67211" rIns="134422" bIns="67211" rtlCol="0" anchor="ctr"/>
+          <a:lstStyle/>
+          <a:p>
+            <a:pPr defTabSz="672130"/>
+            <a:r>
+              <a:rPr lang="en-US" sz="1544" dirty="0">
+                <a:latin typeface="Simplon Oi Headline" charset="0"/>
+                <a:ea typeface="Simplon Oi Headline" charset="0"/>
+                <a:cs typeface="Simplon Oi Headline" charset="0"/>
+              </a:rPr>
+              <a:t>PROGRESSOS</a:t>
+            </a:r>
+            <a:endParaRPr lang="pt-BR" sz="1544" dirty="0">
+              <a:latin typeface="Simplon Oi Headline" charset="0"/>
+              <a:ea typeface="Simplon Oi Headline" charset="0"/>
+              <a:cs typeface="Simplon Oi Headline" charset="0"/>
+            </a:endParaRPr>
+          </a:p>
+        </p:txBody>
+      </p:sp>
+      <p:sp>
+        <p:nvSpPr>
+          <p:cNvPr id="65" name="Retângulo 64"/>
+          <p:cNvSpPr/>
+          <p:nvPr/>
+        </p:nvSpPr>
+        <p:spPr>
+          <a:xfrm>
+            <a:off x="6814576" y="868345"/>
+            <a:ext cx="6194715" cy="238150"/>
+          </a:xfrm>
+          <a:prstGeom prst="rect">
+            <a:avLst/>
+          </a:prstGeom>
+          <a:solidFill>
+            <a:schemeClr val="bg1">
+              <a:lumMod val="85000"/>
+            </a:schemeClr>
+          </a:solidFill>
+        </p:spPr>
+        <p:txBody>
+          <a:bodyPr vert="horz" lIns="134422" tIns="67211" rIns="134422" bIns="67211" rtlCol="0" anchor="ctr"/>
+          <a:lstStyle/>
+          <a:p>
+            <a:pPr defTabSz="672130"/>
+            <a:r>
+              <a:rPr lang="pt-BR" sz="1544" dirty="0">
+                <a:latin typeface="Simplon Oi Headline" charset="0"/>
+                <a:ea typeface="Simplon Oi Headline" charset="0"/>
+                <a:cs typeface="Simplon Oi Headline" charset="0"/>
+              </a:rPr>
+              <a:t>Pontos atenção/ Principais Riscos</a:t>
+            </a:r>
+          </a:p>
+        </p:txBody>
+      </p:sp>
+      <p:sp>
+        <p:nvSpPr>
+          <p:cNvPr id="66" name="Retângulo 65"/>
+          <p:cNvSpPr/>
+          <p:nvPr/>
+        </p:nvSpPr>
+        <p:spPr>
+          <a:xfrm>
+            <a:off x="507536" y="3418875"/>
+            <a:ext cx="12505521" cy="238150"/>
+          </a:xfrm>
+          <a:prstGeom prst="rect">
+            <a:avLst/>
+          </a:prstGeom>
+          <a:solidFill>
+            <a:schemeClr val="bg1">
+              <a:lumMod val="85000"/>
+            </a:schemeClr>
+          </a:solidFill>
+        </p:spPr>
+        <p:txBody>
+          <a:bodyPr vert="horz" lIns="134422" tIns="67211" rIns="134422" bIns="67211" rtlCol="0" anchor="ctr"/>
+          <a:lstStyle/>
+          <a:p>
+            <a:pPr defTabSz="672130"/>
+            <a:r>
+              <a:rPr lang="pt-BR" sz="1544" dirty="0">
+                <a:latin typeface="Simplon Oi Headline" charset="0"/>
+                <a:ea typeface="Simplon Oi Headline" charset="0"/>
+                <a:cs typeface="Simplon Oi Headline" charset="0"/>
+              </a:rPr>
+              <a:t>Próximos Passos/ Decisões a tomar</a:t>
+            </a:r>
+          </a:p>
+        </p:txBody>
+      </p:sp>
+      <p:sp>
+        <p:nvSpPr>
+          <p:cNvPr id="63" name="Rectangle 37"/>
+          <p:cNvSpPr/>
+          <p:nvPr/>
+        </p:nvSpPr>
+        <p:spPr>
+          <a:xfrm>
+            <a:off x="496765" y="1106495"/>
+            <a:ext cx="6207777" cy="2235805"/>
+          </a:xfrm>
+          <a:prstGeom prst="rect">
+            <a:avLst/>
+          </a:prstGeom>
+          <a:noFill/>
+          <a:ln w="12700">
+            <a:solidFill>
+              <a:schemeClr val="bg1">
+                <a:lumMod val="50000"/>
+              </a:schemeClr>
+            </a:solidFill>
+          </a:ln>
+        </p:spPr>
+        <p:style>
+          <a:lnRef idx="2">
+            <a:schemeClr val="accent4"/>
+          </a:lnRef>
+          <a:fillRef idx="1">
+            <a:schemeClr val="lt1"/>
+          </a:fillRef>
+          <a:effectRef idx="0">
+            <a:schemeClr val="accent4"/>
+          </a:effectRef>
+          <a:fontRef idx="minor">
+            <a:schemeClr val="dk1"/>
+          </a:fontRef>
+        </p:style>
+        <p:txBody>
+          <a:bodyPr tIns="105844" rtlCol="0" anchor="t"/>
+          <a:lstStyle/>
+          <a:p>
+            <a:pPr marL="252049" lvl="1" indent="-252049">
+              <a:buFont typeface="Wingdings" panose="05000000000000000000" pitchFamily="2" charset="2"/>
+              <a:buChar char="§"/>
+            </a:pPr>
+            <a:r>
+              <a:rPr lang="pt-BR" sz="1323" b="1" dirty="0">
+                <a:solidFill>
+                  <a:schemeClr val="tx1"/>
+                </a:solidFill>
+                <a:latin typeface="Calibri" panose="020F0502020204030204" pitchFamily="34" charset="0"/>
+                <a:cs typeface="Simplon BP Regular"/>
+              </a:rPr>
+              <a:t>Refinamos o modelo lógico</a:t>
+            </a:r>
+          </a:p>
+          <a:p>
+            <a:pPr marL="252049" lvl="1" indent="-252049">
+              <a:buFont typeface="Wingdings" panose="05000000000000000000" pitchFamily="2" charset="2"/>
+              <a:buChar char="§"/>
+            </a:pPr>
+            <a:r>
+              <a:rPr lang="pt-BR" sz="1323" b="1" dirty="0">
+                <a:solidFill>
+                  <a:schemeClr val="tx1"/>
+                </a:solidFill>
+                <a:latin typeface="Calibri" panose="020F0502020204030204" pitchFamily="34" charset="0"/>
+                <a:cs typeface="Simplon BP Regular"/>
+              </a:rPr>
+              <a:t>Refinamos o Protótipo de telas</a:t>
+            </a:r>
+          </a:p>
+          <a:p>
+            <a:pPr marL="252049" lvl="1" indent="-252049">
+              <a:buFont typeface="Wingdings" panose="05000000000000000000" pitchFamily="2" charset="2"/>
+              <a:buChar char="§"/>
+            </a:pPr>
+            <a:r>
+              <a:rPr lang="pt-BR" sz="1323" b="1" dirty="0">
+                <a:solidFill>
+                  <a:schemeClr val="tx1"/>
+                </a:solidFill>
+                <a:latin typeface="Calibri" panose="020F0502020204030204" pitchFamily="34" charset="0"/>
+                <a:cs typeface="Simplon BP Regular"/>
+              </a:rPr>
+              <a:t>Finalizamos o protótipo de </a:t>
+            </a:r>
+            <a:r>
+              <a:rPr lang="pt-BR" sz="1323" b="1" dirty="0" err="1">
+                <a:solidFill>
+                  <a:schemeClr val="tx1"/>
+                </a:solidFill>
+                <a:latin typeface="Calibri" panose="020F0502020204030204" pitchFamily="34" charset="0"/>
+                <a:cs typeface="Simplon BP Regular"/>
+              </a:rPr>
+              <a:t>spring</a:t>
+            </a:r>
+            <a:r>
+              <a:rPr lang="pt-BR" sz="1323" b="1" dirty="0">
+                <a:solidFill>
+                  <a:schemeClr val="tx1"/>
+                </a:solidFill>
+                <a:latin typeface="Calibri" panose="020F0502020204030204" pitchFamily="34" charset="0"/>
+                <a:cs typeface="Simplon BP Regular"/>
+              </a:rPr>
+              <a:t>  </a:t>
+            </a:r>
+          </a:p>
+          <a:p>
+            <a:pPr marL="252049" lvl="1" indent="-252049">
+              <a:buFont typeface="Wingdings" panose="05000000000000000000" pitchFamily="2" charset="2"/>
+              <a:buChar char="§"/>
+            </a:pPr>
+            <a:endParaRPr lang="pt-BR" sz="1323" b="1" dirty="0">
+              <a:solidFill>
+                <a:schemeClr val="tx1"/>
+              </a:solidFill>
+              <a:latin typeface="Calibri" panose="020F0502020204030204" pitchFamily="34" charset="0"/>
+              <a:cs typeface="Simplon BP Regular"/>
+            </a:endParaRPr>
+          </a:p>
+          <a:p>
+            <a:pPr marL="0" lvl="1"/>
+            <a:endParaRPr lang="pt-BR" sz="1200" dirty="0">
+              <a:solidFill>
+                <a:schemeClr val="tx1"/>
+              </a:solidFill>
+              <a:latin typeface="Calibri" panose="020F0502020204030204" pitchFamily="34" charset="0"/>
+              <a:cs typeface="Simplon BP Regular"/>
+            </a:endParaRPr>
+          </a:p>
+          <a:p>
+            <a:pPr marL="252049" lvl="1" indent="-252049">
+              <a:buFont typeface="Wingdings" panose="05000000000000000000" pitchFamily="2" charset="2"/>
+              <a:buChar char="§"/>
+            </a:pPr>
+            <a:endParaRPr lang="pt-BR" sz="1200" dirty="0">
+              <a:solidFill>
+                <a:schemeClr val="tx1"/>
+              </a:solidFill>
+              <a:latin typeface="Calibri" panose="020F0502020204030204" pitchFamily="34" charset="0"/>
+              <a:cs typeface="Simplon BP Regular"/>
+            </a:endParaRPr>
+          </a:p>
+          <a:p>
+            <a:pPr marL="252049" lvl="1" indent="-252049">
+              <a:buFont typeface="Wingdings" panose="05000000000000000000" pitchFamily="2" charset="2"/>
+              <a:buChar char="§"/>
+            </a:pPr>
+            <a:endParaRPr lang="pt-BR" sz="1323" b="1" dirty="0">
+              <a:solidFill>
+                <a:schemeClr val="tx1"/>
+              </a:solidFill>
+              <a:latin typeface="Calibri" panose="020F0502020204030204" pitchFamily="34" charset="0"/>
+              <a:cs typeface="Simplon BP Regular"/>
+            </a:endParaRPr>
+          </a:p>
+          <a:p>
+            <a:pPr marL="0" lvl="1" defTabSz="672130"/>
+            <a:endParaRPr lang="pt-BR" sz="1600" b="1" dirty="0">
+              <a:solidFill>
+                <a:schemeClr val="tx1"/>
+              </a:solidFill>
+              <a:latin typeface="Calibri" panose="020F0502020204030204" pitchFamily="34" charset="0"/>
+              <a:cs typeface="Simplon BP Regular"/>
+            </a:endParaRPr>
+          </a:p>
+          <a:p>
+            <a:pPr marL="252049" lvl="1" indent="-252049" fontAlgn="base">
+              <a:spcBef>
+                <a:spcPct val="0"/>
+              </a:spcBef>
+              <a:buFont typeface="Wingdings" panose="05000000000000000000" pitchFamily="2" charset="2"/>
+              <a:buChar char="ü"/>
+              <a:defRPr/>
+            </a:pPr>
+            <a:endParaRPr lang="pt-BR" sz="1323" b="1" dirty="0">
+              <a:solidFill>
+                <a:schemeClr val="tx1"/>
+              </a:solidFill>
+              <a:latin typeface="Calibri" panose="020F0502020204030204" pitchFamily="34" charset="0"/>
+              <a:cs typeface="Simplon BP Regular"/>
+            </a:endParaRPr>
+          </a:p>
+          <a:p>
+            <a:pPr marL="252049" lvl="1" indent="-252049" fontAlgn="base">
+              <a:spcBef>
+                <a:spcPct val="0"/>
+              </a:spcBef>
+              <a:buFont typeface="Wingdings" panose="05000000000000000000" pitchFamily="2" charset="2"/>
+              <a:buChar char="ü"/>
+              <a:defRPr/>
+            </a:pPr>
+            <a:endParaRPr lang="pt-BR" sz="1323" b="1" dirty="0">
+              <a:solidFill>
+                <a:schemeClr val="tx1"/>
+              </a:solidFill>
+              <a:latin typeface="Calibri" panose="020F0502020204030204" pitchFamily="34" charset="0"/>
+              <a:cs typeface="Simplon BP Regular"/>
+            </a:endParaRPr>
+          </a:p>
+          <a:p>
+            <a:pPr marL="252049" lvl="1" indent="-252049" fontAlgn="base">
+              <a:spcBef>
+                <a:spcPct val="0"/>
+              </a:spcBef>
+              <a:buFont typeface="Wingdings" panose="05000000000000000000" pitchFamily="2" charset="2"/>
+              <a:buChar char="ü"/>
+              <a:defRPr/>
+            </a:pPr>
+            <a:endParaRPr lang="pt-BR" sz="1323" b="1" dirty="0">
+              <a:solidFill>
+                <a:schemeClr val="tx1"/>
+              </a:solidFill>
+              <a:latin typeface="Calibri" panose="020F0502020204030204" pitchFamily="34" charset="0"/>
+              <a:cs typeface="Simplon BP Regular"/>
+            </a:endParaRPr>
+          </a:p>
+          <a:p>
+            <a:pPr marL="252049" indent="-252049" fontAlgn="base">
+              <a:spcBef>
+                <a:spcPct val="0"/>
+              </a:spcBef>
+              <a:buFont typeface="Wingdings" panose="05000000000000000000" pitchFamily="2" charset="2"/>
+              <a:buChar char="ü"/>
+              <a:defRPr/>
+            </a:pPr>
+            <a:endParaRPr lang="pt-BR" sz="1323" b="1" dirty="0">
+              <a:solidFill>
+                <a:schemeClr val="tx1"/>
+              </a:solidFill>
+              <a:latin typeface="Calibri" panose="020F0502020204030204" pitchFamily="34" charset="0"/>
+              <a:cs typeface="Simplon BP Regular"/>
+            </a:endParaRPr>
+          </a:p>
+          <a:p>
+            <a:pPr marL="252049" indent="-252049" fontAlgn="base">
+              <a:spcBef>
+                <a:spcPct val="0"/>
+              </a:spcBef>
+              <a:buFont typeface="Wingdings" panose="05000000000000000000" pitchFamily="2" charset="2"/>
+              <a:buChar char="ü"/>
+              <a:defRPr/>
+            </a:pPr>
+            <a:endParaRPr lang="pt-BR" sz="1323" b="1" dirty="0">
+              <a:solidFill>
+                <a:schemeClr val="tx1"/>
+              </a:solidFill>
+              <a:latin typeface="Calibri" panose="020F0502020204030204" pitchFamily="34" charset="0"/>
+              <a:cs typeface="Simplon BP Regular"/>
+            </a:endParaRPr>
+          </a:p>
+        </p:txBody>
+      </p:sp>
+      <p:sp>
+        <p:nvSpPr>
+          <p:cNvPr id="2" name="Rectangle 43">
+            <a:extLst>
+              <a:ext uri="{FF2B5EF4-FFF2-40B4-BE49-F238E27FC236}">
+                <a16:creationId xmlns:a16="http://schemas.microsoft.com/office/drawing/2014/main" id="{B15BA19F-C787-4E6A-ADAB-C0DFF09C66A8}"/>
+              </a:ext>
+            </a:extLst>
+          </p:cNvPr>
+          <p:cNvSpPr>
+            <a:spLocks/>
+          </p:cNvSpPr>
+          <p:nvPr/>
+        </p:nvSpPr>
+        <p:spPr>
+          <a:xfrm>
+            <a:off x="512766" y="3728204"/>
+            <a:ext cx="12496524" cy="3833059"/>
+          </a:xfrm>
+          <a:prstGeom prst="rect">
+            <a:avLst/>
+          </a:prstGeom>
+          <a:noFill/>
+          <a:ln w="12700">
+            <a:solidFill>
+              <a:schemeClr val="bg1">
+                <a:lumMod val="50000"/>
+              </a:schemeClr>
+            </a:solidFill>
+          </a:ln>
+        </p:spPr>
+        <p:style>
+          <a:lnRef idx="2">
+            <a:schemeClr val="accent4"/>
+          </a:lnRef>
+          <a:fillRef idx="1">
+            <a:schemeClr val="lt1"/>
+          </a:fillRef>
+          <a:effectRef idx="0">
+            <a:schemeClr val="accent4"/>
+          </a:effectRef>
+          <a:fontRef idx="minor">
+            <a:schemeClr val="dk1"/>
+          </a:fontRef>
+        </p:style>
+        <p:txBody>
+          <a:bodyPr wrap="square" tIns="105844" numCol="3" rtlCol="0" anchor="ctr"/>
+          <a:lstStyle/>
+          <a:p>
+            <a:pPr marL="0" lvl="1" defTabSz="672130"/>
+            <a:r>
+              <a:rPr lang="pt-BR" sz="1323" b="1" dirty="0">
+                <a:solidFill>
+                  <a:schemeClr val="tx1"/>
+                </a:solidFill>
+                <a:latin typeface="Calibri" panose="020F0502020204030204" pitchFamily="34" charset="0"/>
+                <a:cs typeface="Simplon BP Regular"/>
+              </a:rPr>
+              <a:t>Frente Plataforma</a:t>
+            </a:r>
+          </a:p>
+          <a:p>
+            <a:pPr marL="0" lvl="1" defTabSz="672130"/>
+            <a:endParaRPr lang="pt-BR" sz="1323" b="1" dirty="0">
+              <a:solidFill>
+                <a:schemeClr val="tx1"/>
+              </a:solidFill>
+              <a:latin typeface="Calibri" panose="020F0502020204030204" pitchFamily="34" charset="0"/>
+              <a:cs typeface="Simplon BP Regular"/>
+            </a:endParaRPr>
+          </a:p>
+          <a:p>
+            <a:pPr marL="0" lvl="1" defTabSz="672130"/>
+            <a:r>
+              <a:rPr lang="pt-BR" sz="1323" b="1" dirty="0">
+                <a:solidFill>
+                  <a:schemeClr val="tx1"/>
+                </a:solidFill>
+                <a:latin typeface="Calibri" panose="020F0502020204030204" pitchFamily="34" charset="0"/>
+                <a:cs typeface="Simplon BP Regular"/>
+              </a:rPr>
+              <a:t>Frente </a:t>
+            </a:r>
+            <a:r>
+              <a:rPr lang="pt-BR" sz="1323" b="1" dirty="0" err="1">
+                <a:solidFill>
+                  <a:schemeClr val="tx1"/>
+                </a:solidFill>
+                <a:latin typeface="Calibri" panose="020F0502020204030204" pitchFamily="34" charset="0"/>
+                <a:cs typeface="Simplon BP Regular"/>
+              </a:rPr>
+              <a:t>Backend</a:t>
+            </a:r>
+            <a:endParaRPr lang="pt-BR" sz="1323" b="1" dirty="0">
+              <a:solidFill>
+                <a:schemeClr val="tx1"/>
+              </a:solidFill>
+              <a:latin typeface="Calibri" panose="020F0502020204030204" pitchFamily="34" charset="0"/>
+              <a:cs typeface="Simplon BP Regular"/>
+            </a:endParaRPr>
+          </a:p>
+          <a:p>
+            <a:pPr marL="0" lvl="1" defTabSz="672130"/>
+            <a:endParaRPr lang="pt-BR" sz="1323" b="1" dirty="0">
+              <a:solidFill>
+                <a:schemeClr val="tx1"/>
+              </a:solidFill>
+              <a:latin typeface="Calibri" panose="020F0502020204030204" pitchFamily="34" charset="0"/>
+              <a:cs typeface="Simplon BP Regular"/>
+            </a:endParaRPr>
+          </a:p>
+          <a:p>
+            <a:pPr marL="0" lvl="1" defTabSz="672130"/>
+            <a:r>
+              <a:rPr lang="pt-BR" sz="1323" b="1" dirty="0">
+                <a:solidFill>
+                  <a:schemeClr val="tx1"/>
+                </a:solidFill>
+                <a:latin typeface="Calibri" panose="020F0502020204030204" pitchFamily="34" charset="0"/>
+                <a:cs typeface="Simplon BP Regular"/>
+              </a:rPr>
+              <a:t>Frente Front </a:t>
+            </a:r>
+            <a:r>
+              <a:rPr lang="pt-BR" sz="1323" b="1" dirty="0" err="1">
+                <a:solidFill>
+                  <a:schemeClr val="tx1"/>
+                </a:solidFill>
+                <a:latin typeface="Calibri" panose="020F0502020204030204" pitchFamily="34" charset="0"/>
+                <a:cs typeface="Simplon BP Regular"/>
+              </a:rPr>
+              <a:t>end</a:t>
+            </a:r>
+            <a:endParaRPr lang="pt-BR" sz="1323" b="1" dirty="0">
+              <a:solidFill>
+                <a:schemeClr val="tx1"/>
+              </a:solidFill>
+              <a:latin typeface="Calibri" panose="020F0502020204030204" pitchFamily="34" charset="0"/>
+              <a:cs typeface="Simplon BP Regular"/>
+            </a:endParaRPr>
+          </a:p>
+          <a:p>
+            <a:pPr marL="0" lvl="1" defTabSz="672130"/>
+            <a:endParaRPr lang="pt-BR" sz="1323" b="1" dirty="0">
+              <a:solidFill>
+                <a:schemeClr val="tx1"/>
+              </a:solidFill>
+              <a:latin typeface="Calibri" panose="020F0502020204030204" pitchFamily="34" charset="0"/>
+              <a:cs typeface="Simplon BP Regular"/>
+            </a:endParaRPr>
+          </a:p>
+          <a:p>
+            <a:pPr marL="252049" lvl="1" indent="-252049">
+              <a:buFont typeface="Wingdings" panose="05000000000000000000" pitchFamily="2" charset="2"/>
+              <a:buChar char="§"/>
+            </a:pPr>
+            <a:r>
+              <a:rPr lang="pt-BR" sz="1323" dirty="0">
+                <a:solidFill>
+                  <a:schemeClr val="tx1"/>
+                </a:solidFill>
+                <a:latin typeface="Calibri" panose="020F0502020204030204" pitchFamily="34" charset="0"/>
+                <a:cs typeface="Simplon BP Regular"/>
+              </a:rPr>
+              <a:t>Finalizar protótipo de telas;</a:t>
+            </a:r>
+          </a:p>
+          <a:p>
+            <a:pPr marL="0" lvl="1" defTabSz="672130"/>
+            <a:endParaRPr lang="pt-BR" sz="1600" b="1" dirty="0">
+              <a:solidFill>
+                <a:schemeClr val="tx1"/>
+              </a:solidFill>
+              <a:latin typeface="Calibri" panose="020F0502020204030204" pitchFamily="34" charset="0"/>
+              <a:cs typeface="Simplon BP Regular"/>
+            </a:endParaRPr>
+          </a:p>
+          <a:p>
+            <a:pPr marL="0" lvl="1" defTabSz="672130"/>
+            <a:r>
+              <a:rPr lang="pt-BR" sz="1400" b="1" dirty="0">
+                <a:solidFill>
+                  <a:schemeClr val="tx1"/>
+                </a:solidFill>
+                <a:latin typeface="Calibri" panose="020F0502020204030204" pitchFamily="34" charset="0"/>
+                <a:cs typeface="Simplon BP Regular"/>
+              </a:rPr>
+              <a:t>Frente Negócios</a:t>
+            </a:r>
+            <a:r>
+              <a:rPr lang="pt-BR" sz="1400" dirty="0">
+                <a:solidFill>
+                  <a:schemeClr val="tx1"/>
+                </a:solidFill>
+                <a:latin typeface="Calibri" panose="020F0502020204030204" pitchFamily="34" charset="0"/>
+                <a:cs typeface="Simplon BP Regular"/>
+              </a:rPr>
+              <a:t>;</a:t>
+            </a:r>
+          </a:p>
+          <a:p>
+            <a:pPr marL="0" lvl="1" defTabSz="672130"/>
+            <a:endParaRPr lang="pt-BR" sz="1400" dirty="0">
+              <a:solidFill>
+                <a:schemeClr val="tx1"/>
+              </a:solidFill>
+              <a:latin typeface="Calibri" panose="020F0502020204030204" pitchFamily="34" charset="0"/>
+              <a:cs typeface="Simplon BP Regular"/>
+            </a:endParaRPr>
+          </a:p>
+          <a:p>
+            <a:pPr marL="252049" lvl="1" indent="-252049">
+              <a:buFont typeface="Wingdings" panose="05000000000000000000" pitchFamily="2" charset="2"/>
+              <a:buChar char="§"/>
+            </a:pPr>
+            <a:r>
+              <a:rPr lang="pt-BR" sz="1400" dirty="0">
+                <a:solidFill>
+                  <a:schemeClr val="tx1"/>
+                </a:solidFill>
+                <a:latin typeface="Calibri" panose="020F0502020204030204" pitchFamily="34" charset="0"/>
+                <a:cs typeface="Simplon BP Regular"/>
+              </a:rPr>
+              <a:t>Validar com a Thais a possibilidade de aumentar o prazo de entrega para usuários com maiores rankings na plataforma </a:t>
+            </a:r>
+          </a:p>
+          <a:p>
+            <a:pPr marL="252049" lvl="1" indent="-252049">
+              <a:buFont typeface="Wingdings" panose="05000000000000000000" pitchFamily="2" charset="2"/>
+              <a:buChar char="§"/>
+            </a:pPr>
+            <a:r>
+              <a:rPr lang="pt-BR" sz="1400" dirty="0">
+                <a:solidFill>
+                  <a:schemeClr val="tx1"/>
+                </a:solidFill>
+                <a:latin typeface="Calibri" panose="020F0502020204030204" pitchFamily="34" charset="0"/>
+                <a:cs typeface="Simplon BP Regular"/>
+              </a:rPr>
+              <a:t>Validar com o </a:t>
+            </a:r>
+            <a:r>
+              <a:rPr lang="pt-BR" sz="1400" dirty="0" err="1">
+                <a:solidFill>
+                  <a:schemeClr val="tx1"/>
+                </a:solidFill>
+                <a:latin typeface="Calibri" panose="020F0502020204030204" pitchFamily="34" charset="0"/>
+                <a:cs typeface="Simplon BP Regular"/>
+              </a:rPr>
+              <a:t>alex</a:t>
+            </a:r>
+            <a:r>
+              <a:rPr lang="pt-BR" sz="1400" dirty="0">
+                <a:solidFill>
+                  <a:schemeClr val="tx1"/>
+                </a:solidFill>
+                <a:latin typeface="Calibri" panose="020F0502020204030204" pitchFamily="34" charset="0"/>
+                <a:cs typeface="Simplon BP Regular"/>
+              </a:rPr>
+              <a:t> atividade de usabilidade de Eng. Software </a:t>
+            </a:r>
+          </a:p>
+          <a:p>
+            <a:pPr marL="0" lvl="1"/>
+            <a:endParaRPr lang="pt-BR" sz="1400" b="1" dirty="0">
+              <a:solidFill>
+                <a:schemeClr val="tx1"/>
+              </a:solidFill>
+              <a:latin typeface="Calibri" panose="020F0502020204030204" pitchFamily="34" charset="0"/>
+              <a:cs typeface="Simplon BP Regular"/>
+            </a:endParaRPr>
+          </a:p>
+          <a:p>
+            <a:pPr marL="0" lvl="1"/>
+            <a:r>
+              <a:rPr lang="pt-BR" sz="1400" b="1" dirty="0">
+                <a:solidFill>
+                  <a:schemeClr val="tx1"/>
+                </a:solidFill>
+                <a:latin typeface="Calibri" panose="020F0502020204030204" pitchFamily="34" charset="0"/>
+                <a:cs typeface="Simplon BP Regular"/>
+              </a:rPr>
+              <a:t>Frente Gestão Organizacional</a:t>
+            </a:r>
+          </a:p>
+          <a:p>
+            <a:pPr marL="0" lvl="1"/>
+            <a:endParaRPr lang="pt-BR" sz="1400" b="1" dirty="0">
+              <a:solidFill>
+                <a:schemeClr val="tx1"/>
+              </a:solidFill>
+              <a:latin typeface="Calibri" panose="020F0502020204030204" pitchFamily="34" charset="0"/>
+              <a:cs typeface="Simplon BP Regular"/>
+            </a:endParaRPr>
+          </a:p>
+        </p:txBody>
+      </p:sp>
+      <p:sp>
+        <p:nvSpPr>
+          <p:cNvPr id="6" name="Oval 134">
+            <a:extLst>
+              <a:ext uri="{FF2B5EF4-FFF2-40B4-BE49-F238E27FC236}">
+                <a16:creationId xmlns:a16="http://schemas.microsoft.com/office/drawing/2014/main" id="{70825C6F-9257-4CF5-8C62-1CA1EB2F8815}"/>
+              </a:ext>
+            </a:extLst>
+          </p:cNvPr>
+          <p:cNvSpPr>
+            <a:spLocks noChangeAspect="1"/>
+          </p:cNvSpPr>
+          <p:nvPr/>
+        </p:nvSpPr>
+        <p:spPr>
+          <a:xfrm>
+            <a:off x="9225955" y="282529"/>
+            <a:ext cx="211404" cy="211689"/>
+          </a:xfrm>
+          <a:prstGeom prst="ellipse">
+            <a:avLst/>
+          </a:prstGeom>
+          <a:solidFill>
+            <a:srgbClr val="00B050"/>
+          </a:solidFill>
+          <a:ln w="12700">
+            <a:solidFill>
+              <a:schemeClr val="accent3"/>
+            </a:solidFill>
+          </a:ln>
+        </p:spPr>
+        <p:style>
+          <a:lnRef idx="2">
+            <a:schemeClr val="accent1">
+              <a:shade val="50000"/>
+            </a:schemeClr>
+          </a:lnRef>
+          <a:fillRef idx="1">
+            <a:schemeClr val="accent1"/>
+          </a:fillRef>
+          <a:effectRef idx="0">
+            <a:schemeClr val="accent1"/>
+          </a:effectRef>
+          <a:fontRef idx="minor">
+            <a:schemeClr val="lt1"/>
+          </a:fontRef>
+        </p:style>
+        <p:txBody>
+          <a:bodyPr wrap="none" lIns="52922" tIns="52922" rIns="52922" rtlCol="0" anchor="ctr"/>
+          <a:lstStyle/>
+          <a:p>
+            <a:pPr algn="ctr" defTabSz="672130"/>
+            <a:endParaRPr lang="en-US" sz="1176" dirty="0">
+              <a:solidFill>
+                <a:prstClr val="black"/>
+              </a:solidFill>
+              <a:latin typeface="Simplon BP Regular"/>
+              <a:cs typeface="Simplon BP Regular"/>
+            </a:endParaRPr>
+          </a:p>
+        </p:txBody>
+      </p:sp>
+      <p:sp>
+        <p:nvSpPr>
+          <p:cNvPr id="9" name="Oval 134">
+            <a:extLst>
+              <a:ext uri="{FF2B5EF4-FFF2-40B4-BE49-F238E27FC236}">
+                <a16:creationId xmlns:a16="http://schemas.microsoft.com/office/drawing/2014/main" id="{B60B13C9-0C70-4C0F-82B2-D0CD4FDFC1F0}"/>
+              </a:ext>
+            </a:extLst>
+          </p:cNvPr>
+          <p:cNvSpPr>
+            <a:spLocks noChangeAspect="1"/>
+          </p:cNvSpPr>
+          <p:nvPr/>
+        </p:nvSpPr>
+        <p:spPr>
+          <a:xfrm>
+            <a:off x="12155999" y="278623"/>
+            <a:ext cx="211404" cy="211689"/>
+          </a:xfrm>
+          <a:prstGeom prst="ellipse">
+            <a:avLst/>
+          </a:prstGeom>
+          <a:solidFill>
+            <a:srgbClr val="00B050"/>
+          </a:solidFill>
+          <a:ln w="12700">
+            <a:solidFill>
+              <a:schemeClr val="accent3"/>
+            </a:solidFill>
+          </a:ln>
+        </p:spPr>
+        <p:style>
+          <a:lnRef idx="2">
+            <a:schemeClr val="accent1">
+              <a:shade val="50000"/>
+            </a:schemeClr>
+          </a:lnRef>
+          <a:fillRef idx="1">
+            <a:schemeClr val="accent1"/>
+          </a:fillRef>
+          <a:effectRef idx="0">
+            <a:schemeClr val="accent1"/>
+          </a:effectRef>
+          <a:fontRef idx="minor">
+            <a:schemeClr val="lt1"/>
+          </a:fontRef>
+        </p:style>
+        <p:txBody>
+          <a:bodyPr wrap="none" lIns="52922" tIns="52922" rIns="52922" rtlCol="0" anchor="ctr"/>
+          <a:lstStyle/>
+          <a:p>
+            <a:pPr algn="ctr" defTabSz="672130"/>
+            <a:endParaRPr lang="en-US" sz="1176" dirty="0">
+              <a:solidFill>
+                <a:prstClr val="black"/>
+              </a:solidFill>
+              <a:latin typeface="Simplon BP Regular"/>
+              <a:cs typeface="Simplon BP Regular"/>
+            </a:endParaRPr>
+          </a:p>
+        </p:txBody>
+      </p:sp>
+      <p:sp>
+        <p:nvSpPr>
+          <p:cNvPr id="44" name="Oval 120">
+            <a:extLst>
+              <a:ext uri="{FF2B5EF4-FFF2-40B4-BE49-F238E27FC236}">
+                <a16:creationId xmlns:a16="http://schemas.microsoft.com/office/drawing/2014/main" id="{2688D066-DD5D-4246-B846-8AD1218C78EC}"/>
+              </a:ext>
+            </a:extLst>
+          </p:cNvPr>
+          <p:cNvSpPr>
+            <a:spLocks noChangeAspect="1"/>
+          </p:cNvSpPr>
+          <p:nvPr/>
+        </p:nvSpPr>
+        <p:spPr>
+          <a:xfrm>
+            <a:off x="10188056" y="288207"/>
+            <a:ext cx="211404" cy="211689"/>
+          </a:xfrm>
+          <a:prstGeom prst="ellipse">
+            <a:avLst/>
+          </a:prstGeom>
+          <a:solidFill>
+            <a:srgbClr val="FFFF00"/>
+          </a:solidFill>
+          <a:ln w="12700">
+            <a:solidFill>
+              <a:schemeClr val="accent3"/>
+            </a:solidFill>
+          </a:ln>
+        </p:spPr>
+        <p:style>
+          <a:lnRef idx="2">
+            <a:schemeClr val="accent1">
+              <a:shade val="50000"/>
+            </a:schemeClr>
+          </a:lnRef>
+          <a:fillRef idx="1">
+            <a:schemeClr val="accent1"/>
+          </a:fillRef>
+          <a:effectRef idx="0">
+            <a:schemeClr val="accent1"/>
+          </a:effectRef>
+          <a:fontRef idx="minor">
+            <a:schemeClr val="lt1"/>
+          </a:fontRef>
+        </p:style>
+        <p:txBody>
+          <a:bodyPr wrap="none" lIns="52922" tIns="52922" rIns="52922" rtlCol="0" anchor="ctr"/>
+          <a:lstStyle/>
+          <a:p>
+            <a:pPr algn="ctr" defTabSz="672130"/>
+            <a:endParaRPr lang="en-US" sz="1176" dirty="0">
+              <a:solidFill>
+                <a:srgbClr val="FFFF00"/>
+              </a:solidFill>
+              <a:highlight>
+                <a:srgbClr val="FFFF00"/>
+              </a:highlight>
+              <a:latin typeface="Simplon BP Regular"/>
+              <a:cs typeface="Simplon BP Regular"/>
+            </a:endParaRPr>
+          </a:p>
+        </p:txBody>
+      </p:sp>
+      <p:sp>
+        <p:nvSpPr>
+          <p:cNvPr id="5" name="Retângulo 4">
+            <a:extLst>
+              <a:ext uri="{FF2B5EF4-FFF2-40B4-BE49-F238E27FC236}">
+                <a16:creationId xmlns:a16="http://schemas.microsoft.com/office/drawing/2014/main" id="{A1C14918-6027-46B3-96BF-C5F7FDEC3276}"/>
+              </a:ext>
+            </a:extLst>
+          </p:cNvPr>
+          <p:cNvSpPr/>
+          <p:nvPr/>
+        </p:nvSpPr>
+        <p:spPr>
+          <a:xfrm>
+            <a:off x="8017619" y="180231"/>
+            <a:ext cx="4937689" cy="618769"/>
+          </a:xfrm>
+          <a:prstGeom prst="rect">
+            <a:avLst/>
+          </a:prstGeom>
+          <a:noFill/>
+          <a:ln w="6350">
+            <a:solidFill>
+              <a:schemeClr val="bg1">
+                <a:lumMod val="75000"/>
+              </a:schemeClr>
+            </a:solidFill>
+          </a:ln>
+        </p:spPr>
+        <p:style>
+          <a:lnRef idx="2">
+            <a:schemeClr val="accent1">
+              <a:shade val="50000"/>
+            </a:schemeClr>
+          </a:lnRef>
+          <a:fillRef idx="1">
+            <a:schemeClr val="accent1"/>
+          </a:fillRef>
+          <a:effectRef idx="0">
+            <a:schemeClr val="accent1"/>
+          </a:effectRef>
+          <a:fontRef idx="minor">
+            <a:schemeClr val="lt1"/>
+          </a:fontRef>
+        </p:style>
+        <p:txBody>
+          <a:bodyPr rtlCol="0" anchor="ctr"/>
+          <a:lstStyle/>
+          <a:p>
+            <a:pPr algn="ctr"/>
+            <a:endParaRPr lang="pt-BR"/>
+          </a:p>
+        </p:txBody>
+      </p:sp>
+      <p:sp>
+        <p:nvSpPr>
+          <p:cNvPr id="8" name="TextBox 138">
+            <a:extLst>
+              <a:ext uri="{FF2B5EF4-FFF2-40B4-BE49-F238E27FC236}">
+                <a16:creationId xmlns:a16="http://schemas.microsoft.com/office/drawing/2014/main" id="{5CE7D08C-795B-4BF1-97F6-F9773F4E9F4C}"/>
+              </a:ext>
+            </a:extLst>
+          </p:cNvPr>
+          <p:cNvSpPr txBox="1"/>
+          <p:nvPr/>
+        </p:nvSpPr>
+        <p:spPr>
+          <a:xfrm>
+            <a:off x="9747419" y="-22583"/>
+            <a:ext cx="1478088" cy="211688"/>
+          </a:xfrm>
+          <a:prstGeom prst="rect">
+            <a:avLst/>
+          </a:prstGeom>
+          <a:solidFill>
+            <a:schemeClr val="bg1"/>
+          </a:solidFill>
+          <a:ln w="12700">
+            <a:noFill/>
+          </a:ln>
+        </p:spPr>
+        <p:style>
+          <a:lnRef idx="2">
+            <a:schemeClr val="accent4"/>
+          </a:lnRef>
+          <a:fillRef idx="1">
+            <a:schemeClr val="lt1"/>
+          </a:fillRef>
+          <a:effectRef idx="0">
+            <a:schemeClr val="accent4"/>
+          </a:effectRef>
+          <a:fontRef idx="minor">
+            <a:schemeClr val="dk1"/>
+          </a:fontRef>
+        </p:style>
+        <p:txBody>
+          <a:bodyPr wrap="none" lIns="52922" tIns="52922" rIns="52922" bIns="0" rtlCol="0" anchor="b"/>
+          <a:lstStyle>
+            <a:defPPr>
+              <a:defRPr lang="en-US"/>
+            </a:defPPr>
+            <a:lvl1pPr algn="ctr">
+              <a:defRPr sz="1000" b="1">
+                <a:latin typeface="Simplon BP Regular"/>
+                <a:cs typeface="Simplon BP Regular"/>
+              </a:defRPr>
+            </a:lvl1pPr>
+            <a:lvl2pPr>
+              <a:defRPr>
+                <a:solidFill>
+                  <a:schemeClr val="dk1"/>
+                </a:solidFill>
+              </a:defRPr>
+            </a:lvl2pPr>
+            <a:lvl3pPr>
+              <a:defRPr>
+                <a:solidFill>
+                  <a:schemeClr val="dk1"/>
+                </a:solidFill>
+              </a:defRPr>
+            </a:lvl3pPr>
+            <a:lvl4pPr>
+              <a:defRPr>
+                <a:solidFill>
+                  <a:schemeClr val="dk1"/>
+                </a:solidFill>
+              </a:defRPr>
+            </a:lvl4pPr>
+            <a:lvl5pPr>
+              <a:defRPr>
+                <a:solidFill>
+                  <a:schemeClr val="dk1"/>
+                </a:solidFill>
+              </a:defRPr>
+            </a:lvl5pPr>
+            <a:lvl6pPr>
+              <a:defRPr>
+                <a:solidFill>
+                  <a:schemeClr val="dk1"/>
+                </a:solidFill>
+              </a:defRPr>
+            </a:lvl6pPr>
+            <a:lvl7pPr>
+              <a:defRPr>
+                <a:solidFill>
+                  <a:schemeClr val="dk1"/>
+                </a:solidFill>
+              </a:defRPr>
+            </a:lvl7pPr>
+            <a:lvl8pPr>
+              <a:defRPr>
+                <a:solidFill>
+                  <a:schemeClr val="dk1"/>
+                </a:solidFill>
+              </a:defRPr>
+            </a:lvl8pPr>
+            <a:lvl9pPr>
+              <a:defRPr>
+                <a:solidFill>
+                  <a:schemeClr val="dk1"/>
+                </a:solidFill>
+              </a:defRPr>
+            </a:lvl9pPr>
+          </a:lstStyle>
+          <a:p>
+            <a:pPr defTabSz="672130"/>
+            <a:r>
+              <a:rPr lang="en-US" sz="1176" b="0" dirty="0">
+                <a:solidFill>
+                  <a:prstClr val="black"/>
+                </a:solidFill>
+                <a:latin typeface="Simplon BP Bold" pitchFamily="2" charset="0"/>
+              </a:rPr>
+              <a:t>    </a:t>
+            </a:r>
+            <a:r>
+              <a:rPr lang="en-US" sz="1176" b="0" dirty="0" err="1">
+                <a:solidFill>
+                  <a:prstClr val="black"/>
+                </a:solidFill>
+                <a:latin typeface="Simplon BP Bold" pitchFamily="2" charset="0"/>
+              </a:rPr>
+              <a:t>Farol</a:t>
+            </a:r>
+            <a:r>
+              <a:rPr lang="en-US" sz="1176" b="0" dirty="0">
+                <a:solidFill>
+                  <a:prstClr val="black"/>
+                </a:solidFill>
+                <a:latin typeface="Simplon BP Bold" pitchFamily="2" charset="0"/>
+              </a:rPr>
+              <a:t> do </a:t>
+            </a:r>
+            <a:r>
+              <a:rPr lang="en-US" sz="1176" b="0" dirty="0" err="1">
+                <a:solidFill>
+                  <a:prstClr val="black"/>
+                </a:solidFill>
+                <a:latin typeface="Simplon BP Bold" pitchFamily="2" charset="0"/>
+              </a:rPr>
+              <a:t>Projeto</a:t>
+            </a:r>
+            <a:r>
+              <a:rPr lang="en-US" sz="1176" b="0" dirty="0">
+                <a:solidFill>
+                  <a:prstClr val="black"/>
+                </a:solidFill>
+                <a:latin typeface="Simplon BP Bold" pitchFamily="2" charset="0"/>
+              </a:rPr>
+              <a:t>   </a:t>
+            </a:r>
+          </a:p>
+        </p:txBody>
+      </p:sp>
+    </p:spTree>
+    <p:extLst>
+      <p:ext uri="{BB962C8B-B14F-4D97-AF65-F5344CB8AC3E}">
+        <p14:creationId xmlns:p14="http://schemas.microsoft.com/office/powerpoint/2010/main" val="1619437704"/>
       </p:ext>
     </p:extLst>
   </p:cSld>

</xml_diff>

<commit_message>
Doc: Att status report
</commit_message>
<xml_diff>
--- a/Documentação/EngenhariaDeSoftware/Mod_Status_Report-PI20202.pptx
+++ b/Documentação/EngenhariaDeSoftware/Mod_Status_Report-PI20202.pptx
@@ -7,10 +7,10 @@
     <p:sldMasterId id="2147483665" r:id="rId6"/>
   </p:sldMasterIdLst>
   <p:notesMasterIdLst>
-    <p:notesMasterId r:id="rId14"/>
+    <p:notesMasterId r:id="rId15"/>
   </p:notesMasterIdLst>
   <p:handoutMasterIdLst>
-    <p:handoutMasterId r:id="rId15"/>
+    <p:handoutMasterId r:id="rId16"/>
   </p:handoutMasterIdLst>
   <p:sldIdLst>
     <p:sldId id="256" r:id="rId7"/>
@@ -20,6 +20,7 @@
     <p:sldId id="473" r:id="rId11"/>
     <p:sldId id="474" r:id="rId12"/>
     <p:sldId id="475" r:id="rId13"/>
+    <p:sldId id="476" r:id="rId14"/>
   </p:sldIdLst>
   <p:sldSz cx="13442950" cy="7561263"/>
   <p:notesSz cx="7104063" cy="10234613"/>
@@ -134,6 +135,7 @@
             <p14:sldId id="473"/>
             <p14:sldId id="474"/>
             <p14:sldId id="475"/>
+            <p14:sldId id="476"/>
           </p14:sldIdLst>
         </p14:section>
       </p14:sectionLst>
@@ -247,7 +249,7 @@
             <a:fld id="{C3CD65D1-5C11-455D-9F9A-0E035F00A0DA}" type="datetimeFigureOut">
               <a:rPr lang="pt-BR" smtClean="0"/>
               <a:pPr/>
-              <a:t>22/09/2021</a:t>
+              <a:t>29/09/2021</a:t>
             </a:fld>
             <a:endParaRPr lang="pt-BR"/>
           </a:p>
@@ -415,7 +417,7 @@
             <a:fld id="{A05DA3EF-18EA-43DE-B1BB-402A3C558822}" type="datetimeFigureOut">
               <a:rPr lang="pt-BR" smtClean="0"/>
               <a:pPr/>
-              <a:t>22/09/2021</a:t>
+              <a:t>29/09/2021</a:t>
             </a:fld>
             <a:endParaRPr lang="pt-BR"/>
           </a:p>
@@ -1227,6 +1229,99 @@
     <p:extLst>
       <p:ext uri="{BB962C8B-B14F-4D97-AF65-F5344CB8AC3E}">
         <p14:creationId xmlns:p14="http://schemas.microsoft.com/office/powerpoint/2010/main" val="2015159838"/>
+      </p:ext>
+    </p:extLst>
+  </p:cSld>
+  <p:clrMapOvr>
+    <a:masterClrMapping/>
+  </p:clrMapOvr>
+</p:notes>
+</file>
+
+<file path=ppt/notesSlides/notesSlide7.xml><?xml version="1.0" encoding="utf-8"?>
+<p:notes xmlns:a="http://schemas.openxmlformats.org/drawingml/2006/main" xmlns:r="http://schemas.openxmlformats.org/officeDocument/2006/relationships" xmlns:p="http://schemas.openxmlformats.org/presentationml/2006/main">
+  <p:cSld>
+    <p:spTree>
+      <p:nvGrpSpPr>
+        <p:cNvPr id="1" name=""/>
+        <p:cNvGrpSpPr/>
+        <p:nvPr/>
+      </p:nvGrpSpPr>
+      <p:grpSpPr>
+        <a:xfrm>
+          <a:off x="0" y="0"/>
+          <a:ext cx="0" cy="0"/>
+          <a:chOff x="0" y="0"/>
+          <a:chExt cx="0" cy="0"/>
+        </a:xfrm>
+      </p:grpSpPr>
+      <p:sp>
+        <p:nvSpPr>
+          <p:cNvPr id="2" name="Slide Image Placeholder 1"/>
+          <p:cNvSpPr>
+            <a:spLocks noGrp="1" noRot="1" noChangeAspect="1"/>
+          </p:cNvSpPr>
+          <p:nvPr>
+            <p:ph type="sldImg"/>
+          </p:nvPr>
+        </p:nvSpPr>
+        <p:spPr/>
+      </p:sp>
+      <p:sp>
+        <p:nvSpPr>
+          <p:cNvPr id="3" name="Notes Placeholder 2"/>
+          <p:cNvSpPr>
+            <a:spLocks noGrp="1"/>
+          </p:cNvSpPr>
+          <p:nvPr>
+            <p:ph type="body" idx="1"/>
+          </p:nvPr>
+        </p:nvSpPr>
+        <p:spPr/>
+        <p:txBody>
+          <a:bodyPr/>
+          <a:lstStyle/>
+          <a:p>
+            <a:endParaRPr lang="en-US"/>
+          </a:p>
+        </p:txBody>
+      </p:sp>
+      <p:sp>
+        <p:nvSpPr>
+          <p:cNvPr id="4" name="Slide Number Placeholder 3"/>
+          <p:cNvSpPr>
+            <a:spLocks noGrp="1"/>
+          </p:cNvSpPr>
+          <p:nvPr>
+            <p:ph type="sldNum" sz="quarter" idx="10"/>
+          </p:nvPr>
+        </p:nvSpPr>
+        <p:spPr/>
+        <p:txBody>
+          <a:bodyPr/>
+          <a:lstStyle/>
+          <a:p>
+            <a:fld id="{B39AF3DB-B6A1-2444-9DD8-53D016F8E638}" type="slidenum">
+              <a:rPr lang="pt-BR" smtClean="0">
+                <a:solidFill>
+                  <a:prstClr val="black"/>
+                </a:solidFill>
+              </a:rPr>
+              <a:pPr/>
+              <a:t>8</a:t>
+            </a:fld>
+            <a:endParaRPr lang="pt-BR">
+              <a:solidFill>
+                <a:prstClr val="black"/>
+              </a:solidFill>
+            </a:endParaRPr>
+          </a:p>
+        </p:txBody>
+      </p:sp>
+    </p:spTree>
+    <p:extLst>
+      <p:ext uri="{BB962C8B-B14F-4D97-AF65-F5344CB8AC3E}">
+        <p14:creationId xmlns:p14="http://schemas.microsoft.com/office/powerpoint/2010/main" val="3181586481"/>
       </p:ext>
     </p:extLst>
   </p:cSld>
@@ -33146,6 +33241,1942 @@
     <p:extLst>
       <p:ext uri="{BB962C8B-B14F-4D97-AF65-F5344CB8AC3E}">
         <p14:creationId xmlns:p14="http://schemas.microsoft.com/office/powerpoint/2010/main" val="96222296"/>
+      </p:ext>
+    </p:extLst>
+  </p:cSld>
+  <p:clrMapOvr>
+    <a:masterClrMapping/>
+  </p:clrMapOvr>
+</p:sld>
+</file>
+
+<file path=ppt/slides/slide8.xml><?xml version="1.0" encoding="utf-8"?>
+<p:sld xmlns:a="http://schemas.openxmlformats.org/drawingml/2006/main" xmlns:r="http://schemas.openxmlformats.org/officeDocument/2006/relationships" xmlns:p="http://schemas.openxmlformats.org/presentationml/2006/main">
+  <p:cSld>
+    <p:spTree>
+      <p:nvGrpSpPr>
+        <p:cNvPr id="1" name=""/>
+        <p:cNvGrpSpPr/>
+        <p:nvPr/>
+      </p:nvGrpSpPr>
+      <p:grpSpPr>
+        <a:xfrm>
+          <a:off x="0" y="0"/>
+          <a:ext cx="0" cy="0"/>
+          <a:chOff x="0" y="0"/>
+          <a:chExt cx="0" cy="0"/>
+        </a:xfrm>
+      </p:grpSpPr>
+      <p:sp>
+        <p:nvSpPr>
+          <p:cNvPr id="43" name="Rectangle 42"/>
+          <p:cNvSpPr/>
+          <p:nvPr/>
+        </p:nvSpPr>
+        <p:spPr>
+          <a:xfrm>
+            <a:off x="6814576" y="1080752"/>
+            <a:ext cx="6209639" cy="2235805"/>
+          </a:xfrm>
+          <a:prstGeom prst="rect">
+            <a:avLst/>
+          </a:prstGeom>
+          <a:noFill/>
+          <a:ln w="12700">
+            <a:solidFill>
+              <a:schemeClr val="bg1">
+                <a:lumMod val="50000"/>
+              </a:schemeClr>
+            </a:solidFill>
+          </a:ln>
+        </p:spPr>
+        <p:style>
+          <a:lnRef idx="2">
+            <a:schemeClr val="accent4"/>
+          </a:lnRef>
+          <a:fillRef idx="1">
+            <a:schemeClr val="lt1"/>
+          </a:fillRef>
+          <a:effectRef idx="0">
+            <a:schemeClr val="accent4"/>
+          </a:effectRef>
+          <a:fontRef idx="minor">
+            <a:schemeClr val="dk1"/>
+          </a:fontRef>
+        </p:style>
+        <p:txBody>
+          <a:bodyPr tIns="105844" rtlCol="0" anchor="t"/>
+          <a:lstStyle/>
+          <a:p>
+            <a:pPr defTabSz="672130">
+              <a:spcAft>
+                <a:spcPts val="882"/>
+              </a:spcAft>
+            </a:pPr>
+            <a:endParaRPr lang="pt-BR" sz="1470" dirty="0">
+              <a:solidFill>
+                <a:schemeClr val="tx1"/>
+              </a:solidFill>
+              <a:latin typeface="Calibri" panose="020F0502020204030204" pitchFamily="34" charset="0"/>
+              <a:cs typeface="Simplon BP Regular"/>
+            </a:endParaRPr>
+          </a:p>
+        </p:txBody>
+      </p:sp>
+      <p:sp>
+        <p:nvSpPr>
+          <p:cNvPr id="3" name="Title 2"/>
+          <p:cNvSpPr>
+            <a:spLocks noGrp="1"/>
+          </p:cNvSpPr>
+          <p:nvPr>
+            <p:ph type="title"/>
+          </p:nvPr>
+        </p:nvSpPr>
+        <p:spPr>
+          <a:xfrm>
+            <a:off x="469692" y="185232"/>
+            <a:ext cx="12098020" cy="800352"/>
+          </a:xfrm>
+        </p:spPr>
+        <p:txBody>
+          <a:bodyPr vert="horz" wrap="square" lIns="105844" tIns="0" rIns="105844" bIns="0" numCol="1" anchor="t" anchorCtr="0" compatLnSpc="1">
+            <a:prstTxWarp prst="textNoShape">
+              <a:avLst/>
+            </a:prstTxWarp>
+            <a:noAutofit/>
+          </a:bodyPr>
+          <a:lstStyle/>
+          <a:p>
+            <a:pPr algn="l">
+              <a:spcAft>
+                <a:spcPts val="882"/>
+              </a:spcAft>
+            </a:pPr>
+            <a:r>
+              <a:rPr lang="en-US" sz="2646" dirty="0">
+                <a:solidFill>
+                  <a:prstClr val="black"/>
+                </a:solidFill>
+                <a:latin typeface="Simplon Oi Headline"/>
+                <a:cs typeface="Simplon Oi Headline"/>
+              </a:rPr>
+              <a:t>SEMANA 5 - 31/09/2021 – 06/10/2021</a:t>
+            </a:r>
+          </a:p>
+        </p:txBody>
+      </p:sp>
+      <p:sp>
+        <p:nvSpPr>
+          <p:cNvPr id="78" name="TextBox 118"/>
+          <p:cNvSpPr txBox="1"/>
+          <p:nvPr/>
+        </p:nvSpPr>
+        <p:spPr>
+          <a:xfrm>
+            <a:off x="11822773" y="576471"/>
+            <a:ext cx="899678" cy="179824"/>
+          </a:xfrm>
+          <a:prstGeom prst="rect">
+            <a:avLst/>
+          </a:prstGeom>
+          <a:noFill/>
+          <a:ln w="12700">
+            <a:noFill/>
+          </a:ln>
+        </p:spPr>
+        <p:style>
+          <a:lnRef idx="2">
+            <a:schemeClr val="accent4"/>
+          </a:lnRef>
+          <a:fillRef idx="1">
+            <a:schemeClr val="lt1"/>
+          </a:fillRef>
+          <a:effectRef idx="0">
+            <a:schemeClr val="accent4"/>
+          </a:effectRef>
+          <a:fontRef idx="minor">
+            <a:schemeClr val="dk1"/>
+          </a:fontRef>
+        </p:style>
+        <p:txBody>
+          <a:bodyPr wrap="none" lIns="52922" tIns="52922" rIns="52922" bIns="0" rtlCol="0" anchor="b"/>
+          <a:lstStyle>
+            <a:defPPr>
+              <a:defRPr lang="en-US"/>
+            </a:defPPr>
+            <a:lvl1pPr algn="ctr">
+              <a:defRPr sz="1000" b="1">
+                <a:latin typeface="Simplon BP Regular"/>
+                <a:cs typeface="Simplon BP Regular"/>
+              </a:defRPr>
+            </a:lvl1pPr>
+            <a:lvl2pPr>
+              <a:defRPr>
+                <a:solidFill>
+                  <a:schemeClr val="dk1"/>
+                </a:solidFill>
+              </a:defRPr>
+            </a:lvl2pPr>
+            <a:lvl3pPr>
+              <a:defRPr>
+                <a:solidFill>
+                  <a:schemeClr val="dk1"/>
+                </a:solidFill>
+              </a:defRPr>
+            </a:lvl3pPr>
+            <a:lvl4pPr>
+              <a:defRPr>
+                <a:solidFill>
+                  <a:schemeClr val="dk1"/>
+                </a:solidFill>
+              </a:defRPr>
+            </a:lvl4pPr>
+            <a:lvl5pPr>
+              <a:defRPr>
+                <a:solidFill>
+                  <a:schemeClr val="dk1"/>
+                </a:solidFill>
+              </a:defRPr>
+            </a:lvl5pPr>
+            <a:lvl6pPr>
+              <a:defRPr>
+                <a:solidFill>
+                  <a:schemeClr val="dk1"/>
+                </a:solidFill>
+              </a:defRPr>
+            </a:lvl6pPr>
+            <a:lvl7pPr>
+              <a:defRPr>
+                <a:solidFill>
+                  <a:schemeClr val="dk1"/>
+                </a:solidFill>
+              </a:defRPr>
+            </a:lvl7pPr>
+            <a:lvl8pPr>
+              <a:defRPr>
+                <a:solidFill>
+                  <a:schemeClr val="dk1"/>
+                </a:solidFill>
+              </a:defRPr>
+            </a:lvl8pPr>
+            <a:lvl9pPr>
+              <a:defRPr>
+                <a:solidFill>
+                  <a:schemeClr val="dk1"/>
+                </a:solidFill>
+              </a:defRPr>
+            </a:lvl9pPr>
+          </a:lstStyle>
+          <a:p>
+            <a:pPr defTabSz="672130"/>
+            <a:r>
+              <a:rPr lang="pt-BR" sz="1176" b="0" dirty="0">
+                <a:solidFill>
+                  <a:prstClr val="black"/>
+                </a:solidFill>
+                <a:latin typeface="Simplon BP Bold" pitchFamily="2" charset="0"/>
+              </a:rPr>
+              <a:t>Negócios</a:t>
+            </a:r>
+          </a:p>
+        </p:txBody>
+      </p:sp>
+      <p:sp>
+        <p:nvSpPr>
+          <p:cNvPr id="80" name="TextBox 123"/>
+          <p:cNvSpPr txBox="1"/>
+          <p:nvPr/>
+        </p:nvSpPr>
+        <p:spPr>
+          <a:xfrm>
+            <a:off x="10852497" y="576471"/>
+            <a:ext cx="899678" cy="179824"/>
+          </a:xfrm>
+          <a:prstGeom prst="rect">
+            <a:avLst/>
+          </a:prstGeom>
+          <a:noFill/>
+          <a:ln w="12700">
+            <a:noFill/>
+          </a:ln>
+        </p:spPr>
+        <p:style>
+          <a:lnRef idx="2">
+            <a:schemeClr val="accent4"/>
+          </a:lnRef>
+          <a:fillRef idx="1">
+            <a:schemeClr val="lt1"/>
+          </a:fillRef>
+          <a:effectRef idx="0">
+            <a:schemeClr val="accent4"/>
+          </a:effectRef>
+          <a:fontRef idx="minor">
+            <a:schemeClr val="dk1"/>
+          </a:fontRef>
+        </p:style>
+        <p:txBody>
+          <a:bodyPr wrap="none" lIns="52922" tIns="52922" rIns="52922" bIns="0" rtlCol="0" anchor="b"/>
+          <a:lstStyle>
+            <a:defPPr>
+              <a:defRPr lang="en-US"/>
+            </a:defPPr>
+            <a:lvl1pPr algn="ctr">
+              <a:defRPr sz="1000" b="1">
+                <a:latin typeface="Simplon BP Regular"/>
+                <a:cs typeface="Simplon BP Regular"/>
+              </a:defRPr>
+            </a:lvl1pPr>
+            <a:lvl2pPr>
+              <a:defRPr>
+                <a:solidFill>
+                  <a:schemeClr val="dk1"/>
+                </a:solidFill>
+              </a:defRPr>
+            </a:lvl2pPr>
+            <a:lvl3pPr>
+              <a:defRPr>
+                <a:solidFill>
+                  <a:schemeClr val="dk1"/>
+                </a:solidFill>
+              </a:defRPr>
+            </a:lvl3pPr>
+            <a:lvl4pPr>
+              <a:defRPr>
+                <a:solidFill>
+                  <a:schemeClr val="dk1"/>
+                </a:solidFill>
+              </a:defRPr>
+            </a:lvl4pPr>
+            <a:lvl5pPr>
+              <a:defRPr>
+                <a:solidFill>
+                  <a:schemeClr val="dk1"/>
+                </a:solidFill>
+              </a:defRPr>
+            </a:lvl5pPr>
+            <a:lvl6pPr>
+              <a:defRPr>
+                <a:solidFill>
+                  <a:schemeClr val="dk1"/>
+                </a:solidFill>
+              </a:defRPr>
+            </a:lvl6pPr>
+            <a:lvl7pPr>
+              <a:defRPr>
+                <a:solidFill>
+                  <a:schemeClr val="dk1"/>
+                </a:solidFill>
+              </a:defRPr>
+            </a:lvl7pPr>
+            <a:lvl8pPr>
+              <a:defRPr>
+                <a:solidFill>
+                  <a:schemeClr val="dk1"/>
+                </a:solidFill>
+              </a:defRPr>
+            </a:lvl8pPr>
+            <a:lvl9pPr>
+              <a:defRPr>
+                <a:solidFill>
+                  <a:schemeClr val="dk1"/>
+                </a:solidFill>
+              </a:defRPr>
+            </a:lvl9pPr>
+          </a:lstStyle>
+          <a:p>
+            <a:pPr defTabSz="672130"/>
+            <a:r>
+              <a:rPr lang="pt-BR" sz="1176" b="0" dirty="0">
+                <a:solidFill>
+                  <a:prstClr val="black"/>
+                </a:solidFill>
+                <a:latin typeface="Simplon BP Bold" pitchFamily="2" charset="0"/>
+              </a:rPr>
+              <a:t>Plataforma</a:t>
+            </a:r>
+          </a:p>
+        </p:txBody>
+      </p:sp>
+      <p:sp>
+        <p:nvSpPr>
+          <p:cNvPr id="82" name="TextBox 128"/>
+          <p:cNvSpPr txBox="1"/>
+          <p:nvPr/>
+        </p:nvSpPr>
+        <p:spPr>
+          <a:xfrm>
+            <a:off x="9854245" y="576471"/>
+            <a:ext cx="899678" cy="179824"/>
+          </a:xfrm>
+          <a:prstGeom prst="rect">
+            <a:avLst/>
+          </a:prstGeom>
+          <a:noFill/>
+          <a:ln w="12700">
+            <a:noFill/>
+          </a:ln>
+        </p:spPr>
+        <p:style>
+          <a:lnRef idx="2">
+            <a:schemeClr val="accent4"/>
+          </a:lnRef>
+          <a:fillRef idx="1">
+            <a:schemeClr val="lt1"/>
+          </a:fillRef>
+          <a:effectRef idx="0">
+            <a:schemeClr val="accent4"/>
+          </a:effectRef>
+          <a:fontRef idx="minor">
+            <a:schemeClr val="dk1"/>
+          </a:fontRef>
+        </p:style>
+        <p:txBody>
+          <a:bodyPr wrap="none" lIns="52922" tIns="52922" rIns="52922" bIns="0" rtlCol="0" anchor="b"/>
+          <a:lstStyle>
+            <a:defPPr>
+              <a:defRPr lang="en-US"/>
+            </a:defPPr>
+            <a:lvl1pPr algn="ctr">
+              <a:defRPr sz="1000" b="1">
+                <a:latin typeface="Simplon BP Regular"/>
+                <a:cs typeface="Simplon BP Regular"/>
+              </a:defRPr>
+            </a:lvl1pPr>
+            <a:lvl2pPr>
+              <a:defRPr>
+                <a:solidFill>
+                  <a:schemeClr val="dk1"/>
+                </a:solidFill>
+              </a:defRPr>
+            </a:lvl2pPr>
+            <a:lvl3pPr>
+              <a:defRPr>
+                <a:solidFill>
+                  <a:schemeClr val="dk1"/>
+                </a:solidFill>
+              </a:defRPr>
+            </a:lvl3pPr>
+            <a:lvl4pPr>
+              <a:defRPr>
+                <a:solidFill>
+                  <a:schemeClr val="dk1"/>
+                </a:solidFill>
+              </a:defRPr>
+            </a:lvl4pPr>
+            <a:lvl5pPr>
+              <a:defRPr>
+                <a:solidFill>
+                  <a:schemeClr val="dk1"/>
+                </a:solidFill>
+              </a:defRPr>
+            </a:lvl5pPr>
+            <a:lvl6pPr>
+              <a:defRPr>
+                <a:solidFill>
+                  <a:schemeClr val="dk1"/>
+                </a:solidFill>
+              </a:defRPr>
+            </a:lvl6pPr>
+            <a:lvl7pPr>
+              <a:defRPr>
+                <a:solidFill>
+                  <a:schemeClr val="dk1"/>
+                </a:solidFill>
+              </a:defRPr>
+            </a:lvl7pPr>
+            <a:lvl8pPr>
+              <a:defRPr>
+                <a:solidFill>
+                  <a:schemeClr val="dk1"/>
+                </a:solidFill>
+              </a:defRPr>
+            </a:lvl8pPr>
+            <a:lvl9pPr>
+              <a:defRPr>
+                <a:solidFill>
+                  <a:schemeClr val="dk1"/>
+                </a:solidFill>
+              </a:defRPr>
+            </a:lvl9pPr>
+          </a:lstStyle>
+          <a:p>
+            <a:pPr defTabSz="672130"/>
+            <a:r>
+              <a:rPr lang="pt-BR" sz="1176" b="0" dirty="0">
+                <a:solidFill>
+                  <a:prstClr val="black"/>
+                </a:solidFill>
+                <a:latin typeface="Simplon BP Bold" pitchFamily="2" charset="0"/>
+              </a:rPr>
+              <a:t>Back</a:t>
+            </a:r>
+          </a:p>
+        </p:txBody>
+      </p:sp>
+      <p:sp>
+        <p:nvSpPr>
+          <p:cNvPr id="84" name="TextBox 133"/>
+          <p:cNvSpPr txBox="1"/>
+          <p:nvPr/>
+        </p:nvSpPr>
+        <p:spPr>
+          <a:xfrm>
+            <a:off x="8934246" y="576471"/>
+            <a:ext cx="899678" cy="179824"/>
+          </a:xfrm>
+          <a:prstGeom prst="rect">
+            <a:avLst/>
+          </a:prstGeom>
+          <a:noFill/>
+          <a:ln w="12700">
+            <a:noFill/>
+          </a:ln>
+        </p:spPr>
+        <p:style>
+          <a:lnRef idx="2">
+            <a:schemeClr val="accent4"/>
+          </a:lnRef>
+          <a:fillRef idx="1">
+            <a:schemeClr val="lt1"/>
+          </a:fillRef>
+          <a:effectRef idx="0">
+            <a:schemeClr val="accent4"/>
+          </a:effectRef>
+          <a:fontRef idx="minor">
+            <a:schemeClr val="dk1"/>
+          </a:fontRef>
+        </p:style>
+        <p:txBody>
+          <a:bodyPr wrap="none" lIns="52922" tIns="52922" rIns="52922" bIns="0" rtlCol="0" anchor="b"/>
+          <a:lstStyle>
+            <a:defPPr>
+              <a:defRPr lang="en-US"/>
+            </a:defPPr>
+            <a:lvl1pPr algn="ctr">
+              <a:defRPr sz="1000" b="1">
+                <a:latin typeface="Simplon BP Regular"/>
+                <a:cs typeface="Simplon BP Regular"/>
+              </a:defRPr>
+            </a:lvl1pPr>
+            <a:lvl2pPr>
+              <a:defRPr>
+                <a:solidFill>
+                  <a:schemeClr val="dk1"/>
+                </a:solidFill>
+              </a:defRPr>
+            </a:lvl2pPr>
+            <a:lvl3pPr>
+              <a:defRPr>
+                <a:solidFill>
+                  <a:schemeClr val="dk1"/>
+                </a:solidFill>
+              </a:defRPr>
+            </a:lvl3pPr>
+            <a:lvl4pPr>
+              <a:defRPr>
+                <a:solidFill>
+                  <a:schemeClr val="dk1"/>
+                </a:solidFill>
+              </a:defRPr>
+            </a:lvl4pPr>
+            <a:lvl5pPr>
+              <a:defRPr>
+                <a:solidFill>
+                  <a:schemeClr val="dk1"/>
+                </a:solidFill>
+              </a:defRPr>
+            </a:lvl5pPr>
+            <a:lvl6pPr>
+              <a:defRPr>
+                <a:solidFill>
+                  <a:schemeClr val="dk1"/>
+                </a:solidFill>
+              </a:defRPr>
+            </a:lvl6pPr>
+            <a:lvl7pPr>
+              <a:defRPr>
+                <a:solidFill>
+                  <a:schemeClr val="dk1"/>
+                </a:solidFill>
+              </a:defRPr>
+            </a:lvl7pPr>
+            <a:lvl8pPr>
+              <a:defRPr>
+                <a:solidFill>
+                  <a:schemeClr val="dk1"/>
+                </a:solidFill>
+              </a:defRPr>
+            </a:lvl8pPr>
+            <a:lvl9pPr>
+              <a:defRPr>
+                <a:solidFill>
+                  <a:schemeClr val="dk1"/>
+                </a:solidFill>
+              </a:defRPr>
+            </a:lvl9pPr>
+          </a:lstStyle>
+          <a:p>
+            <a:pPr defTabSz="672130"/>
+            <a:r>
+              <a:rPr lang="pt-BR" sz="1176" b="0" dirty="0">
+                <a:solidFill>
+                  <a:prstClr val="black"/>
+                </a:solidFill>
+                <a:latin typeface="Simplon BP Bold" pitchFamily="2" charset="0"/>
+              </a:rPr>
+              <a:t>Front</a:t>
+            </a:r>
+          </a:p>
+        </p:txBody>
+      </p:sp>
+      <p:sp>
+        <p:nvSpPr>
+          <p:cNvPr id="88" name="Oval 134"/>
+          <p:cNvSpPr>
+            <a:spLocks noChangeAspect="1"/>
+          </p:cNvSpPr>
+          <p:nvPr/>
+        </p:nvSpPr>
+        <p:spPr>
+          <a:xfrm>
+            <a:off x="8443555" y="282529"/>
+            <a:ext cx="211404" cy="211689"/>
+          </a:xfrm>
+          <a:prstGeom prst="ellipse">
+            <a:avLst/>
+          </a:prstGeom>
+          <a:solidFill>
+            <a:srgbClr val="00B050"/>
+          </a:solidFill>
+          <a:ln w="12700">
+            <a:solidFill>
+              <a:schemeClr val="accent3"/>
+            </a:solidFill>
+          </a:ln>
+        </p:spPr>
+        <p:style>
+          <a:lnRef idx="2">
+            <a:schemeClr val="accent1">
+              <a:shade val="50000"/>
+            </a:schemeClr>
+          </a:lnRef>
+          <a:fillRef idx="1">
+            <a:schemeClr val="accent1"/>
+          </a:fillRef>
+          <a:effectRef idx="0">
+            <a:schemeClr val="accent1"/>
+          </a:effectRef>
+          <a:fontRef idx="minor">
+            <a:schemeClr val="lt1"/>
+          </a:fontRef>
+        </p:style>
+        <p:txBody>
+          <a:bodyPr wrap="none" lIns="52922" tIns="52922" rIns="52922" rtlCol="0" anchor="ctr"/>
+          <a:lstStyle/>
+          <a:p>
+            <a:pPr algn="ctr" defTabSz="672130"/>
+            <a:endParaRPr lang="en-US" sz="1176" dirty="0">
+              <a:solidFill>
+                <a:srgbClr val="FFFF00"/>
+              </a:solidFill>
+              <a:latin typeface="Simplon BP Regular"/>
+              <a:cs typeface="Simplon BP Regular"/>
+            </a:endParaRPr>
+          </a:p>
+        </p:txBody>
+      </p:sp>
+      <p:sp>
+        <p:nvSpPr>
+          <p:cNvPr id="86" name="TextBox 138"/>
+          <p:cNvSpPr txBox="1"/>
+          <p:nvPr/>
+        </p:nvSpPr>
+        <p:spPr>
+          <a:xfrm>
+            <a:off x="8126053" y="576471"/>
+            <a:ext cx="899678" cy="179824"/>
+          </a:xfrm>
+          <a:prstGeom prst="rect">
+            <a:avLst/>
+          </a:prstGeom>
+          <a:noFill/>
+          <a:ln w="12700">
+            <a:noFill/>
+          </a:ln>
+        </p:spPr>
+        <p:style>
+          <a:lnRef idx="2">
+            <a:schemeClr val="accent4"/>
+          </a:lnRef>
+          <a:fillRef idx="1">
+            <a:schemeClr val="lt1"/>
+          </a:fillRef>
+          <a:effectRef idx="0">
+            <a:schemeClr val="accent4"/>
+          </a:effectRef>
+          <a:fontRef idx="minor">
+            <a:schemeClr val="dk1"/>
+          </a:fontRef>
+        </p:style>
+        <p:txBody>
+          <a:bodyPr wrap="none" lIns="52922" tIns="52922" rIns="52922" bIns="0" rtlCol="0" anchor="b"/>
+          <a:lstStyle>
+            <a:defPPr>
+              <a:defRPr lang="en-US"/>
+            </a:defPPr>
+            <a:lvl1pPr algn="ctr">
+              <a:defRPr sz="1000" b="1">
+                <a:latin typeface="Simplon BP Regular"/>
+                <a:cs typeface="Simplon BP Regular"/>
+              </a:defRPr>
+            </a:lvl1pPr>
+            <a:lvl2pPr>
+              <a:defRPr>
+                <a:solidFill>
+                  <a:schemeClr val="dk1"/>
+                </a:solidFill>
+              </a:defRPr>
+            </a:lvl2pPr>
+            <a:lvl3pPr>
+              <a:defRPr>
+                <a:solidFill>
+                  <a:schemeClr val="dk1"/>
+                </a:solidFill>
+              </a:defRPr>
+            </a:lvl3pPr>
+            <a:lvl4pPr>
+              <a:defRPr>
+                <a:solidFill>
+                  <a:schemeClr val="dk1"/>
+                </a:solidFill>
+              </a:defRPr>
+            </a:lvl4pPr>
+            <a:lvl5pPr>
+              <a:defRPr>
+                <a:solidFill>
+                  <a:schemeClr val="dk1"/>
+                </a:solidFill>
+              </a:defRPr>
+            </a:lvl5pPr>
+            <a:lvl6pPr>
+              <a:defRPr>
+                <a:solidFill>
+                  <a:schemeClr val="dk1"/>
+                </a:solidFill>
+              </a:defRPr>
+            </a:lvl6pPr>
+            <a:lvl7pPr>
+              <a:defRPr>
+                <a:solidFill>
+                  <a:schemeClr val="dk1"/>
+                </a:solidFill>
+              </a:defRPr>
+            </a:lvl7pPr>
+            <a:lvl8pPr>
+              <a:defRPr>
+                <a:solidFill>
+                  <a:schemeClr val="dk1"/>
+                </a:solidFill>
+              </a:defRPr>
+            </a:lvl8pPr>
+            <a:lvl9pPr>
+              <a:defRPr>
+                <a:solidFill>
+                  <a:schemeClr val="dk1"/>
+                </a:solidFill>
+              </a:defRPr>
+            </a:lvl9pPr>
+          </a:lstStyle>
+          <a:p>
+            <a:pPr defTabSz="672130"/>
+            <a:r>
+              <a:rPr lang="en-US" sz="1176" b="0" dirty="0" err="1">
+                <a:solidFill>
+                  <a:prstClr val="black"/>
+                </a:solidFill>
+                <a:latin typeface="Simplon BP Bold" pitchFamily="2" charset="0"/>
+              </a:rPr>
+              <a:t>Equipe</a:t>
+            </a:r>
+            <a:endParaRPr lang="en-US" sz="1176" b="0" dirty="0">
+              <a:solidFill>
+                <a:prstClr val="black"/>
+              </a:solidFill>
+              <a:latin typeface="Simplon BP Bold" pitchFamily="2" charset="0"/>
+            </a:endParaRPr>
+          </a:p>
+        </p:txBody>
+      </p:sp>
+      <p:sp>
+        <p:nvSpPr>
+          <p:cNvPr id="64" name="Retângulo 63"/>
+          <p:cNvSpPr/>
+          <p:nvPr/>
+        </p:nvSpPr>
+        <p:spPr>
+          <a:xfrm>
+            <a:off x="512766" y="868345"/>
+            <a:ext cx="6186608" cy="238150"/>
+          </a:xfrm>
+          <a:prstGeom prst="rect">
+            <a:avLst/>
+          </a:prstGeom>
+          <a:solidFill>
+            <a:schemeClr val="bg1">
+              <a:lumMod val="85000"/>
+            </a:schemeClr>
+          </a:solidFill>
+        </p:spPr>
+        <p:txBody>
+          <a:bodyPr vert="horz" lIns="134422" tIns="67211" rIns="134422" bIns="67211" rtlCol="0" anchor="ctr"/>
+          <a:lstStyle/>
+          <a:p>
+            <a:pPr defTabSz="672130"/>
+            <a:r>
+              <a:rPr lang="en-US" sz="1544" dirty="0">
+                <a:latin typeface="Simplon Oi Headline" charset="0"/>
+                <a:ea typeface="Simplon Oi Headline" charset="0"/>
+                <a:cs typeface="Simplon Oi Headline" charset="0"/>
+              </a:rPr>
+              <a:t>PROGRESSOS</a:t>
+            </a:r>
+            <a:endParaRPr lang="pt-BR" sz="1544" dirty="0">
+              <a:latin typeface="Simplon Oi Headline" charset="0"/>
+              <a:ea typeface="Simplon Oi Headline" charset="0"/>
+              <a:cs typeface="Simplon Oi Headline" charset="0"/>
+            </a:endParaRPr>
+          </a:p>
+        </p:txBody>
+      </p:sp>
+      <p:sp>
+        <p:nvSpPr>
+          <p:cNvPr id="65" name="Retângulo 64"/>
+          <p:cNvSpPr/>
+          <p:nvPr/>
+        </p:nvSpPr>
+        <p:spPr>
+          <a:xfrm>
+            <a:off x="6814576" y="868345"/>
+            <a:ext cx="6194715" cy="238150"/>
+          </a:xfrm>
+          <a:prstGeom prst="rect">
+            <a:avLst/>
+          </a:prstGeom>
+          <a:solidFill>
+            <a:schemeClr val="bg1">
+              <a:lumMod val="85000"/>
+            </a:schemeClr>
+          </a:solidFill>
+        </p:spPr>
+        <p:txBody>
+          <a:bodyPr vert="horz" lIns="134422" tIns="67211" rIns="134422" bIns="67211" rtlCol="0" anchor="ctr"/>
+          <a:lstStyle/>
+          <a:p>
+            <a:pPr defTabSz="672130"/>
+            <a:r>
+              <a:rPr lang="pt-BR" sz="1544" dirty="0">
+                <a:latin typeface="Simplon Oi Headline" charset="0"/>
+                <a:ea typeface="Simplon Oi Headline" charset="0"/>
+                <a:cs typeface="Simplon Oi Headline" charset="0"/>
+              </a:rPr>
+              <a:t>Pontos atenção/ Principais Riscos</a:t>
+            </a:r>
+          </a:p>
+        </p:txBody>
+      </p:sp>
+      <p:sp>
+        <p:nvSpPr>
+          <p:cNvPr id="66" name="Retângulo 65"/>
+          <p:cNvSpPr/>
+          <p:nvPr/>
+        </p:nvSpPr>
+        <p:spPr>
+          <a:xfrm>
+            <a:off x="507536" y="3418875"/>
+            <a:ext cx="12505521" cy="238150"/>
+          </a:xfrm>
+          <a:prstGeom prst="rect">
+            <a:avLst/>
+          </a:prstGeom>
+          <a:solidFill>
+            <a:schemeClr val="bg1">
+              <a:lumMod val="85000"/>
+            </a:schemeClr>
+          </a:solidFill>
+        </p:spPr>
+        <p:txBody>
+          <a:bodyPr vert="horz" lIns="134422" tIns="67211" rIns="134422" bIns="67211" rtlCol="0" anchor="ctr"/>
+          <a:lstStyle/>
+          <a:p>
+            <a:pPr defTabSz="672130"/>
+            <a:r>
+              <a:rPr lang="pt-BR" sz="1544" dirty="0">
+                <a:latin typeface="Simplon Oi Headline" charset="0"/>
+                <a:ea typeface="Simplon Oi Headline" charset="0"/>
+                <a:cs typeface="Simplon Oi Headline" charset="0"/>
+              </a:rPr>
+              <a:t>Próximos Passos/ Decisões a tomar</a:t>
+            </a:r>
+          </a:p>
+        </p:txBody>
+      </p:sp>
+      <p:sp>
+        <p:nvSpPr>
+          <p:cNvPr id="63" name="Rectangle 37"/>
+          <p:cNvSpPr/>
+          <p:nvPr/>
+        </p:nvSpPr>
+        <p:spPr>
+          <a:xfrm>
+            <a:off x="496765" y="1106495"/>
+            <a:ext cx="6207777" cy="2235805"/>
+          </a:xfrm>
+          <a:prstGeom prst="rect">
+            <a:avLst/>
+          </a:prstGeom>
+          <a:noFill/>
+          <a:ln w="12700">
+            <a:solidFill>
+              <a:schemeClr val="bg1">
+                <a:lumMod val="50000"/>
+              </a:schemeClr>
+            </a:solidFill>
+          </a:ln>
+        </p:spPr>
+        <p:style>
+          <a:lnRef idx="2">
+            <a:schemeClr val="accent4"/>
+          </a:lnRef>
+          <a:fillRef idx="1">
+            <a:schemeClr val="lt1"/>
+          </a:fillRef>
+          <a:effectRef idx="0">
+            <a:schemeClr val="accent4"/>
+          </a:effectRef>
+          <a:fontRef idx="minor">
+            <a:schemeClr val="dk1"/>
+          </a:fontRef>
+        </p:style>
+        <p:txBody>
+          <a:bodyPr tIns="105844" rtlCol="0" anchor="t"/>
+          <a:lstStyle/>
+          <a:p>
+            <a:pPr marL="252049" lvl="1" indent="-252049">
+              <a:buFont typeface="Wingdings" panose="05000000000000000000" pitchFamily="2" charset="2"/>
+              <a:buChar char="§"/>
+            </a:pPr>
+            <a:r>
+              <a:rPr lang="pt-BR" sz="1323" b="1" dirty="0">
+                <a:solidFill>
+                  <a:schemeClr val="tx1"/>
+                </a:solidFill>
+                <a:latin typeface="Calibri" panose="020F0502020204030204" pitchFamily="34" charset="0"/>
+                <a:cs typeface="Simplon BP Regular"/>
+              </a:rPr>
+              <a:t>Começamos a Integração do back end com o front end(Tela Cadastro de livros)</a:t>
+            </a:r>
+          </a:p>
+          <a:p>
+            <a:pPr marL="252049" lvl="1" indent="-252049">
+              <a:buFont typeface="Wingdings" panose="05000000000000000000" pitchFamily="2" charset="2"/>
+              <a:buChar char="§"/>
+            </a:pPr>
+            <a:r>
+              <a:rPr lang="pt-BR" sz="1323" b="1" dirty="0">
+                <a:solidFill>
+                  <a:schemeClr val="tx1"/>
+                </a:solidFill>
+                <a:latin typeface="Calibri" panose="020F0502020204030204" pitchFamily="34" charset="0"/>
+                <a:cs typeface="Simplon BP Regular"/>
+              </a:rPr>
+              <a:t>Refinamos os end points de Cadastro de livros, cadastro de alunos e consulta de livros.</a:t>
+            </a:r>
+          </a:p>
+          <a:p>
+            <a:pPr marL="252049" lvl="1" indent="-252049">
+              <a:buFont typeface="Wingdings" panose="05000000000000000000" pitchFamily="2" charset="2"/>
+              <a:buChar char="§"/>
+            </a:pPr>
+            <a:r>
+              <a:rPr lang="pt-BR" sz="1323" b="1" dirty="0">
+                <a:solidFill>
+                  <a:schemeClr val="tx1"/>
+                </a:solidFill>
+                <a:latin typeface="Calibri" panose="020F0502020204030204" pitchFamily="34" charset="0"/>
+                <a:cs typeface="Simplon BP Regular"/>
+              </a:rPr>
+              <a:t>Terminamos integração back end com o Azure</a:t>
+            </a:r>
+          </a:p>
+          <a:p>
+            <a:pPr marL="252049" lvl="1" indent="-252049">
+              <a:buFont typeface="Wingdings" panose="05000000000000000000" pitchFamily="2" charset="2"/>
+              <a:buChar char="§"/>
+            </a:pPr>
+            <a:r>
+              <a:rPr lang="pt-BR" sz="1323" b="1" dirty="0">
+                <a:solidFill>
+                  <a:schemeClr val="tx1"/>
+                </a:solidFill>
+                <a:latin typeface="Calibri" panose="020F0502020204030204" pitchFamily="34" charset="0"/>
+                <a:cs typeface="Simplon BP Regular"/>
+              </a:rPr>
+              <a:t>Conclusão da estilização da tela de usuario</a:t>
+            </a:r>
+          </a:p>
+          <a:p>
+            <a:pPr marL="252049" lvl="1" indent="-252049">
+              <a:buFont typeface="Wingdings" panose="05000000000000000000" pitchFamily="2" charset="2"/>
+              <a:buChar char="§"/>
+            </a:pPr>
+            <a:r>
+              <a:rPr lang="pt-BR" sz="1323" b="1" dirty="0">
+                <a:solidFill>
+                  <a:schemeClr val="tx1"/>
+                </a:solidFill>
+                <a:latin typeface="Calibri" panose="020F0502020204030204" pitchFamily="34" charset="0"/>
+                <a:cs typeface="Simplon BP Regular"/>
+              </a:rPr>
+              <a:t>Começamos a integração do React no Header, Footer e sidenav</a:t>
+            </a:r>
+          </a:p>
+          <a:p>
+            <a:pPr marL="252049" lvl="1" indent="-252049">
+              <a:buFont typeface="Wingdings" panose="05000000000000000000" pitchFamily="2" charset="2"/>
+              <a:buChar char="§"/>
+            </a:pPr>
+            <a:r>
+              <a:rPr lang="pt-BR" sz="1323" b="1" dirty="0">
+                <a:solidFill>
+                  <a:schemeClr val="tx1"/>
+                </a:solidFill>
+                <a:latin typeface="Calibri" panose="020F0502020204030204" pitchFamily="34" charset="0"/>
+                <a:cs typeface="Simplon BP Regular"/>
+              </a:rPr>
+              <a:t>Terminamos </a:t>
+            </a:r>
+            <a:r>
+              <a:rPr lang="pt-BR" sz="1323" b="1">
+                <a:solidFill>
+                  <a:schemeClr val="tx1"/>
+                </a:solidFill>
+                <a:latin typeface="Calibri" panose="020F0502020204030204" pitchFamily="34" charset="0"/>
+                <a:cs typeface="Simplon BP Regular"/>
+              </a:rPr>
+              <a:t>o Gantt</a:t>
+            </a:r>
+          </a:p>
+          <a:p>
+            <a:pPr marL="252049" lvl="1" indent="-252049">
+              <a:buFont typeface="Wingdings" panose="05000000000000000000" pitchFamily="2" charset="2"/>
+              <a:buChar char="§"/>
+            </a:pPr>
+            <a:endParaRPr lang="pt-BR" sz="1323" b="1" dirty="0">
+              <a:solidFill>
+                <a:schemeClr val="tx1"/>
+              </a:solidFill>
+              <a:latin typeface="Calibri" panose="020F0502020204030204" pitchFamily="34" charset="0"/>
+              <a:cs typeface="Simplon BP Regular"/>
+            </a:endParaRPr>
+          </a:p>
+          <a:p>
+            <a:pPr marL="252049" lvl="1" indent="-252049">
+              <a:buFont typeface="Wingdings" panose="05000000000000000000" pitchFamily="2" charset="2"/>
+              <a:buChar char="§"/>
+            </a:pPr>
+            <a:endParaRPr lang="pt-BR" sz="1200" dirty="0">
+              <a:solidFill>
+                <a:schemeClr val="tx1"/>
+              </a:solidFill>
+              <a:latin typeface="Calibri" panose="020F0502020204030204" pitchFamily="34" charset="0"/>
+              <a:cs typeface="Simplon BP Regular"/>
+            </a:endParaRPr>
+          </a:p>
+          <a:p>
+            <a:pPr marL="252049" lvl="1" indent="-252049">
+              <a:buFont typeface="Wingdings" panose="05000000000000000000" pitchFamily="2" charset="2"/>
+              <a:buChar char="§"/>
+            </a:pPr>
+            <a:endParaRPr lang="pt-BR" sz="1200" dirty="0">
+              <a:solidFill>
+                <a:schemeClr val="tx1"/>
+              </a:solidFill>
+              <a:latin typeface="Calibri" panose="020F0502020204030204" pitchFamily="34" charset="0"/>
+              <a:cs typeface="Simplon BP Regular"/>
+            </a:endParaRPr>
+          </a:p>
+          <a:p>
+            <a:pPr marL="252049" lvl="1" indent="-252049">
+              <a:buFont typeface="Wingdings" panose="05000000000000000000" pitchFamily="2" charset="2"/>
+              <a:buChar char="§"/>
+            </a:pPr>
+            <a:endParaRPr lang="pt-BR" sz="1323" b="1" dirty="0">
+              <a:solidFill>
+                <a:schemeClr val="tx1"/>
+              </a:solidFill>
+              <a:latin typeface="Calibri" panose="020F0502020204030204" pitchFamily="34" charset="0"/>
+              <a:cs typeface="Simplon BP Regular"/>
+            </a:endParaRPr>
+          </a:p>
+          <a:p>
+            <a:pPr marL="0" lvl="1" defTabSz="672130"/>
+            <a:endParaRPr lang="pt-BR" sz="1600" b="1" dirty="0">
+              <a:solidFill>
+                <a:schemeClr val="tx1"/>
+              </a:solidFill>
+              <a:latin typeface="Calibri" panose="020F0502020204030204" pitchFamily="34" charset="0"/>
+              <a:cs typeface="Simplon BP Regular"/>
+            </a:endParaRPr>
+          </a:p>
+          <a:p>
+            <a:pPr marL="252049" lvl="1" indent="-252049" fontAlgn="base">
+              <a:spcBef>
+                <a:spcPct val="0"/>
+              </a:spcBef>
+              <a:buFont typeface="Wingdings" panose="05000000000000000000" pitchFamily="2" charset="2"/>
+              <a:buChar char="ü"/>
+              <a:defRPr/>
+            </a:pPr>
+            <a:endParaRPr lang="pt-BR" sz="1323" b="1" dirty="0">
+              <a:solidFill>
+                <a:schemeClr val="tx1"/>
+              </a:solidFill>
+              <a:latin typeface="Calibri" panose="020F0502020204030204" pitchFamily="34" charset="0"/>
+              <a:cs typeface="Simplon BP Regular"/>
+            </a:endParaRPr>
+          </a:p>
+          <a:p>
+            <a:pPr marL="252049" lvl="1" indent="-252049" fontAlgn="base">
+              <a:spcBef>
+                <a:spcPct val="0"/>
+              </a:spcBef>
+              <a:buFont typeface="Wingdings" panose="05000000000000000000" pitchFamily="2" charset="2"/>
+              <a:buChar char="ü"/>
+              <a:defRPr/>
+            </a:pPr>
+            <a:endParaRPr lang="pt-BR" sz="1323" b="1" dirty="0">
+              <a:solidFill>
+                <a:schemeClr val="tx1"/>
+              </a:solidFill>
+              <a:latin typeface="Calibri" panose="020F0502020204030204" pitchFamily="34" charset="0"/>
+              <a:cs typeface="Simplon BP Regular"/>
+            </a:endParaRPr>
+          </a:p>
+          <a:p>
+            <a:pPr marL="252049" lvl="1" indent="-252049" fontAlgn="base">
+              <a:spcBef>
+                <a:spcPct val="0"/>
+              </a:spcBef>
+              <a:buFont typeface="Wingdings" panose="05000000000000000000" pitchFamily="2" charset="2"/>
+              <a:buChar char="ü"/>
+              <a:defRPr/>
+            </a:pPr>
+            <a:endParaRPr lang="pt-BR" sz="1323" b="1" dirty="0">
+              <a:solidFill>
+                <a:schemeClr val="tx1"/>
+              </a:solidFill>
+              <a:latin typeface="Calibri" panose="020F0502020204030204" pitchFamily="34" charset="0"/>
+              <a:cs typeface="Simplon BP Regular"/>
+            </a:endParaRPr>
+          </a:p>
+          <a:p>
+            <a:pPr marL="252049" indent="-252049" fontAlgn="base">
+              <a:spcBef>
+                <a:spcPct val="0"/>
+              </a:spcBef>
+              <a:buFont typeface="Wingdings" panose="05000000000000000000" pitchFamily="2" charset="2"/>
+              <a:buChar char="ü"/>
+              <a:defRPr/>
+            </a:pPr>
+            <a:endParaRPr lang="pt-BR" sz="1323" b="1" dirty="0">
+              <a:solidFill>
+                <a:schemeClr val="tx1"/>
+              </a:solidFill>
+              <a:latin typeface="Calibri" panose="020F0502020204030204" pitchFamily="34" charset="0"/>
+              <a:cs typeface="Simplon BP Regular"/>
+            </a:endParaRPr>
+          </a:p>
+          <a:p>
+            <a:pPr marL="252049" indent="-252049" fontAlgn="base">
+              <a:spcBef>
+                <a:spcPct val="0"/>
+              </a:spcBef>
+              <a:buFont typeface="Wingdings" panose="05000000000000000000" pitchFamily="2" charset="2"/>
+              <a:buChar char="ü"/>
+              <a:defRPr/>
+            </a:pPr>
+            <a:endParaRPr lang="pt-BR" sz="1323" b="1" dirty="0">
+              <a:solidFill>
+                <a:schemeClr val="tx1"/>
+              </a:solidFill>
+              <a:latin typeface="Calibri" panose="020F0502020204030204" pitchFamily="34" charset="0"/>
+              <a:cs typeface="Simplon BP Regular"/>
+            </a:endParaRPr>
+          </a:p>
+        </p:txBody>
+      </p:sp>
+      <p:sp>
+        <p:nvSpPr>
+          <p:cNvPr id="2" name="Rectangle 43">
+            <a:extLst>
+              <a:ext uri="{FF2B5EF4-FFF2-40B4-BE49-F238E27FC236}">
+                <a16:creationId xmlns:a16="http://schemas.microsoft.com/office/drawing/2014/main" id="{B15BA19F-C787-4E6A-ADAB-C0DFF09C66A8}"/>
+              </a:ext>
+            </a:extLst>
+          </p:cNvPr>
+          <p:cNvSpPr>
+            <a:spLocks/>
+          </p:cNvSpPr>
+          <p:nvPr/>
+        </p:nvSpPr>
+        <p:spPr>
+          <a:xfrm>
+            <a:off x="496765" y="3657025"/>
+            <a:ext cx="12496524" cy="3833059"/>
+          </a:xfrm>
+          <a:prstGeom prst="rect">
+            <a:avLst/>
+          </a:prstGeom>
+          <a:noFill/>
+          <a:ln w="12700">
+            <a:solidFill>
+              <a:schemeClr val="bg1">
+                <a:lumMod val="50000"/>
+              </a:schemeClr>
+            </a:solidFill>
+          </a:ln>
+        </p:spPr>
+        <p:style>
+          <a:lnRef idx="2">
+            <a:schemeClr val="accent4"/>
+          </a:lnRef>
+          <a:fillRef idx="1">
+            <a:schemeClr val="lt1"/>
+          </a:fillRef>
+          <a:effectRef idx="0">
+            <a:schemeClr val="accent4"/>
+          </a:effectRef>
+          <a:fontRef idx="minor">
+            <a:schemeClr val="dk1"/>
+          </a:fontRef>
+        </p:style>
+        <p:txBody>
+          <a:bodyPr wrap="square" tIns="105844" numCol="3" rtlCol="0" anchor="ctr"/>
+          <a:lstStyle/>
+          <a:p>
+            <a:pPr marL="0" lvl="1" defTabSz="672130"/>
+            <a:r>
+              <a:rPr lang="pt-BR" sz="1323" b="1" dirty="0">
+                <a:solidFill>
+                  <a:schemeClr val="tx1"/>
+                </a:solidFill>
+                <a:latin typeface="Calibri" panose="020F0502020204030204" pitchFamily="34" charset="0"/>
+                <a:cs typeface="Simplon BP Regular"/>
+              </a:rPr>
+              <a:t>Frente Plataforma</a:t>
+            </a:r>
+          </a:p>
+          <a:p>
+            <a:pPr marL="0" lvl="1" defTabSz="672130"/>
+            <a:endParaRPr lang="pt-BR" sz="1323" b="1" dirty="0">
+              <a:solidFill>
+                <a:schemeClr val="tx1"/>
+              </a:solidFill>
+              <a:latin typeface="Calibri" panose="020F0502020204030204" pitchFamily="34" charset="0"/>
+              <a:cs typeface="Simplon BP Regular"/>
+            </a:endParaRPr>
+          </a:p>
+          <a:p>
+            <a:pPr marL="0" lvl="1" defTabSz="672130"/>
+            <a:r>
+              <a:rPr lang="pt-BR" sz="1323" b="1" dirty="0">
+                <a:solidFill>
+                  <a:schemeClr val="tx1"/>
+                </a:solidFill>
+                <a:latin typeface="Calibri" panose="020F0502020204030204" pitchFamily="34" charset="0"/>
+                <a:cs typeface="Simplon BP Regular"/>
+              </a:rPr>
+              <a:t>Frente Backend</a:t>
+            </a:r>
+          </a:p>
+          <a:p>
+            <a:pPr marL="285750" lvl="1" indent="-285750" defTabSz="672130">
+              <a:buFont typeface="Arial" panose="020B0604020202020204" pitchFamily="34" charset="0"/>
+              <a:buChar char="•"/>
+            </a:pPr>
+            <a:r>
+              <a:rPr lang="pt-BR" sz="1323" dirty="0">
+                <a:solidFill>
+                  <a:schemeClr val="tx1"/>
+                </a:solidFill>
+                <a:latin typeface="Calibri" panose="020F0502020204030204" pitchFamily="34" charset="0"/>
+                <a:cs typeface="Simplon BP Regular"/>
+              </a:rPr>
+              <a:t>Alinhar back end com o diagrama de classes</a:t>
+            </a:r>
+          </a:p>
+          <a:p>
+            <a:pPr marL="285750" lvl="1" indent="-285750" defTabSz="672130">
+              <a:buFont typeface="Arial" panose="020B0604020202020204" pitchFamily="34" charset="0"/>
+              <a:buChar char="•"/>
+            </a:pPr>
+            <a:endParaRPr lang="pt-BR" sz="1323" b="1" dirty="0">
+              <a:solidFill>
+                <a:schemeClr val="tx1"/>
+              </a:solidFill>
+              <a:latin typeface="Calibri" panose="020F0502020204030204" pitchFamily="34" charset="0"/>
+              <a:cs typeface="Simplon BP Regular"/>
+            </a:endParaRPr>
+          </a:p>
+          <a:p>
+            <a:pPr marL="0" lvl="1" defTabSz="672130"/>
+            <a:r>
+              <a:rPr lang="pt-BR" sz="1323" b="1" dirty="0">
+                <a:solidFill>
+                  <a:schemeClr val="tx1"/>
+                </a:solidFill>
+                <a:latin typeface="Calibri" panose="020F0502020204030204" pitchFamily="34" charset="0"/>
+                <a:cs typeface="Simplon BP Regular"/>
+              </a:rPr>
+              <a:t>Frente Front end</a:t>
+            </a:r>
+            <a:endParaRPr lang="pt-BR" sz="1200" dirty="0">
+              <a:solidFill>
+                <a:schemeClr val="tx1"/>
+              </a:solidFill>
+              <a:latin typeface="Calibri" panose="020F0502020204030204" pitchFamily="34" charset="0"/>
+              <a:cs typeface="Simplon BP Regular"/>
+            </a:endParaRPr>
+          </a:p>
+          <a:p>
+            <a:pPr marL="285750" lvl="1" indent="-285750" defTabSz="672130">
+              <a:buFont typeface="Arial" panose="020B0604020202020204" pitchFamily="34" charset="0"/>
+              <a:buChar char="•"/>
+            </a:pPr>
+            <a:r>
+              <a:rPr lang="pt-BR" sz="1323" dirty="0">
+                <a:solidFill>
+                  <a:schemeClr val="tx1"/>
+                </a:solidFill>
+                <a:latin typeface="Calibri" panose="020F0502020204030204" pitchFamily="34" charset="0"/>
+                <a:cs typeface="Simplon BP Regular"/>
+              </a:rPr>
+              <a:t>Terminar a integração do React no Header, Footer e sidenav</a:t>
+            </a:r>
+          </a:p>
+          <a:p>
+            <a:pPr marL="285750" lvl="1" indent="-285750" defTabSz="672130">
+              <a:buFont typeface="Arial" panose="020B0604020202020204" pitchFamily="34" charset="0"/>
+              <a:buChar char="•"/>
+            </a:pPr>
+            <a:r>
+              <a:rPr lang="pt-BR" sz="1323" dirty="0">
+                <a:solidFill>
+                  <a:schemeClr val="tx1"/>
+                </a:solidFill>
+                <a:latin typeface="Calibri" panose="020F0502020204030204" pitchFamily="34" charset="0"/>
+                <a:cs typeface="Simplon BP Regular"/>
+              </a:rPr>
+              <a:t>Integração com o back end</a:t>
+            </a:r>
+          </a:p>
+          <a:p>
+            <a:pPr marL="0" lvl="1" defTabSz="672130"/>
+            <a:endParaRPr lang="pt-BR" sz="1600" b="1" dirty="0">
+              <a:solidFill>
+                <a:schemeClr val="tx1"/>
+              </a:solidFill>
+              <a:latin typeface="Calibri" panose="020F0502020204030204" pitchFamily="34" charset="0"/>
+              <a:cs typeface="Simplon BP Regular"/>
+            </a:endParaRPr>
+          </a:p>
+          <a:p>
+            <a:pPr marL="0" lvl="1" defTabSz="672130"/>
+            <a:r>
+              <a:rPr lang="pt-BR" sz="1400" b="1" dirty="0">
+                <a:solidFill>
+                  <a:schemeClr val="tx1"/>
+                </a:solidFill>
+                <a:latin typeface="Calibri" panose="020F0502020204030204" pitchFamily="34" charset="0"/>
+                <a:cs typeface="Simplon BP Regular"/>
+              </a:rPr>
+              <a:t>Frente Negócios</a:t>
+            </a:r>
+            <a:r>
+              <a:rPr lang="pt-BR" sz="1400" dirty="0">
+                <a:solidFill>
+                  <a:schemeClr val="tx1"/>
+                </a:solidFill>
+                <a:latin typeface="Calibri" panose="020F0502020204030204" pitchFamily="34" charset="0"/>
+                <a:cs typeface="Simplon BP Regular"/>
+              </a:rPr>
+              <a:t>;</a:t>
+            </a:r>
+          </a:p>
+          <a:p>
+            <a:pPr marL="0" lvl="1"/>
+            <a:endParaRPr lang="pt-BR" sz="1400" b="1" dirty="0">
+              <a:solidFill>
+                <a:schemeClr val="tx1"/>
+              </a:solidFill>
+              <a:latin typeface="Calibri" panose="020F0502020204030204" pitchFamily="34" charset="0"/>
+              <a:cs typeface="Simplon BP Regular"/>
+            </a:endParaRPr>
+          </a:p>
+          <a:p>
+            <a:pPr marL="0" lvl="1"/>
+            <a:r>
+              <a:rPr lang="pt-BR" sz="1400" b="1" dirty="0">
+                <a:solidFill>
+                  <a:schemeClr val="tx1"/>
+                </a:solidFill>
+                <a:latin typeface="Calibri" panose="020F0502020204030204" pitchFamily="34" charset="0"/>
+                <a:cs typeface="Simplon BP Regular"/>
+              </a:rPr>
+              <a:t>Frente Gestão Organizacional</a:t>
+            </a:r>
+          </a:p>
+          <a:p>
+            <a:pPr marL="285750" lvl="1" indent="-285750">
+              <a:buFont typeface="Arial" panose="020B0604020202020204" pitchFamily="34" charset="0"/>
+              <a:buChar char="•"/>
+            </a:pPr>
+            <a:r>
+              <a:rPr lang="pt-BR" sz="1400" dirty="0">
+                <a:solidFill>
+                  <a:schemeClr val="tx1"/>
+                </a:solidFill>
+                <a:latin typeface="Calibri" panose="020F0502020204030204" pitchFamily="34" charset="0"/>
+                <a:cs typeface="Simplon BP Regular"/>
+              </a:rPr>
+              <a:t>Começar desenho de arquitetura</a:t>
+            </a:r>
+          </a:p>
+        </p:txBody>
+      </p:sp>
+      <p:sp>
+        <p:nvSpPr>
+          <p:cNvPr id="6" name="Oval 134">
+            <a:extLst>
+              <a:ext uri="{FF2B5EF4-FFF2-40B4-BE49-F238E27FC236}">
+                <a16:creationId xmlns:a16="http://schemas.microsoft.com/office/drawing/2014/main" id="{70825C6F-9257-4CF5-8C62-1CA1EB2F8815}"/>
+              </a:ext>
+            </a:extLst>
+          </p:cNvPr>
+          <p:cNvSpPr>
+            <a:spLocks noChangeAspect="1"/>
+          </p:cNvSpPr>
+          <p:nvPr/>
+        </p:nvSpPr>
+        <p:spPr>
+          <a:xfrm>
+            <a:off x="9225955" y="282529"/>
+            <a:ext cx="211404" cy="211689"/>
+          </a:xfrm>
+          <a:prstGeom prst="ellipse">
+            <a:avLst/>
+          </a:prstGeom>
+          <a:solidFill>
+            <a:srgbClr val="00B050"/>
+          </a:solidFill>
+          <a:ln w="12700">
+            <a:solidFill>
+              <a:schemeClr val="accent3"/>
+            </a:solidFill>
+          </a:ln>
+        </p:spPr>
+        <p:style>
+          <a:lnRef idx="2">
+            <a:schemeClr val="accent1">
+              <a:shade val="50000"/>
+            </a:schemeClr>
+          </a:lnRef>
+          <a:fillRef idx="1">
+            <a:schemeClr val="accent1"/>
+          </a:fillRef>
+          <a:effectRef idx="0">
+            <a:schemeClr val="accent1"/>
+          </a:effectRef>
+          <a:fontRef idx="minor">
+            <a:schemeClr val="lt1"/>
+          </a:fontRef>
+        </p:style>
+        <p:txBody>
+          <a:bodyPr wrap="none" lIns="52922" tIns="52922" rIns="52922" rtlCol="0" anchor="ctr"/>
+          <a:lstStyle/>
+          <a:p>
+            <a:pPr algn="ctr" defTabSz="672130"/>
+            <a:endParaRPr lang="en-US" sz="1176" dirty="0">
+              <a:solidFill>
+                <a:prstClr val="black"/>
+              </a:solidFill>
+              <a:latin typeface="Simplon BP Regular"/>
+              <a:cs typeface="Simplon BP Regular"/>
+            </a:endParaRPr>
+          </a:p>
+        </p:txBody>
+      </p:sp>
+      <p:sp>
+        <p:nvSpPr>
+          <p:cNvPr id="9" name="Oval 134">
+            <a:extLst>
+              <a:ext uri="{FF2B5EF4-FFF2-40B4-BE49-F238E27FC236}">
+                <a16:creationId xmlns:a16="http://schemas.microsoft.com/office/drawing/2014/main" id="{B60B13C9-0C70-4C0F-82B2-D0CD4FDFC1F0}"/>
+              </a:ext>
+            </a:extLst>
+          </p:cNvPr>
+          <p:cNvSpPr>
+            <a:spLocks noChangeAspect="1"/>
+          </p:cNvSpPr>
+          <p:nvPr/>
+        </p:nvSpPr>
+        <p:spPr>
+          <a:xfrm>
+            <a:off x="12155999" y="278623"/>
+            <a:ext cx="211404" cy="211689"/>
+          </a:xfrm>
+          <a:prstGeom prst="ellipse">
+            <a:avLst/>
+          </a:prstGeom>
+          <a:solidFill>
+            <a:srgbClr val="00B050"/>
+          </a:solidFill>
+          <a:ln w="12700">
+            <a:solidFill>
+              <a:schemeClr val="accent3"/>
+            </a:solidFill>
+          </a:ln>
+        </p:spPr>
+        <p:style>
+          <a:lnRef idx="2">
+            <a:schemeClr val="accent1">
+              <a:shade val="50000"/>
+            </a:schemeClr>
+          </a:lnRef>
+          <a:fillRef idx="1">
+            <a:schemeClr val="accent1"/>
+          </a:fillRef>
+          <a:effectRef idx="0">
+            <a:schemeClr val="accent1"/>
+          </a:effectRef>
+          <a:fontRef idx="minor">
+            <a:schemeClr val="lt1"/>
+          </a:fontRef>
+        </p:style>
+        <p:txBody>
+          <a:bodyPr wrap="none" lIns="52922" tIns="52922" rIns="52922" rtlCol="0" anchor="ctr"/>
+          <a:lstStyle/>
+          <a:p>
+            <a:pPr algn="ctr" defTabSz="672130"/>
+            <a:endParaRPr lang="en-US" sz="1176" dirty="0">
+              <a:solidFill>
+                <a:prstClr val="black"/>
+              </a:solidFill>
+              <a:latin typeface="Simplon BP Regular"/>
+              <a:cs typeface="Simplon BP Regular"/>
+            </a:endParaRPr>
+          </a:p>
+        </p:txBody>
+      </p:sp>
+      <p:sp>
+        <p:nvSpPr>
+          <p:cNvPr id="5" name="Retângulo 4">
+            <a:extLst>
+              <a:ext uri="{FF2B5EF4-FFF2-40B4-BE49-F238E27FC236}">
+                <a16:creationId xmlns:a16="http://schemas.microsoft.com/office/drawing/2014/main" id="{A1C14918-6027-46B3-96BF-C5F7FDEC3276}"/>
+              </a:ext>
+            </a:extLst>
+          </p:cNvPr>
+          <p:cNvSpPr/>
+          <p:nvPr/>
+        </p:nvSpPr>
+        <p:spPr>
+          <a:xfrm>
+            <a:off x="8017619" y="180231"/>
+            <a:ext cx="4937689" cy="618769"/>
+          </a:xfrm>
+          <a:prstGeom prst="rect">
+            <a:avLst/>
+          </a:prstGeom>
+          <a:noFill/>
+          <a:ln w="6350">
+            <a:solidFill>
+              <a:schemeClr val="bg1">
+                <a:lumMod val="75000"/>
+              </a:schemeClr>
+            </a:solidFill>
+          </a:ln>
+        </p:spPr>
+        <p:style>
+          <a:lnRef idx="2">
+            <a:schemeClr val="accent1">
+              <a:shade val="50000"/>
+            </a:schemeClr>
+          </a:lnRef>
+          <a:fillRef idx="1">
+            <a:schemeClr val="accent1"/>
+          </a:fillRef>
+          <a:effectRef idx="0">
+            <a:schemeClr val="accent1"/>
+          </a:effectRef>
+          <a:fontRef idx="minor">
+            <a:schemeClr val="lt1"/>
+          </a:fontRef>
+        </p:style>
+        <p:txBody>
+          <a:bodyPr rtlCol="0" anchor="ctr"/>
+          <a:lstStyle/>
+          <a:p>
+            <a:pPr algn="ctr"/>
+            <a:endParaRPr lang="pt-BR"/>
+          </a:p>
+        </p:txBody>
+      </p:sp>
+      <p:sp>
+        <p:nvSpPr>
+          <p:cNvPr id="8" name="TextBox 138">
+            <a:extLst>
+              <a:ext uri="{FF2B5EF4-FFF2-40B4-BE49-F238E27FC236}">
+                <a16:creationId xmlns:a16="http://schemas.microsoft.com/office/drawing/2014/main" id="{5CE7D08C-795B-4BF1-97F6-F9773F4E9F4C}"/>
+              </a:ext>
+            </a:extLst>
+          </p:cNvPr>
+          <p:cNvSpPr txBox="1"/>
+          <p:nvPr/>
+        </p:nvSpPr>
+        <p:spPr>
+          <a:xfrm>
+            <a:off x="9747419" y="-22583"/>
+            <a:ext cx="1478088" cy="211688"/>
+          </a:xfrm>
+          <a:prstGeom prst="rect">
+            <a:avLst/>
+          </a:prstGeom>
+          <a:solidFill>
+            <a:schemeClr val="bg1"/>
+          </a:solidFill>
+          <a:ln w="12700">
+            <a:noFill/>
+          </a:ln>
+        </p:spPr>
+        <p:style>
+          <a:lnRef idx="2">
+            <a:schemeClr val="accent4"/>
+          </a:lnRef>
+          <a:fillRef idx="1">
+            <a:schemeClr val="lt1"/>
+          </a:fillRef>
+          <a:effectRef idx="0">
+            <a:schemeClr val="accent4"/>
+          </a:effectRef>
+          <a:fontRef idx="minor">
+            <a:schemeClr val="dk1"/>
+          </a:fontRef>
+        </p:style>
+        <p:txBody>
+          <a:bodyPr wrap="none" lIns="52922" tIns="52922" rIns="52922" bIns="0" rtlCol="0" anchor="b"/>
+          <a:lstStyle>
+            <a:defPPr>
+              <a:defRPr lang="en-US"/>
+            </a:defPPr>
+            <a:lvl1pPr algn="ctr">
+              <a:defRPr sz="1000" b="1">
+                <a:latin typeface="Simplon BP Regular"/>
+                <a:cs typeface="Simplon BP Regular"/>
+              </a:defRPr>
+            </a:lvl1pPr>
+            <a:lvl2pPr>
+              <a:defRPr>
+                <a:solidFill>
+                  <a:schemeClr val="dk1"/>
+                </a:solidFill>
+              </a:defRPr>
+            </a:lvl2pPr>
+            <a:lvl3pPr>
+              <a:defRPr>
+                <a:solidFill>
+                  <a:schemeClr val="dk1"/>
+                </a:solidFill>
+              </a:defRPr>
+            </a:lvl3pPr>
+            <a:lvl4pPr>
+              <a:defRPr>
+                <a:solidFill>
+                  <a:schemeClr val="dk1"/>
+                </a:solidFill>
+              </a:defRPr>
+            </a:lvl4pPr>
+            <a:lvl5pPr>
+              <a:defRPr>
+                <a:solidFill>
+                  <a:schemeClr val="dk1"/>
+                </a:solidFill>
+              </a:defRPr>
+            </a:lvl5pPr>
+            <a:lvl6pPr>
+              <a:defRPr>
+                <a:solidFill>
+                  <a:schemeClr val="dk1"/>
+                </a:solidFill>
+              </a:defRPr>
+            </a:lvl6pPr>
+            <a:lvl7pPr>
+              <a:defRPr>
+                <a:solidFill>
+                  <a:schemeClr val="dk1"/>
+                </a:solidFill>
+              </a:defRPr>
+            </a:lvl7pPr>
+            <a:lvl8pPr>
+              <a:defRPr>
+                <a:solidFill>
+                  <a:schemeClr val="dk1"/>
+                </a:solidFill>
+              </a:defRPr>
+            </a:lvl8pPr>
+            <a:lvl9pPr>
+              <a:defRPr>
+                <a:solidFill>
+                  <a:schemeClr val="dk1"/>
+                </a:solidFill>
+              </a:defRPr>
+            </a:lvl9pPr>
+          </a:lstStyle>
+          <a:p>
+            <a:pPr defTabSz="672130"/>
+            <a:r>
+              <a:rPr lang="en-US" sz="1176" b="0" dirty="0">
+                <a:solidFill>
+                  <a:prstClr val="black"/>
+                </a:solidFill>
+                <a:latin typeface="Simplon BP Bold" pitchFamily="2" charset="0"/>
+              </a:rPr>
+              <a:t>    </a:t>
+            </a:r>
+            <a:r>
+              <a:rPr lang="en-US" sz="1176" b="0" dirty="0" err="1">
+                <a:solidFill>
+                  <a:prstClr val="black"/>
+                </a:solidFill>
+                <a:latin typeface="Simplon BP Bold" pitchFamily="2" charset="0"/>
+              </a:rPr>
+              <a:t>Farol</a:t>
+            </a:r>
+            <a:r>
+              <a:rPr lang="en-US" sz="1176" b="0" dirty="0">
+                <a:solidFill>
+                  <a:prstClr val="black"/>
+                </a:solidFill>
+                <a:latin typeface="Simplon BP Bold" pitchFamily="2" charset="0"/>
+              </a:rPr>
+              <a:t> do </a:t>
+            </a:r>
+            <a:r>
+              <a:rPr lang="en-US" sz="1176" b="0" dirty="0" err="1">
+                <a:solidFill>
+                  <a:prstClr val="black"/>
+                </a:solidFill>
+                <a:latin typeface="Simplon BP Bold" pitchFamily="2" charset="0"/>
+              </a:rPr>
+              <a:t>Projeto</a:t>
+            </a:r>
+            <a:r>
+              <a:rPr lang="en-US" sz="1176" b="0" dirty="0">
+                <a:solidFill>
+                  <a:prstClr val="black"/>
+                </a:solidFill>
+                <a:latin typeface="Simplon BP Bold" pitchFamily="2" charset="0"/>
+              </a:rPr>
+              <a:t>   </a:t>
+            </a:r>
+          </a:p>
+        </p:txBody>
+      </p:sp>
+      <p:sp>
+        <p:nvSpPr>
+          <p:cNvPr id="7" name="TextBox 6">
+            <a:extLst>
+              <a:ext uri="{FF2B5EF4-FFF2-40B4-BE49-F238E27FC236}">
+                <a16:creationId xmlns:a16="http://schemas.microsoft.com/office/drawing/2014/main" id="{C39335B6-EDC1-4CA9-BAE3-E8852F9F1FFC}"/>
+              </a:ext>
+            </a:extLst>
+          </p:cNvPr>
+          <p:cNvSpPr txBox="1"/>
+          <p:nvPr/>
+        </p:nvSpPr>
+        <p:spPr>
+          <a:xfrm>
+            <a:off x="6912041" y="1132960"/>
+            <a:ext cx="4777986" cy="923330"/>
+          </a:xfrm>
+          <a:prstGeom prst="rect">
+            <a:avLst/>
+          </a:prstGeom>
+          <a:noFill/>
+        </p:spPr>
+        <p:txBody>
+          <a:bodyPr wrap="square" rtlCol="0">
+            <a:spAutoFit/>
+          </a:bodyPr>
+          <a:lstStyle/>
+          <a:p>
+            <a:pPr marL="285750" indent="-285750">
+              <a:buFont typeface="Arial" panose="020B0604020202020204" pitchFamily="34" charset="0"/>
+              <a:buChar char="•"/>
+            </a:pPr>
+            <a:r>
+              <a:rPr lang="pt-BR" sz="1800" dirty="0">
+                <a:latin typeface="+mj-lt"/>
+              </a:rPr>
+              <a:t>Conexão do Back End com o front problemas com o metodo fetch</a:t>
+            </a:r>
+          </a:p>
+          <a:p>
+            <a:pPr marL="285750" indent="-285750">
+              <a:buFont typeface="Arial" panose="020B0604020202020204" pitchFamily="34" charset="0"/>
+              <a:buChar char="•"/>
+            </a:pPr>
+            <a:r>
+              <a:rPr lang="pt-BR" sz="1800" dirty="0">
+                <a:latin typeface="+mj-lt"/>
+              </a:rPr>
+              <a:t>Alinhar as questões sobre a classe lista</a:t>
+            </a:r>
+            <a:endParaRPr lang="pt-BR" sz="1600" dirty="0">
+              <a:latin typeface="+mj-lt"/>
+            </a:endParaRPr>
+          </a:p>
+        </p:txBody>
+      </p:sp>
+      <p:sp>
+        <p:nvSpPr>
+          <p:cNvPr id="22" name="Oval 120">
+            <a:extLst>
+              <a:ext uri="{FF2B5EF4-FFF2-40B4-BE49-F238E27FC236}">
+                <a16:creationId xmlns:a16="http://schemas.microsoft.com/office/drawing/2014/main" id="{82942FCC-51D7-4B47-AB3E-6BD310106286}"/>
+              </a:ext>
+            </a:extLst>
+          </p:cNvPr>
+          <p:cNvSpPr>
+            <a:spLocks noChangeAspect="1"/>
+          </p:cNvSpPr>
+          <p:nvPr/>
+        </p:nvSpPr>
+        <p:spPr>
+          <a:xfrm>
+            <a:off x="11193898" y="297930"/>
+            <a:ext cx="211404" cy="211689"/>
+          </a:xfrm>
+          <a:prstGeom prst="ellipse">
+            <a:avLst/>
+          </a:prstGeom>
+          <a:solidFill>
+            <a:srgbClr val="00B050"/>
+          </a:solidFill>
+          <a:ln w="12700">
+            <a:solidFill>
+              <a:schemeClr val="accent3"/>
+            </a:solidFill>
+          </a:ln>
+        </p:spPr>
+        <p:style>
+          <a:lnRef idx="2">
+            <a:schemeClr val="accent1">
+              <a:shade val="50000"/>
+            </a:schemeClr>
+          </a:lnRef>
+          <a:fillRef idx="1">
+            <a:schemeClr val="accent1"/>
+          </a:fillRef>
+          <a:effectRef idx="0">
+            <a:schemeClr val="accent1"/>
+          </a:effectRef>
+          <a:fontRef idx="minor">
+            <a:schemeClr val="lt1"/>
+          </a:fontRef>
+        </p:style>
+        <p:txBody>
+          <a:bodyPr wrap="none" lIns="52922" tIns="52922" rIns="52922" rtlCol="0" anchor="ctr"/>
+          <a:lstStyle/>
+          <a:p>
+            <a:pPr algn="ctr" defTabSz="672130"/>
+            <a:endParaRPr lang="en-US" sz="1176" dirty="0">
+              <a:solidFill>
+                <a:prstClr val="black"/>
+              </a:solidFill>
+              <a:latin typeface="Simplon BP Regular"/>
+              <a:cs typeface="Simplon BP Regular"/>
+            </a:endParaRPr>
+          </a:p>
+        </p:txBody>
+      </p:sp>
+      <p:sp>
+        <p:nvSpPr>
+          <p:cNvPr id="23" name="Oval 120">
+            <a:extLst>
+              <a:ext uri="{FF2B5EF4-FFF2-40B4-BE49-F238E27FC236}">
+                <a16:creationId xmlns:a16="http://schemas.microsoft.com/office/drawing/2014/main" id="{5ADAF550-6797-4C0A-98D2-79746CAC4DBD}"/>
+              </a:ext>
+            </a:extLst>
+          </p:cNvPr>
+          <p:cNvSpPr>
+            <a:spLocks noChangeAspect="1"/>
+          </p:cNvSpPr>
+          <p:nvPr/>
+        </p:nvSpPr>
+        <p:spPr>
+          <a:xfrm>
+            <a:off x="10185228" y="284273"/>
+            <a:ext cx="211404" cy="211689"/>
+          </a:xfrm>
+          <a:prstGeom prst="ellipse">
+            <a:avLst/>
+          </a:prstGeom>
+          <a:solidFill>
+            <a:srgbClr val="00B050"/>
+          </a:solidFill>
+          <a:ln w="12700">
+            <a:solidFill>
+              <a:schemeClr val="accent3"/>
+            </a:solidFill>
+          </a:ln>
+        </p:spPr>
+        <p:style>
+          <a:lnRef idx="2">
+            <a:schemeClr val="accent1">
+              <a:shade val="50000"/>
+            </a:schemeClr>
+          </a:lnRef>
+          <a:fillRef idx="1">
+            <a:schemeClr val="accent1"/>
+          </a:fillRef>
+          <a:effectRef idx="0">
+            <a:schemeClr val="accent1"/>
+          </a:effectRef>
+          <a:fontRef idx="minor">
+            <a:schemeClr val="lt1"/>
+          </a:fontRef>
+        </p:style>
+        <p:txBody>
+          <a:bodyPr wrap="none" lIns="52922" tIns="52922" rIns="52922" rtlCol="0" anchor="ctr"/>
+          <a:lstStyle/>
+          <a:p>
+            <a:pPr algn="ctr" defTabSz="672130"/>
+            <a:endParaRPr lang="en-US" sz="1176" dirty="0">
+              <a:solidFill>
+                <a:prstClr val="black"/>
+              </a:solidFill>
+              <a:latin typeface="Simplon BP Regular"/>
+              <a:cs typeface="Simplon BP Regular"/>
+            </a:endParaRPr>
+          </a:p>
+        </p:txBody>
+      </p:sp>
+    </p:spTree>
+    <p:extLst>
+      <p:ext uri="{BB962C8B-B14F-4D97-AF65-F5344CB8AC3E}">
+        <p14:creationId xmlns:p14="http://schemas.microsoft.com/office/powerpoint/2010/main" val="4071169191"/>
       </p:ext>
     </p:extLst>
   </p:cSld>
@@ -34666,15 +36697,6 @@
 </file>
 
 <file path=customXml/item2.xml><?xml version="1.0" encoding="utf-8"?>
-<?mso-contentType ?>
-<FormTemplates xmlns="http://schemas.microsoft.com/sharepoint/v3/contenttype/forms">
-  <Display>DocumentLibraryForm</Display>
-  <Edit>DocumentLibraryForm</Edit>
-  <New>DocumentLibraryForm</New>
-</FormTemplates>
-</file>
-
-<file path=customXml/item3.xml><?xml version="1.0" encoding="utf-8"?>
 <ct:contentTypeSchema xmlns:ct="http://schemas.microsoft.com/office/2006/metadata/contentType" xmlns:ma="http://schemas.microsoft.com/office/2006/metadata/properties/metaAttributes" ct:_="" ma:_="" ma:contentTypeName="Document" ma:contentTypeID="0x0101001132905C37EA9847A7207C4BBCCCD8F4" ma:contentTypeVersion="34" ma:contentTypeDescription="Create a new document." ma:contentTypeScope="" ma:versionID="2f28daba72ca6e92be87ea70ebe5bb94">
   <xsd:schema xmlns:xsd="http://www.w3.org/2001/XMLSchema" xmlns:xs="http://www.w3.org/2001/XMLSchema" xmlns:p="http://schemas.microsoft.com/office/2006/metadata/properties" xmlns:ns3="4327b14a-fe89-488e-9f6d-9658cacf372b" xmlns:ns4="bbcd8c33-6940-4d4c-a587-bbc736ca1e4d" targetNamespace="http://schemas.microsoft.com/office/2006/metadata/properties" ma:root="true" ma:fieldsID="df18e839ce2650f1975b41376e6cdb6b" ns3:_="" ns4:_="">
     <xsd:import namespace="4327b14a-fe89-488e-9f6d-9658cacf372b"/>
@@ -35091,6 +37113,15 @@
 </ct:contentTypeSchema>
 </file>
 
+<file path=customXml/item3.xml><?xml version="1.0" encoding="utf-8"?>
+<?mso-contentType ?>
+<FormTemplates xmlns="http://schemas.microsoft.com/sharepoint/v3/contenttype/forms">
+  <Display>DocumentLibraryForm</Display>
+  <Edit>DocumentLibraryForm</Edit>
+  <New>DocumentLibraryForm</New>
+</FormTemplates>
+</file>
+
 <file path=customXml/itemProps1.xml><?xml version="1.0" encoding="utf-8"?>
 <ds:datastoreItem xmlns:ds="http://schemas.openxmlformats.org/officeDocument/2006/customXml" ds:itemID="{4B31267F-D399-4A8A-87F8-B75F56828412}">
   <ds:schemaRefs>
@@ -35109,14 +37140,6 @@
 </file>
 
 <file path=customXml/itemProps2.xml><?xml version="1.0" encoding="utf-8"?>
-<ds:datastoreItem xmlns:ds="http://schemas.openxmlformats.org/officeDocument/2006/customXml" ds:itemID="{E2481852-F24E-4532-AF30-C154D705D105}">
-  <ds:schemaRefs>
-    <ds:schemaRef ds:uri="http://schemas.microsoft.com/sharepoint/v3/contenttype/forms"/>
-  </ds:schemaRefs>
-</ds:datastoreItem>
-</file>
-
-<file path=customXml/itemProps3.xml><?xml version="1.0" encoding="utf-8"?>
 <ds:datastoreItem xmlns:ds="http://schemas.openxmlformats.org/officeDocument/2006/customXml" ds:itemID="{3BE6CAF6-1F55-4A70-B10C-21633F74987A}">
   <ds:schemaRefs>
     <ds:schemaRef ds:uri="http://schemas.microsoft.com/office/2006/metadata/contentType"/>
@@ -35133,4 +37156,12 @@
     <ds:schemaRef ds:uri="http://schemas.microsoft.com/internal/obd"/>
   </ds:schemaRefs>
 </ds:datastoreItem>
+</file>
+
+<file path=customXml/itemProps3.xml><?xml version="1.0" encoding="utf-8"?>
+<ds:datastoreItem xmlns:ds="http://schemas.openxmlformats.org/officeDocument/2006/customXml" ds:itemID="{E2481852-F24E-4532-AF30-C154D705D105}">
+  <ds:schemaRefs>
+    <ds:schemaRef ds:uri="http://schemas.microsoft.com/sharepoint/v3/contenttype/forms"/>
+  </ds:schemaRefs>
+</ds:datastoreItem>
 </file>
</xml_diff>

<commit_message>
add status report 06/10
</commit_message>
<xml_diff>
--- a/Documentação/EngenhariaDeSoftware/Mod_Status_Report-PI20202.pptx
+++ b/Documentação/EngenhariaDeSoftware/Mod_Status_Report-PI20202.pptx
@@ -7,10 +7,10 @@
     <p:sldMasterId id="2147483665" r:id="rId6"/>
   </p:sldMasterIdLst>
   <p:notesMasterIdLst>
-    <p:notesMasterId r:id="rId15"/>
+    <p:notesMasterId r:id="rId16"/>
   </p:notesMasterIdLst>
   <p:handoutMasterIdLst>
-    <p:handoutMasterId r:id="rId16"/>
+    <p:handoutMasterId r:id="rId17"/>
   </p:handoutMasterIdLst>
   <p:sldIdLst>
     <p:sldId id="256" r:id="rId7"/>
@@ -21,6 +21,7 @@
     <p:sldId id="474" r:id="rId12"/>
     <p:sldId id="475" r:id="rId13"/>
     <p:sldId id="476" r:id="rId14"/>
+    <p:sldId id="477" r:id="rId15"/>
   </p:sldIdLst>
   <p:sldSz cx="13442950" cy="7561263"/>
   <p:notesSz cx="7104063" cy="10234613"/>
@@ -136,6 +137,7 @@
             <p14:sldId id="474"/>
             <p14:sldId id="475"/>
             <p14:sldId id="476"/>
+            <p14:sldId id="477"/>
           </p14:sldIdLst>
         </p14:section>
       </p14:sectionLst>
@@ -249,7 +251,7 @@
             <a:fld id="{C3CD65D1-5C11-455D-9F9A-0E035F00A0DA}" type="datetimeFigureOut">
               <a:rPr lang="pt-BR" smtClean="0"/>
               <a:pPr/>
-              <a:t>29/09/2021</a:t>
+              <a:t>06/10/2021</a:t>
             </a:fld>
             <a:endParaRPr lang="pt-BR"/>
           </a:p>
@@ -316,7 +318,7 @@
             <a:fld id="{CA8E3B7C-E4AE-4E9E-8479-7C668141D483}" type="slidenum">
               <a:rPr lang="pt-BR" smtClean="0"/>
               <a:pPr/>
-              <a:t>‹#›</a:t>
+              <a:t>‹nº›</a:t>
             </a:fld>
             <a:endParaRPr lang="pt-BR"/>
           </a:p>
@@ -417,7 +419,7 @@
             <a:fld id="{A05DA3EF-18EA-43DE-B1BB-402A3C558822}" type="datetimeFigureOut">
               <a:rPr lang="pt-BR" smtClean="0"/>
               <a:pPr/>
-              <a:t>29/09/2021</a:t>
+              <a:t>06/10/2021</a:t>
             </a:fld>
             <a:endParaRPr lang="pt-BR"/>
           </a:p>
@@ -578,7 +580,7 @@
             <a:fld id="{75B3645A-D0AE-4F6E-A17E-E0036A9041AF}" type="slidenum">
               <a:rPr lang="pt-BR" smtClean="0"/>
               <a:pPr/>
-              <a:t>‹#›</a:t>
+              <a:t>‹nº›</a:t>
             </a:fld>
             <a:endParaRPr lang="pt-BR"/>
           </a:p>
@@ -1331,6 +1333,99 @@
 </p:notes>
 </file>
 
+<file path=ppt/notesSlides/notesSlide8.xml><?xml version="1.0" encoding="utf-8"?>
+<p:notes xmlns:a="http://schemas.openxmlformats.org/drawingml/2006/main" xmlns:r="http://schemas.openxmlformats.org/officeDocument/2006/relationships" xmlns:p="http://schemas.openxmlformats.org/presentationml/2006/main">
+  <p:cSld>
+    <p:spTree>
+      <p:nvGrpSpPr>
+        <p:cNvPr id="1" name=""/>
+        <p:cNvGrpSpPr/>
+        <p:nvPr/>
+      </p:nvGrpSpPr>
+      <p:grpSpPr>
+        <a:xfrm>
+          <a:off x="0" y="0"/>
+          <a:ext cx="0" cy="0"/>
+          <a:chOff x="0" y="0"/>
+          <a:chExt cx="0" cy="0"/>
+        </a:xfrm>
+      </p:grpSpPr>
+      <p:sp>
+        <p:nvSpPr>
+          <p:cNvPr id="2" name="Slide Image Placeholder 1"/>
+          <p:cNvSpPr>
+            <a:spLocks noGrp="1" noRot="1" noChangeAspect="1"/>
+          </p:cNvSpPr>
+          <p:nvPr>
+            <p:ph type="sldImg"/>
+          </p:nvPr>
+        </p:nvSpPr>
+        <p:spPr/>
+      </p:sp>
+      <p:sp>
+        <p:nvSpPr>
+          <p:cNvPr id="3" name="Notes Placeholder 2"/>
+          <p:cNvSpPr>
+            <a:spLocks noGrp="1"/>
+          </p:cNvSpPr>
+          <p:nvPr>
+            <p:ph type="body" idx="1"/>
+          </p:nvPr>
+        </p:nvSpPr>
+        <p:spPr/>
+        <p:txBody>
+          <a:bodyPr/>
+          <a:lstStyle/>
+          <a:p>
+            <a:endParaRPr lang="en-US"/>
+          </a:p>
+        </p:txBody>
+      </p:sp>
+      <p:sp>
+        <p:nvSpPr>
+          <p:cNvPr id="4" name="Slide Number Placeholder 3"/>
+          <p:cNvSpPr>
+            <a:spLocks noGrp="1"/>
+          </p:cNvSpPr>
+          <p:nvPr>
+            <p:ph type="sldNum" sz="quarter" idx="10"/>
+          </p:nvPr>
+        </p:nvSpPr>
+        <p:spPr/>
+        <p:txBody>
+          <a:bodyPr/>
+          <a:lstStyle/>
+          <a:p>
+            <a:fld id="{B39AF3DB-B6A1-2444-9DD8-53D016F8E638}" type="slidenum">
+              <a:rPr lang="pt-BR" smtClean="0">
+                <a:solidFill>
+                  <a:prstClr val="black"/>
+                </a:solidFill>
+              </a:rPr>
+              <a:pPr/>
+              <a:t>9</a:t>
+            </a:fld>
+            <a:endParaRPr lang="pt-BR">
+              <a:solidFill>
+                <a:prstClr val="black"/>
+              </a:solidFill>
+            </a:endParaRPr>
+          </a:p>
+        </p:txBody>
+      </p:sp>
+    </p:spTree>
+    <p:extLst>
+      <p:ext uri="{BB962C8B-B14F-4D97-AF65-F5344CB8AC3E}">
+        <p14:creationId xmlns:p14="http://schemas.microsoft.com/office/powerpoint/2010/main" val="4243947593"/>
+      </p:ext>
+    </p:extLst>
+  </p:cSld>
+  <p:clrMapOvr>
+    <a:masterClrMapping/>
+  </p:clrMapOvr>
+</p:notes>
+</file>
+
 <file path=ppt/slideLayouts/slideLayout1.xml><?xml version="1.0" encoding="utf-8"?>
 <p:sldLayout xmlns:a="http://schemas.openxmlformats.org/drawingml/2006/main" xmlns:r="http://schemas.openxmlformats.org/officeDocument/2006/relationships" xmlns:p="http://schemas.openxmlformats.org/presentationml/2006/main" preserve="1">
   <p:cSld name="Capa 1A">
@@ -3950,7 +4045,7 @@
               <a:pPr>
                 <a:defRPr/>
               </a:pPr>
-              <a:t>‹#›</a:t>
+              <a:t>‹nº›</a:t>
             </a:fld>
             <a:endParaRPr lang="pt-BR" sz="700" dirty="0"/>
           </a:p>
@@ -5749,7 +5844,7 @@
               <a:pPr>
                 <a:defRPr/>
               </a:pPr>
-              <a:t>‹#›</a:t>
+              <a:t>‹nº›</a:t>
             </a:fld>
             <a:endParaRPr lang="pt-BR" sz="700" dirty="0"/>
           </a:p>
@@ -22182,7 +22277,7 @@
                 </a:solidFill>
               </a:rPr>
               <a:pPr/>
-              <a:t>‹#›</a:t>
+              <a:t>‹nº›</a:t>
             </a:fld>
             <a:endParaRPr lang="pt-BR" dirty="0">
               <a:solidFill>
@@ -35177,6 +35272,2120 @@
     <p:extLst>
       <p:ext uri="{BB962C8B-B14F-4D97-AF65-F5344CB8AC3E}">
         <p14:creationId xmlns:p14="http://schemas.microsoft.com/office/powerpoint/2010/main" val="4071169191"/>
+      </p:ext>
+    </p:extLst>
+  </p:cSld>
+  <p:clrMapOvr>
+    <a:masterClrMapping/>
+  </p:clrMapOvr>
+</p:sld>
+</file>
+
+<file path=ppt/slides/slide9.xml><?xml version="1.0" encoding="utf-8"?>
+<p:sld xmlns:a="http://schemas.openxmlformats.org/drawingml/2006/main" xmlns:r="http://schemas.openxmlformats.org/officeDocument/2006/relationships" xmlns:p="http://schemas.openxmlformats.org/presentationml/2006/main">
+  <p:cSld>
+    <p:spTree>
+      <p:nvGrpSpPr>
+        <p:cNvPr id="1" name=""/>
+        <p:cNvGrpSpPr/>
+        <p:nvPr/>
+      </p:nvGrpSpPr>
+      <p:grpSpPr>
+        <a:xfrm>
+          <a:off x="0" y="0"/>
+          <a:ext cx="0" cy="0"/>
+          <a:chOff x="0" y="0"/>
+          <a:chExt cx="0" cy="0"/>
+        </a:xfrm>
+      </p:grpSpPr>
+      <p:sp>
+        <p:nvSpPr>
+          <p:cNvPr id="43" name="Rectangle 42"/>
+          <p:cNvSpPr/>
+          <p:nvPr/>
+        </p:nvSpPr>
+        <p:spPr>
+          <a:xfrm>
+            <a:off x="6814576" y="1080752"/>
+            <a:ext cx="6209639" cy="2235805"/>
+          </a:xfrm>
+          <a:prstGeom prst="rect">
+            <a:avLst/>
+          </a:prstGeom>
+          <a:noFill/>
+          <a:ln w="12700">
+            <a:solidFill>
+              <a:schemeClr val="bg1">
+                <a:lumMod val="50000"/>
+              </a:schemeClr>
+            </a:solidFill>
+          </a:ln>
+        </p:spPr>
+        <p:style>
+          <a:lnRef idx="2">
+            <a:schemeClr val="accent4"/>
+          </a:lnRef>
+          <a:fillRef idx="1">
+            <a:schemeClr val="lt1"/>
+          </a:fillRef>
+          <a:effectRef idx="0">
+            <a:schemeClr val="accent4"/>
+          </a:effectRef>
+          <a:fontRef idx="minor">
+            <a:schemeClr val="dk1"/>
+          </a:fontRef>
+        </p:style>
+        <p:txBody>
+          <a:bodyPr tIns="105844" rtlCol="0" anchor="t"/>
+          <a:lstStyle/>
+          <a:p>
+            <a:pPr defTabSz="672130">
+              <a:spcAft>
+                <a:spcPts val="882"/>
+              </a:spcAft>
+            </a:pPr>
+            <a:endParaRPr lang="pt-BR" sz="1470" dirty="0">
+              <a:solidFill>
+                <a:schemeClr val="tx1"/>
+              </a:solidFill>
+              <a:latin typeface="Calibri" panose="020F0502020204030204" pitchFamily="34" charset="0"/>
+              <a:cs typeface="Simplon BP Regular"/>
+            </a:endParaRPr>
+          </a:p>
+        </p:txBody>
+      </p:sp>
+      <p:sp>
+        <p:nvSpPr>
+          <p:cNvPr id="3" name="Title 2"/>
+          <p:cNvSpPr>
+            <a:spLocks noGrp="1"/>
+          </p:cNvSpPr>
+          <p:nvPr>
+            <p:ph type="title"/>
+          </p:nvPr>
+        </p:nvSpPr>
+        <p:spPr>
+          <a:xfrm>
+            <a:off x="469692" y="185232"/>
+            <a:ext cx="12098020" cy="800352"/>
+          </a:xfrm>
+        </p:spPr>
+        <p:txBody>
+          <a:bodyPr vert="horz" wrap="square" lIns="105844" tIns="0" rIns="105844" bIns="0" numCol="1" anchor="t" anchorCtr="0" compatLnSpc="1">
+            <a:prstTxWarp prst="textNoShape">
+              <a:avLst/>
+            </a:prstTxWarp>
+            <a:noAutofit/>
+          </a:bodyPr>
+          <a:lstStyle/>
+          <a:p>
+            <a:pPr algn="l">
+              <a:spcAft>
+                <a:spcPts val="882"/>
+              </a:spcAft>
+            </a:pPr>
+            <a:r>
+              <a:rPr lang="en-US" sz="2646" dirty="0">
+                <a:solidFill>
+                  <a:prstClr val="black"/>
+                </a:solidFill>
+                <a:latin typeface="Simplon Oi Headline"/>
+                <a:cs typeface="Simplon Oi Headline"/>
+              </a:rPr>
+              <a:t>SEMANA 6 - 07/09/2021 – 13/10/2021</a:t>
+            </a:r>
+          </a:p>
+        </p:txBody>
+      </p:sp>
+      <p:sp>
+        <p:nvSpPr>
+          <p:cNvPr id="78" name="TextBox 118"/>
+          <p:cNvSpPr txBox="1"/>
+          <p:nvPr/>
+        </p:nvSpPr>
+        <p:spPr>
+          <a:xfrm>
+            <a:off x="11822773" y="576471"/>
+            <a:ext cx="899678" cy="179824"/>
+          </a:xfrm>
+          <a:prstGeom prst="rect">
+            <a:avLst/>
+          </a:prstGeom>
+          <a:noFill/>
+          <a:ln w="12700">
+            <a:noFill/>
+          </a:ln>
+        </p:spPr>
+        <p:style>
+          <a:lnRef idx="2">
+            <a:schemeClr val="accent4"/>
+          </a:lnRef>
+          <a:fillRef idx="1">
+            <a:schemeClr val="lt1"/>
+          </a:fillRef>
+          <a:effectRef idx="0">
+            <a:schemeClr val="accent4"/>
+          </a:effectRef>
+          <a:fontRef idx="minor">
+            <a:schemeClr val="dk1"/>
+          </a:fontRef>
+        </p:style>
+        <p:txBody>
+          <a:bodyPr wrap="none" lIns="52922" tIns="52922" rIns="52922" bIns="0" rtlCol="0" anchor="b"/>
+          <a:lstStyle>
+            <a:defPPr>
+              <a:defRPr lang="en-US"/>
+            </a:defPPr>
+            <a:lvl1pPr algn="ctr">
+              <a:defRPr sz="1000" b="1">
+                <a:latin typeface="Simplon BP Regular"/>
+                <a:cs typeface="Simplon BP Regular"/>
+              </a:defRPr>
+            </a:lvl1pPr>
+            <a:lvl2pPr>
+              <a:defRPr>
+                <a:solidFill>
+                  <a:schemeClr val="dk1"/>
+                </a:solidFill>
+              </a:defRPr>
+            </a:lvl2pPr>
+            <a:lvl3pPr>
+              <a:defRPr>
+                <a:solidFill>
+                  <a:schemeClr val="dk1"/>
+                </a:solidFill>
+              </a:defRPr>
+            </a:lvl3pPr>
+            <a:lvl4pPr>
+              <a:defRPr>
+                <a:solidFill>
+                  <a:schemeClr val="dk1"/>
+                </a:solidFill>
+              </a:defRPr>
+            </a:lvl4pPr>
+            <a:lvl5pPr>
+              <a:defRPr>
+                <a:solidFill>
+                  <a:schemeClr val="dk1"/>
+                </a:solidFill>
+              </a:defRPr>
+            </a:lvl5pPr>
+            <a:lvl6pPr>
+              <a:defRPr>
+                <a:solidFill>
+                  <a:schemeClr val="dk1"/>
+                </a:solidFill>
+              </a:defRPr>
+            </a:lvl6pPr>
+            <a:lvl7pPr>
+              <a:defRPr>
+                <a:solidFill>
+                  <a:schemeClr val="dk1"/>
+                </a:solidFill>
+              </a:defRPr>
+            </a:lvl7pPr>
+            <a:lvl8pPr>
+              <a:defRPr>
+                <a:solidFill>
+                  <a:schemeClr val="dk1"/>
+                </a:solidFill>
+              </a:defRPr>
+            </a:lvl8pPr>
+            <a:lvl9pPr>
+              <a:defRPr>
+                <a:solidFill>
+                  <a:schemeClr val="dk1"/>
+                </a:solidFill>
+              </a:defRPr>
+            </a:lvl9pPr>
+          </a:lstStyle>
+          <a:p>
+            <a:pPr defTabSz="672130"/>
+            <a:r>
+              <a:rPr lang="pt-BR" sz="1176" b="0" dirty="0">
+                <a:solidFill>
+                  <a:prstClr val="black"/>
+                </a:solidFill>
+                <a:latin typeface="Simplon BP Bold" pitchFamily="2" charset="0"/>
+              </a:rPr>
+              <a:t>Negócios</a:t>
+            </a:r>
+          </a:p>
+        </p:txBody>
+      </p:sp>
+      <p:sp>
+        <p:nvSpPr>
+          <p:cNvPr id="80" name="TextBox 123"/>
+          <p:cNvSpPr txBox="1"/>
+          <p:nvPr/>
+        </p:nvSpPr>
+        <p:spPr>
+          <a:xfrm>
+            <a:off x="10852497" y="576471"/>
+            <a:ext cx="899678" cy="179824"/>
+          </a:xfrm>
+          <a:prstGeom prst="rect">
+            <a:avLst/>
+          </a:prstGeom>
+          <a:noFill/>
+          <a:ln w="12700">
+            <a:noFill/>
+          </a:ln>
+        </p:spPr>
+        <p:style>
+          <a:lnRef idx="2">
+            <a:schemeClr val="accent4"/>
+          </a:lnRef>
+          <a:fillRef idx="1">
+            <a:schemeClr val="lt1"/>
+          </a:fillRef>
+          <a:effectRef idx="0">
+            <a:schemeClr val="accent4"/>
+          </a:effectRef>
+          <a:fontRef idx="minor">
+            <a:schemeClr val="dk1"/>
+          </a:fontRef>
+        </p:style>
+        <p:txBody>
+          <a:bodyPr wrap="none" lIns="52922" tIns="52922" rIns="52922" bIns="0" rtlCol="0" anchor="b"/>
+          <a:lstStyle>
+            <a:defPPr>
+              <a:defRPr lang="en-US"/>
+            </a:defPPr>
+            <a:lvl1pPr algn="ctr">
+              <a:defRPr sz="1000" b="1">
+                <a:latin typeface="Simplon BP Regular"/>
+                <a:cs typeface="Simplon BP Regular"/>
+              </a:defRPr>
+            </a:lvl1pPr>
+            <a:lvl2pPr>
+              <a:defRPr>
+                <a:solidFill>
+                  <a:schemeClr val="dk1"/>
+                </a:solidFill>
+              </a:defRPr>
+            </a:lvl2pPr>
+            <a:lvl3pPr>
+              <a:defRPr>
+                <a:solidFill>
+                  <a:schemeClr val="dk1"/>
+                </a:solidFill>
+              </a:defRPr>
+            </a:lvl3pPr>
+            <a:lvl4pPr>
+              <a:defRPr>
+                <a:solidFill>
+                  <a:schemeClr val="dk1"/>
+                </a:solidFill>
+              </a:defRPr>
+            </a:lvl4pPr>
+            <a:lvl5pPr>
+              <a:defRPr>
+                <a:solidFill>
+                  <a:schemeClr val="dk1"/>
+                </a:solidFill>
+              </a:defRPr>
+            </a:lvl5pPr>
+            <a:lvl6pPr>
+              <a:defRPr>
+                <a:solidFill>
+                  <a:schemeClr val="dk1"/>
+                </a:solidFill>
+              </a:defRPr>
+            </a:lvl6pPr>
+            <a:lvl7pPr>
+              <a:defRPr>
+                <a:solidFill>
+                  <a:schemeClr val="dk1"/>
+                </a:solidFill>
+              </a:defRPr>
+            </a:lvl7pPr>
+            <a:lvl8pPr>
+              <a:defRPr>
+                <a:solidFill>
+                  <a:schemeClr val="dk1"/>
+                </a:solidFill>
+              </a:defRPr>
+            </a:lvl8pPr>
+            <a:lvl9pPr>
+              <a:defRPr>
+                <a:solidFill>
+                  <a:schemeClr val="dk1"/>
+                </a:solidFill>
+              </a:defRPr>
+            </a:lvl9pPr>
+          </a:lstStyle>
+          <a:p>
+            <a:pPr defTabSz="672130"/>
+            <a:r>
+              <a:rPr lang="pt-BR" sz="1176" b="0" dirty="0">
+                <a:solidFill>
+                  <a:prstClr val="black"/>
+                </a:solidFill>
+                <a:latin typeface="Simplon BP Bold" pitchFamily="2" charset="0"/>
+              </a:rPr>
+              <a:t>Plataforma</a:t>
+            </a:r>
+          </a:p>
+        </p:txBody>
+      </p:sp>
+      <p:sp>
+        <p:nvSpPr>
+          <p:cNvPr id="82" name="TextBox 128"/>
+          <p:cNvSpPr txBox="1"/>
+          <p:nvPr/>
+        </p:nvSpPr>
+        <p:spPr>
+          <a:xfrm>
+            <a:off x="9854245" y="576471"/>
+            <a:ext cx="899678" cy="179824"/>
+          </a:xfrm>
+          <a:prstGeom prst="rect">
+            <a:avLst/>
+          </a:prstGeom>
+          <a:noFill/>
+          <a:ln w="12700">
+            <a:noFill/>
+          </a:ln>
+        </p:spPr>
+        <p:style>
+          <a:lnRef idx="2">
+            <a:schemeClr val="accent4"/>
+          </a:lnRef>
+          <a:fillRef idx="1">
+            <a:schemeClr val="lt1"/>
+          </a:fillRef>
+          <a:effectRef idx="0">
+            <a:schemeClr val="accent4"/>
+          </a:effectRef>
+          <a:fontRef idx="minor">
+            <a:schemeClr val="dk1"/>
+          </a:fontRef>
+        </p:style>
+        <p:txBody>
+          <a:bodyPr wrap="none" lIns="52922" tIns="52922" rIns="52922" bIns="0" rtlCol="0" anchor="b"/>
+          <a:lstStyle>
+            <a:defPPr>
+              <a:defRPr lang="en-US"/>
+            </a:defPPr>
+            <a:lvl1pPr algn="ctr">
+              <a:defRPr sz="1000" b="1">
+                <a:latin typeface="Simplon BP Regular"/>
+                <a:cs typeface="Simplon BP Regular"/>
+              </a:defRPr>
+            </a:lvl1pPr>
+            <a:lvl2pPr>
+              <a:defRPr>
+                <a:solidFill>
+                  <a:schemeClr val="dk1"/>
+                </a:solidFill>
+              </a:defRPr>
+            </a:lvl2pPr>
+            <a:lvl3pPr>
+              <a:defRPr>
+                <a:solidFill>
+                  <a:schemeClr val="dk1"/>
+                </a:solidFill>
+              </a:defRPr>
+            </a:lvl3pPr>
+            <a:lvl4pPr>
+              <a:defRPr>
+                <a:solidFill>
+                  <a:schemeClr val="dk1"/>
+                </a:solidFill>
+              </a:defRPr>
+            </a:lvl4pPr>
+            <a:lvl5pPr>
+              <a:defRPr>
+                <a:solidFill>
+                  <a:schemeClr val="dk1"/>
+                </a:solidFill>
+              </a:defRPr>
+            </a:lvl5pPr>
+            <a:lvl6pPr>
+              <a:defRPr>
+                <a:solidFill>
+                  <a:schemeClr val="dk1"/>
+                </a:solidFill>
+              </a:defRPr>
+            </a:lvl6pPr>
+            <a:lvl7pPr>
+              <a:defRPr>
+                <a:solidFill>
+                  <a:schemeClr val="dk1"/>
+                </a:solidFill>
+              </a:defRPr>
+            </a:lvl7pPr>
+            <a:lvl8pPr>
+              <a:defRPr>
+                <a:solidFill>
+                  <a:schemeClr val="dk1"/>
+                </a:solidFill>
+              </a:defRPr>
+            </a:lvl8pPr>
+            <a:lvl9pPr>
+              <a:defRPr>
+                <a:solidFill>
+                  <a:schemeClr val="dk1"/>
+                </a:solidFill>
+              </a:defRPr>
+            </a:lvl9pPr>
+          </a:lstStyle>
+          <a:p>
+            <a:pPr defTabSz="672130"/>
+            <a:r>
+              <a:rPr lang="pt-BR" sz="1176" b="0" dirty="0">
+                <a:solidFill>
+                  <a:prstClr val="black"/>
+                </a:solidFill>
+                <a:latin typeface="Simplon BP Bold" pitchFamily="2" charset="0"/>
+              </a:rPr>
+              <a:t>Back</a:t>
+            </a:r>
+          </a:p>
+        </p:txBody>
+      </p:sp>
+      <p:sp>
+        <p:nvSpPr>
+          <p:cNvPr id="84" name="TextBox 133"/>
+          <p:cNvSpPr txBox="1"/>
+          <p:nvPr/>
+        </p:nvSpPr>
+        <p:spPr>
+          <a:xfrm>
+            <a:off x="8934246" y="576471"/>
+            <a:ext cx="899678" cy="179824"/>
+          </a:xfrm>
+          <a:prstGeom prst="rect">
+            <a:avLst/>
+          </a:prstGeom>
+          <a:noFill/>
+          <a:ln w="12700">
+            <a:noFill/>
+          </a:ln>
+        </p:spPr>
+        <p:style>
+          <a:lnRef idx="2">
+            <a:schemeClr val="accent4"/>
+          </a:lnRef>
+          <a:fillRef idx="1">
+            <a:schemeClr val="lt1"/>
+          </a:fillRef>
+          <a:effectRef idx="0">
+            <a:schemeClr val="accent4"/>
+          </a:effectRef>
+          <a:fontRef idx="minor">
+            <a:schemeClr val="dk1"/>
+          </a:fontRef>
+        </p:style>
+        <p:txBody>
+          <a:bodyPr wrap="none" lIns="52922" tIns="52922" rIns="52922" bIns="0" rtlCol="0" anchor="b"/>
+          <a:lstStyle>
+            <a:defPPr>
+              <a:defRPr lang="en-US"/>
+            </a:defPPr>
+            <a:lvl1pPr algn="ctr">
+              <a:defRPr sz="1000" b="1">
+                <a:latin typeface="Simplon BP Regular"/>
+                <a:cs typeface="Simplon BP Regular"/>
+              </a:defRPr>
+            </a:lvl1pPr>
+            <a:lvl2pPr>
+              <a:defRPr>
+                <a:solidFill>
+                  <a:schemeClr val="dk1"/>
+                </a:solidFill>
+              </a:defRPr>
+            </a:lvl2pPr>
+            <a:lvl3pPr>
+              <a:defRPr>
+                <a:solidFill>
+                  <a:schemeClr val="dk1"/>
+                </a:solidFill>
+              </a:defRPr>
+            </a:lvl3pPr>
+            <a:lvl4pPr>
+              <a:defRPr>
+                <a:solidFill>
+                  <a:schemeClr val="dk1"/>
+                </a:solidFill>
+              </a:defRPr>
+            </a:lvl4pPr>
+            <a:lvl5pPr>
+              <a:defRPr>
+                <a:solidFill>
+                  <a:schemeClr val="dk1"/>
+                </a:solidFill>
+              </a:defRPr>
+            </a:lvl5pPr>
+            <a:lvl6pPr>
+              <a:defRPr>
+                <a:solidFill>
+                  <a:schemeClr val="dk1"/>
+                </a:solidFill>
+              </a:defRPr>
+            </a:lvl6pPr>
+            <a:lvl7pPr>
+              <a:defRPr>
+                <a:solidFill>
+                  <a:schemeClr val="dk1"/>
+                </a:solidFill>
+              </a:defRPr>
+            </a:lvl7pPr>
+            <a:lvl8pPr>
+              <a:defRPr>
+                <a:solidFill>
+                  <a:schemeClr val="dk1"/>
+                </a:solidFill>
+              </a:defRPr>
+            </a:lvl8pPr>
+            <a:lvl9pPr>
+              <a:defRPr>
+                <a:solidFill>
+                  <a:schemeClr val="dk1"/>
+                </a:solidFill>
+              </a:defRPr>
+            </a:lvl9pPr>
+          </a:lstStyle>
+          <a:p>
+            <a:pPr defTabSz="672130"/>
+            <a:r>
+              <a:rPr lang="pt-BR" sz="1176" b="0" dirty="0">
+                <a:solidFill>
+                  <a:prstClr val="black"/>
+                </a:solidFill>
+                <a:latin typeface="Simplon BP Bold" pitchFamily="2" charset="0"/>
+              </a:rPr>
+              <a:t>Front</a:t>
+            </a:r>
+          </a:p>
+        </p:txBody>
+      </p:sp>
+      <p:sp>
+        <p:nvSpPr>
+          <p:cNvPr id="88" name="Oval 134"/>
+          <p:cNvSpPr>
+            <a:spLocks noChangeAspect="1"/>
+          </p:cNvSpPr>
+          <p:nvPr/>
+        </p:nvSpPr>
+        <p:spPr>
+          <a:xfrm>
+            <a:off x="8443555" y="282529"/>
+            <a:ext cx="211404" cy="211689"/>
+          </a:xfrm>
+          <a:prstGeom prst="ellipse">
+            <a:avLst/>
+          </a:prstGeom>
+          <a:solidFill>
+            <a:srgbClr val="00B050"/>
+          </a:solidFill>
+          <a:ln w="12700">
+            <a:solidFill>
+              <a:schemeClr val="accent3"/>
+            </a:solidFill>
+          </a:ln>
+        </p:spPr>
+        <p:style>
+          <a:lnRef idx="2">
+            <a:schemeClr val="accent1">
+              <a:shade val="50000"/>
+            </a:schemeClr>
+          </a:lnRef>
+          <a:fillRef idx="1">
+            <a:schemeClr val="accent1"/>
+          </a:fillRef>
+          <a:effectRef idx="0">
+            <a:schemeClr val="accent1"/>
+          </a:effectRef>
+          <a:fontRef idx="minor">
+            <a:schemeClr val="lt1"/>
+          </a:fontRef>
+        </p:style>
+        <p:txBody>
+          <a:bodyPr wrap="none" lIns="52922" tIns="52922" rIns="52922" rtlCol="0" anchor="ctr"/>
+          <a:lstStyle/>
+          <a:p>
+            <a:pPr algn="ctr" defTabSz="672130"/>
+            <a:endParaRPr lang="en-US" sz="1176" dirty="0">
+              <a:solidFill>
+                <a:srgbClr val="FFFF00"/>
+              </a:solidFill>
+              <a:latin typeface="Simplon BP Regular"/>
+              <a:cs typeface="Simplon BP Regular"/>
+            </a:endParaRPr>
+          </a:p>
+        </p:txBody>
+      </p:sp>
+      <p:sp>
+        <p:nvSpPr>
+          <p:cNvPr id="86" name="TextBox 138"/>
+          <p:cNvSpPr txBox="1"/>
+          <p:nvPr/>
+        </p:nvSpPr>
+        <p:spPr>
+          <a:xfrm>
+            <a:off x="8126053" y="576471"/>
+            <a:ext cx="899678" cy="179824"/>
+          </a:xfrm>
+          <a:prstGeom prst="rect">
+            <a:avLst/>
+          </a:prstGeom>
+          <a:noFill/>
+          <a:ln w="12700">
+            <a:noFill/>
+          </a:ln>
+        </p:spPr>
+        <p:style>
+          <a:lnRef idx="2">
+            <a:schemeClr val="accent4"/>
+          </a:lnRef>
+          <a:fillRef idx="1">
+            <a:schemeClr val="lt1"/>
+          </a:fillRef>
+          <a:effectRef idx="0">
+            <a:schemeClr val="accent4"/>
+          </a:effectRef>
+          <a:fontRef idx="minor">
+            <a:schemeClr val="dk1"/>
+          </a:fontRef>
+        </p:style>
+        <p:txBody>
+          <a:bodyPr wrap="none" lIns="52922" tIns="52922" rIns="52922" bIns="0" rtlCol="0" anchor="b"/>
+          <a:lstStyle>
+            <a:defPPr>
+              <a:defRPr lang="en-US"/>
+            </a:defPPr>
+            <a:lvl1pPr algn="ctr">
+              <a:defRPr sz="1000" b="1">
+                <a:latin typeface="Simplon BP Regular"/>
+                <a:cs typeface="Simplon BP Regular"/>
+              </a:defRPr>
+            </a:lvl1pPr>
+            <a:lvl2pPr>
+              <a:defRPr>
+                <a:solidFill>
+                  <a:schemeClr val="dk1"/>
+                </a:solidFill>
+              </a:defRPr>
+            </a:lvl2pPr>
+            <a:lvl3pPr>
+              <a:defRPr>
+                <a:solidFill>
+                  <a:schemeClr val="dk1"/>
+                </a:solidFill>
+              </a:defRPr>
+            </a:lvl3pPr>
+            <a:lvl4pPr>
+              <a:defRPr>
+                <a:solidFill>
+                  <a:schemeClr val="dk1"/>
+                </a:solidFill>
+              </a:defRPr>
+            </a:lvl4pPr>
+            <a:lvl5pPr>
+              <a:defRPr>
+                <a:solidFill>
+                  <a:schemeClr val="dk1"/>
+                </a:solidFill>
+              </a:defRPr>
+            </a:lvl5pPr>
+            <a:lvl6pPr>
+              <a:defRPr>
+                <a:solidFill>
+                  <a:schemeClr val="dk1"/>
+                </a:solidFill>
+              </a:defRPr>
+            </a:lvl6pPr>
+            <a:lvl7pPr>
+              <a:defRPr>
+                <a:solidFill>
+                  <a:schemeClr val="dk1"/>
+                </a:solidFill>
+              </a:defRPr>
+            </a:lvl7pPr>
+            <a:lvl8pPr>
+              <a:defRPr>
+                <a:solidFill>
+                  <a:schemeClr val="dk1"/>
+                </a:solidFill>
+              </a:defRPr>
+            </a:lvl8pPr>
+            <a:lvl9pPr>
+              <a:defRPr>
+                <a:solidFill>
+                  <a:schemeClr val="dk1"/>
+                </a:solidFill>
+              </a:defRPr>
+            </a:lvl9pPr>
+          </a:lstStyle>
+          <a:p>
+            <a:pPr defTabSz="672130"/>
+            <a:r>
+              <a:rPr lang="en-US" sz="1176" b="0" dirty="0" err="1">
+                <a:solidFill>
+                  <a:prstClr val="black"/>
+                </a:solidFill>
+                <a:latin typeface="Simplon BP Bold" pitchFamily="2" charset="0"/>
+              </a:rPr>
+              <a:t>Equipe</a:t>
+            </a:r>
+            <a:endParaRPr lang="en-US" sz="1176" b="0" dirty="0">
+              <a:solidFill>
+                <a:prstClr val="black"/>
+              </a:solidFill>
+              <a:latin typeface="Simplon BP Bold" pitchFamily="2" charset="0"/>
+            </a:endParaRPr>
+          </a:p>
+        </p:txBody>
+      </p:sp>
+      <p:sp>
+        <p:nvSpPr>
+          <p:cNvPr id="64" name="Retângulo 63"/>
+          <p:cNvSpPr/>
+          <p:nvPr/>
+        </p:nvSpPr>
+        <p:spPr>
+          <a:xfrm>
+            <a:off x="512766" y="868345"/>
+            <a:ext cx="6186608" cy="238150"/>
+          </a:xfrm>
+          <a:prstGeom prst="rect">
+            <a:avLst/>
+          </a:prstGeom>
+          <a:solidFill>
+            <a:schemeClr val="bg1">
+              <a:lumMod val="85000"/>
+            </a:schemeClr>
+          </a:solidFill>
+        </p:spPr>
+        <p:txBody>
+          <a:bodyPr vert="horz" lIns="134422" tIns="67211" rIns="134422" bIns="67211" rtlCol="0" anchor="ctr"/>
+          <a:lstStyle/>
+          <a:p>
+            <a:pPr defTabSz="672130"/>
+            <a:r>
+              <a:rPr lang="en-US" sz="1544" dirty="0">
+                <a:latin typeface="Simplon Oi Headline" charset="0"/>
+                <a:ea typeface="Simplon Oi Headline" charset="0"/>
+                <a:cs typeface="Simplon Oi Headline" charset="0"/>
+              </a:rPr>
+              <a:t>PROGRESSOS</a:t>
+            </a:r>
+            <a:endParaRPr lang="pt-BR" sz="1544" dirty="0">
+              <a:latin typeface="Simplon Oi Headline" charset="0"/>
+              <a:ea typeface="Simplon Oi Headline" charset="0"/>
+              <a:cs typeface="Simplon Oi Headline" charset="0"/>
+            </a:endParaRPr>
+          </a:p>
+        </p:txBody>
+      </p:sp>
+      <p:sp>
+        <p:nvSpPr>
+          <p:cNvPr id="65" name="Retângulo 64"/>
+          <p:cNvSpPr/>
+          <p:nvPr/>
+        </p:nvSpPr>
+        <p:spPr>
+          <a:xfrm>
+            <a:off x="6814576" y="868345"/>
+            <a:ext cx="6194715" cy="238150"/>
+          </a:xfrm>
+          <a:prstGeom prst="rect">
+            <a:avLst/>
+          </a:prstGeom>
+          <a:solidFill>
+            <a:schemeClr val="bg1">
+              <a:lumMod val="85000"/>
+            </a:schemeClr>
+          </a:solidFill>
+        </p:spPr>
+        <p:txBody>
+          <a:bodyPr vert="horz" lIns="134422" tIns="67211" rIns="134422" bIns="67211" rtlCol="0" anchor="ctr"/>
+          <a:lstStyle/>
+          <a:p>
+            <a:pPr defTabSz="672130"/>
+            <a:r>
+              <a:rPr lang="pt-BR" sz="1544" dirty="0">
+                <a:latin typeface="Simplon Oi Headline" charset="0"/>
+                <a:ea typeface="Simplon Oi Headline" charset="0"/>
+                <a:cs typeface="Simplon Oi Headline" charset="0"/>
+              </a:rPr>
+              <a:t>Pontos atenção/ Principais Riscos</a:t>
+            </a:r>
+          </a:p>
+        </p:txBody>
+      </p:sp>
+      <p:sp>
+        <p:nvSpPr>
+          <p:cNvPr id="66" name="Retângulo 65"/>
+          <p:cNvSpPr/>
+          <p:nvPr/>
+        </p:nvSpPr>
+        <p:spPr>
+          <a:xfrm>
+            <a:off x="507536" y="3418875"/>
+            <a:ext cx="12505521" cy="238150"/>
+          </a:xfrm>
+          <a:prstGeom prst="rect">
+            <a:avLst/>
+          </a:prstGeom>
+          <a:solidFill>
+            <a:schemeClr val="bg1">
+              <a:lumMod val="85000"/>
+            </a:schemeClr>
+          </a:solidFill>
+        </p:spPr>
+        <p:txBody>
+          <a:bodyPr vert="horz" lIns="134422" tIns="67211" rIns="134422" bIns="67211" rtlCol="0" anchor="ctr"/>
+          <a:lstStyle/>
+          <a:p>
+            <a:pPr defTabSz="672130"/>
+            <a:r>
+              <a:rPr lang="pt-BR" sz="1544" dirty="0">
+                <a:latin typeface="Simplon Oi Headline" charset="0"/>
+                <a:ea typeface="Simplon Oi Headline" charset="0"/>
+                <a:cs typeface="Simplon Oi Headline" charset="0"/>
+              </a:rPr>
+              <a:t>Próximos Passos/ Decisões a tomar</a:t>
+            </a:r>
+          </a:p>
+        </p:txBody>
+      </p:sp>
+      <p:sp>
+        <p:nvSpPr>
+          <p:cNvPr id="63" name="Rectangle 37"/>
+          <p:cNvSpPr/>
+          <p:nvPr/>
+        </p:nvSpPr>
+        <p:spPr>
+          <a:xfrm>
+            <a:off x="496765" y="1106495"/>
+            <a:ext cx="6207777" cy="2235805"/>
+          </a:xfrm>
+          <a:prstGeom prst="rect">
+            <a:avLst/>
+          </a:prstGeom>
+          <a:noFill/>
+          <a:ln w="12700">
+            <a:solidFill>
+              <a:schemeClr val="bg1">
+                <a:lumMod val="50000"/>
+              </a:schemeClr>
+            </a:solidFill>
+          </a:ln>
+        </p:spPr>
+        <p:style>
+          <a:lnRef idx="2">
+            <a:schemeClr val="accent4"/>
+          </a:lnRef>
+          <a:fillRef idx="1">
+            <a:schemeClr val="lt1"/>
+          </a:fillRef>
+          <a:effectRef idx="0">
+            <a:schemeClr val="accent4"/>
+          </a:effectRef>
+          <a:fontRef idx="minor">
+            <a:schemeClr val="dk1"/>
+          </a:fontRef>
+        </p:style>
+        <p:txBody>
+          <a:bodyPr tIns="105844" rtlCol="0" anchor="t"/>
+          <a:lstStyle/>
+          <a:p>
+            <a:pPr marL="252049" lvl="1" indent="-252049">
+              <a:buFont typeface="Wingdings" panose="05000000000000000000" pitchFamily="2" charset="2"/>
+              <a:buChar char="§"/>
+            </a:pPr>
+            <a:r>
+              <a:rPr lang="pt-BR" sz="1323" b="1" dirty="0">
+                <a:solidFill>
+                  <a:schemeClr val="tx1"/>
+                </a:solidFill>
+                <a:latin typeface="Calibri" panose="020F0502020204030204" pitchFamily="34" charset="0"/>
+                <a:cs typeface="Simplon BP Regular"/>
+              </a:rPr>
+              <a:t>Back-</a:t>
+            </a:r>
+            <a:r>
+              <a:rPr lang="pt-BR" sz="1323" b="1" dirty="0" err="1">
+                <a:solidFill>
+                  <a:schemeClr val="tx1"/>
+                </a:solidFill>
+                <a:latin typeface="Calibri" panose="020F0502020204030204" pitchFamily="34" charset="0"/>
+                <a:cs typeface="Simplon BP Regular"/>
+              </a:rPr>
+              <a:t>end</a:t>
+            </a:r>
+            <a:r>
+              <a:rPr lang="pt-BR" sz="1323" b="1" dirty="0">
+                <a:solidFill>
+                  <a:schemeClr val="tx1"/>
+                </a:solidFill>
+                <a:latin typeface="Calibri" panose="020F0502020204030204" pitchFamily="34" charset="0"/>
+                <a:cs typeface="Simplon BP Regular"/>
+              </a:rPr>
+              <a:t> alinhado com o diagrama de classes.</a:t>
+            </a:r>
+          </a:p>
+          <a:p>
+            <a:pPr marL="252049" lvl="1" indent="-252049">
+              <a:buFont typeface="Wingdings" panose="05000000000000000000" pitchFamily="2" charset="2"/>
+              <a:buChar char="§"/>
+            </a:pPr>
+            <a:r>
+              <a:rPr lang="pt-BR" sz="1323" b="1" dirty="0">
+                <a:solidFill>
+                  <a:schemeClr val="tx1"/>
+                </a:solidFill>
+                <a:latin typeface="Calibri" panose="020F0502020204030204" pitchFamily="34" charset="0"/>
+                <a:cs typeface="Simplon BP Regular"/>
+              </a:rPr>
+              <a:t>Integração do </a:t>
+            </a:r>
+            <a:r>
+              <a:rPr lang="pt-BR" sz="1323" b="1" dirty="0" err="1">
+                <a:solidFill>
+                  <a:schemeClr val="tx1"/>
+                </a:solidFill>
+                <a:latin typeface="Calibri" panose="020F0502020204030204" pitchFamily="34" charset="0"/>
+                <a:cs typeface="Simplon BP Regular"/>
+              </a:rPr>
+              <a:t>React</a:t>
+            </a:r>
+            <a:r>
+              <a:rPr lang="pt-BR" sz="1323" b="1" dirty="0">
+                <a:solidFill>
+                  <a:schemeClr val="tx1"/>
+                </a:solidFill>
+                <a:latin typeface="Calibri" panose="020F0502020204030204" pitchFamily="34" charset="0"/>
+                <a:cs typeface="Simplon BP Regular"/>
+              </a:rPr>
+              <a:t> no Header, </a:t>
+            </a:r>
+            <a:r>
+              <a:rPr lang="pt-BR" sz="1323" b="1" dirty="0" err="1">
+                <a:solidFill>
+                  <a:schemeClr val="tx1"/>
+                </a:solidFill>
+                <a:latin typeface="Calibri" panose="020F0502020204030204" pitchFamily="34" charset="0"/>
+                <a:cs typeface="Simplon BP Regular"/>
+              </a:rPr>
+              <a:t>Footer</a:t>
+            </a:r>
+            <a:r>
+              <a:rPr lang="pt-BR" sz="1323" b="1" dirty="0">
+                <a:solidFill>
+                  <a:schemeClr val="tx1"/>
+                </a:solidFill>
+                <a:latin typeface="Calibri" panose="020F0502020204030204" pitchFamily="34" charset="0"/>
+                <a:cs typeface="Simplon BP Regular"/>
+              </a:rPr>
+              <a:t> e </a:t>
+            </a:r>
+            <a:r>
+              <a:rPr lang="pt-BR" sz="1323" b="1" dirty="0" err="1">
+                <a:solidFill>
+                  <a:schemeClr val="tx1"/>
+                </a:solidFill>
+                <a:latin typeface="Calibri" panose="020F0502020204030204" pitchFamily="34" charset="0"/>
+                <a:cs typeface="Simplon BP Regular"/>
+              </a:rPr>
+              <a:t>Sidebar</a:t>
+            </a:r>
+            <a:r>
+              <a:rPr lang="pt-BR" sz="1323" b="1" dirty="0">
+                <a:solidFill>
+                  <a:schemeClr val="tx1"/>
+                </a:solidFill>
+                <a:latin typeface="Calibri" panose="020F0502020204030204" pitchFamily="34" charset="0"/>
+                <a:cs typeface="Simplon BP Regular"/>
+              </a:rPr>
+              <a:t> Terminado.</a:t>
+            </a:r>
+          </a:p>
+          <a:p>
+            <a:pPr marL="252049" lvl="1" indent="-252049">
+              <a:buFont typeface="Wingdings" panose="05000000000000000000" pitchFamily="2" charset="2"/>
+              <a:buChar char="§"/>
+            </a:pPr>
+            <a:r>
+              <a:rPr lang="pt-BR" sz="1323" b="1" dirty="0">
+                <a:solidFill>
+                  <a:schemeClr val="tx1"/>
+                </a:solidFill>
+                <a:latin typeface="Calibri" panose="020F0502020204030204" pitchFamily="34" charset="0"/>
+                <a:cs typeface="Simplon BP Regular"/>
+              </a:rPr>
+              <a:t>CRUD de livros e usuários terminado.</a:t>
+            </a:r>
+          </a:p>
+          <a:p>
+            <a:pPr marL="252049" lvl="1" indent="-252049">
+              <a:buFont typeface="Wingdings" panose="05000000000000000000" pitchFamily="2" charset="2"/>
+              <a:buChar char="§"/>
+            </a:pPr>
+            <a:r>
+              <a:rPr lang="pt-BR" sz="1300" b="1" dirty="0">
+                <a:solidFill>
+                  <a:schemeClr val="tx1"/>
+                </a:solidFill>
+                <a:latin typeface="Calibri" panose="020F0502020204030204" pitchFamily="34" charset="0"/>
+                <a:cs typeface="Simplon BP Regular"/>
+              </a:rPr>
+              <a:t>Começamos o desenho de arquitetura.</a:t>
+            </a:r>
+          </a:p>
+          <a:p>
+            <a:pPr marL="252049" lvl="1" indent="-252049">
+              <a:buFont typeface="Wingdings" panose="05000000000000000000" pitchFamily="2" charset="2"/>
+              <a:buChar char="§"/>
+            </a:pPr>
+            <a:r>
+              <a:rPr lang="pt-BR" sz="1300" b="1" dirty="0" err="1">
+                <a:solidFill>
+                  <a:schemeClr val="tx1"/>
+                </a:solidFill>
+                <a:latin typeface="Calibri" panose="020F0502020204030204" pitchFamily="34" charset="0"/>
+                <a:cs typeface="Simplon BP Regular"/>
+              </a:rPr>
+              <a:t>Figma</a:t>
+            </a:r>
+            <a:r>
+              <a:rPr lang="pt-BR" sz="1300" b="1" dirty="0">
+                <a:solidFill>
+                  <a:schemeClr val="tx1"/>
+                </a:solidFill>
+                <a:latin typeface="Calibri" panose="020F0502020204030204" pitchFamily="34" charset="0"/>
+                <a:cs typeface="Simplon BP Regular"/>
+              </a:rPr>
+              <a:t> atualizado.</a:t>
+            </a:r>
+          </a:p>
+          <a:p>
+            <a:pPr marL="252049" lvl="1" indent="-252049">
+              <a:buFont typeface="Wingdings" panose="05000000000000000000" pitchFamily="2" charset="2"/>
+              <a:buChar char="§"/>
+            </a:pPr>
+            <a:r>
+              <a:rPr lang="pt-BR" sz="1300" b="1" dirty="0">
+                <a:solidFill>
+                  <a:schemeClr val="tx1"/>
+                </a:solidFill>
+                <a:latin typeface="Calibri" panose="020F0502020204030204" pitchFamily="34" charset="0"/>
+                <a:cs typeface="Simplon BP Regular"/>
+              </a:rPr>
+              <a:t>Front da tela de login/cadastro terminada</a:t>
+            </a:r>
+          </a:p>
+          <a:p>
+            <a:pPr marL="252049" lvl="1" indent="-252049">
+              <a:buFont typeface="Wingdings" panose="05000000000000000000" pitchFamily="2" charset="2"/>
+              <a:buChar char="§"/>
+            </a:pPr>
+            <a:r>
+              <a:rPr lang="pt-BR" sz="1300" b="1" dirty="0">
+                <a:solidFill>
+                  <a:schemeClr val="tx1"/>
+                </a:solidFill>
+                <a:latin typeface="Calibri" panose="020F0502020204030204" pitchFamily="34" charset="0"/>
+                <a:cs typeface="Simplon BP Regular"/>
+              </a:rPr>
+              <a:t>Começado o front da tela de livros</a:t>
+            </a:r>
+          </a:p>
+          <a:p>
+            <a:pPr marL="252049" lvl="1" indent="-252049">
+              <a:buFont typeface="Wingdings" panose="05000000000000000000" pitchFamily="2" charset="2"/>
+              <a:buChar char="§"/>
+            </a:pPr>
+            <a:r>
+              <a:rPr lang="pt-BR" sz="1323" b="1" dirty="0">
+                <a:solidFill>
+                  <a:schemeClr val="tx1"/>
+                </a:solidFill>
+                <a:latin typeface="Calibri" panose="020F0502020204030204" pitchFamily="34" charset="0"/>
+                <a:cs typeface="Simplon BP Regular"/>
+              </a:rPr>
+              <a:t>Começamos a fazer o front todo em </a:t>
+            </a:r>
+            <a:r>
+              <a:rPr lang="pt-BR" sz="1323" b="1" dirty="0" err="1">
+                <a:solidFill>
+                  <a:schemeClr val="tx1"/>
+                </a:solidFill>
+                <a:latin typeface="Calibri" panose="020F0502020204030204" pitchFamily="34" charset="0"/>
+                <a:cs typeface="Simplon BP Regular"/>
+              </a:rPr>
+              <a:t>React</a:t>
+            </a:r>
+            <a:endParaRPr lang="pt-BR" sz="1323" b="1" dirty="0">
+              <a:solidFill>
+                <a:schemeClr val="tx1"/>
+              </a:solidFill>
+              <a:latin typeface="Calibri" panose="020F0502020204030204" pitchFamily="34" charset="0"/>
+              <a:cs typeface="Simplon BP Regular"/>
+            </a:endParaRPr>
+          </a:p>
+          <a:p>
+            <a:pPr marL="252049" lvl="1" indent="-252049">
+              <a:buFont typeface="Wingdings" panose="05000000000000000000" pitchFamily="2" charset="2"/>
+              <a:buChar char="§"/>
+            </a:pPr>
+            <a:endParaRPr lang="pt-BR" sz="1200" dirty="0">
+              <a:solidFill>
+                <a:schemeClr val="tx1"/>
+              </a:solidFill>
+              <a:latin typeface="Calibri" panose="020F0502020204030204" pitchFamily="34" charset="0"/>
+              <a:cs typeface="Simplon BP Regular"/>
+            </a:endParaRPr>
+          </a:p>
+          <a:p>
+            <a:pPr marL="252049" lvl="1" indent="-252049">
+              <a:buFont typeface="Wingdings" panose="05000000000000000000" pitchFamily="2" charset="2"/>
+              <a:buChar char="§"/>
+            </a:pPr>
+            <a:endParaRPr lang="pt-BR" sz="1200" dirty="0">
+              <a:solidFill>
+                <a:schemeClr val="tx1"/>
+              </a:solidFill>
+              <a:latin typeface="Calibri" panose="020F0502020204030204" pitchFamily="34" charset="0"/>
+              <a:cs typeface="Simplon BP Regular"/>
+            </a:endParaRPr>
+          </a:p>
+          <a:p>
+            <a:pPr marL="252049" lvl="1" indent="-252049">
+              <a:buFont typeface="Wingdings" panose="05000000000000000000" pitchFamily="2" charset="2"/>
+              <a:buChar char="§"/>
+            </a:pPr>
+            <a:endParaRPr lang="pt-BR" sz="1323" b="1" dirty="0">
+              <a:solidFill>
+                <a:schemeClr val="tx1"/>
+              </a:solidFill>
+              <a:latin typeface="Calibri" panose="020F0502020204030204" pitchFamily="34" charset="0"/>
+              <a:cs typeface="Simplon BP Regular"/>
+            </a:endParaRPr>
+          </a:p>
+          <a:p>
+            <a:pPr marL="0" lvl="1" defTabSz="672130"/>
+            <a:endParaRPr lang="pt-BR" sz="1600" b="1" dirty="0">
+              <a:solidFill>
+                <a:schemeClr val="tx1"/>
+              </a:solidFill>
+              <a:latin typeface="Calibri" panose="020F0502020204030204" pitchFamily="34" charset="0"/>
+              <a:cs typeface="Simplon BP Regular"/>
+            </a:endParaRPr>
+          </a:p>
+          <a:p>
+            <a:pPr marL="252049" lvl="1" indent="-252049" fontAlgn="base">
+              <a:spcBef>
+                <a:spcPct val="0"/>
+              </a:spcBef>
+              <a:buFont typeface="Wingdings" panose="05000000000000000000" pitchFamily="2" charset="2"/>
+              <a:buChar char="ü"/>
+              <a:defRPr/>
+            </a:pPr>
+            <a:endParaRPr lang="pt-BR" sz="1323" b="1" dirty="0">
+              <a:solidFill>
+                <a:schemeClr val="tx1"/>
+              </a:solidFill>
+              <a:latin typeface="Calibri" panose="020F0502020204030204" pitchFamily="34" charset="0"/>
+              <a:cs typeface="Simplon BP Regular"/>
+            </a:endParaRPr>
+          </a:p>
+          <a:p>
+            <a:pPr marL="252049" lvl="1" indent="-252049" fontAlgn="base">
+              <a:spcBef>
+                <a:spcPct val="0"/>
+              </a:spcBef>
+              <a:buFont typeface="Wingdings" panose="05000000000000000000" pitchFamily="2" charset="2"/>
+              <a:buChar char="ü"/>
+              <a:defRPr/>
+            </a:pPr>
+            <a:endParaRPr lang="pt-BR" sz="1323" b="1" dirty="0">
+              <a:solidFill>
+                <a:schemeClr val="tx1"/>
+              </a:solidFill>
+              <a:latin typeface="Calibri" panose="020F0502020204030204" pitchFamily="34" charset="0"/>
+              <a:cs typeface="Simplon BP Regular"/>
+            </a:endParaRPr>
+          </a:p>
+          <a:p>
+            <a:pPr marL="252049" lvl="1" indent="-252049" fontAlgn="base">
+              <a:spcBef>
+                <a:spcPct val="0"/>
+              </a:spcBef>
+              <a:buFont typeface="Wingdings" panose="05000000000000000000" pitchFamily="2" charset="2"/>
+              <a:buChar char="ü"/>
+              <a:defRPr/>
+            </a:pPr>
+            <a:endParaRPr lang="pt-BR" sz="1323" b="1" dirty="0">
+              <a:solidFill>
+                <a:schemeClr val="tx1"/>
+              </a:solidFill>
+              <a:latin typeface="Calibri" panose="020F0502020204030204" pitchFamily="34" charset="0"/>
+              <a:cs typeface="Simplon BP Regular"/>
+            </a:endParaRPr>
+          </a:p>
+          <a:p>
+            <a:pPr marL="252049" indent="-252049" fontAlgn="base">
+              <a:spcBef>
+                <a:spcPct val="0"/>
+              </a:spcBef>
+              <a:buFont typeface="Wingdings" panose="05000000000000000000" pitchFamily="2" charset="2"/>
+              <a:buChar char="ü"/>
+              <a:defRPr/>
+            </a:pPr>
+            <a:endParaRPr lang="pt-BR" sz="1323" b="1" dirty="0">
+              <a:solidFill>
+                <a:schemeClr val="tx1"/>
+              </a:solidFill>
+              <a:latin typeface="Calibri" panose="020F0502020204030204" pitchFamily="34" charset="0"/>
+              <a:cs typeface="Simplon BP Regular"/>
+            </a:endParaRPr>
+          </a:p>
+          <a:p>
+            <a:pPr marL="252049" indent="-252049" fontAlgn="base">
+              <a:spcBef>
+                <a:spcPct val="0"/>
+              </a:spcBef>
+              <a:buFont typeface="Wingdings" panose="05000000000000000000" pitchFamily="2" charset="2"/>
+              <a:buChar char="ü"/>
+              <a:defRPr/>
+            </a:pPr>
+            <a:endParaRPr lang="pt-BR" sz="1323" b="1" dirty="0">
+              <a:solidFill>
+                <a:schemeClr val="tx1"/>
+              </a:solidFill>
+              <a:latin typeface="Calibri" panose="020F0502020204030204" pitchFamily="34" charset="0"/>
+              <a:cs typeface="Simplon BP Regular"/>
+            </a:endParaRPr>
+          </a:p>
+        </p:txBody>
+      </p:sp>
+      <p:sp>
+        <p:nvSpPr>
+          <p:cNvPr id="2" name="Rectangle 43">
+            <a:extLst>
+              <a:ext uri="{FF2B5EF4-FFF2-40B4-BE49-F238E27FC236}">
+                <a16:creationId xmlns:a16="http://schemas.microsoft.com/office/drawing/2014/main" id="{B15BA19F-C787-4E6A-ADAB-C0DFF09C66A8}"/>
+              </a:ext>
+            </a:extLst>
+          </p:cNvPr>
+          <p:cNvSpPr>
+            <a:spLocks/>
+          </p:cNvSpPr>
+          <p:nvPr/>
+        </p:nvSpPr>
+        <p:spPr>
+          <a:xfrm>
+            <a:off x="496765" y="3657025"/>
+            <a:ext cx="12496524" cy="3833059"/>
+          </a:xfrm>
+          <a:prstGeom prst="rect">
+            <a:avLst/>
+          </a:prstGeom>
+          <a:noFill/>
+          <a:ln w="12700">
+            <a:solidFill>
+              <a:schemeClr val="bg1">
+                <a:lumMod val="50000"/>
+              </a:schemeClr>
+            </a:solidFill>
+          </a:ln>
+        </p:spPr>
+        <p:style>
+          <a:lnRef idx="2">
+            <a:schemeClr val="accent4"/>
+          </a:lnRef>
+          <a:fillRef idx="1">
+            <a:schemeClr val="lt1"/>
+          </a:fillRef>
+          <a:effectRef idx="0">
+            <a:schemeClr val="accent4"/>
+          </a:effectRef>
+          <a:fontRef idx="minor">
+            <a:schemeClr val="dk1"/>
+          </a:fontRef>
+        </p:style>
+        <p:txBody>
+          <a:bodyPr wrap="square" tIns="105844" numCol="3" rtlCol="0" anchor="ctr"/>
+          <a:lstStyle/>
+          <a:p>
+            <a:pPr marL="0" lvl="1" defTabSz="672130"/>
+            <a:r>
+              <a:rPr lang="pt-BR" sz="1323" b="1" dirty="0">
+                <a:solidFill>
+                  <a:schemeClr val="tx1"/>
+                </a:solidFill>
+                <a:latin typeface="Calibri" panose="020F0502020204030204" pitchFamily="34" charset="0"/>
+                <a:cs typeface="Simplon BP Regular"/>
+              </a:rPr>
+              <a:t>Frente Plataforma</a:t>
+            </a:r>
+          </a:p>
+          <a:p>
+            <a:pPr marL="0" lvl="1" defTabSz="672130"/>
+            <a:endParaRPr lang="pt-BR" sz="1323" b="1" dirty="0">
+              <a:solidFill>
+                <a:schemeClr val="tx1"/>
+              </a:solidFill>
+              <a:latin typeface="Calibri" panose="020F0502020204030204" pitchFamily="34" charset="0"/>
+              <a:cs typeface="Simplon BP Regular"/>
+            </a:endParaRPr>
+          </a:p>
+          <a:p>
+            <a:pPr marL="0" lvl="1" defTabSz="672130"/>
+            <a:r>
+              <a:rPr lang="pt-BR" sz="1323" b="1" dirty="0">
+                <a:solidFill>
+                  <a:schemeClr val="tx1"/>
+                </a:solidFill>
+                <a:latin typeface="Calibri" panose="020F0502020204030204" pitchFamily="34" charset="0"/>
+                <a:cs typeface="Simplon BP Regular"/>
+              </a:rPr>
+              <a:t>Frente Backend</a:t>
+            </a:r>
+          </a:p>
+          <a:p>
+            <a:pPr marL="285750" lvl="1" indent="-285750" defTabSz="672130">
+              <a:buFont typeface="Arial" panose="020B0604020202020204" pitchFamily="34" charset="0"/>
+              <a:buChar char="•"/>
+            </a:pPr>
+            <a:r>
+              <a:rPr lang="pt-BR" sz="1323" dirty="0">
+                <a:solidFill>
+                  <a:schemeClr val="tx1"/>
+                </a:solidFill>
+                <a:latin typeface="Calibri" panose="020F0502020204030204" pitchFamily="34" charset="0"/>
+                <a:cs typeface="Simplon BP Regular"/>
+              </a:rPr>
+              <a:t>Ajustar lista de pendências.</a:t>
+            </a:r>
+          </a:p>
+          <a:p>
+            <a:pPr marL="285750" lvl="1" indent="-285750" defTabSz="672130">
+              <a:buFont typeface="Arial" panose="020B0604020202020204" pitchFamily="34" charset="0"/>
+              <a:buChar char="•"/>
+            </a:pPr>
+            <a:r>
+              <a:rPr lang="pt-BR" sz="1323" dirty="0">
+                <a:solidFill>
+                  <a:schemeClr val="tx1"/>
+                </a:solidFill>
+                <a:latin typeface="Calibri" panose="020F0502020204030204" pitchFamily="34" charset="0"/>
+                <a:cs typeface="Simplon BP Regular"/>
+              </a:rPr>
+              <a:t>Finalizar </a:t>
+            </a:r>
+            <a:r>
+              <a:rPr lang="pt-BR" sz="1323" dirty="0" err="1">
+                <a:solidFill>
+                  <a:schemeClr val="tx1"/>
+                </a:solidFill>
+                <a:latin typeface="Calibri" panose="020F0502020204030204" pitchFamily="34" charset="0"/>
+                <a:cs typeface="Simplon BP Regular"/>
+              </a:rPr>
+              <a:t>end</a:t>
+            </a:r>
+            <a:r>
+              <a:rPr lang="pt-BR" sz="1323" dirty="0">
+                <a:solidFill>
+                  <a:schemeClr val="tx1"/>
+                </a:solidFill>
+                <a:latin typeface="Calibri" panose="020F0502020204030204" pitchFamily="34" charset="0"/>
+                <a:cs typeface="Simplon BP Regular"/>
+              </a:rPr>
+              <a:t> point de devolução e renovação.</a:t>
+            </a:r>
+          </a:p>
+          <a:p>
+            <a:pPr marL="285750" lvl="1" indent="-285750" defTabSz="672130">
+              <a:buFont typeface="Arial" panose="020B0604020202020204" pitchFamily="34" charset="0"/>
+              <a:buChar char="•"/>
+            </a:pPr>
+            <a:endParaRPr lang="pt-BR" sz="1323" b="1" dirty="0">
+              <a:solidFill>
+                <a:schemeClr val="tx1"/>
+              </a:solidFill>
+              <a:latin typeface="Calibri" panose="020F0502020204030204" pitchFamily="34" charset="0"/>
+              <a:cs typeface="Simplon BP Regular"/>
+            </a:endParaRPr>
+          </a:p>
+          <a:p>
+            <a:pPr marL="0" lvl="1" defTabSz="672130"/>
+            <a:r>
+              <a:rPr lang="pt-BR" sz="1323" b="1" dirty="0">
+                <a:solidFill>
+                  <a:schemeClr val="tx1"/>
+                </a:solidFill>
+                <a:latin typeface="Calibri" panose="020F0502020204030204" pitchFamily="34" charset="0"/>
+                <a:cs typeface="Simplon BP Regular"/>
+              </a:rPr>
+              <a:t>Frente Front end</a:t>
+            </a:r>
+            <a:endParaRPr lang="pt-BR" sz="1200" dirty="0">
+              <a:solidFill>
+                <a:schemeClr val="tx1"/>
+              </a:solidFill>
+              <a:latin typeface="Calibri" panose="020F0502020204030204" pitchFamily="34" charset="0"/>
+              <a:cs typeface="Simplon BP Regular"/>
+            </a:endParaRPr>
+          </a:p>
+          <a:p>
+            <a:pPr marL="285750" lvl="1" indent="-285750" defTabSz="672130">
+              <a:buFont typeface="Arial" panose="020B0604020202020204" pitchFamily="34" charset="0"/>
+              <a:buChar char="•"/>
+            </a:pPr>
+            <a:r>
+              <a:rPr lang="pt-BR" sz="1323" dirty="0">
+                <a:solidFill>
+                  <a:schemeClr val="tx1"/>
+                </a:solidFill>
+                <a:latin typeface="Calibri" panose="020F0502020204030204" pitchFamily="34" charset="0"/>
+                <a:cs typeface="Simplon BP Regular"/>
+              </a:rPr>
+              <a:t>Começar a fazer a tela institucional.</a:t>
+            </a:r>
+          </a:p>
+          <a:p>
+            <a:pPr marL="285750" lvl="1" indent="-285750" defTabSz="672130">
+              <a:buFont typeface="Arial" panose="020B0604020202020204" pitchFamily="34" charset="0"/>
+              <a:buChar char="•"/>
+            </a:pPr>
+            <a:r>
+              <a:rPr lang="pt-BR" sz="1323" dirty="0">
+                <a:solidFill>
+                  <a:schemeClr val="tx1"/>
+                </a:solidFill>
+                <a:latin typeface="Calibri" panose="020F0502020204030204" pitchFamily="34" charset="0"/>
+                <a:cs typeface="Simplon BP Regular"/>
+              </a:rPr>
+              <a:t>Integração com o back end</a:t>
+            </a:r>
+          </a:p>
+          <a:p>
+            <a:pPr marL="0" lvl="1" defTabSz="672130"/>
+            <a:endParaRPr lang="pt-BR" sz="1600" b="1" dirty="0">
+              <a:solidFill>
+                <a:schemeClr val="tx1"/>
+              </a:solidFill>
+              <a:latin typeface="Calibri" panose="020F0502020204030204" pitchFamily="34" charset="0"/>
+              <a:cs typeface="Simplon BP Regular"/>
+            </a:endParaRPr>
+          </a:p>
+          <a:p>
+            <a:pPr marL="0" lvl="1" defTabSz="672130"/>
+            <a:r>
+              <a:rPr lang="pt-BR" sz="1400" b="1" dirty="0">
+                <a:solidFill>
+                  <a:schemeClr val="tx1"/>
+                </a:solidFill>
+                <a:latin typeface="Calibri" panose="020F0502020204030204" pitchFamily="34" charset="0"/>
+                <a:cs typeface="Simplon BP Regular"/>
+              </a:rPr>
+              <a:t>Frente Negócios</a:t>
+            </a:r>
+            <a:r>
+              <a:rPr lang="pt-BR" sz="1400" dirty="0">
+                <a:solidFill>
+                  <a:schemeClr val="tx1"/>
+                </a:solidFill>
+                <a:latin typeface="Calibri" panose="020F0502020204030204" pitchFamily="34" charset="0"/>
+                <a:cs typeface="Simplon BP Regular"/>
+              </a:rPr>
+              <a:t>;</a:t>
+            </a:r>
+          </a:p>
+          <a:p>
+            <a:pPr marL="0" lvl="1"/>
+            <a:endParaRPr lang="pt-BR" sz="1400" b="1" dirty="0">
+              <a:solidFill>
+                <a:schemeClr val="tx1"/>
+              </a:solidFill>
+              <a:latin typeface="Calibri" panose="020F0502020204030204" pitchFamily="34" charset="0"/>
+              <a:cs typeface="Simplon BP Regular"/>
+            </a:endParaRPr>
+          </a:p>
+          <a:p>
+            <a:pPr marL="0" lvl="1"/>
+            <a:r>
+              <a:rPr lang="pt-BR" sz="1400" b="1" dirty="0">
+                <a:solidFill>
+                  <a:schemeClr val="tx1"/>
+                </a:solidFill>
+                <a:latin typeface="Calibri" panose="020F0502020204030204" pitchFamily="34" charset="0"/>
+                <a:cs typeface="Simplon BP Regular"/>
+              </a:rPr>
+              <a:t>Frente Gestão Organizacional</a:t>
+            </a:r>
+          </a:p>
+          <a:p>
+            <a:pPr marL="285750" lvl="1" indent="-285750">
+              <a:buFont typeface="Arial" panose="020B0604020202020204" pitchFamily="34" charset="0"/>
+              <a:buChar char="•"/>
+            </a:pPr>
+            <a:r>
+              <a:rPr lang="pt-BR" sz="1400" dirty="0">
+                <a:solidFill>
+                  <a:schemeClr val="tx1"/>
+                </a:solidFill>
+                <a:latin typeface="Calibri" panose="020F0502020204030204" pitchFamily="34" charset="0"/>
+                <a:cs typeface="Simplon BP Regular"/>
+              </a:rPr>
+              <a:t>Começar o diagrama de solução</a:t>
+            </a:r>
+          </a:p>
+        </p:txBody>
+      </p:sp>
+      <p:sp>
+        <p:nvSpPr>
+          <p:cNvPr id="6" name="Oval 134">
+            <a:extLst>
+              <a:ext uri="{FF2B5EF4-FFF2-40B4-BE49-F238E27FC236}">
+                <a16:creationId xmlns:a16="http://schemas.microsoft.com/office/drawing/2014/main" id="{70825C6F-9257-4CF5-8C62-1CA1EB2F8815}"/>
+              </a:ext>
+            </a:extLst>
+          </p:cNvPr>
+          <p:cNvSpPr>
+            <a:spLocks noChangeAspect="1"/>
+          </p:cNvSpPr>
+          <p:nvPr/>
+        </p:nvSpPr>
+        <p:spPr>
+          <a:xfrm>
+            <a:off x="9282214" y="282529"/>
+            <a:ext cx="211404" cy="211689"/>
+          </a:xfrm>
+          <a:prstGeom prst="ellipse">
+            <a:avLst/>
+          </a:prstGeom>
+          <a:solidFill>
+            <a:srgbClr val="FFFF00"/>
+          </a:solidFill>
+          <a:ln w="12700">
+            <a:solidFill>
+              <a:schemeClr val="accent3"/>
+            </a:solidFill>
+          </a:ln>
+        </p:spPr>
+        <p:style>
+          <a:lnRef idx="2">
+            <a:schemeClr val="accent1">
+              <a:shade val="50000"/>
+            </a:schemeClr>
+          </a:lnRef>
+          <a:fillRef idx="1">
+            <a:schemeClr val="accent1"/>
+          </a:fillRef>
+          <a:effectRef idx="0">
+            <a:schemeClr val="accent1"/>
+          </a:effectRef>
+          <a:fontRef idx="minor">
+            <a:schemeClr val="lt1"/>
+          </a:fontRef>
+        </p:style>
+        <p:txBody>
+          <a:bodyPr wrap="none" lIns="52922" tIns="52922" rIns="52922" rtlCol="0" anchor="ctr"/>
+          <a:lstStyle/>
+          <a:p>
+            <a:pPr algn="ctr" defTabSz="672130"/>
+            <a:endParaRPr lang="en-US" sz="1176" dirty="0">
+              <a:solidFill>
+                <a:prstClr val="black"/>
+              </a:solidFill>
+              <a:latin typeface="Simplon BP Regular"/>
+              <a:cs typeface="Simplon BP Regular"/>
+            </a:endParaRPr>
+          </a:p>
+        </p:txBody>
+      </p:sp>
+      <p:sp>
+        <p:nvSpPr>
+          <p:cNvPr id="9" name="Oval 134">
+            <a:extLst>
+              <a:ext uri="{FF2B5EF4-FFF2-40B4-BE49-F238E27FC236}">
+                <a16:creationId xmlns:a16="http://schemas.microsoft.com/office/drawing/2014/main" id="{B60B13C9-0C70-4C0F-82B2-D0CD4FDFC1F0}"/>
+              </a:ext>
+            </a:extLst>
+          </p:cNvPr>
+          <p:cNvSpPr>
+            <a:spLocks noChangeAspect="1"/>
+          </p:cNvSpPr>
+          <p:nvPr/>
+        </p:nvSpPr>
+        <p:spPr>
+          <a:xfrm>
+            <a:off x="12155999" y="278623"/>
+            <a:ext cx="211404" cy="211689"/>
+          </a:xfrm>
+          <a:prstGeom prst="ellipse">
+            <a:avLst/>
+          </a:prstGeom>
+          <a:solidFill>
+            <a:srgbClr val="00B050"/>
+          </a:solidFill>
+          <a:ln w="12700">
+            <a:solidFill>
+              <a:schemeClr val="accent3"/>
+            </a:solidFill>
+          </a:ln>
+        </p:spPr>
+        <p:style>
+          <a:lnRef idx="2">
+            <a:schemeClr val="accent1">
+              <a:shade val="50000"/>
+            </a:schemeClr>
+          </a:lnRef>
+          <a:fillRef idx="1">
+            <a:schemeClr val="accent1"/>
+          </a:fillRef>
+          <a:effectRef idx="0">
+            <a:schemeClr val="accent1"/>
+          </a:effectRef>
+          <a:fontRef idx="minor">
+            <a:schemeClr val="lt1"/>
+          </a:fontRef>
+        </p:style>
+        <p:txBody>
+          <a:bodyPr wrap="none" lIns="52922" tIns="52922" rIns="52922" rtlCol="0" anchor="ctr"/>
+          <a:lstStyle/>
+          <a:p>
+            <a:pPr algn="ctr" defTabSz="672130"/>
+            <a:endParaRPr lang="en-US" sz="1176" dirty="0">
+              <a:solidFill>
+                <a:prstClr val="black"/>
+              </a:solidFill>
+              <a:latin typeface="Simplon BP Regular"/>
+              <a:cs typeface="Simplon BP Regular"/>
+            </a:endParaRPr>
+          </a:p>
+        </p:txBody>
+      </p:sp>
+      <p:sp>
+        <p:nvSpPr>
+          <p:cNvPr id="5" name="Retângulo 4">
+            <a:extLst>
+              <a:ext uri="{FF2B5EF4-FFF2-40B4-BE49-F238E27FC236}">
+                <a16:creationId xmlns:a16="http://schemas.microsoft.com/office/drawing/2014/main" id="{A1C14918-6027-46B3-96BF-C5F7FDEC3276}"/>
+              </a:ext>
+            </a:extLst>
+          </p:cNvPr>
+          <p:cNvSpPr/>
+          <p:nvPr/>
+        </p:nvSpPr>
+        <p:spPr>
+          <a:xfrm>
+            <a:off x="8017619" y="180231"/>
+            <a:ext cx="4937689" cy="618769"/>
+          </a:xfrm>
+          <a:prstGeom prst="rect">
+            <a:avLst/>
+          </a:prstGeom>
+          <a:noFill/>
+          <a:ln w="6350">
+            <a:solidFill>
+              <a:schemeClr val="bg1">
+                <a:lumMod val="75000"/>
+              </a:schemeClr>
+            </a:solidFill>
+          </a:ln>
+        </p:spPr>
+        <p:style>
+          <a:lnRef idx="2">
+            <a:schemeClr val="accent1">
+              <a:shade val="50000"/>
+            </a:schemeClr>
+          </a:lnRef>
+          <a:fillRef idx="1">
+            <a:schemeClr val="accent1"/>
+          </a:fillRef>
+          <a:effectRef idx="0">
+            <a:schemeClr val="accent1"/>
+          </a:effectRef>
+          <a:fontRef idx="minor">
+            <a:schemeClr val="lt1"/>
+          </a:fontRef>
+        </p:style>
+        <p:txBody>
+          <a:bodyPr rtlCol="0" anchor="ctr"/>
+          <a:lstStyle/>
+          <a:p>
+            <a:pPr algn="ctr"/>
+            <a:endParaRPr lang="pt-BR"/>
+          </a:p>
+        </p:txBody>
+      </p:sp>
+      <p:sp>
+        <p:nvSpPr>
+          <p:cNvPr id="8" name="TextBox 138">
+            <a:extLst>
+              <a:ext uri="{FF2B5EF4-FFF2-40B4-BE49-F238E27FC236}">
+                <a16:creationId xmlns:a16="http://schemas.microsoft.com/office/drawing/2014/main" id="{5CE7D08C-795B-4BF1-97F6-F9773F4E9F4C}"/>
+              </a:ext>
+            </a:extLst>
+          </p:cNvPr>
+          <p:cNvSpPr txBox="1"/>
+          <p:nvPr/>
+        </p:nvSpPr>
+        <p:spPr>
+          <a:xfrm>
+            <a:off x="9747419" y="-22583"/>
+            <a:ext cx="1478088" cy="211688"/>
+          </a:xfrm>
+          <a:prstGeom prst="rect">
+            <a:avLst/>
+          </a:prstGeom>
+          <a:solidFill>
+            <a:schemeClr val="bg1"/>
+          </a:solidFill>
+          <a:ln w="12700">
+            <a:noFill/>
+          </a:ln>
+        </p:spPr>
+        <p:style>
+          <a:lnRef idx="2">
+            <a:schemeClr val="accent4"/>
+          </a:lnRef>
+          <a:fillRef idx="1">
+            <a:schemeClr val="lt1"/>
+          </a:fillRef>
+          <a:effectRef idx="0">
+            <a:schemeClr val="accent4"/>
+          </a:effectRef>
+          <a:fontRef idx="minor">
+            <a:schemeClr val="dk1"/>
+          </a:fontRef>
+        </p:style>
+        <p:txBody>
+          <a:bodyPr wrap="none" lIns="52922" tIns="52922" rIns="52922" bIns="0" rtlCol="0" anchor="b"/>
+          <a:lstStyle>
+            <a:defPPr>
+              <a:defRPr lang="en-US"/>
+            </a:defPPr>
+            <a:lvl1pPr algn="ctr">
+              <a:defRPr sz="1000" b="1">
+                <a:latin typeface="Simplon BP Regular"/>
+                <a:cs typeface="Simplon BP Regular"/>
+              </a:defRPr>
+            </a:lvl1pPr>
+            <a:lvl2pPr>
+              <a:defRPr>
+                <a:solidFill>
+                  <a:schemeClr val="dk1"/>
+                </a:solidFill>
+              </a:defRPr>
+            </a:lvl2pPr>
+            <a:lvl3pPr>
+              <a:defRPr>
+                <a:solidFill>
+                  <a:schemeClr val="dk1"/>
+                </a:solidFill>
+              </a:defRPr>
+            </a:lvl3pPr>
+            <a:lvl4pPr>
+              <a:defRPr>
+                <a:solidFill>
+                  <a:schemeClr val="dk1"/>
+                </a:solidFill>
+              </a:defRPr>
+            </a:lvl4pPr>
+            <a:lvl5pPr>
+              <a:defRPr>
+                <a:solidFill>
+                  <a:schemeClr val="dk1"/>
+                </a:solidFill>
+              </a:defRPr>
+            </a:lvl5pPr>
+            <a:lvl6pPr>
+              <a:defRPr>
+                <a:solidFill>
+                  <a:schemeClr val="dk1"/>
+                </a:solidFill>
+              </a:defRPr>
+            </a:lvl6pPr>
+            <a:lvl7pPr>
+              <a:defRPr>
+                <a:solidFill>
+                  <a:schemeClr val="dk1"/>
+                </a:solidFill>
+              </a:defRPr>
+            </a:lvl7pPr>
+            <a:lvl8pPr>
+              <a:defRPr>
+                <a:solidFill>
+                  <a:schemeClr val="dk1"/>
+                </a:solidFill>
+              </a:defRPr>
+            </a:lvl8pPr>
+            <a:lvl9pPr>
+              <a:defRPr>
+                <a:solidFill>
+                  <a:schemeClr val="dk1"/>
+                </a:solidFill>
+              </a:defRPr>
+            </a:lvl9pPr>
+          </a:lstStyle>
+          <a:p>
+            <a:pPr defTabSz="672130"/>
+            <a:r>
+              <a:rPr lang="en-US" sz="1176" b="0" dirty="0">
+                <a:solidFill>
+                  <a:prstClr val="black"/>
+                </a:solidFill>
+                <a:latin typeface="Simplon BP Bold" pitchFamily="2" charset="0"/>
+              </a:rPr>
+              <a:t>    </a:t>
+            </a:r>
+            <a:r>
+              <a:rPr lang="en-US" sz="1176" b="0" dirty="0" err="1">
+                <a:solidFill>
+                  <a:prstClr val="black"/>
+                </a:solidFill>
+                <a:latin typeface="Simplon BP Bold" pitchFamily="2" charset="0"/>
+              </a:rPr>
+              <a:t>Farol</a:t>
+            </a:r>
+            <a:r>
+              <a:rPr lang="en-US" sz="1176" b="0" dirty="0">
+                <a:solidFill>
+                  <a:prstClr val="black"/>
+                </a:solidFill>
+                <a:latin typeface="Simplon BP Bold" pitchFamily="2" charset="0"/>
+              </a:rPr>
+              <a:t> do </a:t>
+            </a:r>
+            <a:r>
+              <a:rPr lang="en-US" sz="1176" b="0" dirty="0" err="1">
+                <a:solidFill>
+                  <a:prstClr val="black"/>
+                </a:solidFill>
+                <a:latin typeface="Simplon BP Bold" pitchFamily="2" charset="0"/>
+              </a:rPr>
+              <a:t>Projeto</a:t>
+            </a:r>
+            <a:r>
+              <a:rPr lang="en-US" sz="1176" b="0" dirty="0">
+                <a:solidFill>
+                  <a:prstClr val="black"/>
+                </a:solidFill>
+                <a:latin typeface="Simplon BP Bold" pitchFamily="2" charset="0"/>
+              </a:rPr>
+              <a:t>   </a:t>
+            </a:r>
+          </a:p>
+        </p:txBody>
+      </p:sp>
+      <p:sp>
+        <p:nvSpPr>
+          <p:cNvPr id="7" name="TextBox 6">
+            <a:extLst>
+              <a:ext uri="{FF2B5EF4-FFF2-40B4-BE49-F238E27FC236}">
+                <a16:creationId xmlns:a16="http://schemas.microsoft.com/office/drawing/2014/main" id="{C39335B6-EDC1-4CA9-BAE3-E8852F9F1FFC}"/>
+              </a:ext>
+            </a:extLst>
+          </p:cNvPr>
+          <p:cNvSpPr txBox="1"/>
+          <p:nvPr/>
+        </p:nvSpPr>
+        <p:spPr>
+          <a:xfrm>
+            <a:off x="6912041" y="1132960"/>
+            <a:ext cx="4777986" cy="369332"/>
+          </a:xfrm>
+          <a:prstGeom prst="rect">
+            <a:avLst/>
+          </a:prstGeom>
+          <a:noFill/>
+        </p:spPr>
+        <p:txBody>
+          <a:bodyPr wrap="square" rtlCol="0">
+            <a:spAutoFit/>
+          </a:bodyPr>
+          <a:lstStyle/>
+          <a:p>
+            <a:pPr marL="285750" lvl="1" indent="-285750" defTabSz="672130">
+              <a:buFont typeface="Arial" panose="020B0604020202020204" pitchFamily="34" charset="0"/>
+              <a:buChar char="•"/>
+            </a:pPr>
+            <a:r>
+              <a:rPr lang="pt-BR" sz="1800" dirty="0">
+                <a:solidFill>
+                  <a:schemeClr val="tx1"/>
+                </a:solidFill>
+                <a:latin typeface="Calibri" panose="020F0502020204030204" pitchFamily="34" charset="0"/>
+                <a:cs typeface="Simplon BP Regular"/>
+              </a:rPr>
+              <a:t>Integração com o </a:t>
+            </a:r>
+            <a:r>
+              <a:rPr lang="pt-BR" sz="1800" dirty="0" err="1">
+                <a:solidFill>
+                  <a:schemeClr val="tx1"/>
+                </a:solidFill>
+                <a:latin typeface="Calibri" panose="020F0502020204030204" pitchFamily="34" charset="0"/>
+                <a:cs typeface="Simplon BP Regular"/>
+              </a:rPr>
+              <a:t>back</a:t>
+            </a:r>
+            <a:r>
+              <a:rPr lang="pt-BR" sz="1800" dirty="0">
+                <a:solidFill>
+                  <a:schemeClr val="tx1"/>
+                </a:solidFill>
+                <a:latin typeface="Calibri" panose="020F0502020204030204" pitchFamily="34" charset="0"/>
+                <a:cs typeface="Simplon BP Regular"/>
+              </a:rPr>
+              <a:t> </a:t>
+            </a:r>
+            <a:r>
+              <a:rPr lang="pt-BR" sz="1800" dirty="0" err="1">
+                <a:solidFill>
+                  <a:schemeClr val="tx1"/>
+                </a:solidFill>
+                <a:latin typeface="Calibri" panose="020F0502020204030204" pitchFamily="34" charset="0"/>
+                <a:cs typeface="Simplon BP Regular"/>
+              </a:rPr>
+              <a:t>end</a:t>
+            </a:r>
+            <a:endParaRPr lang="pt-BR" sz="1800" dirty="0">
+              <a:solidFill>
+                <a:schemeClr val="tx1"/>
+              </a:solidFill>
+              <a:latin typeface="Calibri" panose="020F0502020204030204" pitchFamily="34" charset="0"/>
+              <a:cs typeface="Simplon BP Regular"/>
+            </a:endParaRPr>
+          </a:p>
+        </p:txBody>
+      </p:sp>
+      <p:sp>
+        <p:nvSpPr>
+          <p:cNvPr id="22" name="Oval 120">
+            <a:extLst>
+              <a:ext uri="{FF2B5EF4-FFF2-40B4-BE49-F238E27FC236}">
+                <a16:creationId xmlns:a16="http://schemas.microsoft.com/office/drawing/2014/main" id="{82942FCC-51D7-4B47-AB3E-6BD310106286}"/>
+              </a:ext>
+            </a:extLst>
+          </p:cNvPr>
+          <p:cNvSpPr>
+            <a:spLocks noChangeAspect="1"/>
+          </p:cNvSpPr>
+          <p:nvPr/>
+        </p:nvSpPr>
+        <p:spPr>
+          <a:xfrm>
+            <a:off x="11193898" y="297930"/>
+            <a:ext cx="211404" cy="211689"/>
+          </a:xfrm>
+          <a:prstGeom prst="ellipse">
+            <a:avLst/>
+          </a:prstGeom>
+          <a:solidFill>
+            <a:srgbClr val="00B050"/>
+          </a:solidFill>
+          <a:ln w="12700">
+            <a:solidFill>
+              <a:schemeClr val="accent3"/>
+            </a:solidFill>
+          </a:ln>
+        </p:spPr>
+        <p:style>
+          <a:lnRef idx="2">
+            <a:schemeClr val="accent1">
+              <a:shade val="50000"/>
+            </a:schemeClr>
+          </a:lnRef>
+          <a:fillRef idx="1">
+            <a:schemeClr val="accent1"/>
+          </a:fillRef>
+          <a:effectRef idx="0">
+            <a:schemeClr val="accent1"/>
+          </a:effectRef>
+          <a:fontRef idx="minor">
+            <a:schemeClr val="lt1"/>
+          </a:fontRef>
+        </p:style>
+        <p:txBody>
+          <a:bodyPr wrap="none" lIns="52922" tIns="52922" rIns="52922" rtlCol="0" anchor="ctr"/>
+          <a:lstStyle/>
+          <a:p>
+            <a:pPr algn="ctr" defTabSz="672130"/>
+            <a:endParaRPr lang="en-US" sz="1176" dirty="0">
+              <a:solidFill>
+                <a:prstClr val="black"/>
+              </a:solidFill>
+              <a:latin typeface="Simplon BP Regular"/>
+              <a:cs typeface="Simplon BP Regular"/>
+            </a:endParaRPr>
+          </a:p>
+        </p:txBody>
+      </p:sp>
+      <p:sp>
+        <p:nvSpPr>
+          <p:cNvPr id="23" name="Oval 120">
+            <a:extLst>
+              <a:ext uri="{FF2B5EF4-FFF2-40B4-BE49-F238E27FC236}">
+                <a16:creationId xmlns:a16="http://schemas.microsoft.com/office/drawing/2014/main" id="{5ADAF550-6797-4C0A-98D2-79746CAC4DBD}"/>
+              </a:ext>
+            </a:extLst>
+          </p:cNvPr>
+          <p:cNvSpPr>
+            <a:spLocks noChangeAspect="1"/>
+          </p:cNvSpPr>
+          <p:nvPr/>
+        </p:nvSpPr>
+        <p:spPr>
+          <a:xfrm>
+            <a:off x="10185228" y="284273"/>
+            <a:ext cx="211404" cy="211689"/>
+          </a:xfrm>
+          <a:prstGeom prst="ellipse">
+            <a:avLst/>
+          </a:prstGeom>
+          <a:solidFill>
+            <a:srgbClr val="00B050"/>
+          </a:solidFill>
+          <a:ln w="12700">
+            <a:solidFill>
+              <a:schemeClr val="accent3"/>
+            </a:solidFill>
+          </a:ln>
+        </p:spPr>
+        <p:style>
+          <a:lnRef idx="2">
+            <a:schemeClr val="accent1">
+              <a:shade val="50000"/>
+            </a:schemeClr>
+          </a:lnRef>
+          <a:fillRef idx="1">
+            <a:schemeClr val="accent1"/>
+          </a:fillRef>
+          <a:effectRef idx="0">
+            <a:schemeClr val="accent1"/>
+          </a:effectRef>
+          <a:fontRef idx="minor">
+            <a:schemeClr val="lt1"/>
+          </a:fontRef>
+        </p:style>
+        <p:txBody>
+          <a:bodyPr wrap="none" lIns="52922" tIns="52922" rIns="52922" rtlCol="0" anchor="ctr"/>
+          <a:lstStyle/>
+          <a:p>
+            <a:pPr algn="ctr" defTabSz="672130"/>
+            <a:endParaRPr lang="en-US" sz="1176" dirty="0">
+              <a:solidFill>
+                <a:prstClr val="black"/>
+              </a:solidFill>
+              <a:latin typeface="Simplon BP Regular"/>
+              <a:cs typeface="Simplon BP Regular"/>
+            </a:endParaRPr>
+          </a:p>
+        </p:txBody>
+      </p:sp>
+    </p:spTree>
+    <p:extLst>
+      <p:ext uri="{BB962C8B-B14F-4D97-AF65-F5344CB8AC3E}">
+        <p14:creationId xmlns:p14="http://schemas.microsoft.com/office/powerpoint/2010/main" val="1709561095"/>
       </p:ext>
     </p:extLst>
   </p:cSld>
@@ -36697,6 +38906,15 @@
 </file>
 
 <file path=customXml/item2.xml><?xml version="1.0" encoding="utf-8"?>
+<?mso-contentType ?>
+<FormTemplates xmlns="http://schemas.microsoft.com/sharepoint/v3/contenttype/forms">
+  <Display>DocumentLibraryForm</Display>
+  <Edit>DocumentLibraryForm</Edit>
+  <New>DocumentLibraryForm</New>
+</FormTemplates>
+</file>
+
+<file path=customXml/item3.xml><?xml version="1.0" encoding="utf-8"?>
 <ct:contentTypeSchema xmlns:ct="http://schemas.microsoft.com/office/2006/metadata/contentType" xmlns:ma="http://schemas.microsoft.com/office/2006/metadata/properties/metaAttributes" ct:_="" ma:_="" ma:contentTypeName="Document" ma:contentTypeID="0x0101001132905C37EA9847A7207C4BBCCCD8F4" ma:contentTypeVersion="34" ma:contentTypeDescription="Create a new document." ma:contentTypeScope="" ma:versionID="2f28daba72ca6e92be87ea70ebe5bb94">
   <xsd:schema xmlns:xsd="http://www.w3.org/2001/XMLSchema" xmlns:xs="http://www.w3.org/2001/XMLSchema" xmlns:p="http://schemas.microsoft.com/office/2006/metadata/properties" xmlns:ns3="4327b14a-fe89-488e-9f6d-9658cacf372b" xmlns:ns4="bbcd8c33-6940-4d4c-a587-bbc736ca1e4d" targetNamespace="http://schemas.microsoft.com/office/2006/metadata/properties" ma:root="true" ma:fieldsID="df18e839ce2650f1975b41376e6cdb6b" ns3:_="" ns4:_="">
     <xsd:import namespace="4327b14a-fe89-488e-9f6d-9658cacf372b"/>
@@ -37113,15 +39331,6 @@
 </ct:contentTypeSchema>
 </file>
 
-<file path=customXml/item3.xml><?xml version="1.0" encoding="utf-8"?>
-<?mso-contentType ?>
-<FormTemplates xmlns="http://schemas.microsoft.com/sharepoint/v3/contenttype/forms">
-  <Display>DocumentLibraryForm</Display>
-  <Edit>DocumentLibraryForm</Edit>
-  <New>DocumentLibraryForm</New>
-</FormTemplates>
-</file>
-
 <file path=customXml/itemProps1.xml><?xml version="1.0" encoding="utf-8"?>
 <ds:datastoreItem xmlns:ds="http://schemas.openxmlformats.org/officeDocument/2006/customXml" ds:itemID="{4B31267F-D399-4A8A-87F8-B75F56828412}">
   <ds:schemaRefs>
@@ -37140,6 +39349,14 @@
 </file>
 
 <file path=customXml/itemProps2.xml><?xml version="1.0" encoding="utf-8"?>
+<ds:datastoreItem xmlns:ds="http://schemas.openxmlformats.org/officeDocument/2006/customXml" ds:itemID="{E2481852-F24E-4532-AF30-C154D705D105}">
+  <ds:schemaRefs>
+    <ds:schemaRef ds:uri="http://schemas.microsoft.com/sharepoint/v3/contenttype/forms"/>
+  </ds:schemaRefs>
+</ds:datastoreItem>
+</file>
+
+<file path=customXml/itemProps3.xml><?xml version="1.0" encoding="utf-8"?>
 <ds:datastoreItem xmlns:ds="http://schemas.openxmlformats.org/officeDocument/2006/customXml" ds:itemID="{3BE6CAF6-1F55-4A70-B10C-21633F74987A}">
   <ds:schemaRefs>
     <ds:schemaRef ds:uri="http://schemas.microsoft.com/office/2006/metadata/contentType"/>
@@ -37156,12 +39373,4 @@
     <ds:schemaRef ds:uri="http://schemas.microsoft.com/internal/obd"/>
   </ds:schemaRefs>
 </ds:datastoreItem>
-</file>
-
-<file path=customXml/itemProps3.xml><?xml version="1.0" encoding="utf-8"?>
-<ds:datastoreItem xmlns:ds="http://schemas.openxmlformats.org/officeDocument/2006/customXml" ds:itemID="{E2481852-F24E-4532-AF30-C154D705D105}">
-  <ds:schemaRefs>
-    <ds:schemaRef ds:uri="http://schemas.microsoft.com/sharepoint/v3/contenttype/forms"/>
-  </ds:schemaRefs>
-</ds:datastoreItem>
 </file>
</xml_diff>

<commit_message>
docs: add primeria versão do status report desta semana
</commit_message>
<xml_diff>
--- a/Documentação/EngenhariaDeSoftware/Mod_Status_Report-PI20202.pptx
+++ b/Documentação/EngenhariaDeSoftware/Mod_Status_Report-PI20202.pptx
@@ -7,10 +7,10 @@
     <p:sldMasterId id="2147483665" r:id="rId6"/>
   </p:sldMasterIdLst>
   <p:notesMasterIdLst>
-    <p:notesMasterId r:id="rId16"/>
+    <p:notesMasterId r:id="rId17"/>
   </p:notesMasterIdLst>
   <p:handoutMasterIdLst>
-    <p:handoutMasterId r:id="rId17"/>
+    <p:handoutMasterId r:id="rId18"/>
   </p:handoutMasterIdLst>
   <p:sldIdLst>
     <p:sldId id="256" r:id="rId7"/>
@@ -22,6 +22,7 @@
     <p:sldId id="475" r:id="rId13"/>
     <p:sldId id="476" r:id="rId14"/>
     <p:sldId id="477" r:id="rId15"/>
+    <p:sldId id="478" r:id="rId16"/>
   </p:sldIdLst>
   <p:sldSz cx="13442950" cy="7561263"/>
   <p:notesSz cx="7104063" cy="10234613"/>
@@ -138,6 +139,7 @@
             <p14:sldId id="475"/>
             <p14:sldId id="476"/>
             <p14:sldId id="477"/>
+            <p14:sldId id="478"/>
           </p14:sldIdLst>
         </p14:section>
       </p14:sectionLst>
@@ -251,7 +253,7 @@
             <a:fld id="{C3CD65D1-5C11-455D-9F9A-0E035F00A0DA}" type="datetimeFigureOut">
               <a:rPr lang="pt-BR" smtClean="0"/>
               <a:pPr/>
-              <a:t>13/10/2021</a:t>
+              <a:t>29/10/2021</a:t>
             </a:fld>
             <a:endParaRPr lang="pt-BR"/>
           </a:p>
@@ -318,7 +320,7 @@
             <a:fld id="{CA8E3B7C-E4AE-4E9E-8479-7C668141D483}" type="slidenum">
               <a:rPr lang="pt-BR" smtClean="0"/>
               <a:pPr/>
-              <a:t>‹#›</a:t>
+              <a:t>‹nº›</a:t>
             </a:fld>
             <a:endParaRPr lang="pt-BR"/>
           </a:p>
@@ -419,7 +421,7 @@
             <a:fld id="{A05DA3EF-18EA-43DE-B1BB-402A3C558822}" type="datetimeFigureOut">
               <a:rPr lang="pt-BR" smtClean="0"/>
               <a:pPr/>
-              <a:t>13/10/2021</a:t>
+              <a:t>29/10/2021</a:t>
             </a:fld>
             <a:endParaRPr lang="pt-BR"/>
           </a:p>
@@ -580,7 +582,7 @@
             <a:fld id="{75B3645A-D0AE-4F6E-A17E-E0036A9041AF}" type="slidenum">
               <a:rPr lang="pt-BR" smtClean="0"/>
               <a:pPr/>
-              <a:t>‹#›</a:t>
+              <a:t>‹nº›</a:t>
             </a:fld>
             <a:endParaRPr lang="pt-BR"/>
           </a:p>
@@ -1426,6 +1428,99 @@
 </p:notes>
 </file>
 
+<file path=ppt/notesSlides/notesSlide9.xml><?xml version="1.0" encoding="utf-8"?>
+<p:notes xmlns:a="http://schemas.openxmlformats.org/drawingml/2006/main" xmlns:r="http://schemas.openxmlformats.org/officeDocument/2006/relationships" xmlns:p="http://schemas.openxmlformats.org/presentationml/2006/main">
+  <p:cSld>
+    <p:spTree>
+      <p:nvGrpSpPr>
+        <p:cNvPr id="1" name=""/>
+        <p:cNvGrpSpPr/>
+        <p:nvPr/>
+      </p:nvGrpSpPr>
+      <p:grpSpPr>
+        <a:xfrm>
+          <a:off x="0" y="0"/>
+          <a:ext cx="0" cy="0"/>
+          <a:chOff x="0" y="0"/>
+          <a:chExt cx="0" cy="0"/>
+        </a:xfrm>
+      </p:grpSpPr>
+      <p:sp>
+        <p:nvSpPr>
+          <p:cNvPr id="2" name="Slide Image Placeholder 1"/>
+          <p:cNvSpPr>
+            <a:spLocks noGrp="1" noRot="1" noChangeAspect="1"/>
+          </p:cNvSpPr>
+          <p:nvPr>
+            <p:ph type="sldImg"/>
+          </p:nvPr>
+        </p:nvSpPr>
+        <p:spPr/>
+      </p:sp>
+      <p:sp>
+        <p:nvSpPr>
+          <p:cNvPr id="3" name="Notes Placeholder 2"/>
+          <p:cNvSpPr>
+            <a:spLocks noGrp="1"/>
+          </p:cNvSpPr>
+          <p:nvPr>
+            <p:ph type="body" idx="1"/>
+          </p:nvPr>
+        </p:nvSpPr>
+        <p:spPr/>
+        <p:txBody>
+          <a:bodyPr/>
+          <a:lstStyle/>
+          <a:p>
+            <a:endParaRPr lang="en-US"/>
+          </a:p>
+        </p:txBody>
+      </p:sp>
+      <p:sp>
+        <p:nvSpPr>
+          <p:cNvPr id="4" name="Slide Number Placeholder 3"/>
+          <p:cNvSpPr>
+            <a:spLocks noGrp="1"/>
+          </p:cNvSpPr>
+          <p:nvPr>
+            <p:ph type="sldNum" sz="quarter" idx="10"/>
+          </p:nvPr>
+        </p:nvSpPr>
+        <p:spPr/>
+        <p:txBody>
+          <a:bodyPr/>
+          <a:lstStyle/>
+          <a:p>
+            <a:fld id="{B39AF3DB-B6A1-2444-9DD8-53D016F8E638}" type="slidenum">
+              <a:rPr lang="pt-BR" smtClean="0">
+                <a:solidFill>
+                  <a:prstClr val="black"/>
+                </a:solidFill>
+              </a:rPr>
+              <a:pPr/>
+              <a:t>10</a:t>
+            </a:fld>
+            <a:endParaRPr lang="pt-BR">
+              <a:solidFill>
+                <a:prstClr val="black"/>
+              </a:solidFill>
+            </a:endParaRPr>
+          </a:p>
+        </p:txBody>
+      </p:sp>
+    </p:spTree>
+    <p:extLst>
+      <p:ext uri="{BB962C8B-B14F-4D97-AF65-F5344CB8AC3E}">
+        <p14:creationId xmlns:p14="http://schemas.microsoft.com/office/powerpoint/2010/main" val="4102097357"/>
+      </p:ext>
+    </p:extLst>
+  </p:cSld>
+  <p:clrMapOvr>
+    <a:masterClrMapping/>
+  </p:clrMapOvr>
+</p:notes>
+</file>
+
 <file path=ppt/slideLayouts/slideLayout1.xml><?xml version="1.0" encoding="utf-8"?>
 <p:sldLayout xmlns:a="http://schemas.openxmlformats.org/drawingml/2006/main" xmlns:r="http://schemas.openxmlformats.org/officeDocument/2006/relationships" xmlns:p="http://schemas.openxmlformats.org/presentationml/2006/main" preserve="1">
   <p:cSld name="Capa 1A">
@@ -4045,7 +4140,7 @@
               <a:pPr>
                 <a:defRPr/>
               </a:pPr>
-              <a:t>‹#›</a:t>
+              <a:t>‹nº›</a:t>
             </a:fld>
             <a:endParaRPr lang="pt-BR" sz="700" dirty="0"/>
           </a:p>
@@ -5844,7 +5939,7 @@
               <a:pPr>
                 <a:defRPr/>
               </a:pPr>
-              <a:t>‹#›</a:t>
+              <a:t>‹nº›</a:t>
             </a:fld>
             <a:endParaRPr lang="pt-BR" sz="700" dirty="0"/>
           </a:p>
@@ -22277,7 +22372,7 @@
                 </a:solidFill>
               </a:rPr>
               <a:pPr/>
-              <a:t>‹#›</a:t>
+              <a:t>‹nº›</a:t>
             </a:fld>
             <a:endParaRPr lang="pt-BR" dirty="0">
               <a:solidFill>
@@ -23224,6 +23319,1885 @@
   </p:cSld>
   <p:clrMapOvr>
     <a:overrideClrMapping bg1="lt1" tx1="dk1" bg2="lt2" tx2="dk2" accent1="accent1" accent2="accent2" accent3="accent3" accent4="accent4" accent5="accent5" accent6="accent6" hlink="hlink" folHlink="folHlink"/>
+  </p:clrMapOvr>
+</p:sld>
+</file>
+
+<file path=ppt/slides/slide10.xml><?xml version="1.0" encoding="utf-8"?>
+<p:sld xmlns:a="http://schemas.openxmlformats.org/drawingml/2006/main" xmlns:r="http://schemas.openxmlformats.org/officeDocument/2006/relationships" xmlns:p="http://schemas.openxmlformats.org/presentationml/2006/main">
+  <p:cSld>
+    <p:spTree>
+      <p:nvGrpSpPr>
+        <p:cNvPr id="1" name=""/>
+        <p:cNvGrpSpPr/>
+        <p:nvPr/>
+      </p:nvGrpSpPr>
+      <p:grpSpPr>
+        <a:xfrm>
+          <a:off x="0" y="0"/>
+          <a:ext cx="0" cy="0"/>
+          <a:chOff x="0" y="0"/>
+          <a:chExt cx="0" cy="0"/>
+        </a:xfrm>
+      </p:grpSpPr>
+      <p:sp>
+        <p:nvSpPr>
+          <p:cNvPr id="43" name="Rectangle 42"/>
+          <p:cNvSpPr/>
+          <p:nvPr/>
+        </p:nvSpPr>
+        <p:spPr>
+          <a:xfrm>
+            <a:off x="6814576" y="1080752"/>
+            <a:ext cx="6209639" cy="2235805"/>
+          </a:xfrm>
+          <a:prstGeom prst="rect">
+            <a:avLst/>
+          </a:prstGeom>
+          <a:noFill/>
+          <a:ln w="12700">
+            <a:solidFill>
+              <a:schemeClr val="bg1">
+                <a:lumMod val="50000"/>
+              </a:schemeClr>
+            </a:solidFill>
+          </a:ln>
+        </p:spPr>
+        <p:style>
+          <a:lnRef idx="2">
+            <a:schemeClr val="accent4"/>
+          </a:lnRef>
+          <a:fillRef idx="1">
+            <a:schemeClr val="lt1"/>
+          </a:fillRef>
+          <a:effectRef idx="0">
+            <a:schemeClr val="accent4"/>
+          </a:effectRef>
+          <a:fontRef idx="minor">
+            <a:schemeClr val="dk1"/>
+          </a:fontRef>
+        </p:style>
+        <p:txBody>
+          <a:bodyPr tIns="105844" rtlCol="0" anchor="t"/>
+          <a:lstStyle/>
+          <a:p>
+            <a:pPr defTabSz="672130">
+              <a:spcAft>
+                <a:spcPts val="882"/>
+              </a:spcAft>
+            </a:pPr>
+            <a:endParaRPr lang="pt-BR" sz="1470" dirty="0">
+              <a:solidFill>
+                <a:schemeClr val="tx1"/>
+              </a:solidFill>
+              <a:latin typeface="Calibri" panose="020F0502020204030204" pitchFamily="34" charset="0"/>
+              <a:cs typeface="Simplon BP Regular"/>
+            </a:endParaRPr>
+          </a:p>
+        </p:txBody>
+      </p:sp>
+      <p:sp>
+        <p:nvSpPr>
+          <p:cNvPr id="3" name="Title 2"/>
+          <p:cNvSpPr>
+            <a:spLocks noGrp="1"/>
+          </p:cNvSpPr>
+          <p:nvPr>
+            <p:ph type="title"/>
+          </p:nvPr>
+        </p:nvSpPr>
+        <p:spPr>
+          <a:xfrm>
+            <a:off x="469692" y="185232"/>
+            <a:ext cx="12098020" cy="800352"/>
+          </a:xfrm>
+        </p:spPr>
+        <p:txBody>
+          <a:bodyPr vert="horz" wrap="square" lIns="105844" tIns="0" rIns="105844" bIns="0" numCol="1" anchor="t" anchorCtr="0" compatLnSpc="1">
+            <a:prstTxWarp prst="textNoShape">
+              <a:avLst/>
+            </a:prstTxWarp>
+            <a:noAutofit/>
+          </a:bodyPr>
+          <a:lstStyle/>
+          <a:p>
+            <a:pPr algn="l">
+              <a:spcAft>
+                <a:spcPts val="882"/>
+              </a:spcAft>
+            </a:pPr>
+            <a:r>
+              <a:rPr lang="en-US" sz="2646" dirty="0">
+                <a:solidFill>
+                  <a:prstClr val="black"/>
+                </a:solidFill>
+                <a:latin typeface="Simplon Oi Headline"/>
+                <a:cs typeface="Simplon Oi Headline"/>
+              </a:rPr>
+              <a:t>SEMANA 6 - 28/10/2021 – 04/11/2021</a:t>
+            </a:r>
+          </a:p>
+        </p:txBody>
+      </p:sp>
+      <p:sp>
+        <p:nvSpPr>
+          <p:cNvPr id="78" name="TextBox 118"/>
+          <p:cNvSpPr txBox="1"/>
+          <p:nvPr/>
+        </p:nvSpPr>
+        <p:spPr>
+          <a:xfrm>
+            <a:off x="11822773" y="576471"/>
+            <a:ext cx="899678" cy="179824"/>
+          </a:xfrm>
+          <a:prstGeom prst="rect">
+            <a:avLst/>
+          </a:prstGeom>
+          <a:noFill/>
+          <a:ln w="12700">
+            <a:noFill/>
+          </a:ln>
+        </p:spPr>
+        <p:style>
+          <a:lnRef idx="2">
+            <a:schemeClr val="accent4"/>
+          </a:lnRef>
+          <a:fillRef idx="1">
+            <a:schemeClr val="lt1"/>
+          </a:fillRef>
+          <a:effectRef idx="0">
+            <a:schemeClr val="accent4"/>
+          </a:effectRef>
+          <a:fontRef idx="minor">
+            <a:schemeClr val="dk1"/>
+          </a:fontRef>
+        </p:style>
+        <p:txBody>
+          <a:bodyPr wrap="none" lIns="52922" tIns="52922" rIns="52922" bIns="0" rtlCol="0" anchor="b"/>
+          <a:lstStyle>
+            <a:defPPr>
+              <a:defRPr lang="en-US"/>
+            </a:defPPr>
+            <a:lvl1pPr algn="ctr">
+              <a:defRPr sz="1000" b="1">
+                <a:latin typeface="Simplon BP Regular"/>
+                <a:cs typeface="Simplon BP Regular"/>
+              </a:defRPr>
+            </a:lvl1pPr>
+            <a:lvl2pPr>
+              <a:defRPr>
+                <a:solidFill>
+                  <a:schemeClr val="dk1"/>
+                </a:solidFill>
+              </a:defRPr>
+            </a:lvl2pPr>
+            <a:lvl3pPr>
+              <a:defRPr>
+                <a:solidFill>
+                  <a:schemeClr val="dk1"/>
+                </a:solidFill>
+              </a:defRPr>
+            </a:lvl3pPr>
+            <a:lvl4pPr>
+              <a:defRPr>
+                <a:solidFill>
+                  <a:schemeClr val="dk1"/>
+                </a:solidFill>
+              </a:defRPr>
+            </a:lvl4pPr>
+            <a:lvl5pPr>
+              <a:defRPr>
+                <a:solidFill>
+                  <a:schemeClr val="dk1"/>
+                </a:solidFill>
+              </a:defRPr>
+            </a:lvl5pPr>
+            <a:lvl6pPr>
+              <a:defRPr>
+                <a:solidFill>
+                  <a:schemeClr val="dk1"/>
+                </a:solidFill>
+              </a:defRPr>
+            </a:lvl6pPr>
+            <a:lvl7pPr>
+              <a:defRPr>
+                <a:solidFill>
+                  <a:schemeClr val="dk1"/>
+                </a:solidFill>
+              </a:defRPr>
+            </a:lvl7pPr>
+            <a:lvl8pPr>
+              <a:defRPr>
+                <a:solidFill>
+                  <a:schemeClr val="dk1"/>
+                </a:solidFill>
+              </a:defRPr>
+            </a:lvl8pPr>
+            <a:lvl9pPr>
+              <a:defRPr>
+                <a:solidFill>
+                  <a:schemeClr val="dk1"/>
+                </a:solidFill>
+              </a:defRPr>
+            </a:lvl9pPr>
+          </a:lstStyle>
+          <a:p>
+            <a:pPr defTabSz="672130"/>
+            <a:r>
+              <a:rPr lang="pt-BR" sz="1176" b="0" dirty="0">
+                <a:solidFill>
+                  <a:prstClr val="black"/>
+                </a:solidFill>
+                <a:latin typeface="Simplon BP Bold" pitchFamily="2" charset="0"/>
+              </a:rPr>
+              <a:t>Negócios</a:t>
+            </a:r>
+          </a:p>
+        </p:txBody>
+      </p:sp>
+      <p:sp>
+        <p:nvSpPr>
+          <p:cNvPr id="80" name="TextBox 123"/>
+          <p:cNvSpPr txBox="1"/>
+          <p:nvPr/>
+        </p:nvSpPr>
+        <p:spPr>
+          <a:xfrm>
+            <a:off x="10852497" y="576471"/>
+            <a:ext cx="899678" cy="179824"/>
+          </a:xfrm>
+          <a:prstGeom prst="rect">
+            <a:avLst/>
+          </a:prstGeom>
+          <a:noFill/>
+          <a:ln w="12700">
+            <a:noFill/>
+          </a:ln>
+        </p:spPr>
+        <p:style>
+          <a:lnRef idx="2">
+            <a:schemeClr val="accent4"/>
+          </a:lnRef>
+          <a:fillRef idx="1">
+            <a:schemeClr val="lt1"/>
+          </a:fillRef>
+          <a:effectRef idx="0">
+            <a:schemeClr val="accent4"/>
+          </a:effectRef>
+          <a:fontRef idx="minor">
+            <a:schemeClr val="dk1"/>
+          </a:fontRef>
+        </p:style>
+        <p:txBody>
+          <a:bodyPr wrap="none" lIns="52922" tIns="52922" rIns="52922" bIns="0" rtlCol="0" anchor="b"/>
+          <a:lstStyle>
+            <a:defPPr>
+              <a:defRPr lang="en-US"/>
+            </a:defPPr>
+            <a:lvl1pPr algn="ctr">
+              <a:defRPr sz="1000" b="1">
+                <a:latin typeface="Simplon BP Regular"/>
+                <a:cs typeface="Simplon BP Regular"/>
+              </a:defRPr>
+            </a:lvl1pPr>
+            <a:lvl2pPr>
+              <a:defRPr>
+                <a:solidFill>
+                  <a:schemeClr val="dk1"/>
+                </a:solidFill>
+              </a:defRPr>
+            </a:lvl2pPr>
+            <a:lvl3pPr>
+              <a:defRPr>
+                <a:solidFill>
+                  <a:schemeClr val="dk1"/>
+                </a:solidFill>
+              </a:defRPr>
+            </a:lvl3pPr>
+            <a:lvl4pPr>
+              <a:defRPr>
+                <a:solidFill>
+                  <a:schemeClr val="dk1"/>
+                </a:solidFill>
+              </a:defRPr>
+            </a:lvl4pPr>
+            <a:lvl5pPr>
+              <a:defRPr>
+                <a:solidFill>
+                  <a:schemeClr val="dk1"/>
+                </a:solidFill>
+              </a:defRPr>
+            </a:lvl5pPr>
+            <a:lvl6pPr>
+              <a:defRPr>
+                <a:solidFill>
+                  <a:schemeClr val="dk1"/>
+                </a:solidFill>
+              </a:defRPr>
+            </a:lvl6pPr>
+            <a:lvl7pPr>
+              <a:defRPr>
+                <a:solidFill>
+                  <a:schemeClr val="dk1"/>
+                </a:solidFill>
+              </a:defRPr>
+            </a:lvl7pPr>
+            <a:lvl8pPr>
+              <a:defRPr>
+                <a:solidFill>
+                  <a:schemeClr val="dk1"/>
+                </a:solidFill>
+              </a:defRPr>
+            </a:lvl8pPr>
+            <a:lvl9pPr>
+              <a:defRPr>
+                <a:solidFill>
+                  <a:schemeClr val="dk1"/>
+                </a:solidFill>
+              </a:defRPr>
+            </a:lvl9pPr>
+          </a:lstStyle>
+          <a:p>
+            <a:pPr defTabSz="672130"/>
+            <a:r>
+              <a:rPr lang="pt-BR" sz="1176" b="0" dirty="0">
+                <a:solidFill>
+                  <a:prstClr val="black"/>
+                </a:solidFill>
+                <a:latin typeface="Simplon BP Bold" pitchFamily="2" charset="0"/>
+              </a:rPr>
+              <a:t>Plataforma</a:t>
+            </a:r>
+          </a:p>
+        </p:txBody>
+      </p:sp>
+      <p:sp>
+        <p:nvSpPr>
+          <p:cNvPr id="82" name="TextBox 128"/>
+          <p:cNvSpPr txBox="1"/>
+          <p:nvPr/>
+        </p:nvSpPr>
+        <p:spPr>
+          <a:xfrm>
+            <a:off x="9854245" y="576471"/>
+            <a:ext cx="899678" cy="179824"/>
+          </a:xfrm>
+          <a:prstGeom prst="rect">
+            <a:avLst/>
+          </a:prstGeom>
+          <a:noFill/>
+          <a:ln w="12700">
+            <a:noFill/>
+          </a:ln>
+        </p:spPr>
+        <p:style>
+          <a:lnRef idx="2">
+            <a:schemeClr val="accent4"/>
+          </a:lnRef>
+          <a:fillRef idx="1">
+            <a:schemeClr val="lt1"/>
+          </a:fillRef>
+          <a:effectRef idx="0">
+            <a:schemeClr val="accent4"/>
+          </a:effectRef>
+          <a:fontRef idx="minor">
+            <a:schemeClr val="dk1"/>
+          </a:fontRef>
+        </p:style>
+        <p:txBody>
+          <a:bodyPr wrap="none" lIns="52922" tIns="52922" rIns="52922" bIns="0" rtlCol="0" anchor="b"/>
+          <a:lstStyle>
+            <a:defPPr>
+              <a:defRPr lang="en-US"/>
+            </a:defPPr>
+            <a:lvl1pPr algn="ctr">
+              <a:defRPr sz="1000" b="1">
+                <a:latin typeface="Simplon BP Regular"/>
+                <a:cs typeface="Simplon BP Regular"/>
+              </a:defRPr>
+            </a:lvl1pPr>
+            <a:lvl2pPr>
+              <a:defRPr>
+                <a:solidFill>
+                  <a:schemeClr val="dk1"/>
+                </a:solidFill>
+              </a:defRPr>
+            </a:lvl2pPr>
+            <a:lvl3pPr>
+              <a:defRPr>
+                <a:solidFill>
+                  <a:schemeClr val="dk1"/>
+                </a:solidFill>
+              </a:defRPr>
+            </a:lvl3pPr>
+            <a:lvl4pPr>
+              <a:defRPr>
+                <a:solidFill>
+                  <a:schemeClr val="dk1"/>
+                </a:solidFill>
+              </a:defRPr>
+            </a:lvl4pPr>
+            <a:lvl5pPr>
+              <a:defRPr>
+                <a:solidFill>
+                  <a:schemeClr val="dk1"/>
+                </a:solidFill>
+              </a:defRPr>
+            </a:lvl5pPr>
+            <a:lvl6pPr>
+              <a:defRPr>
+                <a:solidFill>
+                  <a:schemeClr val="dk1"/>
+                </a:solidFill>
+              </a:defRPr>
+            </a:lvl6pPr>
+            <a:lvl7pPr>
+              <a:defRPr>
+                <a:solidFill>
+                  <a:schemeClr val="dk1"/>
+                </a:solidFill>
+              </a:defRPr>
+            </a:lvl7pPr>
+            <a:lvl8pPr>
+              <a:defRPr>
+                <a:solidFill>
+                  <a:schemeClr val="dk1"/>
+                </a:solidFill>
+              </a:defRPr>
+            </a:lvl8pPr>
+            <a:lvl9pPr>
+              <a:defRPr>
+                <a:solidFill>
+                  <a:schemeClr val="dk1"/>
+                </a:solidFill>
+              </a:defRPr>
+            </a:lvl9pPr>
+          </a:lstStyle>
+          <a:p>
+            <a:pPr defTabSz="672130"/>
+            <a:r>
+              <a:rPr lang="pt-BR" sz="1176" b="0" dirty="0">
+                <a:solidFill>
+                  <a:prstClr val="black"/>
+                </a:solidFill>
+                <a:latin typeface="Simplon BP Bold" pitchFamily="2" charset="0"/>
+              </a:rPr>
+              <a:t>Back</a:t>
+            </a:r>
+          </a:p>
+        </p:txBody>
+      </p:sp>
+      <p:sp>
+        <p:nvSpPr>
+          <p:cNvPr id="84" name="TextBox 133"/>
+          <p:cNvSpPr txBox="1"/>
+          <p:nvPr/>
+        </p:nvSpPr>
+        <p:spPr>
+          <a:xfrm>
+            <a:off x="8934246" y="576471"/>
+            <a:ext cx="899678" cy="179824"/>
+          </a:xfrm>
+          <a:prstGeom prst="rect">
+            <a:avLst/>
+          </a:prstGeom>
+          <a:noFill/>
+          <a:ln w="12700">
+            <a:noFill/>
+          </a:ln>
+        </p:spPr>
+        <p:style>
+          <a:lnRef idx="2">
+            <a:schemeClr val="accent4"/>
+          </a:lnRef>
+          <a:fillRef idx="1">
+            <a:schemeClr val="lt1"/>
+          </a:fillRef>
+          <a:effectRef idx="0">
+            <a:schemeClr val="accent4"/>
+          </a:effectRef>
+          <a:fontRef idx="minor">
+            <a:schemeClr val="dk1"/>
+          </a:fontRef>
+        </p:style>
+        <p:txBody>
+          <a:bodyPr wrap="none" lIns="52922" tIns="52922" rIns="52922" bIns="0" rtlCol="0" anchor="b"/>
+          <a:lstStyle>
+            <a:defPPr>
+              <a:defRPr lang="en-US"/>
+            </a:defPPr>
+            <a:lvl1pPr algn="ctr">
+              <a:defRPr sz="1000" b="1">
+                <a:latin typeface="Simplon BP Regular"/>
+                <a:cs typeface="Simplon BP Regular"/>
+              </a:defRPr>
+            </a:lvl1pPr>
+            <a:lvl2pPr>
+              <a:defRPr>
+                <a:solidFill>
+                  <a:schemeClr val="dk1"/>
+                </a:solidFill>
+              </a:defRPr>
+            </a:lvl2pPr>
+            <a:lvl3pPr>
+              <a:defRPr>
+                <a:solidFill>
+                  <a:schemeClr val="dk1"/>
+                </a:solidFill>
+              </a:defRPr>
+            </a:lvl3pPr>
+            <a:lvl4pPr>
+              <a:defRPr>
+                <a:solidFill>
+                  <a:schemeClr val="dk1"/>
+                </a:solidFill>
+              </a:defRPr>
+            </a:lvl4pPr>
+            <a:lvl5pPr>
+              <a:defRPr>
+                <a:solidFill>
+                  <a:schemeClr val="dk1"/>
+                </a:solidFill>
+              </a:defRPr>
+            </a:lvl5pPr>
+            <a:lvl6pPr>
+              <a:defRPr>
+                <a:solidFill>
+                  <a:schemeClr val="dk1"/>
+                </a:solidFill>
+              </a:defRPr>
+            </a:lvl6pPr>
+            <a:lvl7pPr>
+              <a:defRPr>
+                <a:solidFill>
+                  <a:schemeClr val="dk1"/>
+                </a:solidFill>
+              </a:defRPr>
+            </a:lvl7pPr>
+            <a:lvl8pPr>
+              <a:defRPr>
+                <a:solidFill>
+                  <a:schemeClr val="dk1"/>
+                </a:solidFill>
+              </a:defRPr>
+            </a:lvl8pPr>
+            <a:lvl9pPr>
+              <a:defRPr>
+                <a:solidFill>
+                  <a:schemeClr val="dk1"/>
+                </a:solidFill>
+              </a:defRPr>
+            </a:lvl9pPr>
+          </a:lstStyle>
+          <a:p>
+            <a:pPr defTabSz="672130"/>
+            <a:r>
+              <a:rPr lang="pt-BR" sz="1176" b="0" dirty="0">
+                <a:solidFill>
+                  <a:prstClr val="black"/>
+                </a:solidFill>
+                <a:latin typeface="Simplon BP Bold" pitchFamily="2" charset="0"/>
+              </a:rPr>
+              <a:t>Front</a:t>
+            </a:r>
+          </a:p>
+        </p:txBody>
+      </p:sp>
+      <p:sp>
+        <p:nvSpPr>
+          <p:cNvPr id="88" name="Oval 134"/>
+          <p:cNvSpPr>
+            <a:spLocks noChangeAspect="1"/>
+          </p:cNvSpPr>
+          <p:nvPr/>
+        </p:nvSpPr>
+        <p:spPr>
+          <a:xfrm>
+            <a:off x="8443555" y="282529"/>
+            <a:ext cx="211404" cy="211689"/>
+          </a:xfrm>
+          <a:prstGeom prst="ellipse">
+            <a:avLst/>
+          </a:prstGeom>
+          <a:solidFill>
+            <a:srgbClr val="00B050"/>
+          </a:solidFill>
+          <a:ln w="12700">
+            <a:solidFill>
+              <a:schemeClr val="accent3"/>
+            </a:solidFill>
+          </a:ln>
+        </p:spPr>
+        <p:style>
+          <a:lnRef idx="2">
+            <a:schemeClr val="accent1">
+              <a:shade val="50000"/>
+            </a:schemeClr>
+          </a:lnRef>
+          <a:fillRef idx="1">
+            <a:schemeClr val="accent1"/>
+          </a:fillRef>
+          <a:effectRef idx="0">
+            <a:schemeClr val="accent1"/>
+          </a:effectRef>
+          <a:fontRef idx="minor">
+            <a:schemeClr val="lt1"/>
+          </a:fontRef>
+        </p:style>
+        <p:txBody>
+          <a:bodyPr wrap="none" lIns="52922" tIns="52922" rIns="52922" rtlCol="0" anchor="ctr"/>
+          <a:lstStyle/>
+          <a:p>
+            <a:pPr algn="ctr" defTabSz="672130"/>
+            <a:endParaRPr lang="en-US" sz="1176" dirty="0">
+              <a:solidFill>
+                <a:srgbClr val="FFFF00"/>
+              </a:solidFill>
+              <a:latin typeface="Simplon BP Regular"/>
+              <a:cs typeface="Simplon BP Regular"/>
+            </a:endParaRPr>
+          </a:p>
+        </p:txBody>
+      </p:sp>
+      <p:sp>
+        <p:nvSpPr>
+          <p:cNvPr id="86" name="TextBox 138"/>
+          <p:cNvSpPr txBox="1"/>
+          <p:nvPr/>
+        </p:nvSpPr>
+        <p:spPr>
+          <a:xfrm>
+            <a:off x="8126053" y="576471"/>
+            <a:ext cx="899678" cy="179824"/>
+          </a:xfrm>
+          <a:prstGeom prst="rect">
+            <a:avLst/>
+          </a:prstGeom>
+          <a:noFill/>
+          <a:ln w="12700">
+            <a:noFill/>
+          </a:ln>
+        </p:spPr>
+        <p:style>
+          <a:lnRef idx="2">
+            <a:schemeClr val="accent4"/>
+          </a:lnRef>
+          <a:fillRef idx="1">
+            <a:schemeClr val="lt1"/>
+          </a:fillRef>
+          <a:effectRef idx="0">
+            <a:schemeClr val="accent4"/>
+          </a:effectRef>
+          <a:fontRef idx="minor">
+            <a:schemeClr val="dk1"/>
+          </a:fontRef>
+        </p:style>
+        <p:txBody>
+          <a:bodyPr wrap="none" lIns="52922" tIns="52922" rIns="52922" bIns="0" rtlCol="0" anchor="b"/>
+          <a:lstStyle>
+            <a:defPPr>
+              <a:defRPr lang="en-US"/>
+            </a:defPPr>
+            <a:lvl1pPr algn="ctr">
+              <a:defRPr sz="1000" b="1">
+                <a:latin typeface="Simplon BP Regular"/>
+                <a:cs typeface="Simplon BP Regular"/>
+              </a:defRPr>
+            </a:lvl1pPr>
+            <a:lvl2pPr>
+              <a:defRPr>
+                <a:solidFill>
+                  <a:schemeClr val="dk1"/>
+                </a:solidFill>
+              </a:defRPr>
+            </a:lvl2pPr>
+            <a:lvl3pPr>
+              <a:defRPr>
+                <a:solidFill>
+                  <a:schemeClr val="dk1"/>
+                </a:solidFill>
+              </a:defRPr>
+            </a:lvl3pPr>
+            <a:lvl4pPr>
+              <a:defRPr>
+                <a:solidFill>
+                  <a:schemeClr val="dk1"/>
+                </a:solidFill>
+              </a:defRPr>
+            </a:lvl4pPr>
+            <a:lvl5pPr>
+              <a:defRPr>
+                <a:solidFill>
+                  <a:schemeClr val="dk1"/>
+                </a:solidFill>
+              </a:defRPr>
+            </a:lvl5pPr>
+            <a:lvl6pPr>
+              <a:defRPr>
+                <a:solidFill>
+                  <a:schemeClr val="dk1"/>
+                </a:solidFill>
+              </a:defRPr>
+            </a:lvl6pPr>
+            <a:lvl7pPr>
+              <a:defRPr>
+                <a:solidFill>
+                  <a:schemeClr val="dk1"/>
+                </a:solidFill>
+              </a:defRPr>
+            </a:lvl7pPr>
+            <a:lvl8pPr>
+              <a:defRPr>
+                <a:solidFill>
+                  <a:schemeClr val="dk1"/>
+                </a:solidFill>
+              </a:defRPr>
+            </a:lvl8pPr>
+            <a:lvl9pPr>
+              <a:defRPr>
+                <a:solidFill>
+                  <a:schemeClr val="dk1"/>
+                </a:solidFill>
+              </a:defRPr>
+            </a:lvl9pPr>
+          </a:lstStyle>
+          <a:p>
+            <a:pPr defTabSz="672130"/>
+            <a:r>
+              <a:rPr lang="en-US" sz="1176" b="0" dirty="0" err="1">
+                <a:solidFill>
+                  <a:prstClr val="black"/>
+                </a:solidFill>
+                <a:latin typeface="Simplon BP Bold" pitchFamily="2" charset="0"/>
+              </a:rPr>
+              <a:t>Equipe</a:t>
+            </a:r>
+            <a:endParaRPr lang="en-US" sz="1176" b="0" dirty="0">
+              <a:solidFill>
+                <a:prstClr val="black"/>
+              </a:solidFill>
+              <a:latin typeface="Simplon BP Bold" pitchFamily="2" charset="0"/>
+            </a:endParaRPr>
+          </a:p>
+        </p:txBody>
+      </p:sp>
+      <p:sp>
+        <p:nvSpPr>
+          <p:cNvPr id="64" name="Retângulo 63"/>
+          <p:cNvSpPr/>
+          <p:nvPr/>
+        </p:nvSpPr>
+        <p:spPr>
+          <a:xfrm>
+            <a:off x="512766" y="868345"/>
+            <a:ext cx="6186608" cy="238150"/>
+          </a:xfrm>
+          <a:prstGeom prst="rect">
+            <a:avLst/>
+          </a:prstGeom>
+          <a:solidFill>
+            <a:schemeClr val="bg1">
+              <a:lumMod val="85000"/>
+            </a:schemeClr>
+          </a:solidFill>
+        </p:spPr>
+        <p:txBody>
+          <a:bodyPr vert="horz" lIns="134422" tIns="67211" rIns="134422" bIns="67211" rtlCol="0" anchor="ctr"/>
+          <a:lstStyle/>
+          <a:p>
+            <a:pPr defTabSz="672130"/>
+            <a:r>
+              <a:rPr lang="en-US" sz="1544" dirty="0">
+                <a:latin typeface="Simplon Oi Headline" charset="0"/>
+                <a:ea typeface="Simplon Oi Headline" charset="0"/>
+                <a:cs typeface="Simplon Oi Headline" charset="0"/>
+              </a:rPr>
+              <a:t>PROGRESSOS</a:t>
+            </a:r>
+            <a:endParaRPr lang="pt-BR" sz="1544" dirty="0">
+              <a:latin typeface="Simplon Oi Headline" charset="0"/>
+              <a:ea typeface="Simplon Oi Headline" charset="0"/>
+              <a:cs typeface="Simplon Oi Headline" charset="0"/>
+            </a:endParaRPr>
+          </a:p>
+        </p:txBody>
+      </p:sp>
+      <p:sp>
+        <p:nvSpPr>
+          <p:cNvPr id="65" name="Retângulo 64"/>
+          <p:cNvSpPr/>
+          <p:nvPr/>
+        </p:nvSpPr>
+        <p:spPr>
+          <a:xfrm>
+            <a:off x="6814576" y="868345"/>
+            <a:ext cx="6194715" cy="238150"/>
+          </a:xfrm>
+          <a:prstGeom prst="rect">
+            <a:avLst/>
+          </a:prstGeom>
+          <a:solidFill>
+            <a:schemeClr val="bg1">
+              <a:lumMod val="85000"/>
+            </a:schemeClr>
+          </a:solidFill>
+        </p:spPr>
+        <p:txBody>
+          <a:bodyPr vert="horz" lIns="134422" tIns="67211" rIns="134422" bIns="67211" rtlCol="0" anchor="ctr"/>
+          <a:lstStyle/>
+          <a:p>
+            <a:pPr defTabSz="672130"/>
+            <a:r>
+              <a:rPr lang="pt-BR" sz="1544" dirty="0">
+                <a:latin typeface="Simplon Oi Headline" charset="0"/>
+                <a:ea typeface="Simplon Oi Headline" charset="0"/>
+                <a:cs typeface="Simplon Oi Headline" charset="0"/>
+              </a:rPr>
+              <a:t>Pontos atenção/ Principais Riscos</a:t>
+            </a:r>
+          </a:p>
+        </p:txBody>
+      </p:sp>
+      <p:sp>
+        <p:nvSpPr>
+          <p:cNvPr id="66" name="Retângulo 65"/>
+          <p:cNvSpPr/>
+          <p:nvPr/>
+        </p:nvSpPr>
+        <p:spPr>
+          <a:xfrm>
+            <a:off x="507536" y="3418875"/>
+            <a:ext cx="12505521" cy="238150"/>
+          </a:xfrm>
+          <a:prstGeom prst="rect">
+            <a:avLst/>
+          </a:prstGeom>
+          <a:solidFill>
+            <a:schemeClr val="bg1">
+              <a:lumMod val="85000"/>
+            </a:schemeClr>
+          </a:solidFill>
+        </p:spPr>
+        <p:txBody>
+          <a:bodyPr vert="horz" lIns="134422" tIns="67211" rIns="134422" bIns="67211" rtlCol="0" anchor="ctr"/>
+          <a:lstStyle/>
+          <a:p>
+            <a:pPr defTabSz="672130"/>
+            <a:r>
+              <a:rPr lang="pt-BR" sz="1544" dirty="0">
+                <a:latin typeface="Simplon Oi Headline" charset="0"/>
+                <a:ea typeface="Simplon Oi Headline" charset="0"/>
+                <a:cs typeface="Simplon Oi Headline" charset="0"/>
+              </a:rPr>
+              <a:t>Próximos Passos/ Decisões a tomar</a:t>
+            </a:r>
+          </a:p>
+        </p:txBody>
+      </p:sp>
+      <p:sp>
+        <p:nvSpPr>
+          <p:cNvPr id="63" name="Rectangle 37"/>
+          <p:cNvSpPr/>
+          <p:nvPr/>
+        </p:nvSpPr>
+        <p:spPr>
+          <a:xfrm>
+            <a:off x="496765" y="1106495"/>
+            <a:ext cx="6207777" cy="2235805"/>
+          </a:xfrm>
+          <a:prstGeom prst="rect">
+            <a:avLst/>
+          </a:prstGeom>
+          <a:noFill/>
+          <a:ln w="12700">
+            <a:solidFill>
+              <a:schemeClr val="bg1">
+                <a:lumMod val="50000"/>
+              </a:schemeClr>
+            </a:solidFill>
+          </a:ln>
+        </p:spPr>
+        <p:style>
+          <a:lnRef idx="2">
+            <a:schemeClr val="accent4"/>
+          </a:lnRef>
+          <a:fillRef idx="1">
+            <a:schemeClr val="lt1"/>
+          </a:fillRef>
+          <a:effectRef idx="0">
+            <a:schemeClr val="accent4"/>
+          </a:effectRef>
+          <a:fontRef idx="minor">
+            <a:schemeClr val="dk1"/>
+          </a:fontRef>
+        </p:style>
+        <p:txBody>
+          <a:bodyPr tIns="105844" rtlCol="0" anchor="t"/>
+          <a:lstStyle/>
+          <a:p>
+            <a:pPr marL="252049" lvl="1" indent="-252049">
+              <a:buFont typeface="Wingdings" panose="05000000000000000000" pitchFamily="2" charset="2"/>
+              <a:buChar char="§"/>
+            </a:pPr>
+            <a:r>
+              <a:rPr lang="pt-BR" sz="1323" b="1" dirty="0" err="1">
+                <a:solidFill>
+                  <a:schemeClr val="tx1"/>
+                </a:solidFill>
+                <a:latin typeface="Calibri" panose="020F0502020204030204" pitchFamily="34" charset="0"/>
+                <a:cs typeface="Simplon BP Regular"/>
+              </a:rPr>
+              <a:t>Enpoint</a:t>
+            </a:r>
+            <a:r>
+              <a:rPr lang="pt-BR" sz="1323" b="1" dirty="0">
+                <a:solidFill>
+                  <a:schemeClr val="tx1"/>
+                </a:solidFill>
+                <a:latin typeface="Calibri" panose="020F0502020204030204" pitchFamily="34" charset="0"/>
+                <a:cs typeface="Simplon BP Regular"/>
+              </a:rPr>
+              <a:t> de renovação</a:t>
+            </a:r>
+          </a:p>
+          <a:p>
+            <a:pPr marL="252049" lvl="1" indent="-252049">
+              <a:buFont typeface="Wingdings" panose="05000000000000000000" pitchFamily="2" charset="2"/>
+              <a:buChar char="§"/>
+            </a:pPr>
+            <a:r>
+              <a:rPr lang="pt-BR" sz="1323" b="1" dirty="0">
+                <a:solidFill>
+                  <a:schemeClr val="tx1"/>
+                </a:solidFill>
+                <a:latin typeface="Calibri" panose="020F0502020204030204" pitchFamily="34" charset="0"/>
+                <a:cs typeface="Simplon BP Regular"/>
+              </a:rPr>
+              <a:t>Começamos a Planilha UAT</a:t>
+            </a:r>
+          </a:p>
+          <a:p>
+            <a:pPr marL="252049" lvl="1" indent="-252049">
+              <a:buFont typeface="Wingdings" panose="05000000000000000000" pitchFamily="2" charset="2"/>
+              <a:buChar char="§"/>
+            </a:pPr>
+            <a:endParaRPr lang="pt-BR" sz="1323" b="1" dirty="0">
+              <a:solidFill>
+                <a:schemeClr val="tx1"/>
+              </a:solidFill>
+              <a:latin typeface="Calibri" panose="020F0502020204030204" pitchFamily="34" charset="0"/>
+              <a:cs typeface="Simplon BP Regular"/>
+            </a:endParaRPr>
+          </a:p>
+          <a:p>
+            <a:pPr marL="0" lvl="1" defTabSz="672130"/>
+            <a:endParaRPr lang="pt-BR" sz="1600" b="1" dirty="0">
+              <a:solidFill>
+                <a:schemeClr val="tx1"/>
+              </a:solidFill>
+              <a:latin typeface="Calibri" panose="020F0502020204030204" pitchFamily="34" charset="0"/>
+              <a:cs typeface="Simplon BP Regular"/>
+            </a:endParaRPr>
+          </a:p>
+          <a:p>
+            <a:pPr marL="252049" lvl="1" indent="-252049" fontAlgn="base">
+              <a:spcBef>
+                <a:spcPct val="0"/>
+              </a:spcBef>
+              <a:buFont typeface="Wingdings" panose="05000000000000000000" pitchFamily="2" charset="2"/>
+              <a:buChar char="ü"/>
+              <a:defRPr/>
+            </a:pPr>
+            <a:endParaRPr lang="pt-BR" sz="1323" b="1" dirty="0">
+              <a:solidFill>
+                <a:schemeClr val="tx1"/>
+              </a:solidFill>
+              <a:latin typeface="Calibri" panose="020F0502020204030204" pitchFamily="34" charset="0"/>
+              <a:cs typeface="Simplon BP Regular"/>
+            </a:endParaRPr>
+          </a:p>
+          <a:p>
+            <a:pPr marL="252049" lvl="1" indent="-252049" fontAlgn="base">
+              <a:spcBef>
+                <a:spcPct val="0"/>
+              </a:spcBef>
+              <a:buFont typeface="Wingdings" panose="05000000000000000000" pitchFamily="2" charset="2"/>
+              <a:buChar char="ü"/>
+              <a:defRPr/>
+            </a:pPr>
+            <a:endParaRPr lang="pt-BR" sz="1323" b="1" dirty="0">
+              <a:solidFill>
+                <a:schemeClr val="tx1"/>
+              </a:solidFill>
+              <a:latin typeface="Calibri" panose="020F0502020204030204" pitchFamily="34" charset="0"/>
+              <a:cs typeface="Simplon BP Regular"/>
+            </a:endParaRPr>
+          </a:p>
+          <a:p>
+            <a:pPr marL="252049" lvl="1" indent="-252049" fontAlgn="base">
+              <a:spcBef>
+                <a:spcPct val="0"/>
+              </a:spcBef>
+              <a:buFont typeface="Wingdings" panose="05000000000000000000" pitchFamily="2" charset="2"/>
+              <a:buChar char="ü"/>
+              <a:defRPr/>
+            </a:pPr>
+            <a:endParaRPr lang="pt-BR" sz="1323" b="1" dirty="0">
+              <a:solidFill>
+                <a:schemeClr val="tx1"/>
+              </a:solidFill>
+              <a:latin typeface="Calibri" panose="020F0502020204030204" pitchFamily="34" charset="0"/>
+              <a:cs typeface="Simplon BP Regular"/>
+            </a:endParaRPr>
+          </a:p>
+          <a:p>
+            <a:pPr marL="252049" indent="-252049" fontAlgn="base">
+              <a:spcBef>
+                <a:spcPct val="0"/>
+              </a:spcBef>
+              <a:buFont typeface="Wingdings" panose="05000000000000000000" pitchFamily="2" charset="2"/>
+              <a:buChar char="ü"/>
+              <a:defRPr/>
+            </a:pPr>
+            <a:endParaRPr lang="pt-BR" sz="1323" b="1" dirty="0">
+              <a:solidFill>
+                <a:schemeClr val="tx1"/>
+              </a:solidFill>
+              <a:latin typeface="Calibri" panose="020F0502020204030204" pitchFamily="34" charset="0"/>
+              <a:cs typeface="Simplon BP Regular"/>
+            </a:endParaRPr>
+          </a:p>
+          <a:p>
+            <a:pPr marL="252049" indent="-252049" fontAlgn="base">
+              <a:spcBef>
+                <a:spcPct val="0"/>
+              </a:spcBef>
+              <a:buFont typeface="Wingdings" panose="05000000000000000000" pitchFamily="2" charset="2"/>
+              <a:buChar char="ü"/>
+              <a:defRPr/>
+            </a:pPr>
+            <a:endParaRPr lang="pt-BR" sz="1323" b="1" dirty="0">
+              <a:solidFill>
+                <a:schemeClr val="tx1"/>
+              </a:solidFill>
+              <a:latin typeface="Calibri" panose="020F0502020204030204" pitchFamily="34" charset="0"/>
+              <a:cs typeface="Simplon BP Regular"/>
+            </a:endParaRPr>
+          </a:p>
+        </p:txBody>
+      </p:sp>
+      <p:sp>
+        <p:nvSpPr>
+          <p:cNvPr id="2" name="Rectangle 43">
+            <a:extLst>
+              <a:ext uri="{FF2B5EF4-FFF2-40B4-BE49-F238E27FC236}">
+                <a16:creationId xmlns:a16="http://schemas.microsoft.com/office/drawing/2014/main" id="{B15BA19F-C787-4E6A-ADAB-C0DFF09C66A8}"/>
+              </a:ext>
+            </a:extLst>
+          </p:cNvPr>
+          <p:cNvSpPr>
+            <a:spLocks/>
+          </p:cNvSpPr>
+          <p:nvPr/>
+        </p:nvSpPr>
+        <p:spPr>
+          <a:xfrm>
+            <a:off x="496765" y="3657025"/>
+            <a:ext cx="12496524" cy="3833059"/>
+          </a:xfrm>
+          <a:prstGeom prst="rect">
+            <a:avLst/>
+          </a:prstGeom>
+          <a:noFill/>
+          <a:ln w="12700">
+            <a:solidFill>
+              <a:schemeClr val="bg1">
+                <a:lumMod val="50000"/>
+              </a:schemeClr>
+            </a:solidFill>
+          </a:ln>
+        </p:spPr>
+        <p:style>
+          <a:lnRef idx="2">
+            <a:schemeClr val="accent4"/>
+          </a:lnRef>
+          <a:fillRef idx="1">
+            <a:schemeClr val="lt1"/>
+          </a:fillRef>
+          <a:effectRef idx="0">
+            <a:schemeClr val="accent4"/>
+          </a:effectRef>
+          <a:fontRef idx="minor">
+            <a:schemeClr val="dk1"/>
+          </a:fontRef>
+        </p:style>
+        <p:txBody>
+          <a:bodyPr wrap="square" tIns="105844" numCol="3" rtlCol="0" anchor="ctr"/>
+          <a:lstStyle/>
+          <a:p>
+            <a:pPr marL="0" lvl="1" defTabSz="672130"/>
+            <a:r>
+              <a:rPr lang="pt-BR" sz="1323" b="1" dirty="0">
+                <a:solidFill>
+                  <a:schemeClr val="tx1"/>
+                </a:solidFill>
+                <a:latin typeface="Calibri" panose="020F0502020204030204" pitchFamily="34" charset="0"/>
+                <a:cs typeface="Simplon BP Regular"/>
+              </a:rPr>
+              <a:t>Frente Plataforma</a:t>
+            </a:r>
+          </a:p>
+          <a:p>
+            <a:pPr marL="0" lvl="1" defTabSz="672130"/>
+            <a:endParaRPr lang="pt-BR" sz="1323" b="1" dirty="0">
+              <a:solidFill>
+                <a:schemeClr val="tx1"/>
+              </a:solidFill>
+              <a:latin typeface="Calibri" panose="020F0502020204030204" pitchFamily="34" charset="0"/>
+              <a:cs typeface="Simplon BP Regular"/>
+            </a:endParaRPr>
+          </a:p>
+          <a:p>
+            <a:pPr marL="0" lvl="1" defTabSz="672130"/>
+            <a:r>
+              <a:rPr lang="pt-BR" sz="1323" b="1" dirty="0">
+                <a:solidFill>
+                  <a:schemeClr val="tx1"/>
+                </a:solidFill>
+                <a:latin typeface="Calibri" panose="020F0502020204030204" pitchFamily="34" charset="0"/>
+                <a:cs typeface="Simplon BP Regular"/>
+              </a:rPr>
+              <a:t>Frente Backend</a:t>
+            </a:r>
+          </a:p>
+          <a:p>
+            <a:pPr marL="285750" lvl="1" indent="-285750" defTabSz="672130">
+              <a:buFont typeface="Arial" panose="020B0604020202020204" pitchFamily="34" charset="0"/>
+              <a:buChar char="•"/>
+            </a:pPr>
+            <a:r>
+              <a:rPr lang="pt-BR" sz="1323" dirty="0">
+                <a:solidFill>
+                  <a:schemeClr val="tx1"/>
+                </a:solidFill>
+                <a:latin typeface="Calibri" panose="020F0502020204030204" pitchFamily="34" charset="0"/>
+                <a:cs typeface="Simplon BP Regular"/>
+              </a:rPr>
+              <a:t>Terminar end-points de devolução </a:t>
+            </a:r>
+          </a:p>
+          <a:p>
+            <a:pPr marL="0" lvl="1" defTabSz="672130"/>
+            <a:r>
+              <a:rPr lang="pt-BR" sz="1323" b="1" dirty="0">
+                <a:solidFill>
+                  <a:schemeClr val="tx1"/>
+                </a:solidFill>
+                <a:latin typeface="Calibri" panose="020F0502020204030204" pitchFamily="34" charset="0"/>
+                <a:cs typeface="Simplon BP Regular"/>
+              </a:rPr>
+              <a:t>Frente Front </a:t>
+            </a:r>
+            <a:r>
+              <a:rPr lang="pt-BR" sz="1323" b="1" dirty="0" err="1">
+                <a:solidFill>
+                  <a:schemeClr val="tx1"/>
+                </a:solidFill>
+                <a:latin typeface="Calibri" panose="020F0502020204030204" pitchFamily="34" charset="0"/>
+                <a:cs typeface="Simplon BP Regular"/>
+              </a:rPr>
+              <a:t>end</a:t>
+            </a:r>
+            <a:endParaRPr lang="pt-BR" sz="1323" b="1" dirty="0">
+              <a:solidFill>
+                <a:schemeClr val="tx1"/>
+              </a:solidFill>
+              <a:latin typeface="Calibri" panose="020F0502020204030204" pitchFamily="34" charset="0"/>
+              <a:cs typeface="Simplon BP Regular"/>
+            </a:endParaRPr>
+          </a:p>
+          <a:p>
+            <a:pPr marL="0" lvl="1" defTabSz="672130"/>
+            <a:r>
+              <a:rPr lang="pt-BR" sz="1400" b="1" dirty="0">
+                <a:solidFill>
+                  <a:schemeClr val="tx1"/>
+                </a:solidFill>
+                <a:latin typeface="Calibri" panose="020F0502020204030204" pitchFamily="34" charset="0"/>
+                <a:cs typeface="Simplon BP Regular"/>
+              </a:rPr>
+              <a:t>Frente Negócios</a:t>
+            </a:r>
+            <a:r>
+              <a:rPr lang="pt-BR" sz="1400" dirty="0">
+                <a:solidFill>
+                  <a:schemeClr val="tx1"/>
+                </a:solidFill>
+                <a:latin typeface="Calibri" panose="020F0502020204030204" pitchFamily="34" charset="0"/>
+                <a:cs typeface="Simplon BP Regular"/>
+              </a:rPr>
+              <a:t>;</a:t>
+            </a:r>
+          </a:p>
+          <a:p>
+            <a:pPr marL="0" lvl="1"/>
+            <a:endParaRPr lang="pt-BR" sz="1400" b="1" dirty="0">
+              <a:solidFill>
+                <a:schemeClr val="tx1"/>
+              </a:solidFill>
+              <a:latin typeface="Calibri" panose="020F0502020204030204" pitchFamily="34" charset="0"/>
+              <a:cs typeface="Simplon BP Regular"/>
+            </a:endParaRPr>
+          </a:p>
+          <a:p>
+            <a:pPr marL="0" lvl="1"/>
+            <a:r>
+              <a:rPr lang="pt-BR" sz="1400" b="1" dirty="0">
+                <a:solidFill>
+                  <a:schemeClr val="tx1"/>
+                </a:solidFill>
+                <a:latin typeface="Calibri" panose="020F0502020204030204" pitchFamily="34" charset="0"/>
+                <a:cs typeface="Simplon BP Regular"/>
+              </a:rPr>
+              <a:t>Frente Gestão Organizacional</a:t>
+            </a:r>
+            <a:endParaRPr lang="pt-BR" sz="1400" dirty="0">
+              <a:solidFill>
+                <a:schemeClr val="tx1"/>
+              </a:solidFill>
+              <a:latin typeface="Calibri" panose="020F0502020204030204" pitchFamily="34" charset="0"/>
+              <a:cs typeface="Simplon BP Regular"/>
+            </a:endParaRPr>
+          </a:p>
+        </p:txBody>
+      </p:sp>
+      <p:sp>
+        <p:nvSpPr>
+          <p:cNvPr id="6" name="Oval 134">
+            <a:extLst>
+              <a:ext uri="{FF2B5EF4-FFF2-40B4-BE49-F238E27FC236}">
+                <a16:creationId xmlns:a16="http://schemas.microsoft.com/office/drawing/2014/main" id="{70825C6F-9257-4CF5-8C62-1CA1EB2F8815}"/>
+              </a:ext>
+            </a:extLst>
+          </p:cNvPr>
+          <p:cNvSpPr>
+            <a:spLocks noChangeAspect="1"/>
+          </p:cNvSpPr>
+          <p:nvPr/>
+        </p:nvSpPr>
+        <p:spPr>
+          <a:xfrm>
+            <a:off x="9282214" y="282529"/>
+            <a:ext cx="211404" cy="211689"/>
+          </a:xfrm>
+          <a:prstGeom prst="ellipse">
+            <a:avLst/>
+          </a:prstGeom>
+          <a:solidFill>
+            <a:srgbClr val="FFFF00"/>
+          </a:solidFill>
+          <a:ln w="12700">
+            <a:solidFill>
+              <a:schemeClr val="accent3"/>
+            </a:solidFill>
+          </a:ln>
+        </p:spPr>
+        <p:style>
+          <a:lnRef idx="2">
+            <a:schemeClr val="accent1">
+              <a:shade val="50000"/>
+            </a:schemeClr>
+          </a:lnRef>
+          <a:fillRef idx="1">
+            <a:schemeClr val="accent1"/>
+          </a:fillRef>
+          <a:effectRef idx="0">
+            <a:schemeClr val="accent1"/>
+          </a:effectRef>
+          <a:fontRef idx="minor">
+            <a:schemeClr val="lt1"/>
+          </a:fontRef>
+        </p:style>
+        <p:txBody>
+          <a:bodyPr wrap="none" lIns="52922" tIns="52922" rIns="52922" rtlCol="0" anchor="ctr"/>
+          <a:lstStyle/>
+          <a:p>
+            <a:pPr algn="ctr" defTabSz="672130"/>
+            <a:endParaRPr lang="en-US" sz="1176" dirty="0">
+              <a:solidFill>
+                <a:prstClr val="black"/>
+              </a:solidFill>
+              <a:latin typeface="Simplon BP Regular"/>
+              <a:cs typeface="Simplon BP Regular"/>
+            </a:endParaRPr>
+          </a:p>
+        </p:txBody>
+      </p:sp>
+      <p:sp>
+        <p:nvSpPr>
+          <p:cNvPr id="9" name="Oval 134">
+            <a:extLst>
+              <a:ext uri="{FF2B5EF4-FFF2-40B4-BE49-F238E27FC236}">
+                <a16:creationId xmlns:a16="http://schemas.microsoft.com/office/drawing/2014/main" id="{B60B13C9-0C70-4C0F-82B2-D0CD4FDFC1F0}"/>
+              </a:ext>
+            </a:extLst>
+          </p:cNvPr>
+          <p:cNvSpPr>
+            <a:spLocks noChangeAspect="1"/>
+          </p:cNvSpPr>
+          <p:nvPr/>
+        </p:nvSpPr>
+        <p:spPr>
+          <a:xfrm>
+            <a:off x="12155999" y="278623"/>
+            <a:ext cx="211404" cy="211689"/>
+          </a:xfrm>
+          <a:prstGeom prst="ellipse">
+            <a:avLst/>
+          </a:prstGeom>
+          <a:solidFill>
+            <a:srgbClr val="00B050"/>
+          </a:solidFill>
+          <a:ln w="12700">
+            <a:solidFill>
+              <a:schemeClr val="accent3"/>
+            </a:solidFill>
+          </a:ln>
+        </p:spPr>
+        <p:style>
+          <a:lnRef idx="2">
+            <a:schemeClr val="accent1">
+              <a:shade val="50000"/>
+            </a:schemeClr>
+          </a:lnRef>
+          <a:fillRef idx="1">
+            <a:schemeClr val="accent1"/>
+          </a:fillRef>
+          <a:effectRef idx="0">
+            <a:schemeClr val="accent1"/>
+          </a:effectRef>
+          <a:fontRef idx="minor">
+            <a:schemeClr val="lt1"/>
+          </a:fontRef>
+        </p:style>
+        <p:txBody>
+          <a:bodyPr wrap="none" lIns="52922" tIns="52922" rIns="52922" rtlCol="0" anchor="ctr"/>
+          <a:lstStyle/>
+          <a:p>
+            <a:pPr algn="ctr" defTabSz="672130"/>
+            <a:endParaRPr lang="en-US" sz="1176" dirty="0">
+              <a:solidFill>
+                <a:prstClr val="black"/>
+              </a:solidFill>
+              <a:latin typeface="Simplon BP Regular"/>
+              <a:cs typeface="Simplon BP Regular"/>
+            </a:endParaRPr>
+          </a:p>
+        </p:txBody>
+      </p:sp>
+      <p:sp>
+        <p:nvSpPr>
+          <p:cNvPr id="5" name="Retângulo 4">
+            <a:extLst>
+              <a:ext uri="{FF2B5EF4-FFF2-40B4-BE49-F238E27FC236}">
+                <a16:creationId xmlns:a16="http://schemas.microsoft.com/office/drawing/2014/main" id="{A1C14918-6027-46B3-96BF-C5F7FDEC3276}"/>
+              </a:ext>
+            </a:extLst>
+          </p:cNvPr>
+          <p:cNvSpPr/>
+          <p:nvPr/>
+        </p:nvSpPr>
+        <p:spPr>
+          <a:xfrm>
+            <a:off x="8017619" y="180231"/>
+            <a:ext cx="4937689" cy="618769"/>
+          </a:xfrm>
+          <a:prstGeom prst="rect">
+            <a:avLst/>
+          </a:prstGeom>
+          <a:noFill/>
+          <a:ln w="6350">
+            <a:solidFill>
+              <a:schemeClr val="bg1">
+                <a:lumMod val="75000"/>
+              </a:schemeClr>
+            </a:solidFill>
+          </a:ln>
+        </p:spPr>
+        <p:style>
+          <a:lnRef idx="2">
+            <a:schemeClr val="accent1">
+              <a:shade val="50000"/>
+            </a:schemeClr>
+          </a:lnRef>
+          <a:fillRef idx="1">
+            <a:schemeClr val="accent1"/>
+          </a:fillRef>
+          <a:effectRef idx="0">
+            <a:schemeClr val="accent1"/>
+          </a:effectRef>
+          <a:fontRef idx="minor">
+            <a:schemeClr val="lt1"/>
+          </a:fontRef>
+        </p:style>
+        <p:txBody>
+          <a:bodyPr rtlCol="0" anchor="ctr"/>
+          <a:lstStyle/>
+          <a:p>
+            <a:pPr algn="ctr"/>
+            <a:endParaRPr lang="pt-BR"/>
+          </a:p>
+        </p:txBody>
+      </p:sp>
+      <p:sp>
+        <p:nvSpPr>
+          <p:cNvPr id="8" name="TextBox 138">
+            <a:extLst>
+              <a:ext uri="{FF2B5EF4-FFF2-40B4-BE49-F238E27FC236}">
+                <a16:creationId xmlns:a16="http://schemas.microsoft.com/office/drawing/2014/main" id="{5CE7D08C-795B-4BF1-97F6-F9773F4E9F4C}"/>
+              </a:ext>
+            </a:extLst>
+          </p:cNvPr>
+          <p:cNvSpPr txBox="1"/>
+          <p:nvPr/>
+        </p:nvSpPr>
+        <p:spPr>
+          <a:xfrm>
+            <a:off x="9747419" y="-22583"/>
+            <a:ext cx="1478088" cy="211688"/>
+          </a:xfrm>
+          <a:prstGeom prst="rect">
+            <a:avLst/>
+          </a:prstGeom>
+          <a:solidFill>
+            <a:schemeClr val="bg1"/>
+          </a:solidFill>
+          <a:ln w="12700">
+            <a:noFill/>
+          </a:ln>
+        </p:spPr>
+        <p:style>
+          <a:lnRef idx="2">
+            <a:schemeClr val="accent4"/>
+          </a:lnRef>
+          <a:fillRef idx="1">
+            <a:schemeClr val="lt1"/>
+          </a:fillRef>
+          <a:effectRef idx="0">
+            <a:schemeClr val="accent4"/>
+          </a:effectRef>
+          <a:fontRef idx="minor">
+            <a:schemeClr val="dk1"/>
+          </a:fontRef>
+        </p:style>
+        <p:txBody>
+          <a:bodyPr wrap="none" lIns="52922" tIns="52922" rIns="52922" bIns="0" rtlCol="0" anchor="b"/>
+          <a:lstStyle>
+            <a:defPPr>
+              <a:defRPr lang="en-US"/>
+            </a:defPPr>
+            <a:lvl1pPr algn="ctr">
+              <a:defRPr sz="1000" b="1">
+                <a:latin typeface="Simplon BP Regular"/>
+                <a:cs typeface="Simplon BP Regular"/>
+              </a:defRPr>
+            </a:lvl1pPr>
+            <a:lvl2pPr>
+              <a:defRPr>
+                <a:solidFill>
+                  <a:schemeClr val="dk1"/>
+                </a:solidFill>
+              </a:defRPr>
+            </a:lvl2pPr>
+            <a:lvl3pPr>
+              <a:defRPr>
+                <a:solidFill>
+                  <a:schemeClr val="dk1"/>
+                </a:solidFill>
+              </a:defRPr>
+            </a:lvl3pPr>
+            <a:lvl4pPr>
+              <a:defRPr>
+                <a:solidFill>
+                  <a:schemeClr val="dk1"/>
+                </a:solidFill>
+              </a:defRPr>
+            </a:lvl4pPr>
+            <a:lvl5pPr>
+              <a:defRPr>
+                <a:solidFill>
+                  <a:schemeClr val="dk1"/>
+                </a:solidFill>
+              </a:defRPr>
+            </a:lvl5pPr>
+            <a:lvl6pPr>
+              <a:defRPr>
+                <a:solidFill>
+                  <a:schemeClr val="dk1"/>
+                </a:solidFill>
+              </a:defRPr>
+            </a:lvl6pPr>
+            <a:lvl7pPr>
+              <a:defRPr>
+                <a:solidFill>
+                  <a:schemeClr val="dk1"/>
+                </a:solidFill>
+              </a:defRPr>
+            </a:lvl7pPr>
+            <a:lvl8pPr>
+              <a:defRPr>
+                <a:solidFill>
+                  <a:schemeClr val="dk1"/>
+                </a:solidFill>
+              </a:defRPr>
+            </a:lvl8pPr>
+            <a:lvl9pPr>
+              <a:defRPr>
+                <a:solidFill>
+                  <a:schemeClr val="dk1"/>
+                </a:solidFill>
+              </a:defRPr>
+            </a:lvl9pPr>
+          </a:lstStyle>
+          <a:p>
+            <a:pPr defTabSz="672130"/>
+            <a:r>
+              <a:rPr lang="en-US" sz="1176" b="0" dirty="0">
+                <a:solidFill>
+                  <a:prstClr val="black"/>
+                </a:solidFill>
+                <a:latin typeface="Simplon BP Bold" pitchFamily="2" charset="0"/>
+              </a:rPr>
+              <a:t>    </a:t>
+            </a:r>
+            <a:r>
+              <a:rPr lang="en-US" sz="1176" b="0" dirty="0" err="1">
+                <a:solidFill>
+                  <a:prstClr val="black"/>
+                </a:solidFill>
+                <a:latin typeface="Simplon BP Bold" pitchFamily="2" charset="0"/>
+              </a:rPr>
+              <a:t>Farol</a:t>
+            </a:r>
+            <a:r>
+              <a:rPr lang="en-US" sz="1176" b="0" dirty="0">
+                <a:solidFill>
+                  <a:prstClr val="black"/>
+                </a:solidFill>
+                <a:latin typeface="Simplon BP Bold" pitchFamily="2" charset="0"/>
+              </a:rPr>
+              <a:t> do </a:t>
+            </a:r>
+            <a:r>
+              <a:rPr lang="en-US" sz="1176" b="0" dirty="0" err="1">
+                <a:solidFill>
+                  <a:prstClr val="black"/>
+                </a:solidFill>
+                <a:latin typeface="Simplon BP Bold" pitchFamily="2" charset="0"/>
+              </a:rPr>
+              <a:t>Projeto</a:t>
+            </a:r>
+            <a:r>
+              <a:rPr lang="en-US" sz="1176" b="0" dirty="0">
+                <a:solidFill>
+                  <a:prstClr val="black"/>
+                </a:solidFill>
+                <a:latin typeface="Simplon BP Bold" pitchFamily="2" charset="0"/>
+              </a:rPr>
+              <a:t>   </a:t>
+            </a:r>
+          </a:p>
+        </p:txBody>
+      </p:sp>
+      <p:sp>
+        <p:nvSpPr>
+          <p:cNvPr id="22" name="Oval 120">
+            <a:extLst>
+              <a:ext uri="{FF2B5EF4-FFF2-40B4-BE49-F238E27FC236}">
+                <a16:creationId xmlns:a16="http://schemas.microsoft.com/office/drawing/2014/main" id="{82942FCC-51D7-4B47-AB3E-6BD310106286}"/>
+              </a:ext>
+            </a:extLst>
+          </p:cNvPr>
+          <p:cNvSpPr>
+            <a:spLocks noChangeAspect="1"/>
+          </p:cNvSpPr>
+          <p:nvPr/>
+        </p:nvSpPr>
+        <p:spPr>
+          <a:xfrm>
+            <a:off x="11193898" y="297930"/>
+            <a:ext cx="211404" cy="211689"/>
+          </a:xfrm>
+          <a:prstGeom prst="ellipse">
+            <a:avLst/>
+          </a:prstGeom>
+          <a:solidFill>
+            <a:srgbClr val="00B050"/>
+          </a:solidFill>
+          <a:ln w="12700">
+            <a:solidFill>
+              <a:schemeClr val="accent3"/>
+            </a:solidFill>
+          </a:ln>
+        </p:spPr>
+        <p:style>
+          <a:lnRef idx="2">
+            <a:schemeClr val="accent1">
+              <a:shade val="50000"/>
+            </a:schemeClr>
+          </a:lnRef>
+          <a:fillRef idx="1">
+            <a:schemeClr val="accent1"/>
+          </a:fillRef>
+          <a:effectRef idx="0">
+            <a:schemeClr val="accent1"/>
+          </a:effectRef>
+          <a:fontRef idx="minor">
+            <a:schemeClr val="lt1"/>
+          </a:fontRef>
+        </p:style>
+        <p:txBody>
+          <a:bodyPr wrap="none" lIns="52922" tIns="52922" rIns="52922" rtlCol="0" anchor="ctr"/>
+          <a:lstStyle/>
+          <a:p>
+            <a:pPr algn="ctr" defTabSz="672130"/>
+            <a:endParaRPr lang="en-US" sz="1176" dirty="0">
+              <a:solidFill>
+                <a:prstClr val="black"/>
+              </a:solidFill>
+              <a:latin typeface="Simplon BP Regular"/>
+              <a:cs typeface="Simplon BP Regular"/>
+            </a:endParaRPr>
+          </a:p>
+        </p:txBody>
+      </p:sp>
+      <p:sp>
+        <p:nvSpPr>
+          <p:cNvPr id="23" name="Oval 120">
+            <a:extLst>
+              <a:ext uri="{FF2B5EF4-FFF2-40B4-BE49-F238E27FC236}">
+                <a16:creationId xmlns:a16="http://schemas.microsoft.com/office/drawing/2014/main" id="{5ADAF550-6797-4C0A-98D2-79746CAC4DBD}"/>
+              </a:ext>
+            </a:extLst>
+          </p:cNvPr>
+          <p:cNvSpPr>
+            <a:spLocks noChangeAspect="1"/>
+          </p:cNvSpPr>
+          <p:nvPr/>
+        </p:nvSpPr>
+        <p:spPr>
+          <a:xfrm>
+            <a:off x="10185228" y="284273"/>
+            <a:ext cx="211404" cy="211689"/>
+          </a:xfrm>
+          <a:prstGeom prst="ellipse">
+            <a:avLst/>
+          </a:prstGeom>
+          <a:solidFill>
+            <a:srgbClr val="00B050"/>
+          </a:solidFill>
+          <a:ln w="12700">
+            <a:solidFill>
+              <a:schemeClr val="accent3"/>
+            </a:solidFill>
+          </a:ln>
+        </p:spPr>
+        <p:style>
+          <a:lnRef idx="2">
+            <a:schemeClr val="accent1">
+              <a:shade val="50000"/>
+            </a:schemeClr>
+          </a:lnRef>
+          <a:fillRef idx="1">
+            <a:schemeClr val="accent1"/>
+          </a:fillRef>
+          <a:effectRef idx="0">
+            <a:schemeClr val="accent1"/>
+          </a:effectRef>
+          <a:fontRef idx="minor">
+            <a:schemeClr val="lt1"/>
+          </a:fontRef>
+        </p:style>
+        <p:txBody>
+          <a:bodyPr wrap="none" lIns="52922" tIns="52922" rIns="52922" rtlCol="0" anchor="ctr"/>
+          <a:lstStyle/>
+          <a:p>
+            <a:pPr algn="ctr" defTabSz="672130"/>
+            <a:endParaRPr lang="en-US" sz="1176" dirty="0">
+              <a:solidFill>
+                <a:prstClr val="black"/>
+              </a:solidFill>
+              <a:latin typeface="Simplon BP Regular"/>
+              <a:cs typeface="Simplon BP Regular"/>
+            </a:endParaRPr>
+          </a:p>
+        </p:txBody>
+      </p:sp>
+      <p:sp>
+        <p:nvSpPr>
+          <p:cNvPr id="24" name="Rectangle 37">
+            <a:extLst>
+              <a:ext uri="{FF2B5EF4-FFF2-40B4-BE49-F238E27FC236}">
+                <a16:creationId xmlns:a16="http://schemas.microsoft.com/office/drawing/2014/main" id="{960653A4-129F-403C-8AC6-0E6026C019EA}"/>
+              </a:ext>
+            </a:extLst>
+          </p:cNvPr>
+          <p:cNvSpPr/>
+          <p:nvPr/>
+        </p:nvSpPr>
+        <p:spPr>
+          <a:xfrm>
+            <a:off x="6823900" y="1114236"/>
+            <a:ext cx="6207777" cy="2235805"/>
+          </a:xfrm>
+          <a:prstGeom prst="rect">
+            <a:avLst/>
+          </a:prstGeom>
+          <a:noFill/>
+          <a:ln w="12700">
+            <a:solidFill>
+              <a:schemeClr val="bg1">
+                <a:lumMod val="50000"/>
+              </a:schemeClr>
+            </a:solidFill>
+          </a:ln>
+        </p:spPr>
+        <p:style>
+          <a:lnRef idx="2">
+            <a:schemeClr val="accent4"/>
+          </a:lnRef>
+          <a:fillRef idx="1">
+            <a:schemeClr val="lt1"/>
+          </a:fillRef>
+          <a:effectRef idx="0">
+            <a:schemeClr val="accent4"/>
+          </a:effectRef>
+          <a:fontRef idx="minor">
+            <a:schemeClr val="dk1"/>
+          </a:fontRef>
+        </p:style>
+        <p:txBody>
+          <a:bodyPr tIns="105844" rtlCol="0" anchor="t"/>
+          <a:lstStyle/>
+          <a:p>
+            <a:pPr marL="252049" lvl="1" indent="-252049">
+              <a:buFont typeface="Wingdings" panose="05000000000000000000" pitchFamily="2" charset="2"/>
+              <a:buChar char="§"/>
+            </a:pPr>
+            <a:endParaRPr lang="pt-BR" sz="1323" b="1" dirty="0">
+              <a:solidFill>
+                <a:schemeClr val="tx1"/>
+              </a:solidFill>
+              <a:latin typeface="Calibri" panose="020F0502020204030204" pitchFamily="34" charset="0"/>
+              <a:cs typeface="Simplon BP Regular"/>
+            </a:endParaRPr>
+          </a:p>
+          <a:p>
+            <a:pPr marL="0" lvl="1" defTabSz="672130"/>
+            <a:endParaRPr lang="pt-BR" sz="1600" b="1" dirty="0">
+              <a:solidFill>
+                <a:schemeClr val="tx1"/>
+              </a:solidFill>
+              <a:latin typeface="Calibri" panose="020F0502020204030204" pitchFamily="34" charset="0"/>
+              <a:cs typeface="Simplon BP Regular"/>
+            </a:endParaRPr>
+          </a:p>
+          <a:p>
+            <a:pPr marL="252049" lvl="1" indent="-252049" fontAlgn="base">
+              <a:spcBef>
+                <a:spcPct val="0"/>
+              </a:spcBef>
+              <a:buFont typeface="Wingdings" panose="05000000000000000000" pitchFamily="2" charset="2"/>
+              <a:buChar char="ü"/>
+              <a:defRPr/>
+            </a:pPr>
+            <a:endParaRPr lang="pt-BR" sz="1323" b="1" dirty="0">
+              <a:solidFill>
+                <a:schemeClr val="tx1"/>
+              </a:solidFill>
+              <a:latin typeface="Calibri" panose="020F0502020204030204" pitchFamily="34" charset="0"/>
+              <a:cs typeface="Simplon BP Regular"/>
+            </a:endParaRPr>
+          </a:p>
+          <a:p>
+            <a:pPr marL="252049" lvl="1" indent="-252049" fontAlgn="base">
+              <a:spcBef>
+                <a:spcPct val="0"/>
+              </a:spcBef>
+              <a:buFont typeface="Wingdings" panose="05000000000000000000" pitchFamily="2" charset="2"/>
+              <a:buChar char="ü"/>
+              <a:defRPr/>
+            </a:pPr>
+            <a:endParaRPr lang="pt-BR" sz="1323" b="1" dirty="0">
+              <a:solidFill>
+                <a:schemeClr val="tx1"/>
+              </a:solidFill>
+              <a:latin typeface="Calibri" panose="020F0502020204030204" pitchFamily="34" charset="0"/>
+              <a:cs typeface="Simplon BP Regular"/>
+            </a:endParaRPr>
+          </a:p>
+          <a:p>
+            <a:pPr marL="252049" lvl="1" indent="-252049" fontAlgn="base">
+              <a:spcBef>
+                <a:spcPct val="0"/>
+              </a:spcBef>
+              <a:buFont typeface="Wingdings" panose="05000000000000000000" pitchFamily="2" charset="2"/>
+              <a:buChar char="ü"/>
+              <a:defRPr/>
+            </a:pPr>
+            <a:endParaRPr lang="pt-BR" sz="1323" b="1" dirty="0">
+              <a:solidFill>
+                <a:schemeClr val="tx1"/>
+              </a:solidFill>
+              <a:latin typeface="Calibri" panose="020F0502020204030204" pitchFamily="34" charset="0"/>
+              <a:cs typeface="Simplon BP Regular"/>
+            </a:endParaRPr>
+          </a:p>
+          <a:p>
+            <a:pPr marL="252049" indent="-252049" fontAlgn="base">
+              <a:spcBef>
+                <a:spcPct val="0"/>
+              </a:spcBef>
+              <a:buFont typeface="Wingdings" panose="05000000000000000000" pitchFamily="2" charset="2"/>
+              <a:buChar char="ü"/>
+              <a:defRPr/>
+            </a:pPr>
+            <a:endParaRPr lang="pt-BR" sz="1323" b="1" dirty="0">
+              <a:solidFill>
+                <a:schemeClr val="tx1"/>
+              </a:solidFill>
+              <a:latin typeface="Calibri" panose="020F0502020204030204" pitchFamily="34" charset="0"/>
+              <a:cs typeface="Simplon BP Regular"/>
+            </a:endParaRPr>
+          </a:p>
+          <a:p>
+            <a:pPr marL="252049" indent="-252049" fontAlgn="base">
+              <a:spcBef>
+                <a:spcPct val="0"/>
+              </a:spcBef>
+              <a:buFont typeface="Wingdings" panose="05000000000000000000" pitchFamily="2" charset="2"/>
+              <a:buChar char="ü"/>
+              <a:defRPr/>
+            </a:pPr>
+            <a:endParaRPr lang="pt-BR" sz="1323" b="1" dirty="0">
+              <a:solidFill>
+                <a:schemeClr val="tx1"/>
+              </a:solidFill>
+              <a:latin typeface="Calibri" panose="020F0502020204030204" pitchFamily="34" charset="0"/>
+              <a:cs typeface="Simplon BP Regular"/>
+            </a:endParaRPr>
+          </a:p>
+        </p:txBody>
+      </p:sp>
+    </p:spTree>
+    <p:extLst>
+      <p:ext uri="{BB962C8B-B14F-4D97-AF65-F5344CB8AC3E}">
+        <p14:creationId xmlns:p14="http://schemas.microsoft.com/office/powerpoint/2010/main" val="1933441803"/>
+      </p:ext>
+    </p:extLst>
+  </p:cSld>
+  <p:clrMapOvr>
+    <a:masterClrMapping/>
   </p:clrMapOvr>
 </p:sld>
 </file>
@@ -38562,6 +40536,15 @@
 </file>
 
 <file path=customXml/item2.xml><?xml version="1.0" encoding="utf-8"?>
+<?mso-contentType ?>
+<FormTemplates xmlns="http://schemas.microsoft.com/sharepoint/v3/contenttype/forms">
+  <Display>DocumentLibraryForm</Display>
+  <Edit>DocumentLibraryForm</Edit>
+  <New>DocumentLibraryForm</New>
+</FormTemplates>
+</file>
+
+<file path=customXml/item3.xml><?xml version="1.0" encoding="utf-8"?>
 <ct:contentTypeSchema xmlns:ct="http://schemas.microsoft.com/office/2006/metadata/contentType" xmlns:ma="http://schemas.microsoft.com/office/2006/metadata/properties/metaAttributes" ct:_="" ma:_="" ma:contentTypeName="Document" ma:contentTypeID="0x0101001132905C37EA9847A7207C4BBCCCD8F4" ma:contentTypeVersion="34" ma:contentTypeDescription="Create a new document." ma:contentTypeScope="" ma:versionID="2f28daba72ca6e92be87ea70ebe5bb94">
   <xsd:schema xmlns:xsd="http://www.w3.org/2001/XMLSchema" xmlns:xs="http://www.w3.org/2001/XMLSchema" xmlns:p="http://schemas.microsoft.com/office/2006/metadata/properties" xmlns:ns3="4327b14a-fe89-488e-9f6d-9658cacf372b" xmlns:ns4="bbcd8c33-6940-4d4c-a587-bbc736ca1e4d" targetNamespace="http://schemas.microsoft.com/office/2006/metadata/properties" ma:root="true" ma:fieldsID="df18e839ce2650f1975b41376e6cdb6b" ns3:_="" ns4:_="">
     <xsd:import namespace="4327b14a-fe89-488e-9f6d-9658cacf372b"/>
@@ -38978,15 +40961,6 @@
 </ct:contentTypeSchema>
 </file>
 
-<file path=customXml/item3.xml><?xml version="1.0" encoding="utf-8"?>
-<?mso-contentType ?>
-<FormTemplates xmlns="http://schemas.microsoft.com/sharepoint/v3/contenttype/forms">
-  <Display>DocumentLibraryForm</Display>
-  <Edit>DocumentLibraryForm</Edit>
-  <New>DocumentLibraryForm</New>
-</FormTemplates>
-</file>
-
 <file path=customXml/itemProps1.xml><?xml version="1.0" encoding="utf-8"?>
 <ds:datastoreItem xmlns:ds="http://schemas.openxmlformats.org/officeDocument/2006/customXml" ds:itemID="{4B31267F-D399-4A8A-87F8-B75F56828412}">
   <ds:schemaRefs>
@@ -39005,6 +40979,14 @@
 </file>
 
 <file path=customXml/itemProps2.xml><?xml version="1.0" encoding="utf-8"?>
+<ds:datastoreItem xmlns:ds="http://schemas.openxmlformats.org/officeDocument/2006/customXml" ds:itemID="{E2481852-F24E-4532-AF30-C154D705D105}">
+  <ds:schemaRefs>
+    <ds:schemaRef ds:uri="http://schemas.microsoft.com/sharepoint/v3/contenttype/forms"/>
+  </ds:schemaRefs>
+</ds:datastoreItem>
+</file>
+
+<file path=customXml/itemProps3.xml><?xml version="1.0" encoding="utf-8"?>
 <ds:datastoreItem xmlns:ds="http://schemas.openxmlformats.org/officeDocument/2006/customXml" ds:itemID="{3BE6CAF6-1F55-4A70-B10C-21633F74987A}">
   <ds:schemaRefs>
     <ds:schemaRef ds:uri="http://schemas.microsoft.com/office/2006/metadata/contentType"/>
@@ -39021,12 +41003,4 @@
     <ds:schemaRef ds:uri="http://schemas.microsoft.com/internal/obd"/>
   </ds:schemaRefs>
 </ds:datastoreItem>
-</file>
-
-<file path=customXml/itemProps3.xml><?xml version="1.0" encoding="utf-8"?>
-<ds:datastoreItem xmlns:ds="http://schemas.openxmlformats.org/officeDocument/2006/customXml" ds:itemID="{E2481852-F24E-4532-AF30-C154D705D105}">
-  <ds:schemaRefs>
-    <ds:schemaRef ds:uri="http://schemas.microsoft.com/sharepoint/v3/contenttype/forms"/>
-  </ds:schemaRefs>
-</ds:datastoreItem>
 </file>
</xml_diff>

<commit_message>
docs: adicionar o status-report semanal
</commit_message>
<xml_diff>
--- a/Documentação/EngenhariaDeSoftware/Mod_Status_Report-PI20202.pptx
+++ b/Documentação/EngenhariaDeSoftware/Mod_Status_Report-PI20202.pptx
@@ -7,10 +7,10 @@
     <p:sldMasterId id="2147483665" r:id="rId6"/>
   </p:sldMasterIdLst>
   <p:notesMasterIdLst>
-    <p:notesMasterId r:id="rId18"/>
+    <p:notesMasterId r:id="rId19"/>
   </p:notesMasterIdLst>
   <p:handoutMasterIdLst>
-    <p:handoutMasterId r:id="rId19"/>
+    <p:handoutMasterId r:id="rId20"/>
   </p:handoutMasterIdLst>
   <p:sldIdLst>
     <p:sldId id="256" r:id="rId7"/>
@@ -24,6 +24,7 @@
     <p:sldId id="477" r:id="rId15"/>
     <p:sldId id="478" r:id="rId16"/>
     <p:sldId id="479" r:id="rId17"/>
+    <p:sldId id="480" r:id="rId18"/>
   </p:sldIdLst>
   <p:sldSz cx="13442950" cy="7561263"/>
   <p:notesSz cx="7104063" cy="10234613"/>
@@ -142,6 +143,7 @@
             <p14:sldId id="477"/>
             <p14:sldId id="478"/>
             <p14:sldId id="479"/>
+            <p14:sldId id="480"/>
           </p14:sldIdLst>
         </p14:section>
       </p14:sectionLst>
@@ -255,7 +257,7 @@
             <a:fld id="{C3CD65D1-5C11-455D-9F9A-0E035F00A0DA}" type="datetimeFigureOut">
               <a:rPr lang="pt-BR" smtClean="0"/>
               <a:pPr/>
-              <a:t>03/11/2021</a:t>
+              <a:t>10/11/2021</a:t>
             </a:fld>
             <a:endParaRPr lang="pt-BR"/>
           </a:p>
@@ -423,7 +425,7 @@
             <a:fld id="{A05DA3EF-18EA-43DE-B1BB-402A3C558822}" type="datetimeFigureOut">
               <a:rPr lang="pt-BR" smtClean="0"/>
               <a:pPr/>
-              <a:t>03/11/2021</a:t>
+              <a:t>10/11/2021</a:t>
             </a:fld>
             <a:endParaRPr lang="pt-BR"/>
           </a:p>
@@ -863,6 +865,99 @@
     <p:extLst>
       <p:ext uri="{BB962C8B-B14F-4D97-AF65-F5344CB8AC3E}">
         <p14:creationId xmlns:p14="http://schemas.microsoft.com/office/powerpoint/2010/main" val="3992602351"/>
+      </p:ext>
+    </p:extLst>
+  </p:cSld>
+  <p:clrMapOvr>
+    <a:masterClrMapping/>
+  </p:clrMapOvr>
+</p:notes>
+</file>
+
+<file path=ppt/notesSlides/notesSlide11.xml><?xml version="1.0" encoding="utf-8"?>
+<p:notes xmlns:a="http://schemas.openxmlformats.org/drawingml/2006/main" xmlns:r="http://schemas.openxmlformats.org/officeDocument/2006/relationships" xmlns:p="http://schemas.openxmlformats.org/presentationml/2006/main">
+  <p:cSld>
+    <p:spTree>
+      <p:nvGrpSpPr>
+        <p:cNvPr id="1" name=""/>
+        <p:cNvGrpSpPr/>
+        <p:nvPr/>
+      </p:nvGrpSpPr>
+      <p:grpSpPr>
+        <a:xfrm>
+          <a:off x="0" y="0"/>
+          <a:ext cx="0" cy="0"/>
+          <a:chOff x="0" y="0"/>
+          <a:chExt cx="0" cy="0"/>
+        </a:xfrm>
+      </p:grpSpPr>
+      <p:sp>
+        <p:nvSpPr>
+          <p:cNvPr id="2" name="Slide Image Placeholder 1"/>
+          <p:cNvSpPr>
+            <a:spLocks noGrp="1" noRot="1" noChangeAspect="1"/>
+          </p:cNvSpPr>
+          <p:nvPr>
+            <p:ph type="sldImg"/>
+          </p:nvPr>
+        </p:nvSpPr>
+        <p:spPr/>
+      </p:sp>
+      <p:sp>
+        <p:nvSpPr>
+          <p:cNvPr id="3" name="Notes Placeholder 2"/>
+          <p:cNvSpPr>
+            <a:spLocks noGrp="1"/>
+          </p:cNvSpPr>
+          <p:nvPr>
+            <p:ph type="body" idx="1"/>
+          </p:nvPr>
+        </p:nvSpPr>
+        <p:spPr/>
+        <p:txBody>
+          <a:bodyPr/>
+          <a:lstStyle/>
+          <a:p>
+            <a:endParaRPr lang="en-US"/>
+          </a:p>
+        </p:txBody>
+      </p:sp>
+      <p:sp>
+        <p:nvSpPr>
+          <p:cNvPr id="4" name="Slide Number Placeholder 3"/>
+          <p:cNvSpPr>
+            <a:spLocks noGrp="1"/>
+          </p:cNvSpPr>
+          <p:nvPr>
+            <p:ph type="sldNum" sz="quarter" idx="10"/>
+          </p:nvPr>
+        </p:nvSpPr>
+        <p:spPr/>
+        <p:txBody>
+          <a:bodyPr/>
+          <a:lstStyle/>
+          <a:p>
+            <a:fld id="{B39AF3DB-B6A1-2444-9DD8-53D016F8E638}" type="slidenum">
+              <a:rPr lang="pt-BR" smtClean="0">
+                <a:solidFill>
+                  <a:prstClr val="black"/>
+                </a:solidFill>
+              </a:rPr>
+              <a:pPr/>
+              <a:t>12</a:t>
+            </a:fld>
+            <a:endParaRPr lang="pt-BR">
+              <a:solidFill>
+                <a:prstClr val="black"/>
+              </a:solidFill>
+            </a:endParaRPr>
+          </a:p>
+        </p:txBody>
+      </p:sp>
+    </p:spTree>
+    <p:extLst>
+      <p:ext uri="{BB962C8B-B14F-4D97-AF65-F5344CB8AC3E}">
+        <p14:creationId xmlns:p14="http://schemas.microsoft.com/office/powerpoint/2010/main" val="3204037339"/>
       </p:ext>
     </p:extLst>
   </p:cSld>
@@ -23529,7 +23624,7 @@
                 <a:latin typeface="Simplon Oi Headline"/>
                 <a:cs typeface="Simplon Oi Headline"/>
               </a:rPr>
-              <a:t>SEMANA 6 - 06/10/2021 – 13/10/2021</a:t>
+              <a:t>SEMANA 7 - 14/10/2021 – 21/10/2021</a:t>
             </a:r>
           </a:p>
         </p:txBody>
@@ -25299,7 +25394,7 @@
                 <a:latin typeface="Simplon Oi Headline"/>
                 <a:cs typeface="Simplon Oi Headline"/>
               </a:rPr>
-              <a:t>SEMANA 6 - 06/10/2021 – 13/10/2021</a:t>
+              <a:t>SEMANA 8 - 22/10/2021 – 28/10/2021</a:t>
             </a:r>
           </a:p>
         </p:txBody>
@@ -27151,6 +27246,2190 @@
     <p:extLst>
       <p:ext uri="{BB962C8B-B14F-4D97-AF65-F5344CB8AC3E}">
         <p14:creationId xmlns:p14="http://schemas.microsoft.com/office/powerpoint/2010/main" val="2499946718"/>
+      </p:ext>
+    </p:extLst>
+  </p:cSld>
+  <p:clrMapOvr>
+    <a:masterClrMapping/>
+  </p:clrMapOvr>
+</p:sld>
+</file>
+
+<file path=ppt/slides/slide12.xml><?xml version="1.0" encoding="utf-8"?>
+<p:sld xmlns:a="http://schemas.openxmlformats.org/drawingml/2006/main" xmlns:r="http://schemas.openxmlformats.org/officeDocument/2006/relationships" xmlns:p="http://schemas.openxmlformats.org/presentationml/2006/main">
+  <p:cSld>
+    <p:spTree>
+      <p:nvGrpSpPr>
+        <p:cNvPr id="1" name=""/>
+        <p:cNvGrpSpPr/>
+        <p:nvPr/>
+      </p:nvGrpSpPr>
+      <p:grpSpPr>
+        <a:xfrm>
+          <a:off x="0" y="0"/>
+          <a:ext cx="0" cy="0"/>
+          <a:chOff x="0" y="0"/>
+          <a:chExt cx="0" cy="0"/>
+        </a:xfrm>
+      </p:grpSpPr>
+      <p:sp>
+        <p:nvSpPr>
+          <p:cNvPr id="43" name="Rectangle 42"/>
+          <p:cNvSpPr/>
+          <p:nvPr/>
+        </p:nvSpPr>
+        <p:spPr>
+          <a:xfrm>
+            <a:off x="6814576" y="1080752"/>
+            <a:ext cx="6209639" cy="2235805"/>
+          </a:xfrm>
+          <a:prstGeom prst="rect">
+            <a:avLst/>
+          </a:prstGeom>
+          <a:noFill/>
+          <a:ln w="12700">
+            <a:solidFill>
+              <a:schemeClr val="bg1">
+                <a:lumMod val="50000"/>
+              </a:schemeClr>
+            </a:solidFill>
+          </a:ln>
+        </p:spPr>
+        <p:style>
+          <a:lnRef idx="2">
+            <a:schemeClr val="accent4"/>
+          </a:lnRef>
+          <a:fillRef idx="1">
+            <a:schemeClr val="lt1"/>
+          </a:fillRef>
+          <a:effectRef idx="0">
+            <a:schemeClr val="accent4"/>
+          </a:effectRef>
+          <a:fontRef idx="minor">
+            <a:schemeClr val="dk1"/>
+          </a:fontRef>
+        </p:style>
+        <p:txBody>
+          <a:bodyPr tIns="105844" rtlCol="0" anchor="t"/>
+          <a:lstStyle/>
+          <a:p>
+            <a:pPr defTabSz="672130">
+              <a:spcAft>
+                <a:spcPts val="882"/>
+              </a:spcAft>
+            </a:pPr>
+            <a:endParaRPr lang="pt-BR" sz="1470" dirty="0">
+              <a:solidFill>
+                <a:schemeClr val="tx1"/>
+              </a:solidFill>
+              <a:latin typeface="Calibri" panose="020F0502020204030204" pitchFamily="34" charset="0"/>
+              <a:cs typeface="Simplon BP Regular"/>
+            </a:endParaRPr>
+          </a:p>
+        </p:txBody>
+      </p:sp>
+      <p:sp>
+        <p:nvSpPr>
+          <p:cNvPr id="3" name="Title 2"/>
+          <p:cNvSpPr>
+            <a:spLocks noGrp="1"/>
+          </p:cNvSpPr>
+          <p:nvPr>
+            <p:ph type="title"/>
+          </p:nvPr>
+        </p:nvSpPr>
+        <p:spPr>
+          <a:xfrm>
+            <a:off x="469692" y="185232"/>
+            <a:ext cx="12098020" cy="800352"/>
+          </a:xfrm>
+        </p:spPr>
+        <p:txBody>
+          <a:bodyPr vert="horz" wrap="square" lIns="105844" tIns="0" rIns="105844" bIns="0" numCol="1" anchor="t" anchorCtr="0" compatLnSpc="1">
+            <a:prstTxWarp prst="textNoShape">
+              <a:avLst/>
+            </a:prstTxWarp>
+            <a:noAutofit/>
+          </a:bodyPr>
+          <a:lstStyle/>
+          <a:p>
+            <a:pPr algn="l">
+              <a:spcAft>
+                <a:spcPts val="882"/>
+              </a:spcAft>
+            </a:pPr>
+            <a:r>
+              <a:rPr lang="en-US" sz="2646" dirty="0">
+                <a:solidFill>
+                  <a:prstClr val="black"/>
+                </a:solidFill>
+                <a:latin typeface="Simplon Oi Headline"/>
+                <a:cs typeface="Simplon Oi Headline"/>
+              </a:rPr>
+              <a:t>SEMANA 9 - 29/10/2021 – 11/11/2021</a:t>
+            </a:r>
+          </a:p>
+        </p:txBody>
+      </p:sp>
+      <p:sp>
+        <p:nvSpPr>
+          <p:cNvPr id="78" name="TextBox 118"/>
+          <p:cNvSpPr txBox="1"/>
+          <p:nvPr/>
+        </p:nvSpPr>
+        <p:spPr>
+          <a:xfrm>
+            <a:off x="11822773" y="576471"/>
+            <a:ext cx="899678" cy="179824"/>
+          </a:xfrm>
+          <a:prstGeom prst="rect">
+            <a:avLst/>
+          </a:prstGeom>
+          <a:noFill/>
+          <a:ln w="12700">
+            <a:noFill/>
+          </a:ln>
+        </p:spPr>
+        <p:style>
+          <a:lnRef idx="2">
+            <a:schemeClr val="accent4"/>
+          </a:lnRef>
+          <a:fillRef idx="1">
+            <a:schemeClr val="lt1"/>
+          </a:fillRef>
+          <a:effectRef idx="0">
+            <a:schemeClr val="accent4"/>
+          </a:effectRef>
+          <a:fontRef idx="minor">
+            <a:schemeClr val="dk1"/>
+          </a:fontRef>
+        </p:style>
+        <p:txBody>
+          <a:bodyPr wrap="none" lIns="52922" tIns="52922" rIns="52922" bIns="0" rtlCol="0" anchor="b"/>
+          <a:lstStyle>
+            <a:defPPr>
+              <a:defRPr lang="en-US"/>
+            </a:defPPr>
+            <a:lvl1pPr algn="ctr">
+              <a:defRPr sz="1000" b="1">
+                <a:latin typeface="Simplon BP Regular"/>
+                <a:cs typeface="Simplon BP Regular"/>
+              </a:defRPr>
+            </a:lvl1pPr>
+            <a:lvl2pPr>
+              <a:defRPr>
+                <a:solidFill>
+                  <a:schemeClr val="dk1"/>
+                </a:solidFill>
+              </a:defRPr>
+            </a:lvl2pPr>
+            <a:lvl3pPr>
+              <a:defRPr>
+                <a:solidFill>
+                  <a:schemeClr val="dk1"/>
+                </a:solidFill>
+              </a:defRPr>
+            </a:lvl3pPr>
+            <a:lvl4pPr>
+              <a:defRPr>
+                <a:solidFill>
+                  <a:schemeClr val="dk1"/>
+                </a:solidFill>
+              </a:defRPr>
+            </a:lvl4pPr>
+            <a:lvl5pPr>
+              <a:defRPr>
+                <a:solidFill>
+                  <a:schemeClr val="dk1"/>
+                </a:solidFill>
+              </a:defRPr>
+            </a:lvl5pPr>
+            <a:lvl6pPr>
+              <a:defRPr>
+                <a:solidFill>
+                  <a:schemeClr val="dk1"/>
+                </a:solidFill>
+              </a:defRPr>
+            </a:lvl6pPr>
+            <a:lvl7pPr>
+              <a:defRPr>
+                <a:solidFill>
+                  <a:schemeClr val="dk1"/>
+                </a:solidFill>
+              </a:defRPr>
+            </a:lvl7pPr>
+            <a:lvl8pPr>
+              <a:defRPr>
+                <a:solidFill>
+                  <a:schemeClr val="dk1"/>
+                </a:solidFill>
+              </a:defRPr>
+            </a:lvl8pPr>
+            <a:lvl9pPr>
+              <a:defRPr>
+                <a:solidFill>
+                  <a:schemeClr val="dk1"/>
+                </a:solidFill>
+              </a:defRPr>
+            </a:lvl9pPr>
+          </a:lstStyle>
+          <a:p>
+            <a:pPr defTabSz="672130"/>
+            <a:r>
+              <a:rPr lang="pt-BR" sz="1176" b="0" dirty="0">
+                <a:solidFill>
+                  <a:prstClr val="black"/>
+                </a:solidFill>
+                <a:latin typeface="Simplon BP Bold" pitchFamily="2" charset="0"/>
+              </a:rPr>
+              <a:t>Negócios</a:t>
+            </a:r>
+          </a:p>
+        </p:txBody>
+      </p:sp>
+      <p:sp>
+        <p:nvSpPr>
+          <p:cNvPr id="80" name="TextBox 123"/>
+          <p:cNvSpPr txBox="1"/>
+          <p:nvPr/>
+        </p:nvSpPr>
+        <p:spPr>
+          <a:xfrm>
+            <a:off x="10852497" y="576471"/>
+            <a:ext cx="899678" cy="179824"/>
+          </a:xfrm>
+          <a:prstGeom prst="rect">
+            <a:avLst/>
+          </a:prstGeom>
+          <a:noFill/>
+          <a:ln w="12700">
+            <a:noFill/>
+          </a:ln>
+        </p:spPr>
+        <p:style>
+          <a:lnRef idx="2">
+            <a:schemeClr val="accent4"/>
+          </a:lnRef>
+          <a:fillRef idx="1">
+            <a:schemeClr val="lt1"/>
+          </a:fillRef>
+          <a:effectRef idx="0">
+            <a:schemeClr val="accent4"/>
+          </a:effectRef>
+          <a:fontRef idx="minor">
+            <a:schemeClr val="dk1"/>
+          </a:fontRef>
+        </p:style>
+        <p:txBody>
+          <a:bodyPr wrap="none" lIns="52922" tIns="52922" rIns="52922" bIns="0" rtlCol="0" anchor="b"/>
+          <a:lstStyle>
+            <a:defPPr>
+              <a:defRPr lang="en-US"/>
+            </a:defPPr>
+            <a:lvl1pPr algn="ctr">
+              <a:defRPr sz="1000" b="1">
+                <a:latin typeface="Simplon BP Regular"/>
+                <a:cs typeface="Simplon BP Regular"/>
+              </a:defRPr>
+            </a:lvl1pPr>
+            <a:lvl2pPr>
+              <a:defRPr>
+                <a:solidFill>
+                  <a:schemeClr val="dk1"/>
+                </a:solidFill>
+              </a:defRPr>
+            </a:lvl2pPr>
+            <a:lvl3pPr>
+              <a:defRPr>
+                <a:solidFill>
+                  <a:schemeClr val="dk1"/>
+                </a:solidFill>
+              </a:defRPr>
+            </a:lvl3pPr>
+            <a:lvl4pPr>
+              <a:defRPr>
+                <a:solidFill>
+                  <a:schemeClr val="dk1"/>
+                </a:solidFill>
+              </a:defRPr>
+            </a:lvl4pPr>
+            <a:lvl5pPr>
+              <a:defRPr>
+                <a:solidFill>
+                  <a:schemeClr val="dk1"/>
+                </a:solidFill>
+              </a:defRPr>
+            </a:lvl5pPr>
+            <a:lvl6pPr>
+              <a:defRPr>
+                <a:solidFill>
+                  <a:schemeClr val="dk1"/>
+                </a:solidFill>
+              </a:defRPr>
+            </a:lvl6pPr>
+            <a:lvl7pPr>
+              <a:defRPr>
+                <a:solidFill>
+                  <a:schemeClr val="dk1"/>
+                </a:solidFill>
+              </a:defRPr>
+            </a:lvl7pPr>
+            <a:lvl8pPr>
+              <a:defRPr>
+                <a:solidFill>
+                  <a:schemeClr val="dk1"/>
+                </a:solidFill>
+              </a:defRPr>
+            </a:lvl8pPr>
+            <a:lvl9pPr>
+              <a:defRPr>
+                <a:solidFill>
+                  <a:schemeClr val="dk1"/>
+                </a:solidFill>
+              </a:defRPr>
+            </a:lvl9pPr>
+          </a:lstStyle>
+          <a:p>
+            <a:pPr defTabSz="672130"/>
+            <a:r>
+              <a:rPr lang="pt-BR" sz="1176" b="0" dirty="0">
+                <a:solidFill>
+                  <a:prstClr val="black"/>
+                </a:solidFill>
+                <a:latin typeface="Simplon BP Bold" pitchFamily="2" charset="0"/>
+              </a:rPr>
+              <a:t>Plataforma</a:t>
+            </a:r>
+          </a:p>
+        </p:txBody>
+      </p:sp>
+      <p:sp>
+        <p:nvSpPr>
+          <p:cNvPr id="82" name="TextBox 128"/>
+          <p:cNvSpPr txBox="1"/>
+          <p:nvPr/>
+        </p:nvSpPr>
+        <p:spPr>
+          <a:xfrm>
+            <a:off x="9854245" y="576471"/>
+            <a:ext cx="899678" cy="179824"/>
+          </a:xfrm>
+          <a:prstGeom prst="rect">
+            <a:avLst/>
+          </a:prstGeom>
+          <a:noFill/>
+          <a:ln w="12700">
+            <a:noFill/>
+          </a:ln>
+        </p:spPr>
+        <p:style>
+          <a:lnRef idx="2">
+            <a:schemeClr val="accent4"/>
+          </a:lnRef>
+          <a:fillRef idx="1">
+            <a:schemeClr val="lt1"/>
+          </a:fillRef>
+          <a:effectRef idx="0">
+            <a:schemeClr val="accent4"/>
+          </a:effectRef>
+          <a:fontRef idx="minor">
+            <a:schemeClr val="dk1"/>
+          </a:fontRef>
+        </p:style>
+        <p:txBody>
+          <a:bodyPr wrap="none" lIns="52922" tIns="52922" rIns="52922" bIns="0" rtlCol="0" anchor="b"/>
+          <a:lstStyle>
+            <a:defPPr>
+              <a:defRPr lang="en-US"/>
+            </a:defPPr>
+            <a:lvl1pPr algn="ctr">
+              <a:defRPr sz="1000" b="1">
+                <a:latin typeface="Simplon BP Regular"/>
+                <a:cs typeface="Simplon BP Regular"/>
+              </a:defRPr>
+            </a:lvl1pPr>
+            <a:lvl2pPr>
+              <a:defRPr>
+                <a:solidFill>
+                  <a:schemeClr val="dk1"/>
+                </a:solidFill>
+              </a:defRPr>
+            </a:lvl2pPr>
+            <a:lvl3pPr>
+              <a:defRPr>
+                <a:solidFill>
+                  <a:schemeClr val="dk1"/>
+                </a:solidFill>
+              </a:defRPr>
+            </a:lvl3pPr>
+            <a:lvl4pPr>
+              <a:defRPr>
+                <a:solidFill>
+                  <a:schemeClr val="dk1"/>
+                </a:solidFill>
+              </a:defRPr>
+            </a:lvl4pPr>
+            <a:lvl5pPr>
+              <a:defRPr>
+                <a:solidFill>
+                  <a:schemeClr val="dk1"/>
+                </a:solidFill>
+              </a:defRPr>
+            </a:lvl5pPr>
+            <a:lvl6pPr>
+              <a:defRPr>
+                <a:solidFill>
+                  <a:schemeClr val="dk1"/>
+                </a:solidFill>
+              </a:defRPr>
+            </a:lvl6pPr>
+            <a:lvl7pPr>
+              <a:defRPr>
+                <a:solidFill>
+                  <a:schemeClr val="dk1"/>
+                </a:solidFill>
+              </a:defRPr>
+            </a:lvl7pPr>
+            <a:lvl8pPr>
+              <a:defRPr>
+                <a:solidFill>
+                  <a:schemeClr val="dk1"/>
+                </a:solidFill>
+              </a:defRPr>
+            </a:lvl8pPr>
+            <a:lvl9pPr>
+              <a:defRPr>
+                <a:solidFill>
+                  <a:schemeClr val="dk1"/>
+                </a:solidFill>
+              </a:defRPr>
+            </a:lvl9pPr>
+          </a:lstStyle>
+          <a:p>
+            <a:pPr defTabSz="672130"/>
+            <a:r>
+              <a:rPr lang="pt-BR" sz="1176" b="0" dirty="0">
+                <a:solidFill>
+                  <a:prstClr val="black"/>
+                </a:solidFill>
+                <a:latin typeface="Simplon BP Bold" pitchFamily="2" charset="0"/>
+              </a:rPr>
+              <a:t>Back</a:t>
+            </a:r>
+          </a:p>
+        </p:txBody>
+      </p:sp>
+      <p:sp>
+        <p:nvSpPr>
+          <p:cNvPr id="84" name="TextBox 133"/>
+          <p:cNvSpPr txBox="1"/>
+          <p:nvPr/>
+        </p:nvSpPr>
+        <p:spPr>
+          <a:xfrm>
+            <a:off x="8934246" y="576471"/>
+            <a:ext cx="899678" cy="179824"/>
+          </a:xfrm>
+          <a:prstGeom prst="rect">
+            <a:avLst/>
+          </a:prstGeom>
+          <a:noFill/>
+          <a:ln w="12700">
+            <a:noFill/>
+          </a:ln>
+        </p:spPr>
+        <p:style>
+          <a:lnRef idx="2">
+            <a:schemeClr val="accent4"/>
+          </a:lnRef>
+          <a:fillRef idx="1">
+            <a:schemeClr val="lt1"/>
+          </a:fillRef>
+          <a:effectRef idx="0">
+            <a:schemeClr val="accent4"/>
+          </a:effectRef>
+          <a:fontRef idx="minor">
+            <a:schemeClr val="dk1"/>
+          </a:fontRef>
+        </p:style>
+        <p:txBody>
+          <a:bodyPr wrap="none" lIns="52922" tIns="52922" rIns="52922" bIns="0" rtlCol="0" anchor="b"/>
+          <a:lstStyle>
+            <a:defPPr>
+              <a:defRPr lang="en-US"/>
+            </a:defPPr>
+            <a:lvl1pPr algn="ctr">
+              <a:defRPr sz="1000" b="1">
+                <a:latin typeface="Simplon BP Regular"/>
+                <a:cs typeface="Simplon BP Regular"/>
+              </a:defRPr>
+            </a:lvl1pPr>
+            <a:lvl2pPr>
+              <a:defRPr>
+                <a:solidFill>
+                  <a:schemeClr val="dk1"/>
+                </a:solidFill>
+              </a:defRPr>
+            </a:lvl2pPr>
+            <a:lvl3pPr>
+              <a:defRPr>
+                <a:solidFill>
+                  <a:schemeClr val="dk1"/>
+                </a:solidFill>
+              </a:defRPr>
+            </a:lvl3pPr>
+            <a:lvl4pPr>
+              <a:defRPr>
+                <a:solidFill>
+                  <a:schemeClr val="dk1"/>
+                </a:solidFill>
+              </a:defRPr>
+            </a:lvl4pPr>
+            <a:lvl5pPr>
+              <a:defRPr>
+                <a:solidFill>
+                  <a:schemeClr val="dk1"/>
+                </a:solidFill>
+              </a:defRPr>
+            </a:lvl5pPr>
+            <a:lvl6pPr>
+              <a:defRPr>
+                <a:solidFill>
+                  <a:schemeClr val="dk1"/>
+                </a:solidFill>
+              </a:defRPr>
+            </a:lvl6pPr>
+            <a:lvl7pPr>
+              <a:defRPr>
+                <a:solidFill>
+                  <a:schemeClr val="dk1"/>
+                </a:solidFill>
+              </a:defRPr>
+            </a:lvl7pPr>
+            <a:lvl8pPr>
+              <a:defRPr>
+                <a:solidFill>
+                  <a:schemeClr val="dk1"/>
+                </a:solidFill>
+              </a:defRPr>
+            </a:lvl8pPr>
+            <a:lvl9pPr>
+              <a:defRPr>
+                <a:solidFill>
+                  <a:schemeClr val="dk1"/>
+                </a:solidFill>
+              </a:defRPr>
+            </a:lvl9pPr>
+          </a:lstStyle>
+          <a:p>
+            <a:pPr defTabSz="672130"/>
+            <a:r>
+              <a:rPr lang="pt-BR" sz="1176" b="0" dirty="0">
+                <a:solidFill>
+                  <a:prstClr val="black"/>
+                </a:solidFill>
+                <a:latin typeface="Simplon BP Bold" pitchFamily="2" charset="0"/>
+              </a:rPr>
+              <a:t>Front</a:t>
+            </a:r>
+          </a:p>
+        </p:txBody>
+      </p:sp>
+      <p:sp>
+        <p:nvSpPr>
+          <p:cNvPr id="88" name="Oval 134"/>
+          <p:cNvSpPr>
+            <a:spLocks noChangeAspect="1"/>
+          </p:cNvSpPr>
+          <p:nvPr/>
+        </p:nvSpPr>
+        <p:spPr>
+          <a:xfrm>
+            <a:off x="8443555" y="282529"/>
+            <a:ext cx="211404" cy="211689"/>
+          </a:xfrm>
+          <a:prstGeom prst="ellipse">
+            <a:avLst/>
+          </a:prstGeom>
+          <a:solidFill>
+            <a:srgbClr val="00B050"/>
+          </a:solidFill>
+          <a:ln w="12700">
+            <a:solidFill>
+              <a:schemeClr val="accent3"/>
+            </a:solidFill>
+          </a:ln>
+        </p:spPr>
+        <p:style>
+          <a:lnRef idx="2">
+            <a:schemeClr val="accent1">
+              <a:shade val="50000"/>
+            </a:schemeClr>
+          </a:lnRef>
+          <a:fillRef idx="1">
+            <a:schemeClr val="accent1"/>
+          </a:fillRef>
+          <a:effectRef idx="0">
+            <a:schemeClr val="accent1"/>
+          </a:effectRef>
+          <a:fontRef idx="minor">
+            <a:schemeClr val="lt1"/>
+          </a:fontRef>
+        </p:style>
+        <p:txBody>
+          <a:bodyPr wrap="none" lIns="52922" tIns="52922" rIns="52922" rtlCol="0" anchor="ctr"/>
+          <a:lstStyle/>
+          <a:p>
+            <a:pPr algn="ctr" defTabSz="672130"/>
+            <a:endParaRPr lang="en-US" sz="1176" dirty="0">
+              <a:solidFill>
+                <a:srgbClr val="FFFF00"/>
+              </a:solidFill>
+              <a:latin typeface="Simplon BP Regular"/>
+              <a:cs typeface="Simplon BP Regular"/>
+            </a:endParaRPr>
+          </a:p>
+        </p:txBody>
+      </p:sp>
+      <p:sp>
+        <p:nvSpPr>
+          <p:cNvPr id="86" name="TextBox 138"/>
+          <p:cNvSpPr txBox="1"/>
+          <p:nvPr/>
+        </p:nvSpPr>
+        <p:spPr>
+          <a:xfrm>
+            <a:off x="8126053" y="576471"/>
+            <a:ext cx="899678" cy="179824"/>
+          </a:xfrm>
+          <a:prstGeom prst="rect">
+            <a:avLst/>
+          </a:prstGeom>
+          <a:noFill/>
+          <a:ln w="12700">
+            <a:noFill/>
+          </a:ln>
+        </p:spPr>
+        <p:style>
+          <a:lnRef idx="2">
+            <a:schemeClr val="accent4"/>
+          </a:lnRef>
+          <a:fillRef idx="1">
+            <a:schemeClr val="lt1"/>
+          </a:fillRef>
+          <a:effectRef idx="0">
+            <a:schemeClr val="accent4"/>
+          </a:effectRef>
+          <a:fontRef idx="minor">
+            <a:schemeClr val="dk1"/>
+          </a:fontRef>
+        </p:style>
+        <p:txBody>
+          <a:bodyPr wrap="none" lIns="52922" tIns="52922" rIns="52922" bIns="0" rtlCol="0" anchor="b"/>
+          <a:lstStyle>
+            <a:defPPr>
+              <a:defRPr lang="en-US"/>
+            </a:defPPr>
+            <a:lvl1pPr algn="ctr">
+              <a:defRPr sz="1000" b="1">
+                <a:latin typeface="Simplon BP Regular"/>
+                <a:cs typeface="Simplon BP Regular"/>
+              </a:defRPr>
+            </a:lvl1pPr>
+            <a:lvl2pPr>
+              <a:defRPr>
+                <a:solidFill>
+                  <a:schemeClr val="dk1"/>
+                </a:solidFill>
+              </a:defRPr>
+            </a:lvl2pPr>
+            <a:lvl3pPr>
+              <a:defRPr>
+                <a:solidFill>
+                  <a:schemeClr val="dk1"/>
+                </a:solidFill>
+              </a:defRPr>
+            </a:lvl3pPr>
+            <a:lvl4pPr>
+              <a:defRPr>
+                <a:solidFill>
+                  <a:schemeClr val="dk1"/>
+                </a:solidFill>
+              </a:defRPr>
+            </a:lvl4pPr>
+            <a:lvl5pPr>
+              <a:defRPr>
+                <a:solidFill>
+                  <a:schemeClr val="dk1"/>
+                </a:solidFill>
+              </a:defRPr>
+            </a:lvl5pPr>
+            <a:lvl6pPr>
+              <a:defRPr>
+                <a:solidFill>
+                  <a:schemeClr val="dk1"/>
+                </a:solidFill>
+              </a:defRPr>
+            </a:lvl6pPr>
+            <a:lvl7pPr>
+              <a:defRPr>
+                <a:solidFill>
+                  <a:schemeClr val="dk1"/>
+                </a:solidFill>
+              </a:defRPr>
+            </a:lvl7pPr>
+            <a:lvl8pPr>
+              <a:defRPr>
+                <a:solidFill>
+                  <a:schemeClr val="dk1"/>
+                </a:solidFill>
+              </a:defRPr>
+            </a:lvl8pPr>
+            <a:lvl9pPr>
+              <a:defRPr>
+                <a:solidFill>
+                  <a:schemeClr val="dk1"/>
+                </a:solidFill>
+              </a:defRPr>
+            </a:lvl9pPr>
+          </a:lstStyle>
+          <a:p>
+            <a:pPr defTabSz="672130"/>
+            <a:r>
+              <a:rPr lang="en-US" sz="1176" b="0" dirty="0" err="1">
+                <a:solidFill>
+                  <a:prstClr val="black"/>
+                </a:solidFill>
+                <a:latin typeface="Simplon BP Bold" pitchFamily="2" charset="0"/>
+              </a:rPr>
+              <a:t>Equipe</a:t>
+            </a:r>
+            <a:endParaRPr lang="en-US" sz="1176" b="0" dirty="0">
+              <a:solidFill>
+                <a:prstClr val="black"/>
+              </a:solidFill>
+              <a:latin typeface="Simplon BP Bold" pitchFamily="2" charset="0"/>
+            </a:endParaRPr>
+          </a:p>
+        </p:txBody>
+      </p:sp>
+      <p:sp>
+        <p:nvSpPr>
+          <p:cNvPr id="64" name="Retângulo 63"/>
+          <p:cNvSpPr/>
+          <p:nvPr/>
+        </p:nvSpPr>
+        <p:spPr>
+          <a:xfrm>
+            <a:off x="512766" y="868345"/>
+            <a:ext cx="6186608" cy="238150"/>
+          </a:xfrm>
+          <a:prstGeom prst="rect">
+            <a:avLst/>
+          </a:prstGeom>
+          <a:solidFill>
+            <a:schemeClr val="bg1">
+              <a:lumMod val="85000"/>
+            </a:schemeClr>
+          </a:solidFill>
+        </p:spPr>
+        <p:txBody>
+          <a:bodyPr vert="horz" lIns="134422" tIns="67211" rIns="134422" bIns="67211" rtlCol="0" anchor="ctr"/>
+          <a:lstStyle/>
+          <a:p>
+            <a:pPr defTabSz="672130"/>
+            <a:r>
+              <a:rPr lang="en-US" sz="1544" dirty="0">
+                <a:latin typeface="Simplon Oi Headline" charset="0"/>
+                <a:ea typeface="Simplon Oi Headline" charset="0"/>
+                <a:cs typeface="Simplon Oi Headline" charset="0"/>
+              </a:rPr>
+              <a:t>PROGRESSOS</a:t>
+            </a:r>
+            <a:endParaRPr lang="pt-BR" sz="1544" dirty="0">
+              <a:latin typeface="Simplon Oi Headline" charset="0"/>
+              <a:ea typeface="Simplon Oi Headline" charset="0"/>
+              <a:cs typeface="Simplon Oi Headline" charset="0"/>
+            </a:endParaRPr>
+          </a:p>
+        </p:txBody>
+      </p:sp>
+      <p:sp>
+        <p:nvSpPr>
+          <p:cNvPr id="65" name="Retângulo 64"/>
+          <p:cNvSpPr/>
+          <p:nvPr/>
+        </p:nvSpPr>
+        <p:spPr>
+          <a:xfrm>
+            <a:off x="6814576" y="868345"/>
+            <a:ext cx="6194715" cy="238150"/>
+          </a:xfrm>
+          <a:prstGeom prst="rect">
+            <a:avLst/>
+          </a:prstGeom>
+          <a:solidFill>
+            <a:schemeClr val="bg1">
+              <a:lumMod val="85000"/>
+            </a:schemeClr>
+          </a:solidFill>
+        </p:spPr>
+        <p:txBody>
+          <a:bodyPr vert="horz" lIns="134422" tIns="67211" rIns="134422" bIns="67211" rtlCol="0" anchor="ctr"/>
+          <a:lstStyle/>
+          <a:p>
+            <a:pPr defTabSz="672130"/>
+            <a:r>
+              <a:rPr lang="pt-BR" sz="1544" dirty="0">
+                <a:latin typeface="Simplon Oi Headline" charset="0"/>
+                <a:ea typeface="Simplon Oi Headline" charset="0"/>
+                <a:cs typeface="Simplon Oi Headline" charset="0"/>
+              </a:rPr>
+              <a:t>Pontos atenção/ Principais Riscos</a:t>
+            </a:r>
+          </a:p>
+        </p:txBody>
+      </p:sp>
+      <p:sp>
+        <p:nvSpPr>
+          <p:cNvPr id="66" name="Retângulo 65"/>
+          <p:cNvSpPr/>
+          <p:nvPr/>
+        </p:nvSpPr>
+        <p:spPr>
+          <a:xfrm>
+            <a:off x="507536" y="3418875"/>
+            <a:ext cx="12505521" cy="238150"/>
+          </a:xfrm>
+          <a:prstGeom prst="rect">
+            <a:avLst/>
+          </a:prstGeom>
+          <a:solidFill>
+            <a:schemeClr val="bg1">
+              <a:lumMod val="85000"/>
+            </a:schemeClr>
+          </a:solidFill>
+        </p:spPr>
+        <p:txBody>
+          <a:bodyPr vert="horz" lIns="134422" tIns="67211" rIns="134422" bIns="67211" rtlCol="0" anchor="ctr"/>
+          <a:lstStyle/>
+          <a:p>
+            <a:pPr defTabSz="672130"/>
+            <a:r>
+              <a:rPr lang="pt-BR" sz="1544" dirty="0">
+                <a:latin typeface="Simplon Oi Headline" charset="0"/>
+                <a:ea typeface="Simplon Oi Headline" charset="0"/>
+                <a:cs typeface="Simplon Oi Headline" charset="0"/>
+              </a:rPr>
+              <a:t>Próximos Passos/ Decisões a tomar</a:t>
+            </a:r>
+          </a:p>
+        </p:txBody>
+      </p:sp>
+      <p:sp>
+        <p:nvSpPr>
+          <p:cNvPr id="63" name="Rectangle 37"/>
+          <p:cNvSpPr/>
+          <p:nvPr/>
+        </p:nvSpPr>
+        <p:spPr>
+          <a:xfrm>
+            <a:off x="496765" y="1106495"/>
+            <a:ext cx="6207777" cy="2235805"/>
+          </a:xfrm>
+          <a:prstGeom prst="rect">
+            <a:avLst/>
+          </a:prstGeom>
+          <a:noFill/>
+          <a:ln w="12700">
+            <a:solidFill>
+              <a:schemeClr val="bg1">
+                <a:lumMod val="50000"/>
+              </a:schemeClr>
+            </a:solidFill>
+          </a:ln>
+        </p:spPr>
+        <p:style>
+          <a:lnRef idx="2">
+            <a:schemeClr val="accent4"/>
+          </a:lnRef>
+          <a:fillRef idx="1">
+            <a:schemeClr val="lt1"/>
+          </a:fillRef>
+          <a:effectRef idx="0">
+            <a:schemeClr val="accent4"/>
+          </a:effectRef>
+          <a:fontRef idx="minor">
+            <a:schemeClr val="dk1"/>
+          </a:fontRef>
+        </p:style>
+        <p:txBody>
+          <a:bodyPr tIns="105844" rtlCol="0" anchor="t"/>
+          <a:lstStyle/>
+          <a:p>
+            <a:pPr marL="252049" lvl="1" indent="-252049">
+              <a:buFont typeface="Wingdings" panose="05000000000000000000" pitchFamily="2" charset="2"/>
+              <a:buChar char="§"/>
+            </a:pPr>
+            <a:r>
+              <a:rPr lang="pt-BR" sz="1323" b="1" dirty="0" err="1">
+                <a:solidFill>
+                  <a:schemeClr val="tx1"/>
+                </a:solidFill>
+                <a:latin typeface="Calibri" panose="020F0502020204030204" pitchFamily="34" charset="0"/>
+                <a:cs typeface="Simplon BP Regular"/>
+              </a:rPr>
+              <a:t>end</a:t>
+            </a:r>
+            <a:r>
+              <a:rPr lang="pt-BR" sz="1323" b="1" dirty="0">
+                <a:solidFill>
+                  <a:schemeClr val="tx1"/>
+                </a:solidFill>
+                <a:latin typeface="Calibri" panose="020F0502020204030204" pitchFamily="34" charset="0"/>
+                <a:cs typeface="Simplon BP Regular"/>
+              </a:rPr>
+              <a:t>-point de devolução finalizado</a:t>
+            </a:r>
+          </a:p>
+          <a:p>
+            <a:pPr marL="252049" lvl="1" indent="-252049">
+              <a:buFont typeface="Wingdings" panose="05000000000000000000" pitchFamily="2" charset="2"/>
+              <a:buChar char="§"/>
+            </a:pPr>
+            <a:r>
+              <a:rPr lang="pt-BR" sz="1320" b="1" dirty="0">
+                <a:solidFill>
+                  <a:schemeClr val="tx1"/>
+                </a:solidFill>
+                <a:latin typeface="Calibri" panose="020F0502020204030204" pitchFamily="34" charset="0"/>
+                <a:cs typeface="Simplon BP Regular"/>
+              </a:rPr>
+              <a:t>Geração do Arquivo TXT</a:t>
+            </a:r>
+          </a:p>
+          <a:p>
+            <a:pPr marL="252049" lvl="1" indent="-252049">
+              <a:buFont typeface="Wingdings" panose="05000000000000000000" pitchFamily="2" charset="2"/>
+              <a:buChar char="§"/>
+            </a:pPr>
+            <a:r>
+              <a:rPr lang="pt-BR" sz="1320" b="1" dirty="0">
+                <a:solidFill>
+                  <a:schemeClr val="tx1"/>
+                </a:solidFill>
+                <a:latin typeface="Calibri" panose="020F0502020204030204" pitchFamily="34" charset="0"/>
+                <a:cs typeface="Simplon BP Regular"/>
+              </a:rPr>
+              <a:t>Inclusão do livro no </a:t>
+            </a:r>
+            <a:r>
+              <a:rPr lang="pt-BR" sz="1320" b="1" dirty="0" err="1">
+                <a:solidFill>
+                  <a:schemeClr val="tx1"/>
+                </a:solidFill>
+                <a:latin typeface="Calibri" panose="020F0502020204030204" pitchFamily="34" charset="0"/>
+                <a:cs typeface="Simplon BP Regular"/>
+              </a:rPr>
+              <a:t>payload</a:t>
+            </a:r>
+            <a:r>
+              <a:rPr lang="pt-BR" sz="1320" b="1" dirty="0">
+                <a:solidFill>
+                  <a:schemeClr val="tx1"/>
+                </a:solidFill>
+                <a:latin typeface="Calibri" panose="020F0502020204030204" pitchFamily="34" charset="0"/>
+                <a:cs typeface="Simplon BP Regular"/>
+              </a:rPr>
+              <a:t> do usuário </a:t>
+            </a:r>
+          </a:p>
+          <a:p>
+            <a:pPr marL="252049" lvl="1" indent="-252049">
+              <a:buFont typeface="Wingdings" panose="05000000000000000000" pitchFamily="2" charset="2"/>
+              <a:buChar char="§"/>
+            </a:pPr>
+            <a:r>
+              <a:rPr lang="pt-BR" sz="1320" b="1" dirty="0">
+                <a:solidFill>
+                  <a:schemeClr val="tx1"/>
+                </a:solidFill>
+                <a:latin typeface="Calibri" panose="020F0502020204030204" pitchFamily="34" charset="0"/>
+                <a:cs typeface="Simplon BP Regular"/>
+              </a:rPr>
+              <a:t>Finalização da geração de usuários pendentes</a:t>
+            </a:r>
+          </a:p>
+          <a:p>
+            <a:pPr marL="252049" lvl="1" indent="-252049">
+              <a:buFont typeface="Wingdings" panose="05000000000000000000" pitchFamily="2" charset="2"/>
+              <a:buChar char="§"/>
+            </a:pPr>
+            <a:r>
+              <a:rPr lang="pt-BR" sz="1320" b="1" dirty="0">
+                <a:solidFill>
+                  <a:schemeClr val="tx1"/>
+                </a:solidFill>
+                <a:latin typeface="Calibri" panose="020F0502020204030204" pitchFamily="34" charset="0"/>
+                <a:cs typeface="Simplon BP Regular"/>
+              </a:rPr>
+              <a:t>Integração com </a:t>
+            </a:r>
+            <a:r>
+              <a:rPr lang="pt-BR" sz="1320" b="1" dirty="0" err="1">
+                <a:solidFill>
+                  <a:schemeClr val="tx1"/>
+                </a:solidFill>
+                <a:latin typeface="Calibri" panose="020F0502020204030204" pitchFamily="34" charset="0"/>
+                <a:cs typeface="Simplon BP Regular"/>
+              </a:rPr>
+              <a:t>endpoint</a:t>
+            </a:r>
+            <a:r>
+              <a:rPr lang="pt-BR" sz="1320" b="1" dirty="0">
+                <a:solidFill>
+                  <a:schemeClr val="tx1"/>
+                </a:solidFill>
+                <a:latin typeface="Calibri" panose="020F0502020204030204" pitchFamily="34" charset="0"/>
+                <a:cs typeface="Simplon BP Regular"/>
+              </a:rPr>
+              <a:t> de autenticação</a:t>
+            </a:r>
+          </a:p>
+          <a:p>
+            <a:pPr marL="252049" lvl="1" indent="-252049">
+              <a:buFont typeface="Wingdings" panose="05000000000000000000" pitchFamily="2" charset="2"/>
+              <a:buChar char="§"/>
+            </a:pPr>
+            <a:r>
+              <a:rPr lang="pt-BR" sz="1320" b="1" dirty="0">
+                <a:solidFill>
+                  <a:schemeClr val="tx1"/>
+                </a:solidFill>
+                <a:latin typeface="Calibri" panose="020F0502020204030204" pitchFamily="34" charset="0"/>
+                <a:cs typeface="Simplon BP Regular"/>
+              </a:rPr>
+              <a:t>Validação de usuários logados </a:t>
+            </a:r>
+          </a:p>
+          <a:p>
+            <a:pPr marL="252049" lvl="1" indent="-252049">
+              <a:buFont typeface="Wingdings" panose="05000000000000000000" pitchFamily="2" charset="2"/>
+              <a:buChar char="§"/>
+            </a:pPr>
+            <a:r>
+              <a:rPr lang="pt-BR" sz="1320" b="1" dirty="0">
+                <a:solidFill>
+                  <a:schemeClr val="tx1"/>
+                </a:solidFill>
+                <a:latin typeface="Calibri" panose="020F0502020204030204" pitchFamily="34" charset="0"/>
+                <a:cs typeface="Simplon BP Regular"/>
+              </a:rPr>
+              <a:t>Continuação da planilha UAT</a:t>
+            </a:r>
+          </a:p>
+          <a:p>
+            <a:pPr marL="252049" lvl="1" indent="-252049">
+              <a:buFont typeface="Wingdings" panose="05000000000000000000" pitchFamily="2" charset="2"/>
+              <a:buChar char="§"/>
+            </a:pPr>
+            <a:r>
+              <a:rPr lang="pt-BR" sz="1320" b="1" dirty="0">
+                <a:solidFill>
+                  <a:schemeClr val="tx1"/>
+                </a:solidFill>
+                <a:latin typeface="Calibri" panose="020F0502020204030204" pitchFamily="34" charset="0"/>
+                <a:cs typeface="Simplon BP Regular"/>
+              </a:rPr>
+              <a:t>Inicio dos estudos sobre testes unitários com </a:t>
+            </a:r>
+            <a:r>
+              <a:rPr lang="pt-BR" sz="1320" b="1" dirty="0" err="1">
+                <a:solidFill>
+                  <a:schemeClr val="tx1"/>
+                </a:solidFill>
+                <a:latin typeface="Calibri" panose="020F0502020204030204" pitchFamily="34" charset="0"/>
+                <a:cs typeface="Simplon BP Regular"/>
+              </a:rPr>
+              <a:t>Junit</a:t>
+            </a:r>
+            <a:endParaRPr lang="pt-BR" sz="1320" b="1" dirty="0">
+              <a:solidFill>
+                <a:schemeClr val="tx1"/>
+              </a:solidFill>
+              <a:latin typeface="Calibri" panose="020F0502020204030204" pitchFamily="34" charset="0"/>
+              <a:cs typeface="Simplon BP Regular"/>
+            </a:endParaRPr>
+          </a:p>
+          <a:p>
+            <a:pPr marL="252049" lvl="1" indent="-252049">
+              <a:buFont typeface="Wingdings" panose="05000000000000000000" pitchFamily="2" charset="2"/>
+              <a:buChar char="§"/>
+            </a:pPr>
+            <a:r>
+              <a:rPr lang="pt-BR" sz="1320" b="1" dirty="0">
+                <a:solidFill>
+                  <a:schemeClr val="tx1"/>
+                </a:solidFill>
+                <a:latin typeface="Calibri" panose="020F0502020204030204" pitchFamily="34" charset="0"/>
+                <a:cs typeface="Simplon BP Regular"/>
+              </a:rPr>
+              <a:t>Ajuste do </a:t>
+            </a:r>
+            <a:r>
+              <a:rPr lang="pt-BR" sz="1320" b="1" dirty="0" err="1">
+                <a:solidFill>
+                  <a:schemeClr val="tx1"/>
+                </a:solidFill>
+                <a:latin typeface="Calibri" panose="020F0502020204030204" pitchFamily="34" charset="0"/>
+                <a:cs typeface="Simplon BP Regular"/>
+              </a:rPr>
+              <a:t>back</a:t>
+            </a:r>
+            <a:r>
+              <a:rPr lang="pt-BR" sz="1320" b="1" dirty="0">
+                <a:solidFill>
+                  <a:schemeClr val="tx1"/>
+                </a:solidFill>
+                <a:latin typeface="Calibri" panose="020F0502020204030204" pitchFamily="34" charset="0"/>
+                <a:cs typeface="Simplon BP Regular"/>
+              </a:rPr>
+              <a:t> com as mudanças do banco</a:t>
+            </a:r>
+          </a:p>
+          <a:p>
+            <a:pPr marL="252049" lvl="1" indent="-252049">
+              <a:buFont typeface="Wingdings" panose="05000000000000000000" pitchFamily="2" charset="2"/>
+              <a:buChar char="§"/>
+            </a:pPr>
+            <a:endParaRPr lang="pt-BR" sz="1323" b="1" dirty="0">
+              <a:solidFill>
+                <a:schemeClr val="tx1"/>
+              </a:solidFill>
+              <a:latin typeface="Calibri" panose="020F0502020204030204" pitchFamily="34" charset="0"/>
+              <a:cs typeface="Simplon BP Regular"/>
+            </a:endParaRPr>
+          </a:p>
+          <a:p>
+            <a:pPr marL="0" lvl="1" defTabSz="672130"/>
+            <a:endParaRPr lang="pt-BR" sz="1600" b="1" dirty="0">
+              <a:solidFill>
+                <a:schemeClr val="tx1"/>
+              </a:solidFill>
+              <a:latin typeface="Calibri" panose="020F0502020204030204" pitchFamily="34" charset="0"/>
+              <a:cs typeface="Simplon BP Regular"/>
+            </a:endParaRPr>
+          </a:p>
+          <a:p>
+            <a:pPr marL="252049" lvl="1" indent="-252049" fontAlgn="base">
+              <a:spcBef>
+                <a:spcPct val="0"/>
+              </a:spcBef>
+              <a:buFont typeface="Wingdings" panose="05000000000000000000" pitchFamily="2" charset="2"/>
+              <a:buChar char="ü"/>
+              <a:defRPr/>
+            </a:pPr>
+            <a:endParaRPr lang="pt-BR" sz="1323" b="1" dirty="0">
+              <a:solidFill>
+                <a:schemeClr val="tx1"/>
+              </a:solidFill>
+              <a:latin typeface="Calibri" panose="020F0502020204030204" pitchFamily="34" charset="0"/>
+              <a:cs typeface="Simplon BP Regular"/>
+            </a:endParaRPr>
+          </a:p>
+          <a:p>
+            <a:pPr marL="252049" lvl="1" indent="-252049" fontAlgn="base">
+              <a:spcBef>
+                <a:spcPct val="0"/>
+              </a:spcBef>
+              <a:buFont typeface="Wingdings" panose="05000000000000000000" pitchFamily="2" charset="2"/>
+              <a:buChar char="ü"/>
+              <a:defRPr/>
+            </a:pPr>
+            <a:endParaRPr lang="pt-BR" sz="1323" b="1" dirty="0">
+              <a:solidFill>
+                <a:schemeClr val="tx1"/>
+              </a:solidFill>
+              <a:latin typeface="Calibri" panose="020F0502020204030204" pitchFamily="34" charset="0"/>
+              <a:cs typeface="Simplon BP Regular"/>
+            </a:endParaRPr>
+          </a:p>
+          <a:p>
+            <a:pPr marL="252049" lvl="1" indent="-252049" fontAlgn="base">
+              <a:spcBef>
+                <a:spcPct val="0"/>
+              </a:spcBef>
+              <a:buFont typeface="Wingdings" panose="05000000000000000000" pitchFamily="2" charset="2"/>
+              <a:buChar char="ü"/>
+              <a:defRPr/>
+            </a:pPr>
+            <a:endParaRPr lang="pt-BR" sz="1323" b="1" dirty="0">
+              <a:solidFill>
+                <a:schemeClr val="tx1"/>
+              </a:solidFill>
+              <a:latin typeface="Calibri" panose="020F0502020204030204" pitchFamily="34" charset="0"/>
+              <a:cs typeface="Simplon BP Regular"/>
+            </a:endParaRPr>
+          </a:p>
+          <a:p>
+            <a:pPr marL="252049" indent="-252049" fontAlgn="base">
+              <a:spcBef>
+                <a:spcPct val="0"/>
+              </a:spcBef>
+              <a:buFont typeface="Wingdings" panose="05000000000000000000" pitchFamily="2" charset="2"/>
+              <a:buChar char="ü"/>
+              <a:defRPr/>
+            </a:pPr>
+            <a:endParaRPr lang="pt-BR" sz="1323" b="1" dirty="0">
+              <a:solidFill>
+                <a:schemeClr val="tx1"/>
+              </a:solidFill>
+              <a:latin typeface="Calibri" panose="020F0502020204030204" pitchFamily="34" charset="0"/>
+              <a:cs typeface="Simplon BP Regular"/>
+            </a:endParaRPr>
+          </a:p>
+          <a:p>
+            <a:pPr marL="252049" indent="-252049" fontAlgn="base">
+              <a:spcBef>
+                <a:spcPct val="0"/>
+              </a:spcBef>
+              <a:buFont typeface="Wingdings" panose="05000000000000000000" pitchFamily="2" charset="2"/>
+              <a:buChar char="ü"/>
+              <a:defRPr/>
+            </a:pPr>
+            <a:endParaRPr lang="pt-BR" sz="1323" b="1" dirty="0">
+              <a:solidFill>
+                <a:schemeClr val="tx1"/>
+              </a:solidFill>
+              <a:latin typeface="Calibri" panose="020F0502020204030204" pitchFamily="34" charset="0"/>
+              <a:cs typeface="Simplon BP Regular"/>
+            </a:endParaRPr>
+          </a:p>
+        </p:txBody>
+      </p:sp>
+      <p:sp>
+        <p:nvSpPr>
+          <p:cNvPr id="2" name="Rectangle 43">
+            <a:extLst>
+              <a:ext uri="{FF2B5EF4-FFF2-40B4-BE49-F238E27FC236}">
+                <a16:creationId xmlns:a16="http://schemas.microsoft.com/office/drawing/2014/main" id="{B15BA19F-C787-4E6A-ADAB-C0DFF09C66A8}"/>
+              </a:ext>
+            </a:extLst>
+          </p:cNvPr>
+          <p:cNvSpPr>
+            <a:spLocks/>
+          </p:cNvSpPr>
+          <p:nvPr/>
+        </p:nvSpPr>
+        <p:spPr>
+          <a:xfrm>
+            <a:off x="496765" y="3657025"/>
+            <a:ext cx="12496524" cy="3833059"/>
+          </a:xfrm>
+          <a:prstGeom prst="rect">
+            <a:avLst/>
+          </a:prstGeom>
+          <a:noFill/>
+          <a:ln w="12700">
+            <a:solidFill>
+              <a:schemeClr val="bg1">
+                <a:lumMod val="50000"/>
+              </a:schemeClr>
+            </a:solidFill>
+          </a:ln>
+        </p:spPr>
+        <p:style>
+          <a:lnRef idx="2">
+            <a:schemeClr val="accent4"/>
+          </a:lnRef>
+          <a:fillRef idx="1">
+            <a:schemeClr val="lt1"/>
+          </a:fillRef>
+          <a:effectRef idx="0">
+            <a:schemeClr val="accent4"/>
+          </a:effectRef>
+          <a:fontRef idx="minor">
+            <a:schemeClr val="dk1"/>
+          </a:fontRef>
+        </p:style>
+        <p:txBody>
+          <a:bodyPr wrap="square" tIns="105844" numCol="3" rtlCol="0" anchor="ctr"/>
+          <a:lstStyle/>
+          <a:p>
+            <a:pPr marL="0" lvl="1" defTabSz="672130"/>
+            <a:r>
+              <a:rPr lang="pt-BR" sz="1323" b="1" dirty="0">
+                <a:solidFill>
+                  <a:schemeClr val="tx1"/>
+                </a:solidFill>
+                <a:latin typeface="Calibri" panose="020F0502020204030204" pitchFamily="34" charset="0"/>
+                <a:cs typeface="Simplon BP Regular"/>
+              </a:rPr>
+              <a:t>Frente Plataforma</a:t>
+            </a:r>
+          </a:p>
+          <a:p>
+            <a:pPr marL="285750" lvl="1" indent="-285750" defTabSz="672130">
+              <a:buFont typeface="Arial" panose="020B0604020202020204" pitchFamily="34" charset="0"/>
+              <a:buChar char="•"/>
+            </a:pPr>
+            <a:r>
+              <a:rPr lang="pt-BR" sz="1323" b="1" dirty="0">
+                <a:solidFill>
+                  <a:schemeClr val="tx1"/>
+                </a:solidFill>
+                <a:latin typeface="Calibri" panose="020F0502020204030204" pitchFamily="34" charset="0"/>
+                <a:cs typeface="Simplon BP Regular"/>
+              </a:rPr>
+              <a:t>Iniciar </a:t>
+            </a:r>
+            <a:r>
+              <a:rPr lang="pt-BR" sz="1323" b="1" dirty="0" err="1">
+                <a:solidFill>
+                  <a:schemeClr val="tx1"/>
+                </a:solidFill>
+                <a:latin typeface="Calibri" panose="020F0502020204030204" pitchFamily="34" charset="0"/>
+                <a:cs typeface="Simplon BP Regular"/>
+              </a:rPr>
+              <a:t>deploy</a:t>
+            </a:r>
+            <a:r>
+              <a:rPr lang="pt-BR" sz="1323" b="1" dirty="0">
+                <a:solidFill>
+                  <a:schemeClr val="tx1"/>
+                </a:solidFill>
+                <a:latin typeface="Calibri" panose="020F0502020204030204" pitchFamily="34" charset="0"/>
+                <a:cs typeface="Simplon BP Regular"/>
+              </a:rPr>
+              <a:t> das aplicações na </a:t>
+            </a:r>
+            <a:r>
+              <a:rPr lang="pt-BR" sz="1323" b="1" dirty="0" err="1">
+                <a:solidFill>
+                  <a:schemeClr val="tx1"/>
+                </a:solidFill>
+                <a:latin typeface="Calibri" panose="020F0502020204030204" pitchFamily="34" charset="0"/>
+                <a:cs typeface="Simplon BP Regular"/>
+              </a:rPr>
+              <a:t>azure</a:t>
+            </a:r>
+            <a:r>
+              <a:rPr lang="pt-BR" sz="1323" b="1" dirty="0">
+                <a:solidFill>
+                  <a:schemeClr val="tx1"/>
+                </a:solidFill>
+                <a:latin typeface="Calibri" panose="020F0502020204030204" pitchFamily="34" charset="0"/>
+                <a:cs typeface="Simplon BP Regular"/>
+              </a:rPr>
+              <a:t> </a:t>
+            </a:r>
+          </a:p>
+          <a:p>
+            <a:pPr marL="0" lvl="1" defTabSz="672130"/>
+            <a:r>
+              <a:rPr lang="pt-BR" sz="1323" b="1" dirty="0">
+                <a:solidFill>
+                  <a:schemeClr val="tx1"/>
+                </a:solidFill>
+                <a:latin typeface="Calibri" panose="020F0502020204030204" pitchFamily="34" charset="0"/>
+                <a:cs typeface="Simplon BP Regular"/>
+              </a:rPr>
+              <a:t>Frente Backend</a:t>
+            </a:r>
+          </a:p>
+          <a:p>
+            <a:pPr marL="285750" lvl="1" indent="-285750" defTabSz="672130">
+              <a:buFont typeface="Arial" panose="020B0604020202020204" pitchFamily="34" charset="0"/>
+              <a:buChar char="•"/>
+            </a:pPr>
+            <a:r>
+              <a:rPr lang="pt-BR" sz="1323" b="1" dirty="0">
+                <a:solidFill>
+                  <a:schemeClr val="tx1"/>
+                </a:solidFill>
+                <a:latin typeface="Calibri" panose="020F0502020204030204" pitchFamily="34" charset="0"/>
+                <a:cs typeface="Simplon BP Regular"/>
+              </a:rPr>
+              <a:t>Iniciar classe de testes unitários</a:t>
+            </a:r>
+          </a:p>
+          <a:p>
+            <a:pPr marL="0" lvl="1" defTabSz="672130"/>
+            <a:endParaRPr lang="pt-BR" sz="1323" b="1" dirty="0">
+              <a:solidFill>
+                <a:schemeClr val="tx1"/>
+              </a:solidFill>
+              <a:latin typeface="Calibri" panose="020F0502020204030204" pitchFamily="34" charset="0"/>
+              <a:cs typeface="Simplon BP Regular"/>
+            </a:endParaRPr>
+          </a:p>
+          <a:p>
+            <a:pPr marL="0" lvl="1" defTabSz="672130"/>
+            <a:r>
+              <a:rPr lang="pt-BR" sz="1323" b="1" dirty="0">
+                <a:solidFill>
+                  <a:schemeClr val="tx1"/>
+                </a:solidFill>
+                <a:latin typeface="Calibri" panose="020F0502020204030204" pitchFamily="34" charset="0"/>
+                <a:cs typeface="Simplon BP Regular"/>
+              </a:rPr>
+              <a:t>Frente Front </a:t>
+            </a:r>
+            <a:r>
+              <a:rPr lang="pt-BR" sz="1323" b="1" dirty="0" err="1">
+                <a:solidFill>
+                  <a:schemeClr val="tx1"/>
+                </a:solidFill>
+                <a:latin typeface="Calibri" panose="020F0502020204030204" pitchFamily="34" charset="0"/>
+                <a:cs typeface="Simplon BP Regular"/>
+              </a:rPr>
+              <a:t>end</a:t>
+            </a:r>
+            <a:endParaRPr lang="pt-BR" sz="1323" b="1" dirty="0">
+              <a:solidFill>
+                <a:schemeClr val="tx1"/>
+              </a:solidFill>
+              <a:latin typeface="Calibri" panose="020F0502020204030204" pitchFamily="34" charset="0"/>
+              <a:cs typeface="Simplon BP Regular"/>
+            </a:endParaRPr>
+          </a:p>
+          <a:p>
+            <a:pPr marL="285750" lvl="1" indent="-285750" defTabSz="672130">
+              <a:buFont typeface="Arial" panose="020B0604020202020204" pitchFamily="34" charset="0"/>
+              <a:buChar char="•"/>
+            </a:pPr>
+            <a:r>
+              <a:rPr lang="pt-BR" sz="1323" b="1" dirty="0">
+                <a:solidFill>
+                  <a:schemeClr val="tx1"/>
+                </a:solidFill>
+                <a:latin typeface="Calibri" panose="020F0502020204030204" pitchFamily="34" charset="0"/>
+                <a:cs typeface="Simplon BP Regular"/>
+              </a:rPr>
+              <a:t>Trabalhar responsividade do site</a:t>
+            </a:r>
+          </a:p>
+          <a:p>
+            <a:pPr marL="285750" lvl="1" indent="-285750" defTabSz="672130">
+              <a:buFont typeface="Arial" panose="020B0604020202020204" pitchFamily="34" charset="0"/>
+              <a:buChar char="•"/>
+            </a:pPr>
+            <a:r>
+              <a:rPr lang="pt-BR" sz="1323" b="1" dirty="0">
+                <a:solidFill>
+                  <a:schemeClr val="tx1"/>
+                </a:solidFill>
+                <a:latin typeface="Calibri" panose="020F0502020204030204" pitchFamily="34" charset="0"/>
+                <a:cs typeface="Simplon BP Regular"/>
+              </a:rPr>
+              <a:t>Criar pagina de “Ranking”</a:t>
+            </a:r>
+          </a:p>
+          <a:p>
+            <a:pPr marL="285750" lvl="1" indent="-285750" defTabSz="672130">
+              <a:buFont typeface="Arial" panose="020B0604020202020204" pitchFamily="34" charset="0"/>
+              <a:buChar char="•"/>
+            </a:pPr>
+            <a:r>
+              <a:rPr lang="pt-BR" sz="1323" b="1" dirty="0">
+                <a:solidFill>
+                  <a:schemeClr val="tx1"/>
+                </a:solidFill>
+                <a:latin typeface="Calibri" panose="020F0502020204030204" pitchFamily="34" charset="0"/>
+                <a:cs typeface="Simplon BP Regular"/>
+              </a:rPr>
+              <a:t>Criar pagina de “Sem acesso”</a:t>
+            </a:r>
+          </a:p>
+          <a:p>
+            <a:pPr marL="285750" lvl="1" indent="-285750" defTabSz="672130">
+              <a:buFont typeface="Arial" panose="020B0604020202020204" pitchFamily="34" charset="0"/>
+              <a:buChar char="•"/>
+            </a:pPr>
+            <a:r>
+              <a:rPr lang="pt-BR" sz="1323" b="1" dirty="0">
+                <a:solidFill>
+                  <a:schemeClr val="tx1"/>
+                </a:solidFill>
+                <a:latin typeface="Calibri" panose="020F0502020204030204" pitchFamily="34" charset="0"/>
+                <a:cs typeface="Simplon BP Regular"/>
+              </a:rPr>
+              <a:t>Finalizar a </a:t>
+            </a:r>
+            <a:r>
+              <a:rPr lang="pt-BR" sz="1323" b="1" dirty="0" err="1">
+                <a:solidFill>
+                  <a:schemeClr val="tx1"/>
+                </a:solidFill>
+                <a:latin typeface="Calibri" panose="020F0502020204030204" pitchFamily="34" charset="0"/>
+                <a:cs typeface="Simplon BP Regular"/>
+              </a:rPr>
+              <a:t>gameficação</a:t>
+            </a:r>
+            <a:endParaRPr lang="pt-BR" sz="1323" b="1" dirty="0">
+              <a:solidFill>
+                <a:schemeClr val="tx1"/>
+              </a:solidFill>
+              <a:latin typeface="Calibri" panose="020F0502020204030204" pitchFamily="34" charset="0"/>
+              <a:cs typeface="Simplon BP Regular"/>
+            </a:endParaRPr>
+          </a:p>
+          <a:p>
+            <a:pPr marL="0" lvl="1" defTabSz="672130"/>
+            <a:endParaRPr lang="pt-BR" sz="1400" b="1" dirty="0">
+              <a:solidFill>
+                <a:schemeClr val="tx1"/>
+              </a:solidFill>
+              <a:latin typeface="Calibri" panose="020F0502020204030204" pitchFamily="34" charset="0"/>
+              <a:cs typeface="Simplon BP Regular"/>
+            </a:endParaRPr>
+          </a:p>
+          <a:p>
+            <a:pPr marL="0" lvl="1" defTabSz="672130"/>
+            <a:r>
+              <a:rPr lang="pt-BR" sz="1400" b="1" dirty="0">
+                <a:solidFill>
+                  <a:schemeClr val="tx1"/>
+                </a:solidFill>
+                <a:latin typeface="Calibri" panose="020F0502020204030204" pitchFamily="34" charset="0"/>
+                <a:cs typeface="Simplon BP Regular"/>
+              </a:rPr>
+              <a:t>Frente Negócios</a:t>
+            </a:r>
+            <a:r>
+              <a:rPr lang="pt-BR" sz="1400" dirty="0">
+                <a:solidFill>
+                  <a:schemeClr val="tx1"/>
+                </a:solidFill>
+                <a:latin typeface="Calibri" panose="020F0502020204030204" pitchFamily="34" charset="0"/>
+                <a:cs typeface="Simplon BP Regular"/>
+              </a:rPr>
+              <a:t>;</a:t>
+            </a:r>
+          </a:p>
+          <a:p>
+            <a:pPr marL="285750" lvl="1" indent="-285750" defTabSz="672130">
+              <a:buFont typeface="Arial" panose="020B0604020202020204" pitchFamily="34" charset="0"/>
+              <a:buChar char="•"/>
+            </a:pPr>
+            <a:r>
+              <a:rPr lang="pt-BR" sz="1400" b="1" dirty="0">
+                <a:solidFill>
+                  <a:schemeClr val="tx1"/>
+                </a:solidFill>
+                <a:latin typeface="Calibri" panose="020F0502020204030204" pitchFamily="34" charset="0"/>
+                <a:cs typeface="Simplon BP Regular"/>
+              </a:rPr>
+              <a:t>Dar continuidade na planilha UAT</a:t>
+            </a:r>
+          </a:p>
+          <a:p>
+            <a:pPr marL="0" lvl="1"/>
+            <a:endParaRPr lang="pt-BR" sz="1400" b="1" dirty="0">
+              <a:solidFill>
+                <a:schemeClr val="tx1"/>
+              </a:solidFill>
+              <a:latin typeface="Calibri" panose="020F0502020204030204" pitchFamily="34" charset="0"/>
+              <a:cs typeface="Simplon BP Regular"/>
+            </a:endParaRPr>
+          </a:p>
+          <a:p>
+            <a:pPr marL="0" lvl="1"/>
+            <a:r>
+              <a:rPr lang="pt-BR" sz="1400" b="1" dirty="0">
+                <a:solidFill>
+                  <a:schemeClr val="tx1"/>
+                </a:solidFill>
+                <a:latin typeface="Calibri" panose="020F0502020204030204" pitchFamily="34" charset="0"/>
+                <a:cs typeface="Simplon BP Regular"/>
+              </a:rPr>
+              <a:t>Frente Gestão Organizacional</a:t>
+            </a:r>
+          </a:p>
+          <a:p>
+            <a:pPr marL="285750" lvl="1" indent="-285750">
+              <a:buFont typeface="Arial" panose="020B0604020202020204" pitchFamily="34" charset="0"/>
+              <a:buChar char="•"/>
+            </a:pPr>
+            <a:r>
+              <a:rPr lang="pt-BR" sz="1400" b="1" dirty="0">
+                <a:solidFill>
+                  <a:schemeClr val="tx1"/>
+                </a:solidFill>
+                <a:latin typeface="Calibri" panose="020F0502020204030204" pitchFamily="34" charset="0"/>
+                <a:cs typeface="Simplon BP Regular"/>
+              </a:rPr>
+              <a:t>Iniciar White </a:t>
+            </a:r>
+            <a:r>
+              <a:rPr lang="pt-BR" sz="1400" b="1" dirty="0" err="1">
+                <a:solidFill>
+                  <a:schemeClr val="tx1"/>
+                </a:solidFill>
+                <a:latin typeface="Calibri" panose="020F0502020204030204" pitchFamily="34" charset="0"/>
+                <a:cs typeface="Simplon BP Regular"/>
+              </a:rPr>
+              <a:t>paper</a:t>
+            </a:r>
+            <a:r>
+              <a:rPr lang="pt-BR" sz="1400" b="1" dirty="0">
+                <a:solidFill>
+                  <a:schemeClr val="tx1"/>
+                </a:solidFill>
+                <a:latin typeface="Calibri" panose="020F0502020204030204" pitchFamily="34" charset="0"/>
+                <a:cs typeface="Simplon BP Regular"/>
+              </a:rPr>
+              <a:t> </a:t>
+            </a:r>
+          </a:p>
+          <a:p>
+            <a:pPr marL="0" lvl="1"/>
+            <a:endParaRPr lang="pt-BR" sz="1400" b="1" dirty="0">
+              <a:solidFill>
+                <a:schemeClr val="tx1"/>
+              </a:solidFill>
+              <a:latin typeface="Calibri" panose="020F0502020204030204" pitchFamily="34" charset="0"/>
+              <a:cs typeface="Simplon BP Regular"/>
+            </a:endParaRPr>
+          </a:p>
+          <a:p>
+            <a:pPr marL="285750" lvl="1" indent="-285750">
+              <a:buFont typeface="Arial" panose="020B0604020202020204" pitchFamily="34" charset="0"/>
+              <a:buChar char="•"/>
+            </a:pPr>
+            <a:endParaRPr lang="pt-BR" sz="1400" dirty="0">
+              <a:solidFill>
+                <a:schemeClr val="tx1"/>
+              </a:solidFill>
+              <a:latin typeface="Calibri" panose="020F0502020204030204" pitchFamily="34" charset="0"/>
+              <a:cs typeface="Simplon BP Regular"/>
+            </a:endParaRPr>
+          </a:p>
+        </p:txBody>
+      </p:sp>
+      <p:sp>
+        <p:nvSpPr>
+          <p:cNvPr id="6" name="Oval 134">
+            <a:extLst>
+              <a:ext uri="{FF2B5EF4-FFF2-40B4-BE49-F238E27FC236}">
+                <a16:creationId xmlns:a16="http://schemas.microsoft.com/office/drawing/2014/main" id="{70825C6F-9257-4CF5-8C62-1CA1EB2F8815}"/>
+              </a:ext>
+            </a:extLst>
+          </p:cNvPr>
+          <p:cNvSpPr>
+            <a:spLocks noChangeAspect="1"/>
+          </p:cNvSpPr>
+          <p:nvPr/>
+        </p:nvSpPr>
+        <p:spPr>
+          <a:xfrm>
+            <a:off x="9282214" y="282529"/>
+            <a:ext cx="211404" cy="211689"/>
+          </a:xfrm>
+          <a:prstGeom prst="ellipse">
+            <a:avLst/>
+          </a:prstGeom>
+          <a:solidFill>
+            <a:srgbClr val="FFFF00"/>
+          </a:solidFill>
+          <a:ln w="12700">
+            <a:solidFill>
+              <a:schemeClr val="accent3"/>
+            </a:solidFill>
+          </a:ln>
+        </p:spPr>
+        <p:style>
+          <a:lnRef idx="2">
+            <a:schemeClr val="accent1">
+              <a:shade val="50000"/>
+            </a:schemeClr>
+          </a:lnRef>
+          <a:fillRef idx="1">
+            <a:schemeClr val="accent1"/>
+          </a:fillRef>
+          <a:effectRef idx="0">
+            <a:schemeClr val="accent1"/>
+          </a:effectRef>
+          <a:fontRef idx="minor">
+            <a:schemeClr val="lt1"/>
+          </a:fontRef>
+        </p:style>
+        <p:txBody>
+          <a:bodyPr wrap="none" lIns="52922" tIns="52922" rIns="52922" rtlCol="0" anchor="ctr"/>
+          <a:lstStyle/>
+          <a:p>
+            <a:pPr algn="ctr" defTabSz="672130"/>
+            <a:endParaRPr lang="en-US" sz="1176" dirty="0">
+              <a:solidFill>
+                <a:srgbClr val="00B050"/>
+              </a:solidFill>
+              <a:latin typeface="Simplon BP Regular"/>
+              <a:cs typeface="Simplon BP Regular"/>
+            </a:endParaRPr>
+          </a:p>
+        </p:txBody>
+      </p:sp>
+      <p:sp>
+        <p:nvSpPr>
+          <p:cNvPr id="5" name="Retângulo 4">
+            <a:extLst>
+              <a:ext uri="{FF2B5EF4-FFF2-40B4-BE49-F238E27FC236}">
+                <a16:creationId xmlns:a16="http://schemas.microsoft.com/office/drawing/2014/main" id="{A1C14918-6027-46B3-96BF-C5F7FDEC3276}"/>
+              </a:ext>
+            </a:extLst>
+          </p:cNvPr>
+          <p:cNvSpPr/>
+          <p:nvPr/>
+        </p:nvSpPr>
+        <p:spPr>
+          <a:xfrm>
+            <a:off x="8017619" y="180231"/>
+            <a:ext cx="4937689" cy="618769"/>
+          </a:xfrm>
+          <a:prstGeom prst="rect">
+            <a:avLst/>
+          </a:prstGeom>
+          <a:noFill/>
+          <a:ln w="6350">
+            <a:solidFill>
+              <a:schemeClr val="bg1">
+                <a:lumMod val="75000"/>
+              </a:schemeClr>
+            </a:solidFill>
+          </a:ln>
+        </p:spPr>
+        <p:style>
+          <a:lnRef idx="2">
+            <a:schemeClr val="accent1">
+              <a:shade val="50000"/>
+            </a:schemeClr>
+          </a:lnRef>
+          <a:fillRef idx="1">
+            <a:schemeClr val="accent1"/>
+          </a:fillRef>
+          <a:effectRef idx="0">
+            <a:schemeClr val="accent1"/>
+          </a:effectRef>
+          <a:fontRef idx="minor">
+            <a:schemeClr val="lt1"/>
+          </a:fontRef>
+        </p:style>
+        <p:txBody>
+          <a:bodyPr rtlCol="0" anchor="ctr"/>
+          <a:lstStyle/>
+          <a:p>
+            <a:pPr algn="ctr"/>
+            <a:endParaRPr lang="pt-BR"/>
+          </a:p>
+        </p:txBody>
+      </p:sp>
+      <p:sp>
+        <p:nvSpPr>
+          <p:cNvPr id="8" name="TextBox 138">
+            <a:extLst>
+              <a:ext uri="{FF2B5EF4-FFF2-40B4-BE49-F238E27FC236}">
+                <a16:creationId xmlns:a16="http://schemas.microsoft.com/office/drawing/2014/main" id="{5CE7D08C-795B-4BF1-97F6-F9773F4E9F4C}"/>
+              </a:ext>
+            </a:extLst>
+          </p:cNvPr>
+          <p:cNvSpPr txBox="1"/>
+          <p:nvPr/>
+        </p:nvSpPr>
+        <p:spPr>
+          <a:xfrm>
+            <a:off x="9747419" y="-22583"/>
+            <a:ext cx="1478088" cy="211688"/>
+          </a:xfrm>
+          <a:prstGeom prst="rect">
+            <a:avLst/>
+          </a:prstGeom>
+          <a:solidFill>
+            <a:schemeClr val="bg1"/>
+          </a:solidFill>
+          <a:ln w="12700">
+            <a:noFill/>
+          </a:ln>
+        </p:spPr>
+        <p:style>
+          <a:lnRef idx="2">
+            <a:schemeClr val="accent4"/>
+          </a:lnRef>
+          <a:fillRef idx="1">
+            <a:schemeClr val="lt1"/>
+          </a:fillRef>
+          <a:effectRef idx="0">
+            <a:schemeClr val="accent4"/>
+          </a:effectRef>
+          <a:fontRef idx="minor">
+            <a:schemeClr val="dk1"/>
+          </a:fontRef>
+        </p:style>
+        <p:txBody>
+          <a:bodyPr wrap="none" lIns="52922" tIns="52922" rIns="52922" bIns="0" rtlCol="0" anchor="b"/>
+          <a:lstStyle>
+            <a:defPPr>
+              <a:defRPr lang="en-US"/>
+            </a:defPPr>
+            <a:lvl1pPr algn="ctr">
+              <a:defRPr sz="1000" b="1">
+                <a:latin typeface="Simplon BP Regular"/>
+                <a:cs typeface="Simplon BP Regular"/>
+              </a:defRPr>
+            </a:lvl1pPr>
+            <a:lvl2pPr>
+              <a:defRPr>
+                <a:solidFill>
+                  <a:schemeClr val="dk1"/>
+                </a:solidFill>
+              </a:defRPr>
+            </a:lvl2pPr>
+            <a:lvl3pPr>
+              <a:defRPr>
+                <a:solidFill>
+                  <a:schemeClr val="dk1"/>
+                </a:solidFill>
+              </a:defRPr>
+            </a:lvl3pPr>
+            <a:lvl4pPr>
+              <a:defRPr>
+                <a:solidFill>
+                  <a:schemeClr val="dk1"/>
+                </a:solidFill>
+              </a:defRPr>
+            </a:lvl4pPr>
+            <a:lvl5pPr>
+              <a:defRPr>
+                <a:solidFill>
+                  <a:schemeClr val="dk1"/>
+                </a:solidFill>
+              </a:defRPr>
+            </a:lvl5pPr>
+            <a:lvl6pPr>
+              <a:defRPr>
+                <a:solidFill>
+                  <a:schemeClr val="dk1"/>
+                </a:solidFill>
+              </a:defRPr>
+            </a:lvl6pPr>
+            <a:lvl7pPr>
+              <a:defRPr>
+                <a:solidFill>
+                  <a:schemeClr val="dk1"/>
+                </a:solidFill>
+              </a:defRPr>
+            </a:lvl7pPr>
+            <a:lvl8pPr>
+              <a:defRPr>
+                <a:solidFill>
+                  <a:schemeClr val="dk1"/>
+                </a:solidFill>
+              </a:defRPr>
+            </a:lvl8pPr>
+            <a:lvl9pPr>
+              <a:defRPr>
+                <a:solidFill>
+                  <a:schemeClr val="dk1"/>
+                </a:solidFill>
+              </a:defRPr>
+            </a:lvl9pPr>
+          </a:lstStyle>
+          <a:p>
+            <a:pPr defTabSz="672130"/>
+            <a:r>
+              <a:rPr lang="en-US" sz="1176" b="0" dirty="0">
+                <a:solidFill>
+                  <a:prstClr val="black"/>
+                </a:solidFill>
+                <a:latin typeface="Simplon BP Bold" pitchFamily="2" charset="0"/>
+              </a:rPr>
+              <a:t>    </a:t>
+            </a:r>
+            <a:r>
+              <a:rPr lang="en-US" sz="1176" b="0" dirty="0" err="1">
+                <a:solidFill>
+                  <a:prstClr val="black"/>
+                </a:solidFill>
+                <a:latin typeface="Simplon BP Bold" pitchFamily="2" charset="0"/>
+              </a:rPr>
+              <a:t>Farol</a:t>
+            </a:r>
+            <a:r>
+              <a:rPr lang="en-US" sz="1176" b="0" dirty="0">
+                <a:solidFill>
+                  <a:prstClr val="black"/>
+                </a:solidFill>
+                <a:latin typeface="Simplon BP Bold" pitchFamily="2" charset="0"/>
+              </a:rPr>
+              <a:t> do </a:t>
+            </a:r>
+            <a:r>
+              <a:rPr lang="en-US" sz="1176" b="0" dirty="0" err="1">
+                <a:solidFill>
+                  <a:prstClr val="black"/>
+                </a:solidFill>
+                <a:latin typeface="Simplon BP Bold" pitchFamily="2" charset="0"/>
+              </a:rPr>
+              <a:t>Projeto</a:t>
+            </a:r>
+            <a:r>
+              <a:rPr lang="en-US" sz="1176" b="0" dirty="0">
+                <a:solidFill>
+                  <a:prstClr val="black"/>
+                </a:solidFill>
+                <a:latin typeface="Simplon BP Bold" pitchFamily="2" charset="0"/>
+              </a:rPr>
+              <a:t>   </a:t>
+            </a:r>
+          </a:p>
+        </p:txBody>
+      </p:sp>
+      <p:sp>
+        <p:nvSpPr>
+          <p:cNvPr id="22" name="Oval 120">
+            <a:extLst>
+              <a:ext uri="{FF2B5EF4-FFF2-40B4-BE49-F238E27FC236}">
+                <a16:creationId xmlns:a16="http://schemas.microsoft.com/office/drawing/2014/main" id="{82942FCC-51D7-4B47-AB3E-6BD310106286}"/>
+              </a:ext>
+            </a:extLst>
+          </p:cNvPr>
+          <p:cNvSpPr>
+            <a:spLocks noChangeAspect="1"/>
+          </p:cNvSpPr>
+          <p:nvPr/>
+        </p:nvSpPr>
+        <p:spPr>
+          <a:xfrm>
+            <a:off x="11193898" y="297930"/>
+            <a:ext cx="211404" cy="211689"/>
+          </a:xfrm>
+          <a:prstGeom prst="ellipse">
+            <a:avLst/>
+          </a:prstGeom>
+          <a:solidFill>
+            <a:srgbClr val="FFFF00"/>
+          </a:solidFill>
+          <a:ln w="12700">
+            <a:solidFill>
+              <a:schemeClr val="accent3"/>
+            </a:solidFill>
+          </a:ln>
+        </p:spPr>
+        <p:style>
+          <a:lnRef idx="2">
+            <a:schemeClr val="accent1">
+              <a:shade val="50000"/>
+            </a:schemeClr>
+          </a:lnRef>
+          <a:fillRef idx="1">
+            <a:schemeClr val="accent1"/>
+          </a:fillRef>
+          <a:effectRef idx="0">
+            <a:schemeClr val="accent1"/>
+          </a:effectRef>
+          <a:fontRef idx="minor">
+            <a:schemeClr val="lt1"/>
+          </a:fontRef>
+        </p:style>
+        <p:txBody>
+          <a:bodyPr wrap="none" lIns="52922" tIns="52922" rIns="52922" rtlCol="0" anchor="ctr"/>
+          <a:lstStyle/>
+          <a:p>
+            <a:pPr algn="ctr" defTabSz="672130"/>
+            <a:endParaRPr lang="en-US" sz="1176" dirty="0">
+              <a:solidFill>
+                <a:prstClr val="black"/>
+              </a:solidFill>
+              <a:latin typeface="Simplon BP Regular"/>
+              <a:cs typeface="Simplon BP Regular"/>
+            </a:endParaRPr>
+          </a:p>
+        </p:txBody>
+      </p:sp>
+      <p:sp>
+        <p:nvSpPr>
+          <p:cNvPr id="4" name="CaixaDeTexto 3">
+            <a:extLst>
+              <a:ext uri="{FF2B5EF4-FFF2-40B4-BE49-F238E27FC236}">
+                <a16:creationId xmlns:a16="http://schemas.microsoft.com/office/drawing/2014/main" id="{CC1CD350-F23D-4C0F-9C54-8F84A937BAA5}"/>
+              </a:ext>
+            </a:extLst>
+          </p:cNvPr>
+          <p:cNvSpPr txBox="1"/>
+          <p:nvPr/>
+        </p:nvSpPr>
+        <p:spPr>
+          <a:xfrm>
+            <a:off x="6987402" y="1238316"/>
+            <a:ext cx="3675715" cy="461665"/>
+          </a:xfrm>
+          <a:prstGeom prst="rect">
+            <a:avLst/>
+          </a:prstGeom>
+          <a:noFill/>
+        </p:spPr>
+        <p:txBody>
+          <a:bodyPr wrap="square" rtlCol="0">
+            <a:spAutoFit/>
+          </a:bodyPr>
+          <a:lstStyle/>
+          <a:p>
+            <a:pPr marL="342900" indent="-342900">
+              <a:buFont typeface="Arial" panose="020B0604020202020204" pitchFamily="34" charset="0"/>
+              <a:buChar char="•"/>
+            </a:pPr>
+            <a:r>
+              <a:rPr lang="pt-BR" sz="1200" dirty="0"/>
+              <a:t>Verificar com a Tais sobre os arquivos de livros</a:t>
+            </a:r>
+          </a:p>
+          <a:p>
+            <a:pPr marL="342900" indent="-342900">
+              <a:buFont typeface="Arial" panose="020B0604020202020204" pitchFamily="34" charset="0"/>
+              <a:buChar char="•"/>
+            </a:pPr>
+            <a:r>
+              <a:rPr lang="pt-BR" sz="1200" dirty="0"/>
+              <a:t>Começar o White </a:t>
+            </a:r>
+            <a:r>
+              <a:rPr lang="pt-BR" sz="1200" dirty="0" err="1"/>
+              <a:t>paper</a:t>
+            </a:r>
+            <a:r>
+              <a:rPr lang="pt-BR" sz="1200" dirty="0"/>
+              <a:t> do projeto</a:t>
+            </a:r>
+          </a:p>
+        </p:txBody>
+      </p:sp>
+      <p:sp>
+        <p:nvSpPr>
+          <p:cNvPr id="24" name="Oval 134">
+            <a:extLst>
+              <a:ext uri="{FF2B5EF4-FFF2-40B4-BE49-F238E27FC236}">
+                <a16:creationId xmlns:a16="http://schemas.microsoft.com/office/drawing/2014/main" id="{634FAC8B-9591-4988-A983-E2A328DF8D53}"/>
+              </a:ext>
+            </a:extLst>
+          </p:cNvPr>
+          <p:cNvSpPr>
+            <a:spLocks noChangeAspect="1"/>
+          </p:cNvSpPr>
+          <p:nvPr/>
+        </p:nvSpPr>
+        <p:spPr>
+          <a:xfrm>
+            <a:off x="10194075" y="313264"/>
+            <a:ext cx="211404" cy="211689"/>
+          </a:xfrm>
+          <a:prstGeom prst="ellipse">
+            <a:avLst/>
+          </a:prstGeom>
+          <a:solidFill>
+            <a:srgbClr val="00B050"/>
+          </a:solidFill>
+          <a:ln w="12700">
+            <a:solidFill>
+              <a:schemeClr val="accent3"/>
+            </a:solidFill>
+          </a:ln>
+        </p:spPr>
+        <p:style>
+          <a:lnRef idx="2">
+            <a:schemeClr val="accent1">
+              <a:shade val="50000"/>
+            </a:schemeClr>
+          </a:lnRef>
+          <a:fillRef idx="1">
+            <a:schemeClr val="accent1"/>
+          </a:fillRef>
+          <a:effectRef idx="0">
+            <a:schemeClr val="accent1"/>
+          </a:effectRef>
+          <a:fontRef idx="minor">
+            <a:schemeClr val="lt1"/>
+          </a:fontRef>
+        </p:style>
+        <p:txBody>
+          <a:bodyPr wrap="none" lIns="52922" tIns="52922" rIns="52922" rtlCol="0" anchor="ctr"/>
+          <a:lstStyle/>
+          <a:p>
+            <a:pPr algn="ctr" defTabSz="672130"/>
+            <a:endParaRPr lang="en-US" sz="1176" dirty="0">
+              <a:solidFill>
+                <a:srgbClr val="FFFF00"/>
+              </a:solidFill>
+              <a:latin typeface="Simplon BP Regular"/>
+              <a:cs typeface="Simplon BP Regular"/>
+            </a:endParaRPr>
+          </a:p>
+        </p:txBody>
+      </p:sp>
+      <p:sp>
+        <p:nvSpPr>
+          <p:cNvPr id="25" name="Oval 120">
+            <a:extLst>
+              <a:ext uri="{FF2B5EF4-FFF2-40B4-BE49-F238E27FC236}">
+                <a16:creationId xmlns:a16="http://schemas.microsoft.com/office/drawing/2014/main" id="{CB86A68A-BBAC-4EAC-8E3B-957B40FDD5FA}"/>
+              </a:ext>
+            </a:extLst>
+          </p:cNvPr>
+          <p:cNvSpPr>
+            <a:spLocks noChangeAspect="1"/>
+          </p:cNvSpPr>
+          <p:nvPr/>
+        </p:nvSpPr>
+        <p:spPr>
+          <a:xfrm>
+            <a:off x="12105759" y="309897"/>
+            <a:ext cx="211404" cy="211689"/>
+          </a:xfrm>
+          <a:prstGeom prst="ellipse">
+            <a:avLst/>
+          </a:prstGeom>
+          <a:solidFill>
+            <a:srgbClr val="FFFF00"/>
+          </a:solidFill>
+          <a:ln w="12700">
+            <a:solidFill>
+              <a:schemeClr val="accent3"/>
+            </a:solidFill>
+          </a:ln>
+        </p:spPr>
+        <p:style>
+          <a:lnRef idx="2">
+            <a:schemeClr val="accent1">
+              <a:shade val="50000"/>
+            </a:schemeClr>
+          </a:lnRef>
+          <a:fillRef idx="1">
+            <a:schemeClr val="accent1"/>
+          </a:fillRef>
+          <a:effectRef idx="0">
+            <a:schemeClr val="accent1"/>
+          </a:effectRef>
+          <a:fontRef idx="minor">
+            <a:schemeClr val="lt1"/>
+          </a:fontRef>
+        </p:style>
+        <p:txBody>
+          <a:bodyPr wrap="none" lIns="52922" tIns="52922" rIns="52922" rtlCol="0" anchor="ctr"/>
+          <a:lstStyle/>
+          <a:p>
+            <a:pPr algn="ctr" defTabSz="672130"/>
+            <a:endParaRPr lang="en-US" sz="1176" dirty="0">
+              <a:solidFill>
+                <a:prstClr val="black"/>
+              </a:solidFill>
+              <a:latin typeface="Simplon BP Regular"/>
+              <a:cs typeface="Simplon BP Regular"/>
+            </a:endParaRPr>
+          </a:p>
+        </p:txBody>
+      </p:sp>
+    </p:spTree>
+    <p:extLst>
+      <p:ext uri="{BB962C8B-B14F-4D97-AF65-F5344CB8AC3E}">
+        <p14:creationId xmlns:p14="http://schemas.microsoft.com/office/powerpoint/2010/main" val="789054957"/>
       </p:ext>
     </p:extLst>
   </p:cSld>
@@ -42494,6 +44773,15 @@
 </file>
 
 <file path=customXml/item2.xml><?xml version="1.0" encoding="utf-8"?>
+<?mso-contentType ?>
+<FormTemplates xmlns="http://schemas.microsoft.com/sharepoint/v3/contenttype/forms">
+  <Display>DocumentLibraryForm</Display>
+  <Edit>DocumentLibraryForm</Edit>
+  <New>DocumentLibraryForm</New>
+</FormTemplates>
+</file>
+
+<file path=customXml/item3.xml><?xml version="1.0" encoding="utf-8"?>
 <ct:contentTypeSchema xmlns:ct="http://schemas.microsoft.com/office/2006/metadata/contentType" xmlns:ma="http://schemas.microsoft.com/office/2006/metadata/properties/metaAttributes" ct:_="" ma:_="" ma:contentTypeName="Document" ma:contentTypeID="0x0101001132905C37EA9847A7207C4BBCCCD8F4" ma:contentTypeVersion="34" ma:contentTypeDescription="Create a new document." ma:contentTypeScope="" ma:versionID="2f28daba72ca6e92be87ea70ebe5bb94">
   <xsd:schema xmlns:xsd="http://www.w3.org/2001/XMLSchema" xmlns:xs="http://www.w3.org/2001/XMLSchema" xmlns:p="http://schemas.microsoft.com/office/2006/metadata/properties" xmlns:ns3="4327b14a-fe89-488e-9f6d-9658cacf372b" xmlns:ns4="bbcd8c33-6940-4d4c-a587-bbc736ca1e4d" targetNamespace="http://schemas.microsoft.com/office/2006/metadata/properties" ma:root="true" ma:fieldsID="df18e839ce2650f1975b41376e6cdb6b" ns3:_="" ns4:_="">
     <xsd:import namespace="4327b14a-fe89-488e-9f6d-9658cacf372b"/>
@@ -42910,15 +45198,6 @@
 </ct:contentTypeSchema>
 </file>
 
-<file path=customXml/item3.xml><?xml version="1.0" encoding="utf-8"?>
-<?mso-contentType ?>
-<FormTemplates xmlns="http://schemas.microsoft.com/sharepoint/v3/contenttype/forms">
-  <Display>DocumentLibraryForm</Display>
-  <Edit>DocumentLibraryForm</Edit>
-  <New>DocumentLibraryForm</New>
-</FormTemplates>
-</file>
-
 <file path=customXml/itemProps1.xml><?xml version="1.0" encoding="utf-8"?>
 <ds:datastoreItem xmlns:ds="http://schemas.openxmlformats.org/officeDocument/2006/customXml" ds:itemID="{4B31267F-D399-4A8A-87F8-B75F56828412}">
   <ds:schemaRefs>
@@ -42937,6 +45216,14 @@
 </file>
 
 <file path=customXml/itemProps2.xml><?xml version="1.0" encoding="utf-8"?>
+<ds:datastoreItem xmlns:ds="http://schemas.openxmlformats.org/officeDocument/2006/customXml" ds:itemID="{E2481852-F24E-4532-AF30-C154D705D105}">
+  <ds:schemaRefs>
+    <ds:schemaRef ds:uri="http://schemas.microsoft.com/sharepoint/v3/contenttype/forms"/>
+  </ds:schemaRefs>
+</ds:datastoreItem>
+</file>
+
+<file path=customXml/itemProps3.xml><?xml version="1.0" encoding="utf-8"?>
 <ds:datastoreItem xmlns:ds="http://schemas.openxmlformats.org/officeDocument/2006/customXml" ds:itemID="{3BE6CAF6-1F55-4A70-B10C-21633F74987A}">
   <ds:schemaRefs>
     <ds:schemaRef ds:uri="http://schemas.microsoft.com/office/2006/metadata/contentType"/>
@@ -42953,12 +45240,4 @@
     <ds:schemaRef ds:uri="http://schemas.microsoft.com/internal/obd"/>
   </ds:schemaRefs>
 </ds:datastoreItem>
-</file>
-
-<file path=customXml/itemProps3.xml><?xml version="1.0" encoding="utf-8"?>
-<ds:datastoreItem xmlns:ds="http://schemas.openxmlformats.org/officeDocument/2006/customXml" ds:itemID="{E2481852-F24E-4532-AF30-C154D705D105}">
-  <ds:schemaRefs>
-    <ds:schemaRef ds:uri="http://schemas.microsoft.com/sharepoint/v3/contenttype/forms"/>
-  </ds:schemaRefs>
-</ds:datastoreItem>
 </file>
</xml_diff>

<commit_message>
Revert "docs: adicionar o status-report semanal"
This reverts commit af28287456a4b64f064c0bc9cb2a60ee1630ac49.
</commit_message>
<xml_diff>
--- a/Documentação/EngenhariaDeSoftware/Mod_Status_Report-PI20202.pptx
+++ b/Documentação/EngenhariaDeSoftware/Mod_Status_Report-PI20202.pptx
@@ -7,10 +7,10 @@
     <p:sldMasterId id="2147483665" r:id="rId6"/>
   </p:sldMasterIdLst>
   <p:notesMasterIdLst>
-    <p:notesMasterId r:id="rId19"/>
+    <p:notesMasterId r:id="rId18"/>
   </p:notesMasterIdLst>
   <p:handoutMasterIdLst>
-    <p:handoutMasterId r:id="rId20"/>
+    <p:handoutMasterId r:id="rId19"/>
   </p:handoutMasterIdLst>
   <p:sldIdLst>
     <p:sldId id="256" r:id="rId7"/>
@@ -24,7 +24,6 @@
     <p:sldId id="477" r:id="rId15"/>
     <p:sldId id="478" r:id="rId16"/>
     <p:sldId id="479" r:id="rId17"/>
-    <p:sldId id="480" r:id="rId18"/>
   </p:sldIdLst>
   <p:sldSz cx="13442950" cy="7561263"/>
   <p:notesSz cx="7104063" cy="10234613"/>
@@ -143,7 +142,6 @@
             <p14:sldId id="477"/>
             <p14:sldId id="478"/>
             <p14:sldId id="479"/>
-            <p14:sldId id="480"/>
           </p14:sldIdLst>
         </p14:section>
       </p14:sectionLst>
@@ -257,7 +255,7 @@
             <a:fld id="{C3CD65D1-5C11-455D-9F9A-0E035F00A0DA}" type="datetimeFigureOut">
               <a:rPr lang="pt-BR" smtClean="0"/>
               <a:pPr/>
-              <a:t>10/11/2021</a:t>
+              <a:t>03/11/2021</a:t>
             </a:fld>
             <a:endParaRPr lang="pt-BR"/>
           </a:p>
@@ -425,7 +423,7 @@
             <a:fld id="{A05DA3EF-18EA-43DE-B1BB-402A3C558822}" type="datetimeFigureOut">
               <a:rPr lang="pt-BR" smtClean="0"/>
               <a:pPr/>
-              <a:t>10/11/2021</a:t>
+              <a:t>03/11/2021</a:t>
             </a:fld>
             <a:endParaRPr lang="pt-BR"/>
           </a:p>
@@ -865,99 +863,6 @@
     <p:extLst>
       <p:ext uri="{BB962C8B-B14F-4D97-AF65-F5344CB8AC3E}">
         <p14:creationId xmlns:p14="http://schemas.microsoft.com/office/powerpoint/2010/main" val="3992602351"/>
-      </p:ext>
-    </p:extLst>
-  </p:cSld>
-  <p:clrMapOvr>
-    <a:masterClrMapping/>
-  </p:clrMapOvr>
-</p:notes>
-</file>
-
-<file path=ppt/notesSlides/notesSlide11.xml><?xml version="1.0" encoding="utf-8"?>
-<p:notes xmlns:a="http://schemas.openxmlformats.org/drawingml/2006/main" xmlns:r="http://schemas.openxmlformats.org/officeDocument/2006/relationships" xmlns:p="http://schemas.openxmlformats.org/presentationml/2006/main">
-  <p:cSld>
-    <p:spTree>
-      <p:nvGrpSpPr>
-        <p:cNvPr id="1" name=""/>
-        <p:cNvGrpSpPr/>
-        <p:nvPr/>
-      </p:nvGrpSpPr>
-      <p:grpSpPr>
-        <a:xfrm>
-          <a:off x="0" y="0"/>
-          <a:ext cx="0" cy="0"/>
-          <a:chOff x="0" y="0"/>
-          <a:chExt cx="0" cy="0"/>
-        </a:xfrm>
-      </p:grpSpPr>
-      <p:sp>
-        <p:nvSpPr>
-          <p:cNvPr id="2" name="Slide Image Placeholder 1"/>
-          <p:cNvSpPr>
-            <a:spLocks noGrp="1" noRot="1" noChangeAspect="1"/>
-          </p:cNvSpPr>
-          <p:nvPr>
-            <p:ph type="sldImg"/>
-          </p:nvPr>
-        </p:nvSpPr>
-        <p:spPr/>
-      </p:sp>
-      <p:sp>
-        <p:nvSpPr>
-          <p:cNvPr id="3" name="Notes Placeholder 2"/>
-          <p:cNvSpPr>
-            <a:spLocks noGrp="1"/>
-          </p:cNvSpPr>
-          <p:nvPr>
-            <p:ph type="body" idx="1"/>
-          </p:nvPr>
-        </p:nvSpPr>
-        <p:spPr/>
-        <p:txBody>
-          <a:bodyPr/>
-          <a:lstStyle/>
-          <a:p>
-            <a:endParaRPr lang="en-US"/>
-          </a:p>
-        </p:txBody>
-      </p:sp>
-      <p:sp>
-        <p:nvSpPr>
-          <p:cNvPr id="4" name="Slide Number Placeholder 3"/>
-          <p:cNvSpPr>
-            <a:spLocks noGrp="1"/>
-          </p:cNvSpPr>
-          <p:nvPr>
-            <p:ph type="sldNum" sz="quarter" idx="10"/>
-          </p:nvPr>
-        </p:nvSpPr>
-        <p:spPr/>
-        <p:txBody>
-          <a:bodyPr/>
-          <a:lstStyle/>
-          <a:p>
-            <a:fld id="{B39AF3DB-B6A1-2444-9DD8-53D016F8E638}" type="slidenum">
-              <a:rPr lang="pt-BR" smtClean="0">
-                <a:solidFill>
-                  <a:prstClr val="black"/>
-                </a:solidFill>
-              </a:rPr>
-              <a:pPr/>
-              <a:t>12</a:t>
-            </a:fld>
-            <a:endParaRPr lang="pt-BR">
-              <a:solidFill>
-                <a:prstClr val="black"/>
-              </a:solidFill>
-            </a:endParaRPr>
-          </a:p>
-        </p:txBody>
-      </p:sp>
-    </p:spTree>
-    <p:extLst>
-      <p:ext uri="{BB962C8B-B14F-4D97-AF65-F5344CB8AC3E}">
-        <p14:creationId xmlns:p14="http://schemas.microsoft.com/office/powerpoint/2010/main" val="3204037339"/>
       </p:ext>
     </p:extLst>
   </p:cSld>
@@ -23624,7 +23529,7 @@
                 <a:latin typeface="Simplon Oi Headline"/>
                 <a:cs typeface="Simplon Oi Headline"/>
               </a:rPr>
-              <a:t>SEMANA 7 - 14/10/2021 – 21/10/2021</a:t>
+              <a:t>SEMANA 6 - 06/10/2021 – 13/10/2021</a:t>
             </a:r>
           </a:p>
         </p:txBody>
@@ -25394,7 +25299,7 @@
                 <a:latin typeface="Simplon Oi Headline"/>
                 <a:cs typeface="Simplon Oi Headline"/>
               </a:rPr>
-              <a:t>SEMANA 8 - 22/10/2021 – 28/10/2021</a:t>
+              <a:t>SEMANA 6 - 06/10/2021 – 13/10/2021</a:t>
             </a:r>
           </a:p>
         </p:txBody>
@@ -27246,2190 +27151,6 @@
     <p:extLst>
       <p:ext uri="{BB962C8B-B14F-4D97-AF65-F5344CB8AC3E}">
         <p14:creationId xmlns:p14="http://schemas.microsoft.com/office/powerpoint/2010/main" val="2499946718"/>
-      </p:ext>
-    </p:extLst>
-  </p:cSld>
-  <p:clrMapOvr>
-    <a:masterClrMapping/>
-  </p:clrMapOvr>
-</p:sld>
-</file>
-
-<file path=ppt/slides/slide12.xml><?xml version="1.0" encoding="utf-8"?>
-<p:sld xmlns:a="http://schemas.openxmlformats.org/drawingml/2006/main" xmlns:r="http://schemas.openxmlformats.org/officeDocument/2006/relationships" xmlns:p="http://schemas.openxmlformats.org/presentationml/2006/main">
-  <p:cSld>
-    <p:spTree>
-      <p:nvGrpSpPr>
-        <p:cNvPr id="1" name=""/>
-        <p:cNvGrpSpPr/>
-        <p:nvPr/>
-      </p:nvGrpSpPr>
-      <p:grpSpPr>
-        <a:xfrm>
-          <a:off x="0" y="0"/>
-          <a:ext cx="0" cy="0"/>
-          <a:chOff x="0" y="0"/>
-          <a:chExt cx="0" cy="0"/>
-        </a:xfrm>
-      </p:grpSpPr>
-      <p:sp>
-        <p:nvSpPr>
-          <p:cNvPr id="43" name="Rectangle 42"/>
-          <p:cNvSpPr/>
-          <p:nvPr/>
-        </p:nvSpPr>
-        <p:spPr>
-          <a:xfrm>
-            <a:off x="6814576" y="1080752"/>
-            <a:ext cx="6209639" cy="2235805"/>
-          </a:xfrm>
-          <a:prstGeom prst="rect">
-            <a:avLst/>
-          </a:prstGeom>
-          <a:noFill/>
-          <a:ln w="12700">
-            <a:solidFill>
-              <a:schemeClr val="bg1">
-                <a:lumMod val="50000"/>
-              </a:schemeClr>
-            </a:solidFill>
-          </a:ln>
-        </p:spPr>
-        <p:style>
-          <a:lnRef idx="2">
-            <a:schemeClr val="accent4"/>
-          </a:lnRef>
-          <a:fillRef idx="1">
-            <a:schemeClr val="lt1"/>
-          </a:fillRef>
-          <a:effectRef idx="0">
-            <a:schemeClr val="accent4"/>
-          </a:effectRef>
-          <a:fontRef idx="minor">
-            <a:schemeClr val="dk1"/>
-          </a:fontRef>
-        </p:style>
-        <p:txBody>
-          <a:bodyPr tIns="105844" rtlCol="0" anchor="t"/>
-          <a:lstStyle/>
-          <a:p>
-            <a:pPr defTabSz="672130">
-              <a:spcAft>
-                <a:spcPts val="882"/>
-              </a:spcAft>
-            </a:pPr>
-            <a:endParaRPr lang="pt-BR" sz="1470" dirty="0">
-              <a:solidFill>
-                <a:schemeClr val="tx1"/>
-              </a:solidFill>
-              <a:latin typeface="Calibri" panose="020F0502020204030204" pitchFamily="34" charset="0"/>
-              <a:cs typeface="Simplon BP Regular"/>
-            </a:endParaRPr>
-          </a:p>
-        </p:txBody>
-      </p:sp>
-      <p:sp>
-        <p:nvSpPr>
-          <p:cNvPr id="3" name="Title 2"/>
-          <p:cNvSpPr>
-            <a:spLocks noGrp="1"/>
-          </p:cNvSpPr>
-          <p:nvPr>
-            <p:ph type="title"/>
-          </p:nvPr>
-        </p:nvSpPr>
-        <p:spPr>
-          <a:xfrm>
-            <a:off x="469692" y="185232"/>
-            <a:ext cx="12098020" cy="800352"/>
-          </a:xfrm>
-        </p:spPr>
-        <p:txBody>
-          <a:bodyPr vert="horz" wrap="square" lIns="105844" tIns="0" rIns="105844" bIns="0" numCol="1" anchor="t" anchorCtr="0" compatLnSpc="1">
-            <a:prstTxWarp prst="textNoShape">
-              <a:avLst/>
-            </a:prstTxWarp>
-            <a:noAutofit/>
-          </a:bodyPr>
-          <a:lstStyle/>
-          <a:p>
-            <a:pPr algn="l">
-              <a:spcAft>
-                <a:spcPts val="882"/>
-              </a:spcAft>
-            </a:pPr>
-            <a:r>
-              <a:rPr lang="en-US" sz="2646" dirty="0">
-                <a:solidFill>
-                  <a:prstClr val="black"/>
-                </a:solidFill>
-                <a:latin typeface="Simplon Oi Headline"/>
-                <a:cs typeface="Simplon Oi Headline"/>
-              </a:rPr>
-              <a:t>SEMANA 9 - 29/10/2021 – 11/11/2021</a:t>
-            </a:r>
-          </a:p>
-        </p:txBody>
-      </p:sp>
-      <p:sp>
-        <p:nvSpPr>
-          <p:cNvPr id="78" name="TextBox 118"/>
-          <p:cNvSpPr txBox="1"/>
-          <p:nvPr/>
-        </p:nvSpPr>
-        <p:spPr>
-          <a:xfrm>
-            <a:off x="11822773" y="576471"/>
-            <a:ext cx="899678" cy="179824"/>
-          </a:xfrm>
-          <a:prstGeom prst="rect">
-            <a:avLst/>
-          </a:prstGeom>
-          <a:noFill/>
-          <a:ln w="12700">
-            <a:noFill/>
-          </a:ln>
-        </p:spPr>
-        <p:style>
-          <a:lnRef idx="2">
-            <a:schemeClr val="accent4"/>
-          </a:lnRef>
-          <a:fillRef idx="1">
-            <a:schemeClr val="lt1"/>
-          </a:fillRef>
-          <a:effectRef idx="0">
-            <a:schemeClr val="accent4"/>
-          </a:effectRef>
-          <a:fontRef idx="minor">
-            <a:schemeClr val="dk1"/>
-          </a:fontRef>
-        </p:style>
-        <p:txBody>
-          <a:bodyPr wrap="none" lIns="52922" tIns="52922" rIns="52922" bIns="0" rtlCol="0" anchor="b"/>
-          <a:lstStyle>
-            <a:defPPr>
-              <a:defRPr lang="en-US"/>
-            </a:defPPr>
-            <a:lvl1pPr algn="ctr">
-              <a:defRPr sz="1000" b="1">
-                <a:latin typeface="Simplon BP Regular"/>
-                <a:cs typeface="Simplon BP Regular"/>
-              </a:defRPr>
-            </a:lvl1pPr>
-            <a:lvl2pPr>
-              <a:defRPr>
-                <a:solidFill>
-                  <a:schemeClr val="dk1"/>
-                </a:solidFill>
-              </a:defRPr>
-            </a:lvl2pPr>
-            <a:lvl3pPr>
-              <a:defRPr>
-                <a:solidFill>
-                  <a:schemeClr val="dk1"/>
-                </a:solidFill>
-              </a:defRPr>
-            </a:lvl3pPr>
-            <a:lvl4pPr>
-              <a:defRPr>
-                <a:solidFill>
-                  <a:schemeClr val="dk1"/>
-                </a:solidFill>
-              </a:defRPr>
-            </a:lvl4pPr>
-            <a:lvl5pPr>
-              <a:defRPr>
-                <a:solidFill>
-                  <a:schemeClr val="dk1"/>
-                </a:solidFill>
-              </a:defRPr>
-            </a:lvl5pPr>
-            <a:lvl6pPr>
-              <a:defRPr>
-                <a:solidFill>
-                  <a:schemeClr val="dk1"/>
-                </a:solidFill>
-              </a:defRPr>
-            </a:lvl6pPr>
-            <a:lvl7pPr>
-              <a:defRPr>
-                <a:solidFill>
-                  <a:schemeClr val="dk1"/>
-                </a:solidFill>
-              </a:defRPr>
-            </a:lvl7pPr>
-            <a:lvl8pPr>
-              <a:defRPr>
-                <a:solidFill>
-                  <a:schemeClr val="dk1"/>
-                </a:solidFill>
-              </a:defRPr>
-            </a:lvl8pPr>
-            <a:lvl9pPr>
-              <a:defRPr>
-                <a:solidFill>
-                  <a:schemeClr val="dk1"/>
-                </a:solidFill>
-              </a:defRPr>
-            </a:lvl9pPr>
-          </a:lstStyle>
-          <a:p>
-            <a:pPr defTabSz="672130"/>
-            <a:r>
-              <a:rPr lang="pt-BR" sz="1176" b="0" dirty="0">
-                <a:solidFill>
-                  <a:prstClr val="black"/>
-                </a:solidFill>
-                <a:latin typeface="Simplon BP Bold" pitchFamily="2" charset="0"/>
-              </a:rPr>
-              <a:t>Negócios</a:t>
-            </a:r>
-          </a:p>
-        </p:txBody>
-      </p:sp>
-      <p:sp>
-        <p:nvSpPr>
-          <p:cNvPr id="80" name="TextBox 123"/>
-          <p:cNvSpPr txBox="1"/>
-          <p:nvPr/>
-        </p:nvSpPr>
-        <p:spPr>
-          <a:xfrm>
-            <a:off x="10852497" y="576471"/>
-            <a:ext cx="899678" cy="179824"/>
-          </a:xfrm>
-          <a:prstGeom prst="rect">
-            <a:avLst/>
-          </a:prstGeom>
-          <a:noFill/>
-          <a:ln w="12700">
-            <a:noFill/>
-          </a:ln>
-        </p:spPr>
-        <p:style>
-          <a:lnRef idx="2">
-            <a:schemeClr val="accent4"/>
-          </a:lnRef>
-          <a:fillRef idx="1">
-            <a:schemeClr val="lt1"/>
-          </a:fillRef>
-          <a:effectRef idx="0">
-            <a:schemeClr val="accent4"/>
-          </a:effectRef>
-          <a:fontRef idx="minor">
-            <a:schemeClr val="dk1"/>
-          </a:fontRef>
-        </p:style>
-        <p:txBody>
-          <a:bodyPr wrap="none" lIns="52922" tIns="52922" rIns="52922" bIns="0" rtlCol="0" anchor="b"/>
-          <a:lstStyle>
-            <a:defPPr>
-              <a:defRPr lang="en-US"/>
-            </a:defPPr>
-            <a:lvl1pPr algn="ctr">
-              <a:defRPr sz="1000" b="1">
-                <a:latin typeface="Simplon BP Regular"/>
-                <a:cs typeface="Simplon BP Regular"/>
-              </a:defRPr>
-            </a:lvl1pPr>
-            <a:lvl2pPr>
-              <a:defRPr>
-                <a:solidFill>
-                  <a:schemeClr val="dk1"/>
-                </a:solidFill>
-              </a:defRPr>
-            </a:lvl2pPr>
-            <a:lvl3pPr>
-              <a:defRPr>
-                <a:solidFill>
-                  <a:schemeClr val="dk1"/>
-                </a:solidFill>
-              </a:defRPr>
-            </a:lvl3pPr>
-            <a:lvl4pPr>
-              <a:defRPr>
-                <a:solidFill>
-                  <a:schemeClr val="dk1"/>
-                </a:solidFill>
-              </a:defRPr>
-            </a:lvl4pPr>
-            <a:lvl5pPr>
-              <a:defRPr>
-                <a:solidFill>
-                  <a:schemeClr val="dk1"/>
-                </a:solidFill>
-              </a:defRPr>
-            </a:lvl5pPr>
-            <a:lvl6pPr>
-              <a:defRPr>
-                <a:solidFill>
-                  <a:schemeClr val="dk1"/>
-                </a:solidFill>
-              </a:defRPr>
-            </a:lvl6pPr>
-            <a:lvl7pPr>
-              <a:defRPr>
-                <a:solidFill>
-                  <a:schemeClr val="dk1"/>
-                </a:solidFill>
-              </a:defRPr>
-            </a:lvl7pPr>
-            <a:lvl8pPr>
-              <a:defRPr>
-                <a:solidFill>
-                  <a:schemeClr val="dk1"/>
-                </a:solidFill>
-              </a:defRPr>
-            </a:lvl8pPr>
-            <a:lvl9pPr>
-              <a:defRPr>
-                <a:solidFill>
-                  <a:schemeClr val="dk1"/>
-                </a:solidFill>
-              </a:defRPr>
-            </a:lvl9pPr>
-          </a:lstStyle>
-          <a:p>
-            <a:pPr defTabSz="672130"/>
-            <a:r>
-              <a:rPr lang="pt-BR" sz="1176" b="0" dirty="0">
-                <a:solidFill>
-                  <a:prstClr val="black"/>
-                </a:solidFill>
-                <a:latin typeface="Simplon BP Bold" pitchFamily="2" charset="0"/>
-              </a:rPr>
-              <a:t>Plataforma</a:t>
-            </a:r>
-          </a:p>
-        </p:txBody>
-      </p:sp>
-      <p:sp>
-        <p:nvSpPr>
-          <p:cNvPr id="82" name="TextBox 128"/>
-          <p:cNvSpPr txBox="1"/>
-          <p:nvPr/>
-        </p:nvSpPr>
-        <p:spPr>
-          <a:xfrm>
-            <a:off x="9854245" y="576471"/>
-            <a:ext cx="899678" cy="179824"/>
-          </a:xfrm>
-          <a:prstGeom prst="rect">
-            <a:avLst/>
-          </a:prstGeom>
-          <a:noFill/>
-          <a:ln w="12700">
-            <a:noFill/>
-          </a:ln>
-        </p:spPr>
-        <p:style>
-          <a:lnRef idx="2">
-            <a:schemeClr val="accent4"/>
-          </a:lnRef>
-          <a:fillRef idx="1">
-            <a:schemeClr val="lt1"/>
-          </a:fillRef>
-          <a:effectRef idx="0">
-            <a:schemeClr val="accent4"/>
-          </a:effectRef>
-          <a:fontRef idx="minor">
-            <a:schemeClr val="dk1"/>
-          </a:fontRef>
-        </p:style>
-        <p:txBody>
-          <a:bodyPr wrap="none" lIns="52922" tIns="52922" rIns="52922" bIns="0" rtlCol="0" anchor="b"/>
-          <a:lstStyle>
-            <a:defPPr>
-              <a:defRPr lang="en-US"/>
-            </a:defPPr>
-            <a:lvl1pPr algn="ctr">
-              <a:defRPr sz="1000" b="1">
-                <a:latin typeface="Simplon BP Regular"/>
-                <a:cs typeface="Simplon BP Regular"/>
-              </a:defRPr>
-            </a:lvl1pPr>
-            <a:lvl2pPr>
-              <a:defRPr>
-                <a:solidFill>
-                  <a:schemeClr val="dk1"/>
-                </a:solidFill>
-              </a:defRPr>
-            </a:lvl2pPr>
-            <a:lvl3pPr>
-              <a:defRPr>
-                <a:solidFill>
-                  <a:schemeClr val="dk1"/>
-                </a:solidFill>
-              </a:defRPr>
-            </a:lvl3pPr>
-            <a:lvl4pPr>
-              <a:defRPr>
-                <a:solidFill>
-                  <a:schemeClr val="dk1"/>
-                </a:solidFill>
-              </a:defRPr>
-            </a:lvl4pPr>
-            <a:lvl5pPr>
-              <a:defRPr>
-                <a:solidFill>
-                  <a:schemeClr val="dk1"/>
-                </a:solidFill>
-              </a:defRPr>
-            </a:lvl5pPr>
-            <a:lvl6pPr>
-              <a:defRPr>
-                <a:solidFill>
-                  <a:schemeClr val="dk1"/>
-                </a:solidFill>
-              </a:defRPr>
-            </a:lvl6pPr>
-            <a:lvl7pPr>
-              <a:defRPr>
-                <a:solidFill>
-                  <a:schemeClr val="dk1"/>
-                </a:solidFill>
-              </a:defRPr>
-            </a:lvl7pPr>
-            <a:lvl8pPr>
-              <a:defRPr>
-                <a:solidFill>
-                  <a:schemeClr val="dk1"/>
-                </a:solidFill>
-              </a:defRPr>
-            </a:lvl8pPr>
-            <a:lvl9pPr>
-              <a:defRPr>
-                <a:solidFill>
-                  <a:schemeClr val="dk1"/>
-                </a:solidFill>
-              </a:defRPr>
-            </a:lvl9pPr>
-          </a:lstStyle>
-          <a:p>
-            <a:pPr defTabSz="672130"/>
-            <a:r>
-              <a:rPr lang="pt-BR" sz="1176" b="0" dirty="0">
-                <a:solidFill>
-                  <a:prstClr val="black"/>
-                </a:solidFill>
-                <a:latin typeface="Simplon BP Bold" pitchFamily="2" charset="0"/>
-              </a:rPr>
-              <a:t>Back</a:t>
-            </a:r>
-          </a:p>
-        </p:txBody>
-      </p:sp>
-      <p:sp>
-        <p:nvSpPr>
-          <p:cNvPr id="84" name="TextBox 133"/>
-          <p:cNvSpPr txBox="1"/>
-          <p:nvPr/>
-        </p:nvSpPr>
-        <p:spPr>
-          <a:xfrm>
-            <a:off x="8934246" y="576471"/>
-            <a:ext cx="899678" cy="179824"/>
-          </a:xfrm>
-          <a:prstGeom prst="rect">
-            <a:avLst/>
-          </a:prstGeom>
-          <a:noFill/>
-          <a:ln w="12700">
-            <a:noFill/>
-          </a:ln>
-        </p:spPr>
-        <p:style>
-          <a:lnRef idx="2">
-            <a:schemeClr val="accent4"/>
-          </a:lnRef>
-          <a:fillRef idx="1">
-            <a:schemeClr val="lt1"/>
-          </a:fillRef>
-          <a:effectRef idx="0">
-            <a:schemeClr val="accent4"/>
-          </a:effectRef>
-          <a:fontRef idx="minor">
-            <a:schemeClr val="dk1"/>
-          </a:fontRef>
-        </p:style>
-        <p:txBody>
-          <a:bodyPr wrap="none" lIns="52922" tIns="52922" rIns="52922" bIns="0" rtlCol="0" anchor="b"/>
-          <a:lstStyle>
-            <a:defPPr>
-              <a:defRPr lang="en-US"/>
-            </a:defPPr>
-            <a:lvl1pPr algn="ctr">
-              <a:defRPr sz="1000" b="1">
-                <a:latin typeface="Simplon BP Regular"/>
-                <a:cs typeface="Simplon BP Regular"/>
-              </a:defRPr>
-            </a:lvl1pPr>
-            <a:lvl2pPr>
-              <a:defRPr>
-                <a:solidFill>
-                  <a:schemeClr val="dk1"/>
-                </a:solidFill>
-              </a:defRPr>
-            </a:lvl2pPr>
-            <a:lvl3pPr>
-              <a:defRPr>
-                <a:solidFill>
-                  <a:schemeClr val="dk1"/>
-                </a:solidFill>
-              </a:defRPr>
-            </a:lvl3pPr>
-            <a:lvl4pPr>
-              <a:defRPr>
-                <a:solidFill>
-                  <a:schemeClr val="dk1"/>
-                </a:solidFill>
-              </a:defRPr>
-            </a:lvl4pPr>
-            <a:lvl5pPr>
-              <a:defRPr>
-                <a:solidFill>
-                  <a:schemeClr val="dk1"/>
-                </a:solidFill>
-              </a:defRPr>
-            </a:lvl5pPr>
-            <a:lvl6pPr>
-              <a:defRPr>
-                <a:solidFill>
-                  <a:schemeClr val="dk1"/>
-                </a:solidFill>
-              </a:defRPr>
-            </a:lvl6pPr>
-            <a:lvl7pPr>
-              <a:defRPr>
-                <a:solidFill>
-                  <a:schemeClr val="dk1"/>
-                </a:solidFill>
-              </a:defRPr>
-            </a:lvl7pPr>
-            <a:lvl8pPr>
-              <a:defRPr>
-                <a:solidFill>
-                  <a:schemeClr val="dk1"/>
-                </a:solidFill>
-              </a:defRPr>
-            </a:lvl8pPr>
-            <a:lvl9pPr>
-              <a:defRPr>
-                <a:solidFill>
-                  <a:schemeClr val="dk1"/>
-                </a:solidFill>
-              </a:defRPr>
-            </a:lvl9pPr>
-          </a:lstStyle>
-          <a:p>
-            <a:pPr defTabSz="672130"/>
-            <a:r>
-              <a:rPr lang="pt-BR" sz="1176" b="0" dirty="0">
-                <a:solidFill>
-                  <a:prstClr val="black"/>
-                </a:solidFill>
-                <a:latin typeface="Simplon BP Bold" pitchFamily="2" charset="0"/>
-              </a:rPr>
-              <a:t>Front</a:t>
-            </a:r>
-          </a:p>
-        </p:txBody>
-      </p:sp>
-      <p:sp>
-        <p:nvSpPr>
-          <p:cNvPr id="88" name="Oval 134"/>
-          <p:cNvSpPr>
-            <a:spLocks noChangeAspect="1"/>
-          </p:cNvSpPr>
-          <p:nvPr/>
-        </p:nvSpPr>
-        <p:spPr>
-          <a:xfrm>
-            <a:off x="8443555" y="282529"/>
-            <a:ext cx="211404" cy="211689"/>
-          </a:xfrm>
-          <a:prstGeom prst="ellipse">
-            <a:avLst/>
-          </a:prstGeom>
-          <a:solidFill>
-            <a:srgbClr val="00B050"/>
-          </a:solidFill>
-          <a:ln w="12700">
-            <a:solidFill>
-              <a:schemeClr val="accent3"/>
-            </a:solidFill>
-          </a:ln>
-        </p:spPr>
-        <p:style>
-          <a:lnRef idx="2">
-            <a:schemeClr val="accent1">
-              <a:shade val="50000"/>
-            </a:schemeClr>
-          </a:lnRef>
-          <a:fillRef idx="1">
-            <a:schemeClr val="accent1"/>
-          </a:fillRef>
-          <a:effectRef idx="0">
-            <a:schemeClr val="accent1"/>
-          </a:effectRef>
-          <a:fontRef idx="minor">
-            <a:schemeClr val="lt1"/>
-          </a:fontRef>
-        </p:style>
-        <p:txBody>
-          <a:bodyPr wrap="none" lIns="52922" tIns="52922" rIns="52922" rtlCol="0" anchor="ctr"/>
-          <a:lstStyle/>
-          <a:p>
-            <a:pPr algn="ctr" defTabSz="672130"/>
-            <a:endParaRPr lang="en-US" sz="1176" dirty="0">
-              <a:solidFill>
-                <a:srgbClr val="FFFF00"/>
-              </a:solidFill>
-              <a:latin typeface="Simplon BP Regular"/>
-              <a:cs typeface="Simplon BP Regular"/>
-            </a:endParaRPr>
-          </a:p>
-        </p:txBody>
-      </p:sp>
-      <p:sp>
-        <p:nvSpPr>
-          <p:cNvPr id="86" name="TextBox 138"/>
-          <p:cNvSpPr txBox="1"/>
-          <p:nvPr/>
-        </p:nvSpPr>
-        <p:spPr>
-          <a:xfrm>
-            <a:off x="8126053" y="576471"/>
-            <a:ext cx="899678" cy="179824"/>
-          </a:xfrm>
-          <a:prstGeom prst="rect">
-            <a:avLst/>
-          </a:prstGeom>
-          <a:noFill/>
-          <a:ln w="12700">
-            <a:noFill/>
-          </a:ln>
-        </p:spPr>
-        <p:style>
-          <a:lnRef idx="2">
-            <a:schemeClr val="accent4"/>
-          </a:lnRef>
-          <a:fillRef idx="1">
-            <a:schemeClr val="lt1"/>
-          </a:fillRef>
-          <a:effectRef idx="0">
-            <a:schemeClr val="accent4"/>
-          </a:effectRef>
-          <a:fontRef idx="minor">
-            <a:schemeClr val="dk1"/>
-          </a:fontRef>
-        </p:style>
-        <p:txBody>
-          <a:bodyPr wrap="none" lIns="52922" tIns="52922" rIns="52922" bIns="0" rtlCol="0" anchor="b"/>
-          <a:lstStyle>
-            <a:defPPr>
-              <a:defRPr lang="en-US"/>
-            </a:defPPr>
-            <a:lvl1pPr algn="ctr">
-              <a:defRPr sz="1000" b="1">
-                <a:latin typeface="Simplon BP Regular"/>
-                <a:cs typeface="Simplon BP Regular"/>
-              </a:defRPr>
-            </a:lvl1pPr>
-            <a:lvl2pPr>
-              <a:defRPr>
-                <a:solidFill>
-                  <a:schemeClr val="dk1"/>
-                </a:solidFill>
-              </a:defRPr>
-            </a:lvl2pPr>
-            <a:lvl3pPr>
-              <a:defRPr>
-                <a:solidFill>
-                  <a:schemeClr val="dk1"/>
-                </a:solidFill>
-              </a:defRPr>
-            </a:lvl3pPr>
-            <a:lvl4pPr>
-              <a:defRPr>
-                <a:solidFill>
-                  <a:schemeClr val="dk1"/>
-                </a:solidFill>
-              </a:defRPr>
-            </a:lvl4pPr>
-            <a:lvl5pPr>
-              <a:defRPr>
-                <a:solidFill>
-                  <a:schemeClr val="dk1"/>
-                </a:solidFill>
-              </a:defRPr>
-            </a:lvl5pPr>
-            <a:lvl6pPr>
-              <a:defRPr>
-                <a:solidFill>
-                  <a:schemeClr val="dk1"/>
-                </a:solidFill>
-              </a:defRPr>
-            </a:lvl6pPr>
-            <a:lvl7pPr>
-              <a:defRPr>
-                <a:solidFill>
-                  <a:schemeClr val="dk1"/>
-                </a:solidFill>
-              </a:defRPr>
-            </a:lvl7pPr>
-            <a:lvl8pPr>
-              <a:defRPr>
-                <a:solidFill>
-                  <a:schemeClr val="dk1"/>
-                </a:solidFill>
-              </a:defRPr>
-            </a:lvl8pPr>
-            <a:lvl9pPr>
-              <a:defRPr>
-                <a:solidFill>
-                  <a:schemeClr val="dk1"/>
-                </a:solidFill>
-              </a:defRPr>
-            </a:lvl9pPr>
-          </a:lstStyle>
-          <a:p>
-            <a:pPr defTabSz="672130"/>
-            <a:r>
-              <a:rPr lang="en-US" sz="1176" b="0" dirty="0" err="1">
-                <a:solidFill>
-                  <a:prstClr val="black"/>
-                </a:solidFill>
-                <a:latin typeface="Simplon BP Bold" pitchFamily="2" charset="0"/>
-              </a:rPr>
-              <a:t>Equipe</a:t>
-            </a:r>
-            <a:endParaRPr lang="en-US" sz="1176" b="0" dirty="0">
-              <a:solidFill>
-                <a:prstClr val="black"/>
-              </a:solidFill>
-              <a:latin typeface="Simplon BP Bold" pitchFamily="2" charset="0"/>
-            </a:endParaRPr>
-          </a:p>
-        </p:txBody>
-      </p:sp>
-      <p:sp>
-        <p:nvSpPr>
-          <p:cNvPr id="64" name="Retângulo 63"/>
-          <p:cNvSpPr/>
-          <p:nvPr/>
-        </p:nvSpPr>
-        <p:spPr>
-          <a:xfrm>
-            <a:off x="512766" y="868345"/>
-            <a:ext cx="6186608" cy="238150"/>
-          </a:xfrm>
-          <a:prstGeom prst="rect">
-            <a:avLst/>
-          </a:prstGeom>
-          <a:solidFill>
-            <a:schemeClr val="bg1">
-              <a:lumMod val="85000"/>
-            </a:schemeClr>
-          </a:solidFill>
-        </p:spPr>
-        <p:txBody>
-          <a:bodyPr vert="horz" lIns="134422" tIns="67211" rIns="134422" bIns="67211" rtlCol="0" anchor="ctr"/>
-          <a:lstStyle/>
-          <a:p>
-            <a:pPr defTabSz="672130"/>
-            <a:r>
-              <a:rPr lang="en-US" sz="1544" dirty="0">
-                <a:latin typeface="Simplon Oi Headline" charset="0"/>
-                <a:ea typeface="Simplon Oi Headline" charset="0"/>
-                <a:cs typeface="Simplon Oi Headline" charset="0"/>
-              </a:rPr>
-              <a:t>PROGRESSOS</a:t>
-            </a:r>
-            <a:endParaRPr lang="pt-BR" sz="1544" dirty="0">
-              <a:latin typeface="Simplon Oi Headline" charset="0"/>
-              <a:ea typeface="Simplon Oi Headline" charset="0"/>
-              <a:cs typeface="Simplon Oi Headline" charset="0"/>
-            </a:endParaRPr>
-          </a:p>
-        </p:txBody>
-      </p:sp>
-      <p:sp>
-        <p:nvSpPr>
-          <p:cNvPr id="65" name="Retângulo 64"/>
-          <p:cNvSpPr/>
-          <p:nvPr/>
-        </p:nvSpPr>
-        <p:spPr>
-          <a:xfrm>
-            <a:off x="6814576" y="868345"/>
-            <a:ext cx="6194715" cy="238150"/>
-          </a:xfrm>
-          <a:prstGeom prst="rect">
-            <a:avLst/>
-          </a:prstGeom>
-          <a:solidFill>
-            <a:schemeClr val="bg1">
-              <a:lumMod val="85000"/>
-            </a:schemeClr>
-          </a:solidFill>
-        </p:spPr>
-        <p:txBody>
-          <a:bodyPr vert="horz" lIns="134422" tIns="67211" rIns="134422" bIns="67211" rtlCol="0" anchor="ctr"/>
-          <a:lstStyle/>
-          <a:p>
-            <a:pPr defTabSz="672130"/>
-            <a:r>
-              <a:rPr lang="pt-BR" sz="1544" dirty="0">
-                <a:latin typeface="Simplon Oi Headline" charset="0"/>
-                <a:ea typeface="Simplon Oi Headline" charset="0"/>
-                <a:cs typeface="Simplon Oi Headline" charset="0"/>
-              </a:rPr>
-              <a:t>Pontos atenção/ Principais Riscos</a:t>
-            </a:r>
-          </a:p>
-        </p:txBody>
-      </p:sp>
-      <p:sp>
-        <p:nvSpPr>
-          <p:cNvPr id="66" name="Retângulo 65"/>
-          <p:cNvSpPr/>
-          <p:nvPr/>
-        </p:nvSpPr>
-        <p:spPr>
-          <a:xfrm>
-            <a:off x="507536" y="3418875"/>
-            <a:ext cx="12505521" cy="238150"/>
-          </a:xfrm>
-          <a:prstGeom prst="rect">
-            <a:avLst/>
-          </a:prstGeom>
-          <a:solidFill>
-            <a:schemeClr val="bg1">
-              <a:lumMod val="85000"/>
-            </a:schemeClr>
-          </a:solidFill>
-        </p:spPr>
-        <p:txBody>
-          <a:bodyPr vert="horz" lIns="134422" tIns="67211" rIns="134422" bIns="67211" rtlCol="0" anchor="ctr"/>
-          <a:lstStyle/>
-          <a:p>
-            <a:pPr defTabSz="672130"/>
-            <a:r>
-              <a:rPr lang="pt-BR" sz="1544" dirty="0">
-                <a:latin typeface="Simplon Oi Headline" charset="0"/>
-                <a:ea typeface="Simplon Oi Headline" charset="0"/>
-                <a:cs typeface="Simplon Oi Headline" charset="0"/>
-              </a:rPr>
-              <a:t>Próximos Passos/ Decisões a tomar</a:t>
-            </a:r>
-          </a:p>
-        </p:txBody>
-      </p:sp>
-      <p:sp>
-        <p:nvSpPr>
-          <p:cNvPr id="63" name="Rectangle 37"/>
-          <p:cNvSpPr/>
-          <p:nvPr/>
-        </p:nvSpPr>
-        <p:spPr>
-          <a:xfrm>
-            <a:off x="496765" y="1106495"/>
-            <a:ext cx="6207777" cy="2235805"/>
-          </a:xfrm>
-          <a:prstGeom prst="rect">
-            <a:avLst/>
-          </a:prstGeom>
-          <a:noFill/>
-          <a:ln w="12700">
-            <a:solidFill>
-              <a:schemeClr val="bg1">
-                <a:lumMod val="50000"/>
-              </a:schemeClr>
-            </a:solidFill>
-          </a:ln>
-        </p:spPr>
-        <p:style>
-          <a:lnRef idx="2">
-            <a:schemeClr val="accent4"/>
-          </a:lnRef>
-          <a:fillRef idx="1">
-            <a:schemeClr val="lt1"/>
-          </a:fillRef>
-          <a:effectRef idx="0">
-            <a:schemeClr val="accent4"/>
-          </a:effectRef>
-          <a:fontRef idx="minor">
-            <a:schemeClr val="dk1"/>
-          </a:fontRef>
-        </p:style>
-        <p:txBody>
-          <a:bodyPr tIns="105844" rtlCol="0" anchor="t"/>
-          <a:lstStyle/>
-          <a:p>
-            <a:pPr marL="252049" lvl="1" indent="-252049">
-              <a:buFont typeface="Wingdings" panose="05000000000000000000" pitchFamily="2" charset="2"/>
-              <a:buChar char="§"/>
-            </a:pPr>
-            <a:r>
-              <a:rPr lang="pt-BR" sz="1323" b="1" dirty="0" err="1">
-                <a:solidFill>
-                  <a:schemeClr val="tx1"/>
-                </a:solidFill>
-                <a:latin typeface="Calibri" panose="020F0502020204030204" pitchFamily="34" charset="0"/>
-                <a:cs typeface="Simplon BP Regular"/>
-              </a:rPr>
-              <a:t>end</a:t>
-            </a:r>
-            <a:r>
-              <a:rPr lang="pt-BR" sz="1323" b="1" dirty="0">
-                <a:solidFill>
-                  <a:schemeClr val="tx1"/>
-                </a:solidFill>
-                <a:latin typeface="Calibri" panose="020F0502020204030204" pitchFamily="34" charset="0"/>
-                <a:cs typeface="Simplon BP Regular"/>
-              </a:rPr>
-              <a:t>-point de devolução finalizado</a:t>
-            </a:r>
-          </a:p>
-          <a:p>
-            <a:pPr marL="252049" lvl="1" indent="-252049">
-              <a:buFont typeface="Wingdings" panose="05000000000000000000" pitchFamily="2" charset="2"/>
-              <a:buChar char="§"/>
-            </a:pPr>
-            <a:r>
-              <a:rPr lang="pt-BR" sz="1320" b="1" dirty="0">
-                <a:solidFill>
-                  <a:schemeClr val="tx1"/>
-                </a:solidFill>
-                <a:latin typeface="Calibri" panose="020F0502020204030204" pitchFamily="34" charset="0"/>
-                <a:cs typeface="Simplon BP Regular"/>
-              </a:rPr>
-              <a:t>Geração do Arquivo TXT</a:t>
-            </a:r>
-          </a:p>
-          <a:p>
-            <a:pPr marL="252049" lvl="1" indent="-252049">
-              <a:buFont typeface="Wingdings" panose="05000000000000000000" pitchFamily="2" charset="2"/>
-              <a:buChar char="§"/>
-            </a:pPr>
-            <a:r>
-              <a:rPr lang="pt-BR" sz="1320" b="1" dirty="0">
-                <a:solidFill>
-                  <a:schemeClr val="tx1"/>
-                </a:solidFill>
-                <a:latin typeface="Calibri" panose="020F0502020204030204" pitchFamily="34" charset="0"/>
-                <a:cs typeface="Simplon BP Regular"/>
-              </a:rPr>
-              <a:t>Inclusão do livro no </a:t>
-            </a:r>
-            <a:r>
-              <a:rPr lang="pt-BR" sz="1320" b="1" dirty="0" err="1">
-                <a:solidFill>
-                  <a:schemeClr val="tx1"/>
-                </a:solidFill>
-                <a:latin typeface="Calibri" panose="020F0502020204030204" pitchFamily="34" charset="0"/>
-                <a:cs typeface="Simplon BP Regular"/>
-              </a:rPr>
-              <a:t>payload</a:t>
-            </a:r>
-            <a:r>
-              <a:rPr lang="pt-BR" sz="1320" b="1" dirty="0">
-                <a:solidFill>
-                  <a:schemeClr val="tx1"/>
-                </a:solidFill>
-                <a:latin typeface="Calibri" panose="020F0502020204030204" pitchFamily="34" charset="0"/>
-                <a:cs typeface="Simplon BP Regular"/>
-              </a:rPr>
-              <a:t> do usuário </a:t>
-            </a:r>
-          </a:p>
-          <a:p>
-            <a:pPr marL="252049" lvl="1" indent="-252049">
-              <a:buFont typeface="Wingdings" panose="05000000000000000000" pitchFamily="2" charset="2"/>
-              <a:buChar char="§"/>
-            </a:pPr>
-            <a:r>
-              <a:rPr lang="pt-BR" sz="1320" b="1" dirty="0">
-                <a:solidFill>
-                  <a:schemeClr val="tx1"/>
-                </a:solidFill>
-                <a:latin typeface="Calibri" panose="020F0502020204030204" pitchFamily="34" charset="0"/>
-                <a:cs typeface="Simplon BP Regular"/>
-              </a:rPr>
-              <a:t>Finalização da geração de usuários pendentes</a:t>
-            </a:r>
-          </a:p>
-          <a:p>
-            <a:pPr marL="252049" lvl="1" indent="-252049">
-              <a:buFont typeface="Wingdings" panose="05000000000000000000" pitchFamily="2" charset="2"/>
-              <a:buChar char="§"/>
-            </a:pPr>
-            <a:r>
-              <a:rPr lang="pt-BR" sz="1320" b="1" dirty="0">
-                <a:solidFill>
-                  <a:schemeClr val="tx1"/>
-                </a:solidFill>
-                <a:latin typeface="Calibri" panose="020F0502020204030204" pitchFamily="34" charset="0"/>
-                <a:cs typeface="Simplon BP Regular"/>
-              </a:rPr>
-              <a:t>Integração com </a:t>
-            </a:r>
-            <a:r>
-              <a:rPr lang="pt-BR" sz="1320" b="1" dirty="0" err="1">
-                <a:solidFill>
-                  <a:schemeClr val="tx1"/>
-                </a:solidFill>
-                <a:latin typeface="Calibri" panose="020F0502020204030204" pitchFamily="34" charset="0"/>
-                <a:cs typeface="Simplon BP Regular"/>
-              </a:rPr>
-              <a:t>endpoint</a:t>
-            </a:r>
-            <a:r>
-              <a:rPr lang="pt-BR" sz="1320" b="1" dirty="0">
-                <a:solidFill>
-                  <a:schemeClr val="tx1"/>
-                </a:solidFill>
-                <a:latin typeface="Calibri" panose="020F0502020204030204" pitchFamily="34" charset="0"/>
-                <a:cs typeface="Simplon BP Regular"/>
-              </a:rPr>
-              <a:t> de autenticação</a:t>
-            </a:r>
-          </a:p>
-          <a:p>
-            <a:pPr marL="252049" lvl="1" indent="-252049">
-              <a:buFont typeface="Wingdings" panose="05000000000000000000" pitchFamily="2" charset="2"/>
-              <a:buChar char="§"/>
-            </a:pPr>
-            <a:r>
-              <a:rPr lang="pt-BR" sz="1320" b="1" dirty="0">
-                <a:solidFill>
-                  <a:schemeClr val="tx1"/>
-                </a:solidFill>
-                <a:latin typeface="Calibri" panose="020F0502020204030204" pitchFamily="34" charset="0"/>
-                <a:cs typeface="Simplon BP Regular"/>
-              </a:rPr>
-              <a:t>Validação de usuários logados </a:t>
-            </a:r>
-          </a:p>
-          <a:p>
-            <a:pPr marL="252049" lvl="1" indent="-252049">
-              <a:buFont typeface="Wingdings" panose="05000000000000000000" pitchFamily="2" charset="2"/>
-              <a:buChar char="§"/>
-            </a:pPr>
-            <a:r>
-              <a:rPr lang="pt-BR" sz="1320" b="1" dirty="0">
-                <a:solidFill>
-                  <a:schemeClr val="tx1"/>
-                </a:solidFill>
-                <a:latin typeface="Calibri" panose="020F0502020204030204" pitchFamily="34" charset="0"/>
-                <a:cs typeface="Simplon BP Regular"/>
-              </a:rPr>
-              <a:t>Continuação da planilha UAT</a:t>
-            </a:r>
-          </a:p>
-          <a:p>
-            <a:pPr marL="252049" lvl="1" indent="-252049">
-              <a:buFont typeface="Wingdings" panose="05000000000000000000" pitchFamily="2" charset="2"/>
-              <a:buChar char="§"/>
-            </a:pPr>
-            <a:r>
-              <a:rPr lang="pt-BR" sz="1320" b="1" dirty="0">
-                <a:solidFill>
-                  <a:schemeClr val="tx1"/>
-                </a:solidFill>
-                <a:latin typeface="Calibri" panose="020F0502020204030204" pitchFamily="34" charset="0"/>
-                <a:cs typeface="Simplon BP Regular"/>
-              </a:rPr>
-              <a:t>Inicio dos estudos sobre testes unitários com </a:t>
-            </a:r>
-            <a:r>
-              <a:rPr lang="pt-BR" sz="1320" b="1" dirty="0" err="1">
-                <a:solidFill>
-                  <a:schemeClr val="tx1"/>
-                </a:solidFill>
-                <a:latin typeface="Calibri" panose="020F0502020204030204" pitchFamily="34" charset="0"/>
-                <a:cs typeface="Simplon BP Regular"/>
-              </a:rPr>
-              <a:t>Junit</a:t>
-            </a:r>
-            <a:endParaRPr lang="pt-BR" sz="1320" b="1" dirty="0">
-              <a:solidFill>
-                <a:schemeClr val="tx1"/>
-              </a:solidFill>
-              <a:latin typeface="Calibri" panose="020F0502020204030204" pitchFamily="34" charset="0"/>
-              <a:cs typeface="Simplon BP Regular"/>
-            </a:endParaRPr>
-          </a:p>
-          <a:p>
-            <a:pPr marL="252049" lvl="1" indent="-252049">
-              <a:buFont typeface="Wingdings" panose="05000000000000000000" pitchFamily="2" charset="2"/>
-              <a:buChar char="§"/>
-            </a:pPr>
-            <a:r>
-              <a:rPr lang="pt-BR" sz="1320" b="1" dirty="0">
-                <a:solidFill>
-                  <a:schemeClr val="tx1"/>
-                </a:solidFill>
-                <a:latin typeface="Calibri" panose="020F0502020204030204" pitchFamily="34" charset="0"/>
-                <a:cs typeface="Simplon BP Regular"/>
-              </a:rPr>
-              <a:t>Ajuste do </a:t>
-            </a:r>
-            <a:r>
-              <a:rPr lang="pt-BR" sz="1320" b="1" dirty="0" err="1">
-                <a:solidFill>
-                  <a:schemeClr val="tx1"/>
-                </a:solidFill>
-                <a:latin typeface="Calibri" panose="020F0502020204030204" pitchFamily="34" charset="0"/>
-                <a:cs typeface="Simplon BP Regular"/>
-              </a:rPr>
-              <a:t>back</a:t>
-            </a:r>
-            <a:r>
-              <a:rPr lang="pt-BR" sz="1320" b="1" dirty="0">
-                <a:solidFill>
-                  <a:schemeClr val="tx1"/>
-                </a:solidFill>
-                <a:latin typeface="Calibri" panose="020F0502020204030204" pitchFamily="34" charset="0"/>
-                <a:cs typeface="Simplon BP Regular"/>
-              </a:rPr>
-              <a:t> com as mudanças do banco</a:t>
-            </a:r>
-          </a:p>
-          <a:p>
-            <a:pPr marL="252049" lvl="1" indent="-252049">
-              <a:buFont typeface="Wingdings" panose="05000000000000000000" pitchFamily="2" charset="2"/>
-              <a:buChar char="§"/>
-            </a:pPr>
-            <a:endParaRPr lang="pt-BR" sz="1323" b="1" dirty="0">
-              <a:solidFill>
-                <a:schemeClr val="tx1"/>
-              </a:solidFill>
-              <a:latin typeface="Calibri" panose="020F0502020204030204" pitchFamily="34" charset="0"/>
-              <a:cs typeface="Simplon BP Regular"/>
-            </a:endParaRPr>
-          </a:p>
-          <a:p>
-            <a:pPr marL="0" lvl="1" defTabSz="672130"/>
-            <a:endParaRPr lang="pt-BR" sz="1600" b="1" dirty="0">
-              <a:solidFill>
-                <a:schemeClr val="tx1"/>
-              </a:solidFill>
-              <a:latin typeface="Calibri" panose="020F0502020204030204" pitchFamily="34" charset="0"/>
-              <a:cs typeface="Simplon BP Regular"/>
-            </a:endParaRPr>
-          </a:p>
-          <a:p>
-            <a:pPr marL="252049" lvl="1" indent="-252049" fontAlgn="base">
-              <a:spcBef>
-                <a:spcPct val="0"/>
-              </a:spcBef>
-              <a:buFont typeface="Wingdings" panose="05000000000000000000" pitchFamily="2" charset="2"/>
-              <a:buChar char="ü"/>
-              <a:defRPr/>
-            </a:pPr>
-            <a:endParaRPr lang="pt-BR" sz="1323" b="1" dirty="0">
-              <a:solidFill>
-                <a:schemeClr val="tx1"/>
-              </a:solidFill>
-              <a:latin typeface="Calibri" panose="020F0502020204030204" pitchFamily="34" charset="0"/>
-              <a:cs typeface="Simplon BP Regular"/>
-            </a:endParaRPr>
-          </a:p>
-          <a:p>
-            <a:pPr marL="252049" lvl="1" indent="-252049" fontAlgn="base">
-              <a:spcBef>
-                <a:spcPct val="0"/>
-              </a:spcBef>
-              <a:buFont typeface="Wingdings" panose="05000000000000000000" pitchFamily="2" charset="2"/>
-              <a:buChar char="ü"/>
-              <a:defRPr/>
-            </a:pPr>
-            <a:endParaRPr lang="pt-BR" sz="1323" b="1" dirty="0">
-              <a:solidFill>
-                <a:schemeClr val="tx1"/>
-              </a:solidFill>
-              <a:latin typeface="Calibri" panose="020F0502020204030204" pitchFamily="34" charset="0"/>
-              <a:cs typeface="Simplon BP Regular"/>
-            </a:endParaRPr>
-          </a:p>
-          <a:p>
-            <a:pPr marL="252049" lvl="1" indent="-252049" fontAlgn="base">
-              <a:spcBef>
-                <a:spcPct val="0"/>
-              </a:spcBef>
-              <a:buFont typeface="Wingdings" panose="05000000000000000000" pitchFamily="2" charset="2"/>
-              <a:buChar char="ü"/>
-              <a:defRPr/>
-            </a:pPr>
-            <a:endParaRPr lang="pt-BR" sz="1323" b="1" dirty="0">
-              <a:solidFill>
-                <a:schemeClr val="tx1"/>
-              </a:solidFill>
-              <a:latin typeface="Calibri" panose="020F0502020204030204" pitchFamily="34" charset="0"/>
-              <a:cs typeface="Simplon BP Regular"/>
-            </a:endParaRPr>
-          </a:p>
-          <a:p>
-            <a:pPr marL="252049" indent="-252049" fontAlgn="base">
-              <a:spcBef>
-                <a:spcPct val="0"/>
-              </a:spcBef>
-              <a:buFont typeface="Wingdings" panose="05000000000000000000" pitchFamily="2" charset="2"/>
-              <a:buChar char="ü"/>
-              <a:defRPr/>
-            </a:pPr>
-            <a:endParaRPr lang="pt-BR" sz="1323" b="1" dirty="0">
-              <a:solidFill>
-                <a:schemeClr val="tx1"/>
-              </a:solidFill>
-              <a:latin typeface="Calibri" panose="020F0502020204030204" pitchFamily="34" charset="0"/>
-              <a:cs typeface="Simplon BP Regular"/>
-            </a:endParaRPr>
-          </a:p>
-          <a:p>
-            <a:pPr marL="252049" indent="-252049" fontAlgn="base">
-              <a:spcBef>
-                <a:spcPct val="0"/>
-              </a:spcBef>
-              <a:buFont typeface="Wingdings" panose="05000000000000000000" pitchFamily="2" charset="2"/>
-              <a:buChar char="ü"/>
-              <a:defRPr/>
-            </a:pPr>
-            <a:endParaRPr lang="pt-BR" sz="1323" b="1" dirty="0">
-              <a:solidFill>
-                <a:schemeClr val="tx1"/>
-              </a:solidFill>
-              <a:latin typeface="Calibri" panose="020F0502020204030204" pitchFamily="34" charset="0"/>
-              <a:cs typeface="Simplon BP Regular"/>
-            </a:endParaRPr>
-          </a:p>
-        </p:txBody>
-      </p:sp>
-      <p:sp>
-        <p:nvSpPr>
-          <p:cNvPr id="2" name="Rectangle 43">
-            <a:extLst>
-              <a:ext uri="{FF2B5EF4-FFF2-40B4-BE49-F238E27FC236}">
-                <a16:creationId xmlns:a16="http://schemas.microsoft.com/office/drawing/2014/main" id="{B15BA19F-C787-4E6A-ADAB-C0DFF09C66A8}"/>
-              </a:ext>
-            </a:extLst>
-          </p:cNvPr>
-          <p:cNvSpPr>
-            <a:spLocks/>
-          </p:cNvSpPr>
-          <p:nvPr/>
-        </p:nvSpPr>
-        <p:spPr>
-          <a:xfrm>
-            <a:off x="496765" y="3657025"/>
-            <a:ext cx="12496524" cy="3833059"/>
-          </a:xfrm>
-          <a:prstGeom prst="rect">
-            <a:avLst/>
-          </a:prstGeom>
-          <a:noFill/>
-          <a:ln w="12700">
-            <a:solidFill>
-              <a:schemeClr val="bg1">
-                <a:lumMod val="50000"/>
-              </a:schemeClr>
-            </a:solidFill>
-          </a:ln>
-        </p:spPr>
-        <p:style>
-          <a:lnRef idx="2">
-            <a:schemeClr val="accent4"/>
-          </a:lnRef>
-          <a:fillRef idx="1">
-            <a:schemeClr val="lt1"/>
-          </a:fillRef>
-          <a:effectRef idx="0">
-            <a:schemeClr val="accent4"/>
-          </a:effectRef>
-          <a:fontRef idx="minor">
-            <a:schemeClr val="dk1"/>
-          </a:fontRef>
-        </p:style>
-        <p:txBody>
-          <a:bodyPr wrap="square" tIns="105844" numCol="3" rtlCol="0" anchor="ctr"/>
-          <a:lstStyle/>
-          <a:p>
-            <a:pPr marL="0" lvl="1" defTabSz="672130"/>
-            <a:r>
-              <a:rPr lang="pt-BR" sz="1323" b="1" dirty="0">
-                <a:solidFill>
-                  <a:schemeClr val="tx1"/>
-                </a:solidFill>
-                <a:latin typeface="Calibri" panose="020F0502020204030204" pitchFamily="34" charset="0"/>
-                <a:cs typeface="Simplon BP Regular"/>
-              </a:rPr>
-              <a:t>Frente Plataforma</a:t>
-            </a:r>
-          </a:p>
-          <a:p>
-            <a:pPr marL="285750" lvl="1" indent="-285750" defTabSz="672130">
-              <a:buFont typeface="Arial" panose="020B0604020202020204" pitchFamily="34" charset="0"/>
-              <a:buChar char="•"/>
-            </a:pPr>
-            <a:r>
-              <a:rPr lang="pt-BR" sz="1323" b="1" dirty="0">
-                <a:solidFill>
-                  <a:schemeClr val="tx1"/>
-                </a:solidFill>
-                <a:latin typeface="Calibri" panose="020F0502020204030204" pitchFamily="34" charset="0"/>
-                <a:cs typeface="Simplon BP Regular"/>
-              </a:rPr>
-              <a:t>Iniciar </a:t>
-            </a:r>
-            <a:r>
-              <a:rPr lang="pt-BR" sz="1323" b="1" dirty="0" err="1">
-                <a:solidFill>
-                  <a:schemeClr val="tx1"/>
-                </a:solidFill>
-                <a:latin typeface="Calibri" panose="020F0502020204030204" pitchFamily="34" charset="0"/>
-                <a:cs typeface="Simplon BP Regular"/>
-              </a:rPr>
-              <a:t>deploy</a:t>
-            </a:r>
-            <a:r>
-              <a:rPr lang="pt-BR" sz="1323" b="1" dirty="0">
-                <a:solidFill>
-                  <a:schemeClr val="tx1"/>
-                </a:solidFill>
-                <a:latin typeface="Calibri" panose="020F0502020204030204" pitchFamily="34" charset="0"/>
-                <a:cs typeface="Simplon BP Regular"/>
-              </a:rPr>
-              <a:t> das aplicações na </a:t>
-            </a:r>
-            <a:r>
-              <a:rPr lang="pt-BR" sz="1323" b="1" dirty="0" err="1">
-                <a:solidFill>
-                  <a:schemeClr val="tx1"/>
-                </a:solidFill>
-                <a:latin typeface="Calibri" panose="020F0502020204030204" pitchFamily="34" charset="0"/>
-                <a:cs typeface="Simplon BP Regular"/>
-              </a:rPr>
-              <a:t>azure</a:t>
-            </a:r>
-            <a:r>
-              <a:rPr lang="pt-BR" sz="1323" b="1" dirty="0">
-                <a:solidFill>
-                  <a:schemeClr val="tx1"/>
-                </a:solidFill>
-                <a:latin typeface="Calibri" panose="020F0502020204030204" pitchFamily="34" charset="0"/>
-                <a:cs typeface="Simplon BP Regular"/>
-              </a:rPr>
-              <a:t> </a:t>
-            </a:r>
-          </a:p>
-          <a:p>
-            <a:pPr marL="0" lvl="1" defTabSz="672130"/>
-            <a:r>
-              <a:rPr lang="pt-BR" sz="1323" b="1" dirty="0">
-                <a:solidFill>
-                  <a:schemeClr val="tx1"/>
-                </a:solidFill>
-                <a:latin typeface="Calibri" panose="020F0502020204030204" pitchFamily="34" charset="0"/>
-                <a:cs typeface="Simplon BP Regular"/>
-              </a:rPr>
-              <a:t>Frente Backend</a:t>
-            </a:r>
-          </a:p>
-          <a:p>
-            <a:pPr marL="285750" lvl="1" indent="-285750" defTabSz="672130">
-              <a:buFont typeface="Arial" panose="020B0604020202020204" pitchFamily="34" charset="0"/>
-              <a:buChar char="•"/>
-            </a:pPr>
-            <a:r>
-              <a:rPr lang="pt-BR" sz="1323" b="1" dirty="0">
-                <a:solidFill>
-                  <a:schemeClr val="tx1"/>
-                </a:solidFill>
-                <a:latin typeface="Calibri" panose="020F0502020204030204" pitchFamily="34" charset="0"/>
-                <a:cs typeface="Simplon BP Regular"/>
-              </a:rPr>
-              <a:t>Iniciar classe de testes unitários</a:t>
-            </a:r>
-          </a:p>
-          <a:p>
-            <a:pPr marL="0" lvl="1" defTabSz="672130"/>
-            <a:endParaRPr lang="pt-BR" sz="1323" b="1" dirty="0">
-              <a:solidFill>
-                <a:schemeClr val="tx1"/>
-              </a:solidFill>
-              <a:latin typeface="Calibri" panose="020F0502020204030204" pitchFamily="34" charset="0"/>
-              <a:cs typeface="Simplon BP Regular"/>
-            </a:endParaRPr>
-          </a:p>
-          <a:p>
-            <a:pPr marL="0" lvl="1" defTabSz="672130"/>
-            <a:r>
-              <a:rPr lang="pt-BR" sz="1323" b="1" dirty="0">
-                <a:solidFill>
-                  <a:schemeClr val="tx1"/>
-                </a:solidFill>
-                <a:latin typeface="Calibri" panose="020F0502020204030204" pitchFamily="34" charset="0"/>
-                <a:cs typeface="Simplon BP Regular"/>
-              </a:rPr>
-              <a:t>Frente Front </a:t>
-            </a:r>
-            <a:r>
-              <a:rPr lang="pt-BR" sz="1323" b="1" dirty="0" err="1">
-                <a:solidFill>
-                  <a:schemeClr val="tx1"/>
-                </a:solidFill>
-                <a:latin typeface="Calibri" panose="020F0502020204030204" pitchFamily="34" charset="0"/>
-                <a:cs typeface="Simplon BP Regular"/>
-              </a:rPr>
-              <a:t>end</a:t>
-            </a:r>
-            <a:endParaRPr lang="pt-BR" sz="1323" b="1" dirty="0">
-              <a:solidFill>
-                <a:schemeClr val="tx1"/>
-              </a:solidFill>
-              <a:latin typeface="Calibri" panose="020F0502020204030204" pitchFamily="34" charset="0"/>
-              <a:cs typeface="Simplon BP Regular"/>
-            </a:endParaRPr>
-          </a:p>
-          <a:p>
-            <a:pPr marL="285750" lvl="1" indent="-285750" defTabSz="672130">
-              <a:buFont typeface="Arial" panose="020B0604020202020204" pitchFamily="34" charset="0"/>
-              <a:buChar char="•"/>
-            </a:pPr>
-            <a:r>
-              <a:rPr lang="pt-BR" sz="1323" b="1" dirty="0">
-                <a:solidFill>
-                  <a:schemeClr val="tx1"/>
-                </a:solidFill>
-                <a:latin typeface="Calibri" panose="020F0502020204030204" pitchFamily="34" charset="0"/>
-                <a:cs typeface="Simplon BP Regular"/>
-              </a:rPr>
-              <a:t>Trabalhar responsividade do site</a:t>
-            </a:r>
-          </a:p>
-          <a:p>
-            <a:pPr marL="285750" lvl="1" indent="-285750" defTabSz="672130">
-              <a:buFont typeface="Arial" panose="020B0604020202020204" pitchFamily="34" charset="0"/>
-              <a:buChar char="•"/>
-            </a:pPr>
-            <a:r>
-              <a:rPr lang="pt-BR" sz="1323" b="1" dirty="0">
-                <a:solidFill>
-                  <a:schemeClr val="tx1"/>
-                </a:solidFill>
-                <a:latin typeface="Calibri" panose="020F0502020204030204" pitchFamily="34" charset="0"/>
-                <a:cs typeface="Simplon BP Regular"/>
-              </a:rPr>
-              <a:t>Criar pagina de “Ranking”</a:t>
-            </a:r>
-          </a:p>
-          <a:p>
-            <a:pPr marL="285750" lvl="1" indent="-285750" defTabSz="672130">
-              <a:buFont typeface="Arial" panose="020B0604020202020204" pitchFamily="34" charset="0"/>
-              <a:buChar char="•"/>
-            </a:pPr>
-            <a:r>
-              <a:rPr lang="pt-BR" sz="1323" b="1" dirty="0">
-                <a:solidFill>
-                  <a:schemeClr val="tx1"/>
-                </a:solidFill>
-                <a:latin typeface="Calibri" panose="020F0502020204030204" pitchFamily="34" charset="0"/>
-                <a:cs typeface="Simplon BP Regular"/>
-              </a:rPr>
-              <a:t>Criar pagina de “Sem acesso”</a:t>
-            </a:r>
-          </a:p>
-          <a:p>
-            <a:pPr marL="285750" lvl="1" indent="-285750" defTabSz="672130">
-              <a:buFont typeface="Arial" panose="020B0604020202020204" pitchFamily="34" charset="0"/>
-              <a:buChar char="•"/>
-            </a:pPr>
-            <a:r>
-              <a:rPr lang="pt-BR" sz="1323" b="1" dirty="0">
-                <a:solidFill>
-                  <a:schemeClr val="tx1"/>
-                </a:solidFill>
-                <a:latin typeface="Calibri" panose="020F0502020204030204" pitchFamily="34" charset="0"/>
-                <a:cs typeface="Simplon BP Regular"/>
-              </a:rPr>
-              <a:t>Finalizar a </a:t>
-            </a:r>
-            <a:r>
-              <a:rPr lang="pt-BR" sz="1323" b="1" dirty="0" err="1">
-                <a:solidFill>
-                  <a:schemeClr val="tx1"/>
-                </a:solidFill>
-                <a:latin typeface="Calibri" panose="020F0502020204030204" pitchFamily="34" charset="0"/>
-                <a:cs typeface="Simplon BP Regular"/>
-              </a:rPr>
-              <a:t>gameficação</a:t>
-            </a:r>
-            <a:endParaRPr lang="pt-BR" sz="1323" b="1" dirty="0">
-              <a:solidFill>
-                <a:schemeClr val="tx1"/>
-              </a:solidFill>
-              <a:latin typeface="Calibri" panose="020F0502020204030204" pitchFamily="34" charset="0"/>
-              <a:cs typeface="Simplon BP Regular"/>
-            </a:endParaRPr>
-          </a:p>
-          <a:p>
-            <a:pPr marL="0" lvl="1" defTabSz="672130"/>
-            <a:endParaRPr lang="pt-BR" sz="1400" b="1" dirty="0">
-              <a:solidFill>
-                <a:schemeClr val="tx1"/>
-              </a:solidFill>
-              <a:latin typeface="Calibri" panose="020F0502020204030204" pitchFamily="34" charset="0"/>
-              <a:cs typeface="Simplon BP Regular"/>
-            </a:endParaRPr>
-          </a:p>
-          <a:p>
-            <a:pPr marL="0" lvl="1" defTabSz="672130"/>
-            <a:r>
-              <a:rPr lang="pt-BR" sz="1400" b="1" dirty="0">
-                <a:solidFill>
-                  <a:schemeClr val="tx1"/>
-                </a:solidFill>
-                <a:latin typeface="Calibri" panose="020F0502020204030204" pitchFamily="34" charset="0"/>
-                <a:cs typeface="Simplon BP Regular"/>
-              </a:rPr>
-              <a:t>Frente Negócios</a:t>
-            </a:r>
-            <a:r>
-              <a:rPr lang="pt-BR" sz="1400" dirty="0">
-                <a:solidFill>
-                  <a:schemeClr val="tx1"/>
-                </a:solidFill>
-                <a:latin typeface="Calibri" panose="020F0502020204030204" pitchFamily="34" charset="0"/>
-                <a:cs typeface="Simplon BP Regular"/>
-              </a:rPr>
-              <a:t>;</a:t>
-            </a:r>
-          </a:p>
-          <a:p>
-            <a:pPr marL="285750" lvl="1" indent="-285750" defTabSz="672130">
-              <a:buFont typeface="Arial" panose="020B0604020202020204" pitchFamily="34" charset="0"/>
-              <a:buChar char="•"/>
-            </a:pPr>
-            <a:r>
-              <a:rPr lang="pt-BR" sz="1400" b="1" dirty="0">
-                <a:solidFill>
-                  <a:schemeClr val="tx1"/>
-                </a:solidFill>
-                <a:latin typeface="Calibri" panose="020F0502020204030204" pitchFamily="34" charset="0"/>
-                <a:cs typeface="Simplon BP Regular"/>
-              </a:rPr>
-              <a:t>Dar continuidade na planilha UAT</a:t>
-            </a:r>
-          </a:p>
-          <a:p>
-            <a:pPr marL="0" lvl="1"/>
-            <a:endParaRPr lang="pt-BR" sz="1400" b="1" dirty="0">
-              <a:solidFill>
-                <a:schemeClr val="tx1"/>
-              </a:solidFill>
-              <a:latin typeface="Calibri" panose="020F0502020204030204" pitchFamily="34" charset="0"/>
-              <a:cs typeface="Simplon BP Regular"/>
-            </a:endParaRPr>
-          </a:p>
-          <a:p>
-            <a:pPr marL="0" lvl="1"/>
-            <a:r>
-              <a:rPr lang="pt-BR" sz="1400" b="1" dirty="0">
-                <a:solidFill>
-                  <a:schemeClr val="tx1"/>
-                </a:solidFill>
-                <a:latin typeface="Calibri" panose="020F0502020204030204" pitchFamily="34" charset="0"/>
-                <a:cs typeface="Simplon BP Regular"/>
-              </a:rPr>
-              <a:t>Frente Gestão Organizacional</a:t>
-            </a:r>
-          </a:p>
-          <a:p>
-            <a:pPr marL="285750" lvl="1" indent="-285750">
-              <a:buFont typeface="Arial" panose="020B0604020202020204" pitchFamily="34" charset="0"/>
-              <a:buChar char="•"/>
-            </a:pPr>
-            <a:r>
-              <a:rPr lang="pt-BR" sz="1400" b="1" dirty="0">
-                <a:solidFill>
-                  <a:schemeClr val="tx1"/>
-                </a:solidFill>
-                <a:latin typeface="Calibri" panose="020F0502020204030204" pitchFamily="34" charset="0"/>
-                <a:cs typeface="Simplon BP Regular"/>
-              </a:rPr>
-              <a:t>Iniciar White </a:t>
-            </a:r>
-            <a:r>
-              <a:rPr lang="pt-BR" sz="1400" b="1" dirty="0" err="1">
-                <a:solidFill>
-                  <a:schemeClr val="tx1"/>
-                </a:solidFill>
-                <a:latin typeface="Calibri" panose="020F0502020204030204" pitchFamily="34" charset="0"/>
-                <a:cs typeface="Simplon BP Regular"/>
-              </a:rPr>
-              <a:t>paper</a:t>
-            </a:r>
-            <a:r>
-              <a:rPr lang="pt-BR" sz="1400" b="1" dirty="0">
-                <a:solidFill>
-                  <a:schemeClr val="tx1"/>
-                </a:solidFill>
-                <a:latin typeface="Calibri" panose="020F0502020204030204" pitchFamily="34" charset="0"/>
-                <a:cs typeface="Simplon BP Regular"/>
-              </a:rPr>
-              <a:t> </a:t>
-            </a:r>
-          </a:p>
-          <a:p>
-            <a:pPr marL="0" lvl="1"/>
-            <a:endParaRPr lang="pt-BR" sz="1400" b="1" dirty="0">
-              <a:solidFill>
-                <a:schemeClr val="tx1"/>
-              </a:solidFill>
-              <a:latin typeface="Calibri" panose="020F0502020204030204" pitchFamily="34" charset="0"/>
-              <a:cs typeface="Simplon BP Regular"/>
-            </a:endParaRPr>
-          </a:p>
-          <a:p>
-            <a:pPr marL="285750" lvl="1" indent="-285750">
-              <a:buFont typeface="Arial" panose="020B0604020202020204" pitchFamily="34" charset="0"/>
-              <a:buChar char="•"/>
-            </a:pPr>
-            <a:endParaRPr lang="pt-BR" sz="1400" dirty="0">
-              <a:solidFill>
-                <a:schemeClr val="tx1"/>
-              </a:solidFill>
-              <a:latin typeface="Calibri" panose="020F0502020204030204" pitchFamily="34" charset="0"/>
-              <a:cs typeface="Simplon BP Regular"/>
-            </a:endParaRPr>
-          </a:p>
-        </p:txBody>
-      </p:sp>
-      <p:sp>
-        <p:nvSpPr>
-          <p:cNvPr id="6" name="Oval 134">
-            <a:extLst>
-              <a:ext uri="{FF2B5EF4-FFF2-40B4-BE49-F238E27FC236}">
-                <a16:creationId xmlns:a16="http://schemas.microsoft.com/office/drawing/2014/main" id="{70825C6F-9257-4CF5-8C62-1CA1EB2F8815}"/>
-              </a:ext>
-            </a:extLst>
-          </p:cNvPr>
-          <p:cNvSpPr>
-            <a:spLocks noChangeAspect="1"/>
-          </p:cNvSpPr>
-          <p:nvPr/>
-        </p:nvSpPr>
-        <p:spPr>
-          <a:xfrm>
-            <a:off x="9282214" y="282529"/>
-            <a:ext cx="211404" cy="211689"/>
-          </a:xfrm>
-          <a:prstGeom prst="ellipse">
-            <a:avLst/>
-          </a:prstGeom>
-          <a:solidFill>
-            <a:srgbClr val="FFFF00"/>
-          </a:solidFill>
-          <a:ln w="12700">
-            <a:solidFill>
-              <a:schemeClr val="accent3"/>
-            </a:solidFill>
-          </a:ln>
-        </p:spPr>
-        <p:style>
-          <a:lnRef idx="2">
-            <a:schemeClr val="accent1">
-              <a:shade val="50000"/>
-            </a:schemeClr>
-          </a:lnRef>
-          <a:fillRef idx="1">
-            <a:schemeClr val="accent1"/>
-          </a:fillRef>
-          <a:effectRef idx="0">
-            <a:schemeClr val="accent1"/>
-          </a:effectRef>
-          <a:fontRef idx="minor">
-            <a:schemeClr val="lt1"/>
-          </a:fontRef>
-        </p:style>
-        <p:txBody>
-          <a:bodyPr wrap="none" lIns="52922" tIns="52922" rIns="52922" rtlCol="0" anchor="ctr"/>
-          <a:lstStyle/>
-          <a:p>
-            <a:pPr algn="ctr" defTabSz="672130"/>
-            <a:endParaRPr lang="en-US" sz="1176" dirty="0">
-              <a:solidFill>
-                <a:srgbClr val="00B050"/>
-              </a:solidFill>
-              <a:latin typeface="Simplon BP Regular"/>
-              <a:cs typeface="Simplon BP Regular"/>
-            </a:endParaRPr>
-          </a:p>
-        </p:txBody>
-      </p:sp>
-      <p:sp>
-        <p:nvSpPr>
-          <p:cNvPr id="5" name="Retângulo 4">
-            <a:extLst>
-              <a:ext uri="{FF2B5EF4-FFF2-40B4-BE49-F238E27FC236}">
-                <a16:creationId xmlns:a16="http://schemas.microsoft.com/office/drawing/2014/main" id="{A1C14918-6027-46B3-96BF-C5F7FDEC3276}"/>
-              </a:ext>
-            </a:extLst>
-          </p:cNvPr>
-          <p:cNvSpPr/>
-          <p:nvPr/>
-        </p:nvSpPr>
-        <p:spPr>
-          <a:xfrm>
-            <a:off x="8017619" y="180231"/>
-            <a:ext cx="4937689" cy="618769"/>
-          </a:xfrm>
-          <a:prstGeom prst="rect">
-            <a:avLst/>
-          </a:prstGeom>
-          <a:noFill/>
-          <a:ln w="6350">
-            <a:solidFill>
-              <a:schemeClr val="bg1">
-                <a:lumMod val="75000"/>
-              </a:schemeClr>
-            </a:solidFill>
-          </a:ln>
-        </p:spPr>
-        <p:style>
-          <a:lnRef idx="2">
-            <a:schemeClr val="accent1">
-              <a:shade val="50000"/>
-            </a:schemeClr>
-          </a:lnRef>
-          <a:fillRef idx="1">
-            <a:schemeClr val="accent1"/>
-          </a:fillRef>
-          <a:effectRef idx="0">
-            <a:schemeClr val="accent1"/>
-          </a:effectRef>
-          <a:fontRef idx="minor">
-            <a:schemeClr val="lt1"/>
-          </a:fontRef>
-        </p:style>
-        <p:txBody>
-          <a:bodyPr rtlCol="0" anchor="ctr"/>
-          <a:lstStyle/>
-          <a:p>
-            <a:pPr algn="ctr"/>
-            <a:endParaRPr lang="pt-BR"/>
-          </a:p>
-        </p:txBody>
-      </p:sp>
-      <p:sp>
-        <p:nvSpPr>
-          <p:cNvPr id="8" name="TextBox 138">
-            <a:extLst>
-              <a:ext uri="{FF2B5EF4-FFF2-40B4-BE49-F238E27FC236}">
-                <a16:creationId xmlns:a16="http://schemas.microsoft.com/office/drawing/2014/main" id="{5CE7D08C-795B-4BF1-97F6-F9773F4E9F4C}"/>
-              </a:ext>
-            </a:extLst>
-          </p:cNvPr>
-          <p:cNvSpPr txBox="1"/>
-          <p:nvPr/>
-        </p:nvSpPr>
-        <p:spPr>
-          <a:xfrm>
-            <a:off x="9747419" y="-22583"/>
-            <a:ext cx="1478088" cy="211688"/>
-          </a:xfrm>
-          <a:prstGeom prst="rect">
-            <a:avLst/>
-          </a:prstGeom>
-          <a:solidFill>
-            <a:schemeClr val="bg1"/>
-          </a:solidFill>
-          <a:ln w="12700">
-            <a:noFill/>
-          </a:ln>
-        </p:spPr>
-        <p:style>
-          <a:lnRef idx="2">
-            <a:schemeClr val="accent4"/>
-          </a:lnRef>
-          <a:fillRef idx="1">
-            <a:schemeClr val="lt1"/>
-          </a:fillRef>
-          <a:effectRef idx="0">
-            <a:schemeClr val="accent4"/>
-          </a:effectRef>
-          <a:fontRef idx="minor">
-            <a:schemeClr val="dk1"/>
-          </a:fontRef>
-        </p:style>
-        <p:txBody>
-          <a:bodyPr wrap="none" lIns="52922" tIns="52922" rIns="52922" bIns="0" rtlCol="0" anchor="b"/>
-          <a:lstStyle>
-            <a:defPPr>
-              <a:defRPr lang="en-US"/>
-            </a:defPPr>
-            <a:lvl1pPr algn="ctr">
-              <a:defRPr sz="1000" b="1">
-                <a:latin typeface="Simplon BP Regular"/>
-                <a:cs typeface="Simplon BP Regular"/>
-              </a:defRPr>
-            </a:lvl1pPr>
-            <a:lvl2pPr>
-              <a:defRPr>
-                <a:solidFill>
-                  <a:schemeClr val="dk1"/>
-                </a:solidFill>
-              </a:defRPr>
-            </a:lvl2pPr>
-            <a:lvl3pPr>
-              <a:defRPr>
-                <a:solidFill>
-                  <a:schemeClr val="dk1"/>
-                </a:solidFill>
-              </a:defRPr>
-            </a:lvl3pPr>
-            <a:lvl4pPr>
-              <a:defRPr>
-                <a:solidFill>
-                  <a:schemeClr val="dk1"/>
-                </a:solidFill>
-              </a:defRPr>
-            </a:lvl4pPr>
-            <a:lvl5pPr>
-              <a:defRPr>
-                <a:solidFill>
-                  <a:schemeClr val="dk1"/>
-                </a:solidFill>
-              </a:defRPr>
-            </a:lvl5pPr>
-            <a:lvl6pPr>
-              <a:defRPr>
-                <a:solidFill>
-                  <a:schemeClr val="dk1"/>
-                </a:solidFill>
-              </a:defRPr>
-            </a:lvl6pPr>
-            <a:lvl7pPr>
-              <a:defRPr>
-                <a:solidFill>
-                  <a:schemeClr val="dk1"/>
-                </a:solidFill>
-              </a:defRPr>
-            </a:lvl7pPr>
-            <a:lvl8pPr>
-              <a:defRPr>
-                <a:solidFill>
-                  <a:schemeClr val="dk1"/>
-                </a:solidFill>
-              </a:defRPr>
-            </a:lvl8pPr>
-            <a:lvl9pPr>
-              <a:defRPr>
-                <a:solidFill>
-                  <a:schemeClr val="dk1"/>
-                </a:solidFill>
-              </a:defRPr>
-            </a:lvl9pPr>
-          </a:lstStyle>
-          <a:p>
-            <a:pPr defTabSz="672130"/>
-            <a:r>
-              <a:rPr lang="en-US" sz="1176" b="0" dirty="0">
-                <a:solidFill>
-                  <a:prstClr val="black"/>
-                </a:solidFill>
-                <a:latin typeface="Simplon BP Bold" pitchFamily="2" charset="0"/>
-              </a:rPr>
-              <a:t>    </a:t>
-            </a:r>
-            <a:r>
-              <a:rPr lang="en-US" sz="1176" b="0" dirty="0" err="1">
-                <a:solidFill>
-                  <a:prstClr val="black"/>
-                </a:solidFill>
-                <a:latin typeface="Simplon BP Bold" pitchFamily="2" charset="0"/>
-              </a:rPr>
-              <a:t>Farol</a:t>
-            </a:r>
-            <a:r>
-              <a:rPr lang="en-US" sz="1176" b="0" dirty="0">
-                <a:solidFill>
-                  <a:prstClr val="black"/>
-                </a:solidFill>
-                <a:latin typeface="Simplon BP Bold" pitchFamily="2" charset="0"/>
-              </a:rPr>
-              <a:t> do </a:t>
-            </a:r>
-            <a:r>
-              <a:rPr lang="en-US" sz="1176" b="0" dirty="0" err="1">
-                <a:solidFill>
-                  <a:prstClr val="black"/>
-                </a:solidFill>
-                <a:latin typeface="Simplon BP Bold" pitchFamily="2" charset="0"/>
-              </a:rPr>
-              <a:t>Projeto</a:t>
-            </a:r>
-            <a:r>
-              <a:rPr lang="en-US" sz="1176" b="0" dirty="0">
-                <a:solidFill>
-                  <a:prstClr val="black"/>
-                </a:solidFill>
-                <a:latin typeface="Simplon BP Bold" pitchFamily="2" charset="0"/>
-              </a:rPr>
-              <a:t>   </a:t>
-            </a:r>
-          </a:p>
-        </p:txBody>
-      </p:sp>
-      <p:sp>
-        <p:nvSpPr>
-          <p:cNvPr id="22" name="Oval 120">
-            <a:extLst>
-              <a:ext uri="{FF2B5EF4-FFF2-40B4-BE49-F238E27FC236}">
-                <a16:creationId xmlns:a16="http://schemas.microsoft.com/office/drawing/2014/main" id="{82942FCC-51D7-4B47-AB3E-6BD310106286}"/>
-              </a:ext>
-            </a:extLst>
-          </p:cNvPr>
-          <p:cNvSpPr>
-            <a:spLocks noChangeAspect="1"/>
-          </p:cNvSpPr>
-          <p:nvPr/>
-        </p:nvSpPr>
-        <p:spPr>
-          <a:xfrm>
-            <a:off x="11193898" y="297930"/>
-            <a:ext cx="211404" cy="211689"/>
-          </a:xfrm>
-          <a:prstGeom prst="ellipse">
-            <a:avLst/>
-          </a:prstGeom>
-          <a:solidFill>
-            <a:srgbClr val="FFFF00"/>
-          </a:solidFill>
-          <a:ln w="12700">
-            <a:solidFill>
-              <a:schemeClr val="accent3"/>
-            </a:solidFill>
-          </a:ln>
-        </p:spPr>
-        <p:style>
-          <a:lnRef idx="2">
-            <a:schemeClr val="accent1">
-              <a:shade val="50000"/>
-            </a:schemeClr>
-          </a:lnRef>
-          <a:fillRef idx="1">
-            <a:schemeClr val="accent1"/>
-          </a:fillRef>
-          <a:effectRef idx="0">
-            <a:schemeClr val="accent1"/>
-          </a:effectRef>
-          <a:fontRef idx="minor">
-            <a:schemeClr val="lt1"/>
-          </a:fontRef>
-        </p:style>
-        <p:txBody>
-          <a:bodyPr wrap="none" lIns="52922" tIns="52922" rIns="52922" rtlCol="0" anchor="ctr"/>
-          <a:lstStyle/>
-          <a:p>
-            <a:pPr algn="ctr" defTabSz="672130"/>
-            <a:endParaRPr lang="en-US" sz="1176" dirty="0">
-              <a:solidFill>
-                <a:prstClr val="black"/>
-              </a:solidFill>
-              <a:latin typeface="Simplon BP Regular"/>
-              <a:cs typeface="Simplon BP Regular"/>
-            </a:endParaRPr>
-          </a:p>
-        </p:txBody>
-      </p:sp>
-      <p:sp>
-        <p:nvSpPr>
-          <p:cNvPr id="4" name="CaixaDeTexto 3">
-            <a:extLst>
-              <a:ext uri="{FF2B5EF4-FFF2-40B4-BE49-F238E27FC236}">
-                <a16:creationId xmlns:a16="http://schemas.microsoft.com/office/drawing/2014/main" id="{CC1CD350-F23D-4C0F-9C54-8F84A937BAA5}"/>
-              </a:ext>
-            </a:extLst>
-          </p:cNvPr>
-          <p:cNvSpPr txBox="1"/>
-          <p:nvPr/>
-        </p:nvSpPr>
-        <p:spPr>
-          <a:xfrm>
-            <a:off x="6987402" y="1238316"/>
-            <a:ext cx="3675715" cy="461665"/>
-          </a:xfrm>
-          <a:prstGeom prst="rect">
-            <a:avLst/>
-          </a:prstGeom>
-          <a:noFill/>
-        </p:spPr>
-        <p:txBody>
-          <a:bodyPr wrap="square" rtlCol="0">
-            <a:spAutoFit/>
-          </a:bodyPr>
-          <a:lstStyle/>
-          <a:p>
-            <a:pPr marL="342900" indent="-342900">
-              <a:buFont typeface="Arial" panose="020B0604020202020204" pitchFamily="34" charset="0"/>
-              <a:buChar char="•"/>
-            </a:pPr>
-            <a:r>
-              <a:rPr lang="pt-BR" sz="1200" dirty="0"/>
-              <a:t>Verificar com a Tais sobre os arquivos de livros</a:t>
-            </a:r>
-          </a:p>
-          <a:p>
-            <a:pPr marL="342900" indent="-342900">
-              <a:buFont typeface="Arial" panose="020B0604020202020204" pitchFamily="34" charset="0"/>
-              <a:buChar char="•"/>
-            </a:pPr>
-            <a:r>
-              <a:rPr lang="pt-BR" sz="1200" dirty="0"/>
-              <a:t>Começar o White </a:t>
-            </a:r>
-            <a:r>
-              <a:rPr lang="pt-BR" sz="1200" dirty="0" err="1"/>
-              <a:t>paper</a:t>
-            </a:r>
-            <a:r>
-              <a:rPr lang="pt-BR" sz="1200" dirty="0"/>
-              <a:t> do projeto</a:t>
-            </a:r>
-          </a:p>
-        </p:txBody>
-      </p:sp>
-      <p:sp>
-        <p:nvSpPr>
-          <p:cNvPr id="24" name="Oval 134">
-            <a:extLst>
-              <a:ext uri="{FF2B5EF4-FFF2-40B4-BE49-F238E27FC236}">
-                <a16:creationId xmlns:a16="http://schemas.microsoft.com/office/drawing/2014/main" id="{634FAC8B-9591-4988-A983-E2A328DF8D53}"/>
-              </a:ext>
-            </a:extLst>
-          </p:cNvPr>
-          <p:cNvSpPr>
-            <a:spLocks noChangeAspect="1"/>
-          </p:cNvSpPr>
-          <p:nvPr/>
-        </p:nvSpPr>
-        <p:spPr>
-          <a:xfrm>
-            <a:off x="10194075" y="313264"/>
-            <a:ext cx="211404" cy="211689"/>
-          </a:xfrm>
-          <a:prstGeom prst="ellipse">
-            <a:avLst/>
-          </a:prstGeom>
-          <a:solidFill>
-            <a:srgbClr val="00B050"/>
-          </a:solidFill>
-          <a:ln w="12700">
-            <a:solidFill>
-              <a:schemeClr val="accent3"/>
-            </a:solidFill>
-          </a:ln>
-        </p:spPr>
-        <p:style>
-          <a:lnRef idx="2">
-            <a:schemeClr val="accent1">
-              <a:shade val="50000"/>
-            </a:schemeClr>
-          </a:lnRef>
-          <a:fillRef idx="1">
-            <a:schemeClr val="accent1"/>
-          </a:fillRef>
-          <a:effectRef idx="0">
-            <a:schemeClr val="accent1"/>
-          </a:effectRef>
-          <a:fontRef idx="minor">
-            <a:schemeClr val="lt1"/>
-          </a:fontRef>
-        </p:style>
-        <p:txBody>
-          <a:bodyPr wrap="none" lIns="52922" tIns="52922" rIns="52922" rtlCol="0" anchor="ctr"/>
-          <a:lstStyle/>
-          <a:p>
-            <a:pPr algn="ctr" defTabSz="672130"/>
-            <a:endParaRPr lang="en-US" sz="1176" dirty="0">
-              <a:solidFill>
-                <a:srgbClr val="FFFF00"/>
-              </a:solidFill>
-              <a:latin typeface="Simplon BP Regular"/>
-              <a:cs typeface="Simplon BP Regular"/>
-            </a:endParaRPr>
-          </a:p>
-        </p:txBody>
-      </p:sp>
-      <p:sp>
-        <p:nvSpPr>
-          <p:cNvPr id="25" name="Oval 120">
-            <a:extLst>
-              <a:ext uri="{FF2B5EF4-FFF2-40B4-BE49-F238E27FC236}">
-                <a16:creationId xmlns:a16="http://schemas.microsoft.com/office/drawing/2014/main" id="{CB86A68A-BBAC-4EAC-8E3B-957B40FDD5FA}"/>
-              </a:ext>
-            </a:extLst>
-          </p:cNvPr>
-          <p:cNvSpPr>
-            <a:spLocks noChangeAspect="1"/>
-          </p:cNvSpPr>
-          <p:nvPr/>
-        </p:nvSpPr>
-        <p:spPr>
-          <a:xfrm>
-            <a:off x="12105759" y="309897"/>
-            <a:ext cx="211404" cy="211689"/>
-          </a:xfrm>
-          <a:prstGeom prst="ellipse">
-            <a:avLst/>
-          </a:prstGeom>
-          <a:solidFill>
-            <a:srgbClr val="FFFF00"/>
-          </a:solidFill>
-          <a:ln w="12700">
-            <a:solidFill>
-              <a:schemeClr val="accent3"/>
-            </a:solidFill>
-          </a:ln>
-        </p:spPr>
-        <p:style>
-          <a:lnRef idx="2">
-            <a:schemeClr val="accent1">
-              <a:shade val="50000"/>
-            </a:schemeClr>
-          </a:lnRef>
-          <a:fillRef idx="1">
-            <a:schemeClr val="accent1"/>
-          </a:fillRef>
-          <a:effectRef idx="0">
-            <a:schemeClr val="accent1"/>
-          </a:effectRef>
-          <a:fontRef idx="minor">
-            <a:schemeClr val="lt1"/>
-          </a:fontRef>
-        </p:style>
-        <p:txBody>
-          <a:bodyPr wrap="none" lIns="52922" tIns="52922" rIns="52922" rtlCol="0" anchor="ctr"/>
-          <a:lstStyle/>
-          <a:p>
-            <a:pPr algn="ctr" defTabSz="672130"/>
-            <a:endParaRPr lang="en-US" sz="1176" dirty="0">
-              <a:solidFill>
-                <a:prstClr val="black"/>
-              </a:solidFill>
-              <a:latin typeface="Simplon BP Regular"/>
-              <a:cs typeface="Simplon BP Regular"/>
-            </a:endParaRPr>
-          </a:p>
-        </p:txBody>
-      </p:sp>
-    </p:spTree>
-    <p:extLst>
-      <p:ext uri="{BB962C8B-B14F-4D97-AF65-F5344CB8AC3E}">
-        <p14:creationId xmlns:p14="http://schemas.microsoft.com/office/powerpoint/2010/main" val="789054957"/>
       </p:ext>
     </p:extLst>
   </p:cSld>
@@ -44773,15 +42494,6 @@
 </file>
 
 <file path=customXml/item2.xml><?xml version="1.0" encoding="utf-8"?>
-<?mso-contentType ?>
-<FormTemplates xmlns="http://schemas.microsoft.com/sharepoint/v3/contenttype/forms">
-  <Display>DocumentLibraryForm</Display>
-  <Edit>DocumentLibraryForm</Edit>
-  <New>DocumentLibraryForm</New>
-</FormTemplates>
-</file>
-
-<file path=customXml/item3.xml><?xml version="1.0" encoding="utf-8"?>
 <ct:contentTypeSchema xmlns:ct="http://schemas.microsoft.com/office/2006/metadata/contentType" xmlns:ma="http://schemas.microsoft.com/office/2006/metadata/properties/metaAttributes" ct:_="" ma:_="" ma:contentTypeName="Document" ma:contentTypeID="0x0101001132905C37EA9847A7207C4BBCCCD8F4" ma:contentTypeVersion="34" ma:contentTypeDescription="Create a new document." ma:contentTypeScope="" ma:versionID="2f28daba72ca6e92be87ea70ebe5bb94">
   <xsd:schema xmlns:xsd="http://www.w3.org/2001/XMLSchema" xmlns:xs="http://www.w3.org/2001/XMLSchema" xmlns:p="http://schemas.microsoft.com/office/2006/metadata/properties" xmlns:ns3="4327b14a-fe89-488e-9f6d-9658cacf372b" xmlns:ns4="bbcd8c33-6940-4d4c-a587-bbc736ca1e4d" targetNamespace="http://schemas.microsoft.com/office/2006/metadata/properties" ma:root="true" ma:fieldsID="df18e839ce2650f1975b41376e6cdb6b" ns3:_="" ns4:_="">
     <xsd:import namespace="4327b14a-fe89-488e-9f6d-9658cacf372b"/>
@@ -45198,6 +42910,15 @@
 </ct:contentTypeSchema>
 </file>
 
+<file path=customXml/item3.xml><?xml version="1.0" encoding="utf-8"?>
+<?mso-contentType ?>
+<FormTemplates xmlns="http://schemas.microsoft.com/sharepoint/v3/contenttype/forms">
+  <Display>DocumentLibraryForm</Display>
+  <Edit>DocumentLibraryForm</Edit>
+  <New>DocumentLibraryForm</New>
+</FormTemplates>
+</file>
+
 <file path=customXml/itemProps1.xml><?xml version="1.0" encoding="utf-8"?>
 <ds:datastoreItem xmlns:ds="http://schemas.openxmlformats.org/officeDocument/2006/customXml" ds:itemID="{4B31267F-D399-4A8A-87F8-B75F56828412}">
   <ds:schemaRefs>
@@ -45216,14 +42937,6 @@
 </file>
 
 <file path=customXml/itemProps2.xml><?xml version="1.0" encoding="utf-8"?>
-<ds:datastoreItem xmlns:ds="http://schemas.openxmlformats.org/officeDocument/2006/customXml" ds:itemID="{E2481852-F24E-4532-AF30-C154D705D105}">
-  <ds:schemaRefs>
-    <ds:schemaRef ds:uri="http://schemas.microsoft.com/sharepoint/v3/contenttype/forms"/>
-  </ds:schemaRefs>
-</ds:datastoreItem>
-</file>
-
-<file path=customXml/itemProps3.xml><?xml version="1.0" encoding="utf-8"?>
 <ds:datastoreItem xmlns:ds="http://schemas.openxmlformats.org/officeDocument/2006/customXml" ds:itemID="{3BE6CAF6-1F55-4A70-B10C-21633F74987A}">
   <ds:schemaRefs>
     <ds:schemaRef ds:uri="http://schemas.microsoft.com/office/2006/metadata/contentType"/>
@@ -45240,4 +42953,12 @@
     <ds:schemaRef ds:uri="http://schemas.microsoft.com/internal/obd"/>
   </ds:schemaRefs>
 </ds:datastoreItem>
+</file>
+
+<file path=customXml/itemProps3.xml><?xml version="1.0" encoding="utf-8"?>
+<ds:datastoreItem xmlns:ds="http://schemas.openxmlformats.org/officeDocument/2006/customXml" ds:itemID="{E2481852-F24E-4532-AF30-C154D705D105}">
+  <ds:schemaRefs>
+    <ds:schemaRef ds:uri="http://schemas.microsoft.com/sharepoint/v3/contenttype/forms"/>
+  </ds:schemaRefs>
+</ds:datastoreItem>
 </file>
</xml_diff>

<commit_message>
Att: White paper e status report
</commit_message>
<xml_diff>
--- a/Documentação/EngenhariaDeSoftware/Mod_Status_Report-PI20202.pptx
+++ b/Documentação/EngenhariaDeSoftware/Mod_Status_Report-PI20202.pptx
@@ -7,10 +7,10 @@
     <p:sldMasterId id="2147483665" r:id="rId6"/>
   </p:sldMasterIdLst>
   <p:notesMasterIdLst>
-    <p:notesMasterId r:id="rId20"/>
+    <p:notesMasterId r:id="rId21"/>
   </p:notesMasterIdLst>
   <p:handoutMasterIdLst>
-    <p:handoutMasterId r:id="rId21"/>
+    <p:handoutMasterId r:id="rId22"/>
   </p:handoutMasterIdLst>
   <p:sldIdLst>
     <p:sldId id="256" r:id="rId7"/>
@@ -26,6 +26,7 @@
     <p:sldId id="479" r:id="rId17"/>
     <p:sldId id="480" r:id="rId18"/>
     <p:sldId id="481" r:id="rId19"/>
+    <p:sldId id="482" r:id="rId20"/>
   </p:sldIdLst>
   <p:sldSz cx="13442950" cy="7561263"/>
   <p:notesSz cx="7104063" cy="10234613"/>
@@ -146,6 +147,7 @@
             <p14:sldId id="479"/>
             <p14:sldId id="480"/>
             <p14:sldId id="481"/>
+            <p14:sldId id="482"/>
           </p14:sldIdLst>
         </p14:section>
       </p14:sectionLst>
@@ -259,7 +261,7 @@
             <a:fld id="{C3CD65D1-5C11-455D-9F9A-0E035F00A0DA}" type="datetimeFigureOut">
               <a:rPr lang="pt-BR" smtClean="0"/>
               <a:pPr/>
-              <a:t>18/11/2021</a:t>
+              <a:t>25/11/2021</a:t>
             </a:fld>
             <a:endParaRPr lang="pt-BR"/>
           </a:p>
@@ -326,7 +328,7 @@
             <a:fld id="{CA8E3B7C-E4AE-4E9E-8479-7C668141D483}" type="slidenum">
               <a:rPr lang="pt-BR" smtClean="0"/>
               <a:pPr/>
-              <a:t>‹nº›</a:t>
+              <a:t>‹#›</a:t>
             </a:fld>
             <a:endParaRPr lang="pt-BR"/>
           </a:p>
@@ -427,7 +429,7 @@
             <a:fld id="{A05DA3EF-18EA-43DE-B1BB-402A3C558822}" type="datetimeFigureOut">
               <a:rPr lang="pt-BR" smtClean="0"/>
               <a:pPr/>
-              <a:t>18/11/2021</a:t>
+              <a:t>25/11/2021</a:t>
             </a:fld>
             <a:endParaRPr lang="pt-BR"/>
           </a:p>
@@ -588,7 +590,7 @@
             <a:fld id="{75B3645A-D0AE-4F6E-A17E-E0036A9041AF}" type="slidenum">
               <a:rPr lang="pt-BR" smtClean="0"/>
               <a:pPr/>
-              <a:t>‹nº›</a:t>
+              <a:t>‹#›</a:t>
             </a:fld>
             <a:endParaRPr lang="pt-BR"/>
           </a:p>
@@ -1062,6 +1064,99 @@
 </p:notes>
 </file>
 
+<file path=ppt/notesSlides/notesSlide13.xml><?xml version="1.0" encoding="utf-8"?>
+<p:notes xmlns:a="http://schemas.openxmlformats.org/drawingml/2006/main" xmlns:r="http://schemas.openxmlformats.org/officeDocument/2006/relationships" xmlns:p="http://schemas.openxmlformats.org/presentationml/2006/main">
+  <p:cSld>
+    <p:spTree>
+      <p:nvGrpSpPr>
+        <p:cNvPr id="1" name=""/>
+        <p:cNvGrpSpPr/>
+        <p:nvPr/>
+      </p:nvGrpSpPr>
+      <p:grpSpPr>
+        <a:xfrm>
+          <a:off x="0" y="0"/>
+          <a:ext cx="0" cy="0"/>
+          <a:chOff x="0" y="0"/>
+          <a:chExt cx="0" cy="0"/>
+        </a:xfrm>
+      </p:grpSpPr>
+      <p:sp>
+        <p:nvSpPr>
+          <p:cNvPr id="2" name="Slide Image Placeholder 1"/>
+          <p:cNvSpPr>
+            <a:spLocks noGrp="1" noRot="1" noChangeAspect="1"/>
+          </p:cNvSpPr>
+          <p:nvPr>
+            <p:ph type="sldImg"/>
+          </p:nvPr>
+        </p:nvSpPr>
+        <p:spPr/>
+      </p:sp>
+      <p:sp>
+        <p:nvSpPr>
+          <p:cNvPr id="3" name="Notes Placeholder 2"/>
+          <p:cNvSpPr>
+            <a:spLocks noGrp="1"/>
+          </p:cNvSpPr>
+          <p:nvPr>
+            <p:ph type="body" idx="1"/>
+          </p:nvPr>
+        </p:nvSpPr>
+        <p:spPr/>
+        <p:txBody>
+          <a:bodyPr/>
+          <a:lstStyle/>
+          <a:p>
+            <a:endParaRPr lang="en-US"/>
+          </a:p>
+        </p:txBody>
+      </p:sp>
+      <p:sp>
+        <p:nvSpPr>
+          <p:cNvPr id="4" name="Slide Number Placeholder 3"/>
+          <p:cNvSpPr>
+            <a:spLocks noGrp="1"/>
+          </p:cNvSpPr>
+          <p:nvPr>
+            <p:ph type="sldNum" sz="quarter" idx="10"/>
+          </p:nvPr>
+        </p:nvSpPr>
+        <p:spPr/>
+        <p:txBody>
+          <a:bodyPr/>
+          <a:lstStyle/>
+          <a:p>
+            <a:fld id="{B39AF3DB-B6A1-2444-9DD8-53D016F8E638}" type="slidenum">
+              <a:rPr lang="pt-BR" smtClean="0">
+                <a:solidFill>
+                  <a:prstClr val="black"/>
+                </a:solidFill>
+              </a:rPr>
+              <a:pPr/>
+              <a:t>14</a:t>
+            </a:fld>
+            <a:endParaRPr lang="pt-BR">
+              <a:solidFill>
+                <a:prstClr val="black"/>
+              </a:solidFill>
+            </a:endParaRPr>
+          </a:p>
+        </p:txBody>
+      </p:sp>
+    </p:spTree>
+    <p:extLst>
+      <p:ext uri="{BB962C8B-B14F-4D97-AF65-F5344CB8AC3E}">
+        <p14:creationId xmlns:p14="http://schemas.microsoft.com/office/powerpoint/2010/main" val="3029044713"/>
+      </p:ext>
+    </p:extLst>
+  </p:cSld>
+  <p:clrMapOvr>
+    <a:masterClrMapping/>
+  </p:clrMapOvr>
+</p:notes>
+</file>
+
 <file path=ppt/notesSlides/notesSlide2.xml><?xml version="1.0" encoding="utf-8"?>
 <p:notes xmlns:a="http://schemas.openxmlformats.org/drawingml/2006/main" xmlns:r="http://schemas.openxmlformats.org/officeDocument/2006/relationships" xmlns:p="http://schemas.openxmlformats.org/presentationml/2006/main">
   <p:cSld>
@@ -4425,7 +4520,7 @@
               <a:pPr>
                 <a:defRPr/>
               </a:pPr>
-              <a:t>‹nº›</a:t>
+              <a:t>‹#›</a:t>
             </a:fld>
             <a:endParaRPr lang="pt-BR" sz="700" dirty="0"/>
           </a:p>
@@ -6224,7 +6319,7 @@
               <a:pPr>
                 <a:defRPr/>
               </a:pPr>
-              <a:t>‹nº›</a:t>
+              <a:t>‹#›</a:t>
             </a:fld>
             <a:endParaRPr lang="pt-BR" sz="700" dirty="0"/>
           </a:p>
@@ -22657,7 +22752,7 @@
                 </a:solidFill>
               </a:rPr>
               <a:pPr/>
-              <a:t>‹nº›</a:t>
+              <a:t>‹#›</a:t>
             </a:fld>
             <a:endParaRPr lang="pt-BR" dirty="0">
               <a:solidFill>
@@ -29645,7 +29740,7 @@
                 <a:latin typeface="Simplon Oi Headline"/>
                 <a:cs typeface="Simplon Oi Headline"/>
               </a:rPr>
-              <a:t>SEMANA 10 - 12/10/2021 – 18/11/2021</a:t>
+              <a:t>SEMANA 10 - 19/10/2021 – 25/11/2021</a:t>
             </a:r>
           </a:p>
         </p:txBody>
@@ -31650,6 +31745,1946 @@
     <p:extLst>
       <p:ext uri="{BB962C8B-B14F-4D97-AF65-F5344CB8AC3E}">
         <p14:creationId xmlns:p14="http://schemas.microsoft.com/office/powerpoint/2010/main" val="4028668884"/>
+      </p:ext>
+    </p:extLst>
+  </p:cSld>
+  <p:clrMapOvr>
+    <a:masterClrMapping/>
+  </p:clrMapOvr>
+</p:sld>
+</file>
+
+<file path=ppt/slides/slide14.xml><?xml version="1.0" encoding="utf-8"?>
+<p:sld xmlns:a="http://schemas.openxmlformats.org/drawingml/2006/main" xmlns:r="http://schemas.openxmlformats.org/officeDocument/2006/relationships" xmlns:p="http://schemas.openxmlformats.org/presentationml/2006/main">
+  <p:cSld>
+    <p:spTree>
+      <p:nvGrpSpPr>
+        <p:cNvPr id="1" name=""/>
+        <p:cNvGrpSpPr/>
+        <p:nvPr/>
+      </p:nvGrpSpPr>
+      <p:grpSpPr>
+        <a:xfrm>
+          <a:off x="0" y="0"/>
+          <a:ext cx="0" cy="0"/>
+          <a:chOff x="0" y="0"/>
+          <a:chExt cx="0" cy="0"/>
+        </a:xfrm>
+      </p:grpSpPr>
+      <p:sp>
+        <p:nvSpPr>
+          <p:cNvPr id="43" name="Rectangle 42"/>
+          <p:cNvSpPr/>
+          <p:nvPr/>
+        </p:nvSpPr>
+        <p:spPr>
+          <a:xfrm>
+            <a:off x="6814576" y="1080752"/>
+            <a:ext cx="6209639" cy="2235805"/>
+          </a:xfrm>
+          <a:prstGeom prst="rect">
+            <a:avLst/>
+          </a:prstGeom>
+          <a:noFill/>
+          <a:ln w="12700">
+            <a:solidFill>
+              <a:schemeClr val="bg1">
+                <a:lumMod val="50000"/>
+              </a:schemeClr>
+            </a:solidFill>
+          </a:ln>
+        </p:spPr>
+        <p:style>
+          <a:lnRef idx="2">
+            <a:schemeClr val="accent4"/>
+          </a:lnRef>
+          <a:fillRef idx="1">
+            <a:schemeClr val="lt1"/>
+          </a:fillRef>
+          <a:effectRef idx="0">
+            <a:schemeClr val="accent4"/>
+          </a:effectRef>
+          <a:fontRef idx="minor">
+            <a:schemeClr val="dk1"/>
+          </a:fontRef>
+        </p:style>
+        <p:txBody>
+          <a:bodyPr tIns="105844" rtlCol="0" anchor="t"/>
+          <a:lstStyle/>
+          <a:p>
+            <a:pPr defTabSz="672130">
+              <a:spcAft>
+                <a:spcPts val="882"/>
+              </a:spcAft>
+            </a:pPr>
+            <a:endParaRPr lang="pt-BR" sz="1470" dirty="0">
+              <a:solidFill>
+                <a:schemeClr val="tx1"/>
+              </a:solidFill>
+              <a:latin typeface="Calibri" panose="020F0502020204030204" pitchFamily="34" charset="0"/>
+              <a:cs typeface="Simplon BP Regular"/>
+            </a:endParaRPr>
+          </a:p>
+        </p:txBody>
+      </p:sp>
+      <p:sp>
+        <p:nvSpPr>
+          <p:cNvPr id="3" name="Title 2"/>
+          <p:cNvSpPr>
+            <a:spLocks noGrp="1"/>
+          </p:cNvSpPr>
+          <p:nvPr>
+            <p:ph type="title"/>
+          </p:nvPr>
+        </p:nvSpPr>
+        <p:spPr>
+          <a:xfrm>
+            <a:off x="469692" y="185232"/>
+            <a:ext cx="12098020" cy="800352"/>
+          </a:xfrm>
+        </p:spPr>
+        <p:txBody>
+          <a:bodyPr vert="horz" wrap="square" lIns="105844" tIns="0" rIns="105844" bIns="0" numCol="1" anchor="t" anchorCtr="0" compatLnSpc="1">
+            <a:prstTxWarp prst="textNoShape">
+              <a:avLst/>
+            </a:prstTxWarp>
+            <a:noAutofit/>
+          </a:bodyPr>
+          <a:lstStyle/>
+          <a:p>
+            <a:pPr algn="l">
+              <a:spcAft>
+                <a:spcPts val="882"/>
+              </a:spcAft>
+            </a:pPr>
+            <a:r>
+              <a:rPr lang="en-US" sz="2646" dirty="0">
+                <a:solidFill>
+                  <a:prstClr val="black"/>
+                </a:solidFill>
+                <a:latin typeface="Simplon Oi Headline"/>
+                <a:cs typeface="Simplon Oi Headline"/>
+              </a:rPr>
+              <a:t>SEMANA 11 - 12/10/2021 – 18/11/2021</a:t>
+            </a:r>
+          </a:p>
+        </p:txBody>
+      </p:sp>
+      <p:sp>
+        <p:nvSpPr>
+          <p:cNvPr id="78" name="TextBox 118"/>
+          <p:cNvSpPr txBox="1"/>
+          <p:nvPr/>
+        </p:nvSpPr>
+        <p:spPr>
+          <a:xfrm>
+            <a:off x="11822773" y="576471"/>
+            <a:ext cx="899678" cy="179824"/>
+          </a:xfrm>
+          <a:prstGeom prst="rect">
+            <a:avLst/>
+          </a:prstGeom>
+          <a:noFill/>
+          <a:ln w="12700">
+            <a:noFill/>
+          </a:ln>
+        </p:spPr>
+        <p:style>
+          <a:lnRef idx="2">
+            <a:schemeClr val="accent4"/>
+          </a:lnRef>
+          <a:fillRef idx="1">
+            <a:schemeClr val="lt1"/>
+          </a:fillRef>
+          <a:effectRef idx="0">
+            <a:schemeClr val="accent4"/>
+          </a:effectRef>
+          <a:fontRef idx="minor">
+            <a:schemeClr val="dk1"/>
+          </a:fontRef>
+        </p:style>
+        <p:txBody>
+          <a:bodyPr wrap="none" lIns="52922" tIns="52922" rIns="52922" bIns="0" rtlCol="0" anchor="b"/>
+          <a:lstStyle>
+            <a:defPPr>
+              <a:defRPr lang="en-US"/>
+            </a:defPPr>
+            <a:lvl1pPr algn="ctr">
+              <a:defRPr sz="1000" b="1">
+                <a:latin typeface="Simplon BP Regular"/>
+                <a:cs typeface="Simplon BP Regular"/>
+              </a:defRPr>
+            </a:lvl1pPr>
+            <a:lvl2pPr>
+              <a:defRPr>
+                <a:solidFill>
+                  <a:schemeClr val="dk1"/>
+                </a:solidFill>
+              </a:defRPr>
+            </a:lvl2pPr>
+            <a:lvl3pPr>
+              <a:defRPr>
+                <a:solidFill>
+                  <a:schemeClr val="dk1"/>
+                </a:solidFill>
+              </a:defRPr>
+            </a:lvl3pPr>
+            <a:lvl4pPr>
+              <a:defRPr>
+                <a:solidFill>
+                  <a:schemeClr val="dk1"/>
+                </a:solidFill>
+              </a:defRPr>
+            </a:lvl4pPr>
+            <a:lvl5pPr>
+              <a:defRPr>
+                <a:solidFill>
+                  <a:schemeClr val="dk1"/>
+                </a:solidFill>
+              </a:defRPr>
+            </a:lvl5pPr>
+            <a:lvl6pPr>
+              <a:defRPr>
+                <a:solidFill>
+                  <a:schemeClr val="dk1"/>
+                </a:solidFill>
+              </a:defRPr>
+            </a:lvl6pPr>
+            <a:lvl7pPr>
+              <a:defRPr>
+                <a:solidFill>
+                  <a:schemeClr val="dk1"/>
+                </a:solidFill>
+              </a:defRPr>
+            </a:lvl7pPr>
+            <a:lvl8pPr>
+              <a:defRPr>
+                <a:solidFill>
+                  <a:schemeClr val="dk1"/>
+                </a:solidFill>
+              </a:defRPr>
+            </a:lvl8pPr>
+            <a:lvl9pPr>
+              <a:defRPr>
+                <a:solidFill>
+                  <a:schemeClr val="dk1"/>
+                </a:solidFill>
+              </a:defRPr>
+            </a:lvl9pPr>
+          </a:lstStyle>
+          <a:p>
+            <a:pPr defTabSz="672130"/>
+            <a:r>
+              <a:rPr lang="pt-BR" sz="1176" b="0" dirty="0">
+                <a:solidFill>
+                  <a:prstClr val="black"/>
+                </a:solidFill>
+                <a:latin typeface="Simplon BP Bold" pitchFamily="2" charset="0"/>
+              </a:rPr>
+              <a:t>Negócios</a:t>
+            </a:r>
+          </a:p>
+        </p:txBody>
+      </p:sp>
+      <p:sp>
+        <p:nvSpPr>
+          <p:cNvPr id="80" name="TextBox 123"/>
+          <p:cNvSpPr txBox="1"/>
+          <p:nvPr/>
+        </p:nvSpPr>
+        <p:spPr>
+          <a:xfrm>
+            <a:off x="10852497" y="576471"/>
+            <a:ext cx="899678" cy="179824"/>
+          </a:xfrm>
+          <a:prstGeom prst="rect">
+            <a:avLst/>
+          </a:prstGeom>
+          <a:noFill/>
+          <a:ln w="12700">
+            <a:noFill/>
+          </a:ln>
+        </p:spPr>
+        <p:style>
+          <a:lnRef idx="2">
+            <a:schemeClr val="accent4"/>
+          </a:lnRef>
+          <a:fillRef idx="1">
+            <a:schemeClr val="lt1"/>
+          </a:fillRef>
+          <a:effectRef idx="0">
+            <a:schemeClr val="accent4"/>
+          </a:effectRef>
+          <a:fontRef idx="minor">
+            <a:schemeClr val="dk1"/>
+          </a:fontRef>
+        </p:style>
+        <p:txBody>
+          <a:bodyPr wrap="none" lIns="52922" tIns="52922" rIns="52922" bIns="0" rtlCol="0" anchor="b"/>
+          <a:lstStyle>
+            <a:defPPr>
+              <a:defRPr lang="en-US"/>
+            </a:defPPr>
+            <a:lvl1pPr algn="ctr">
+              <a:defRPr sz="1000" b="1">
+                <a:latin typeface="Simplon BP Regular"/>
+                <a:cs typeface="Simplon BP Regular"/>
+              </a:defRPr>
+            </a:lvl1pPr>
+            <a:lvl2pPr>
+              <a:defRPr>
+                <a:solidFill>
+                  <a:schemeClr val="dk1"/>
+                </a:solidFill>
+              </a:defRPr>
+            </a:lvl2pPr>
+            <a:lvl3pPr>
+              <a:defRPr>
+                <a:solidFill>
+                  <a:schemeClr val="dk1"/>
+                </a:solidFill>
+              </a:defRPr>
+            </a:lvl3pPr>
+            <a:lvl4pPr>
+              <a:defRPr>
+                <a:solidFill>
+                  <a:schemeClr val="dk1"/>
+                </a:solidFill>
+              </a:defRPr>
+            </a:lvl4pPr>
+            <a:lvl5pPr>
+              <a:defRPr>
+                <a:solidFill>
+                  <a:schemeClr val="dk1"/>
+                </a:solidFill>
+              </a:defRPr>
+            </a:lvl5pPr>
+            <a:lvl6pPr>
+              <a:defRPr>
+                <a:solidFill>
+                  <a:schemeClr val="dk1"/>
+                </a:solidFill>
+              </a:defRPr>
+            </a:lvl6pPr>
+            <a:lvl7pPr>
+              <a:defRPr>
+                <a:solidFill>
+                  <a:schemeClr val="dk1"/>
+                </a:solidFill>
+              </a:defRPr>
+            </a:lvl7pPr>
+            <a:lvl8pPr>
+              <a:defRPr>
+                <a:solidFill>
+                  <a:schemeClr val="dk1"/>
+                </a:solidFill>
+              </a:defRPr>
+            </a:lvl8pPr>
+            <a:lvl9pPr>
+              <a:defRPr>
+                <a:solidFill>
+                  <a:schemeClr val="dk1"/>
+                </a:solidFill>
+              </a:defRPr>
+            </a:lvl9pPr>
+          </a:lstStyle>
+          <a:p>
+            <a:pPr defTabSz="672130"/>
+            <a:r>
+              <a:rPr lang="pt-BR" sz="1176" b="0" dirty="0">
+                <a:solidFill>
+                  <a:prstClr val="black"/>
+                </a:solidFill>
+                <a:latin typeface="Simplon BP Bold" pitchFamily="2" charset="0"/>
+              </a:rPr>
+              <a:t>Plataforma</a:t>
+            </a:r>
+          </a:p>
+        </p:txBody>
+      </p:sp>
+      <p:sp>
+        <p:nvSpPr>
+          <p:cNvPr id="82" name="TextBox 128"/>
+          <p:cNvSpPr txBox="1"/>
+          <p:nvPr/>
+        </p:nvSpPr>
+        <p:spPr>
+          <a:xfrm>
+            <a:off x="9854245" y="576471"/>
+            <a:ext cx="899678" cy="179824"/>
+          </a:xfrm>
+          <a:prstGeom prst="rect">
+            <a:avLst/>
+          </a:prstGeom>
+          <a:noFill/>
+          <a:ln w="12700">
+            <a:noFill/>
+          </a:ln>
+        </p:spPr>
+        <p:style>
+          <a:lnRef idx="2">
+            <a:schemeClr val="accent4"/>
+          </a:lnRef>
+          <a:fillRef idx="1">
+            <a:schemeClr val="lt1"/>
+          </a:fillRef>
+          <a:effectRef idx="0">
+            <a:schemeClr val="accent4"/>
+          </a:effectRef>
+          <a:fontRef idx="minor">
+            <a:schemeClr val="dk1"/>
+          </a:fontRef>
+        </p:style>
+        <p:txBody>
+          <a:bodyPr wrap="none" lIns="52922" tIns="52922" rIns="52922" bIns="0" rtlCol="0" anchor="b"/>
+          <a:lstStyle>
+            <a:defPPr>
+              <a:defRPr lang="en-US"/>
+            </a:defPPr>
+            <a:lvl1pPr algn="ctr">
+              <a:defRPr sz="1000" b="1">
+                <a:latin typeface="Simplon BP Regular"/>
+                <a:cs typeface="Simplon BP Regular"/>
+              </a:defRPr>
+            </a:lvl1pPr>
+            <a:lvl2pPr>
+              <a:defRPr>
+                <a:solidFill>
+                  <a:schemeClr val="dk1"/>
+                </a:solidFill>
+              </a:defRPr>
+            </a:lvl2pPr>
+            <a:lvl3pPr>
+              <a:defRPr>
+                <a:solidFill>
+                  <a:schemeClr val="dk1"/>
+                </a:solidFill>
+              </a:defRPr>
+            </a:lvl3pPr>
+            <a:lvl4pPr>
+              <a:defRPr>
+                <a:solidFill>
+                  <a:schemeClr val="dk1"/>
+                </a:solidFill>
+              </a:defRPr>
+            </a:lvl4pPr>
+            <a:lvl5pPr>
+              <a:defRPr>
+                <a:solidFill>
+                  <a:schemeClr val="dk1"/>
+                </a:solidFill>
+              </a:defRPr>
+            </a:lvl5pPr>
+            <a:lvl6pPr>
+              <a:defRPr>
+                <a:solidFill>
+                  <a:schemeClr val="dk1"/>
+                </a:solidFill>
+              </a:defRPr>
+            </a:lvl6pPr>
+            <a:lvl7pPr>
+              <a:defRPr>
+                <a:solidFill>
+                  <a:schemeClr val="dk1"/>
+                </a:solidFill>
+              </a:defRPr>
+            </a:lvl7pPr>
+            <a:lvl8pPr>
+              <a:defRPr>
+                <a:solidFill>
+                  <a:schemeClr val="dk1"/>
+                </a:solidFill>
+              </a:defRPr>
+            </a:lvl8pPr>
+            <a:lvl9pPr>
+              <a:defRPr>
+                <a:solidFill>
+                  <a:schemeClr val="dk1"/>
+                </a:solidFill>
+              </a:defRPr>
+            </a:lvl9pPr>
+          </a:lstStyle>
+          <a:p>
+            <a:pPr defTabSz="672130"/>
+            <a:r>
+              <a:rPr lang="pt-BR" sz="1176" b="0" dirty="0">
+                <a:solidFill>
+                  <a:prstClr val="black"/>
+                </a:solidFill>
+                <a:latin typeface="Simplon BP Bold" pitchFamily="2" charset="0"/>
+              </a:rPr>
+              <a:t>Back</a:t>
+            </a:r>
+          </a:p>
+        </p:txBody>
+      </p:sp>
+      <p:sp>
+        <p:nvSpPr>
+          <p:cNvPr id="84" name="TextBox 133"/>
+          <p:cNvSpPr txBox="1"/>
+          <p:nvPr/>
+        </p:nvSpPr>
+        <p:spPr>
+          <a:xfrm>
+            <a:off x="8934246" y="576471"/>
+            <a:ext cx="899678" cy="179824"/>
+          </a:xfrm>
+          <a:prstGeom prst="rect">
+            <a:avLst/>
+          </a:prstGeom>
+          <a:noFill/>
+          <a:ln w="12700">
+            <a:noFill/>
+          </a:ln>
+        </p:spPr>
+        <p:style>
+          <a:lnRef idx="2">
+            <a:schemeClr val="accent4"/>
+          </a:lnRef>
+          <a:fillRef idx="1">
+            <a:schemeClr val="lt1"/>
+          </a:fillRef>
+          <a:effectRef idx="0">
+            <a:schemeClr val="accent4"/>
+          </a:effectRef>
+          <a:fontRef idx="minor">
+            <a:schemeClr val="dk1"/>
+          </a:fontRef>
+        </p:style>
+        <p:txBody>
+          <a:bodyPr wrap="none" lIns="52922" tIns="52922" rIns="52922" bIns="0" rtlCol="0" anchor="b"/>
+          <a:lstStyle>
+            <a:defPPr>
+              <a:defRPr lang="en-US"/>
+            </a:defPPr>
+            <a:lvl1pPr algn="ctr">
+              <a:defRPr sz="1000" b="1">
+                <a:latin typeface="Simplon BP Regular"/>
+                <a:cs typeface="Simplon BP Regular"/>
+              </a:defRPr>
+            </a:lvl1pPr>
+            <a:lvl2pPr>
+              <a:defRPr>
+                <a:solidFill>
+                  <a:schemeClr val="dk1"/>
+                </a:solidFill>
+              </a:defRPr>
+            </a:lvl2pPr>
+            <a:lvl3pPr>
+              <a:defRPr>
+                <a:solidFill>
+                  <a:schemeClr val="dk1"/>
+                </a:solidFill>
+              </a:defRPr>
+            </a:lvl3pPr>
+            <a:lvl4pPr>
+              <a:defRPr>
+                <a:solidFill>
+                  <a:schemeClr val="dk1"/>
+                </a:solidFill>
+              </a:defRPr>
+            </a:lvl4pPr>
+            <a:lvl5pPr>
+              <a:defRPr>
+                <a:solidFill>
+                  <a:schemeClr val="dk1"/>
+                </a:solidFill>
+              </a:defRPr>
+            </a:lvl5pPr>
+            <a:lvl6pPr>
+              <a:defRPr>
+                <a:solidFill>
+                  <a:schemeClr val="dk1"/>
+                </a:solidFill>
+              </a:defRPr>
+            </a:lvl6pPr>
+            <a:lvl7pPr>
+              <a:defRPr>
+                <a:solidFill>
+                  <a:schemeClr val="dk1"/>
+                </a:solidFill>
+              </a:defRPr>
+            </a:lvl7pPr>
+            <a:lvl8pPr>
+              <a:defRPr>
+                <a:solidFill>
+                  <a:schemeClr val="dk1"/>
+                </a:solidFill>
+              </a:defRPr>
+            </a:lvl8pPr>
+            <a:lvl9pPr>
+              <a:defRPr>
+                <a:solidFill>
+                  <a:schemeClr val="dk1"/>
+                </a:solidFill>
+              </a:defRPr>
+            </a:lvl9pPr>
+          </a:lstStyle>
+          <a:p>
+            <a:pPr defTabSz="672130"/>
+            <a:r>
+              <a:rPr lang="pt-BR" sz="1176" b="0" dirty="0">
+                <a:solidFill>
+                  <a:prstClr val="black"/>
+                </a:solidFill>
+                <a:latin typeface="Simplon BP Bold" pitchFamily="2" charset="0"/>
+              </a:rPr>
+              <a:t>Front</a:t>
+            </a:r>
+          </a:p>
+        </p:txBody>
+      </p:sp>
+      <p:sp>
+        <p:nvSpPr>
+          <p:cNvPr id="88" name="Oval 134"/>
+          <p:cNvSpPr>
+            <a:spLocks noChangeAspect="1"/>
+          </p:cNvSpPr>
+          <p:nvPr/>
+        </p:nvSpPr>
+        <p:spPr>
+          <a:xfrm>
+            <a:off x="8443555" y="282529"/>
+            <a:ext cx="211404" cy="211689"/>
+          </a:xfrm>
+          <a:prstGeom prst="ellipse">
+            <a:avLst/>
+          </a:prstGeom>
+          <a:solidFill>
+            <a:srgbClr val="00B050"/>
+          </a:solidFill>
+          <a:ln w="12700">
+            <a:solidFill>
+              <a:schemeClr val="accent3"/>
+            </a:solidFill>
+          </a:ln>
+        </p:spPr>
+        <p:style>
+          <a:lnRef idx="2">
+            <a:schemeClr val="accent1">
+              <a:shade val="50000"/>
+            </a:schemeClr>
+          </a:lnRef>
+          <a:fillRef idx="1">
+            <a:schemeClr val="accent1"/>
+          </a:fillRef>
+          <a:effectRef idx="0">
+            <a:schemeClr val="accent1"/>
+          </a:effectRef>
+          <a:fontRef idx="minor">
+            <a:schemeClr val="lt1"/>
+          </a:fontRef>
+        </p:style>
+        <p:txBody>
+          <a:bodyPr wrap="none" lIns="52922" tIns="52922" rIns="52922" rtlCol="0" anchor="ctr"/>
+          <a:lstStyle/>
+          <a:p>
+            <a:pPr algn="ctr" defTabSz="672130"/>
+            <a:endParaRPr lang="en-US" sz="1176" dirty="0">
+              <a:solidFill>
+                <a:srgbClr val="FFFF00"/>
+              </a:solidFill>
+              <a:latin typeface="Simplon BP Regular"/>
+              <a:cs typeface="Simplon BP Regular"/>
+            </a:endParaRPr>
+          </a:p>
+        </p:txBody>
+      </p:sp>
+      <p:sp>
+        <p:nvSpPr>
+          <p:cNvPr id="86" name="TextBox 138"/>
+          <p:cNvSpPr txBox="1"/>
+          <p:nvPr/>
+        </p:nvSpPr>
+        <p:spPr>
+          <a:xfrm>
+            <a:off x="8126053" y="576471"/>
+            <a:ext cx="899678" cy="179824"/>
+          </a:xfrm>
+          <a:prstGeom prst="rect">
+            <a:avLst/>
+          </a:prstGeom>
+          <a:noFill/>
+          <a:ln w="12700">
+            <a:noFill/>
+          </a:ln>
+        </p:spPr>
+        <p:style>
+          <a:lnRef idx="2">
+            <a:schemeClr val="accent4"/>
+          </a:lnRef>
+          <a:fillRef idx="1">
+            <a:schemeClr val="lt1"/>
+          </a:fillRef>
+          <a:effectRef idx="0">
+            <a:schemeClr val="accent4"/>
+          </a:effectRef>
+          <a:fontRef idx="minor">
+            <a:schemeClr val="dk1"/>
+          </a:fontRef>
+        </p:style>
+        <p:txBody>
+          <a:bodyPr wrap="none" lIns="52922" tIns="52922" rIns="52922" bIns="0" rtlCol="0" anchor="b"/>
+          <a:lstStyle>
+            <a:defPPr>
+              <a:defRPr lang="en-US"/>
+            </a:defPPr>
+            <a:lvl1pPr algn="ctr">
+              <a:defRPr sz="1000" b="1">
+                <a:latin typeface="Simplon BP Regular"/>
+                <a:cs typeface="Simplon BP Regular"/>
+              </a:defRPr>
+            </a:lvl1pPr>
+            <a:lvl2pPr>
+              <a:defRPr>
+                <a:solidFill>
+                  <a:schemeClr val="dk1"/>
+                </a:solidFill>
+              </a:defRPr>
+            </a:lvl2pPr>
+            <a:lvl3pPr>
+              <a:defRPr>
+                <a:solidFill>
+                  <a:schemeClr val="dk1"/>
+                </a:solidFill>
+              </a:defRPr>
+            </a:lvl3pPr>
+            <a:lvl4pPr>
+              <a:defRPr>
+                <a:solidFill>
+                  <a:schemeClr val="dk1"/>
+                </a:solidFill>
+              </a:defRPr>
+            </a:lvl4pPr>
+            <a:lvl5pPr>
+              <a:defRPr>
+                <a:solidFill>
+                  <a:schemeClr val="dk1"/>
+                </a:solidFill>
+              </a:defRPr>
+            </a:lvl5pPr>
+            <a:lvl6pPr>
+              <a:defRPr>
+                <a:solidFill>
+                  <a:schemeClr val="dk1"/>
+                </a:solidFill>
+              </a:defRPr>
+            </a:lvl6pPr>
+            <a:lvl7pPr>
+              <a:defRPr>
+                <a:solidFill>
+                  <a:schemeClr val="dk1"/>
+                </a:solidFill>
+              </a:defRPr>
+            </a:lvl7pPr>
+            <a:lvl8pPr>
+              <a:defRPr>
+                <a:solidFill>
+                  <a:schemeClr val="dk1"/>
+                </a:solidFill>
+              </a:defRPr>
+            </a:lvl8pPr>
+            <a:lvl9pPr>
+              <a:defRPr>
+                <a:solidFill>
+                  <a:schemeClr val="dk1"/>
+                </a:solidFill>
+              </a:defRPr>
+            </a:lvl9pPr>
+          </a:lstStyle>
+          <a:p>
+            <a:pPr defTabSz="672130"/>
+            <a:r>
+              <a:rPr lang="en-US" sz="1176" b="0" dirty="0" err="1">
+                <a:solidFill>
+                  <a:prstClr val="black"/>
+                </a:solidFill>
+                <a:latin typeface="Simplon BP Bold" pitchFamily="2" charset="0"/>
+              </a:rPr>
+              <a:t>Equipe</a:t>
+            </a:r>
+            <a:endParaRPr lang="en-US" sz="1176" b="0" dirty="0">
+              <a:solidFill>
+                <a:prstClr val="black"/>
+              </a:solidFill>
+              <a:latin typeface="Simplon BP Bold" pitchFamily="2" charset="0"/>
+            </a:endParaRPr>
+          </a:p>
+        </p:txBody>
+      </p:sp>
+      <p:sp>
+        <p:nvSpPr>
+          <p:cNvPr id="64" name="Retângulo 63"/>
+          <p:cNvSpPr/>
+          <p:nvPr/>
+        </p:nvSpPr>
+        <p:spPr>
+          <a:xfrm>
+            <a:off x="512766" y="868345"/>
+            <a:ext cx="6186608" cy="238150"/>
+          </a:xfrm>
+          <a:prstGeom prst="rect">
+            <a:avLst/>
+          </a:prstGeom>
+          <a:solidFill>
+            <a:schemeClr val="bg1">
+              <a:lumMod val="85000"/>
+            </a:schemeClr>
+          </a:solidFill>
+        </p:spPr>
+        <p:txBody>
+          <a:bodyPr vert="horz" lIns="134422" tIns="67211" rIns="134422" bIns="67211" rtlCol="0" anchor="ctr"/>
+          <a:lstStyle/>
+          <a:p>
+            <a:pPr defTabSz="672130"/>
+            <a:r>
+              <a:rPr lang="en-US" sz="1544" dirty="0">
+                <a:latin typeface="Simplon Oi Headline" charset="0"/>
+                <a:ea typeface="Simplon Oi Headline" charset="0"/>
+                <a:cs typeface="Simplon Oi Headline" charset="0"/>
+              </a:rPr>
+              <a:t>PROGRESSOS</a:t>
+            </a:r>
+            <a:endParaRPr lang="pt-BR" sz="1544" dirty="0">
+              <a:latin typeface="Simplon Oi Headline" charset="0"/>
+              <a:ea typeface="Simplon Oi Headline" charset="0"/>
+              <a:cs typeface="Simplon Oi Headline" charset="0"/>
+            </a:endParaRPr>
+          </a:p>
+        </p:txBody>
+      </p:sp>
+      <p:sp>
+        <p:nvSpPr>
+          <p:cNvPr id="65" name="Retângulo 64"/>
+          <p:cNvSpPr/>
+          <p:nvPr/>
+        </p:nvSpPr>
+        <p:spPr>
+          <a:xfrm>
+            <a:off x="6814576" y="868345"/>
+            <a:ext cx="6194715" cy="238150"/>
+          </a:xfrm>
+          <a:prstGeom prst="rect">
+            <a:avLst/>
+          </a:prstGeom>
+          <a:solidFill>
+            <a:schemeClr val="bg1">
+              <a:lumMod val="85000"/>
+            </a:schemeClr>
+          </a:solidFill>
+        </p:spPr>
+        <p:txBody>
+          <a:bodyPr vert="horz" lIns="134422" tIns="67211" rIns="134422" bIns="67211" rtlCol="0" anchor="ctr"/>
+          <a:lstStyle/>
+          <a:p>
+            <a:pPr defTabSz="672130"/>
+            <a:r>
+              <a:rPr lang="pt-BR" sz="1544" dirty="0">
+                <a:latin typeface="Simplon Oi Headline" charset="0"/>
+                <a:ea typeface="Simplon Oi Headline" charset="0"/>
+                <a:cs typeface="Simplon Oi Headline" charset="0"/>
+              </a:rPr>
+              <a:t>Pontos atenção/ Principais Riscos</a:t>
+            </a:r>
+          </a:p>
+        </p:txBody>
+      </p:sp>
+      <p:sp>
+        <p:nvSpPr>
+          <p:cNvPr id="66" name="Retângulo 65"/>
+          <p:cNvSpPr/>
+          <p:nvPr/>
+        </p:nvSpPr>
+        <p:spPr>
+          <a:xfrm>
+            <a:off x="507536" y="3418875"/>
+            <a:ext cx="12505521" cy="238150"/>
+          </a:xfrm>
+          <a:prstGeom prst="rect">
+            <a:avLst/>
+          </a:prstGeom>
+          <a:solidFill>
+            <a:schemeClr val="bg1">
+              <a:lumMod val="85000"/>
+            </a:schemeClr>
+          </a:solidFill>
+        </p:spPr>
+        <p:txBody>
+          <a:bodyPr vert="horz" lIns="134422" tIns="67211" rIns="134422" bIns="67211" rtlCol="0" anchor="ctr"/>
+          <a:lstStyle/>
+          <a:p>
+            <a:pPr defTabSz="672130"/>
+            <a:r>
+              <a:rPr lang="pt-BR" sz="1544" dirty="0">
+                <a:latin typeface="Simplon Oi Headline" charset="0"/>
+                <a:ea typeface="Simplon Oi Headline" charset="0"/>
+                <a:cs typeface="Simplon Oi Headline" charset="0"/>
+              </a:rPr>
+              <a:t>Próximos Passos/ Decisões a tomar</a:t>
+            </a:r>
+          </a:p>
+        </p:txBody>
+      </p:sp>
+      <p:sp>
+        <p:nvSpPr>
+          <p:cNvPr id="63" name="Rectangle 37"/>
+          <p:cNvSpPr/>
+          <p:nvPr/>
+        </p:nvSpPr>
+        <p:spPr>
+          <a:xfrm>
+            <a:off x="496765" y="1106495"/>
+            <a:ext cx="6207777" cy="2235805"/>
+          </a:xfrm>
+          <a:prstGeom prst="rect">
+            <a:avLst/>
+          </a:prstGeom>
+          <a:noFill/>
+          <a:ln w="12700">
+            <a:solidFill>
+              <a:schemeClr val="bg1">
+                <a:lumMod val="50000"/>
+              </a:schemeClr>
+            </a:solidFill>
+          </a:ln>
+        </p:spPr>
+        <p:style>
+          <a:lnRef idx="2">
+            <a:schemeClr val="accent4"/>
+          </a:lnRef>
+          <a:fillRef idx="1">
+            <a:schemeClr val="lt1"/>
+          </a:fillRef>
+          <a:effectRef idx="0">
+            <a:schemeClr val="accent4"/>
+          </a:effectRef>
+          <a:fontRef idx="minor">
+            <a:schemeClr val="dk1"/>
+          </a:fontRef>
+        </p:style>
+        <p:txBody>
+          <a:bodyPr tIns="105844" rtlCol="0" anchor="t"/>
+          <a:lstStyle/>
+          <a:p>
+            <a:pPr marL="285750" lvl="1" indent="-285750" defTabSz="672130">
+              <a:buFont typeface="Arial" panose="020B0604020202020204" pitchFamily="34" charset="0"/>
+              <a:buChar char="•"/>
+            </a:pPr>
+            <a:r>
+              <a:rPr lang="pt-BR" sz="1323" b="1" dirty="0">
+                <a:solidFill>
+                  <a:schemeClr val="tx1"/>
+                </a:solidFill>
+                <a:latin typeface="Calibri" panose="020F0502020204030204" pitchFamily="34" charset="0"/>
+                <a:cs typeface="Simplon BP Regular"/>
+              </a:rPr>
+              <a:t>Finalizado a classe de  testes unitarios</a:t>
+            </a:r>
+          </a:p>
+          <a:p>
+            <a:pPr marL="285750" lvl="1" indent="-285750" defTabSz="672130">
+              <a:buFont typeface="Arial" panose="020B0604020202020204" pitchFamily="34" charset="0"/>
+              <a:buChar char="•"/>
+            </a:pPr>
+            <a:r>
+              <a:rPr lang="pt-BR" sz="1320" b="1" dirty="0">
+                <a:solidFill>
+                  <a:schemeClr val="tx1"/>
+                </a:solidFill>
+                <a:latin typeface="Calibri" panose="020F0502020204030204" pitchFamily="34" charset="0"/>
+                <a:cs typeface="Simplon BP Regular"/>
+              </a:rPr>
+              <a:t>Validação de fluxo dos livros. </a:t>
+            </a:r>
+          </a:p>
+          <a:p>
+            <a:pPr marL="285750" lvl="1" indent="-285750" defTabSz="672130">
+              <a:buFont typeface="Arial" panose="020B0604020202020204" pitchFamily="34" charset="0"/>
+              <a:buChar char="•"/>
+            </a:pPr>
+            <a:r>
+              <a:rPr lang="pt-BR" sz="1320" b="1" dirty="0">
+                <a:solidFill>
+                  <a:schemeClr val="tx1"/>
+                </a:solidFill>
+                <a:latin typeface="Calibri" panose="020F0502020204030204" pitchFamily="34" charset="0"/>
+                <a:cs typeface="Simplon BP Regular"/>
+              </a:rPr>
+              <a:t>Finalizado detalhes de responsividade do site</a:t>
+            </a:r>
+            <a:r>
+              <a:rPr lang="pt-BR" sz="1600" b="1" dirty="0">
+                <a:solidFill>
+                  <a:schemeClr val="tx1"/>
+                </a:solidFill>
+                <a:latin typeface="Calibri" panose="020F0502020204030204" pitchFamily="34" charset="0"/>
+                <a:cs typeface="Simplon BP Regular"/>
+              </a:rPr>
+              <a:t>.</a:t>
+            </a:r>
+          </a:p>
+          <a:p>
+            <a:pPr marL="285750" lvl="1" indent="-285750" defTabSz="672130">
+              <a:buFont typeface="Arial" panose="020B0604020202020204" pitchFamily="34" charset="0"/>
+              <a:buChar char="•"/>
+            </a:pPr>
+            <a:r>
+              <a:rPr lang="pt-BR" sz="1600" b="1" dirty="0">
+                <a:solidFill>
+                  <a:schemeClr val="tx1"/>
+                </a:solidFill>
+                <a:latin typeface="Calibri" panose="020F0502020204030204" pitchFamily="34" charset="0"/>
+                <a:cs typeface="Simplon BP Regular"/>
+              </a:rPr>
+              <a:t>Finalizado o conteudo do White Paper</a:t>
+            </a:r>
+          </a:p>
+          <a:p>
+            <a:pPr marL="285750" lvl="1" indent="-285750" defTabSz="672130">
+              <a:buFont typeface="Arial" panose="020B0604020202020204" pitchFamily="34" charset="0"/>
+              <a:buChar char="•"/>
+            </a:pPr>
+            <a:r>
+              <a:rPr lang="pt-BR" sz="1600" b="1" dirty="0">
+                <a:solidFill>
+                  <a:schemeClr val="tx1"/>
+                </a:solidFill>
+                <a:latin typeface="Calibri" panose="020F0502020204030204" pitchFamily="34" charset="0"/>
+                <a:cs typeface="Simplon BP Regular"/>
+              </a:rPr>
+              <a:t>Subimos o codigo do back no Azure</a:t>
+            </a:r>
+          </a:p>
+          <a:p>
+            <a:pPr marL="285750" lvl="1" indent="-285750" defTabSz="672130">
+              <a:buFont typeface="Arial" panose="020B0604020202020204" pitchFamily="34" charset="0"/>
+              <a:buChar char="•"/>
+            </a:pPr>
+            <a:r>
+              <a:rPr lang="pt-BR" sz="1600" b="1" dirty="0">
+                <a:solidFill>
+                  <a:schemeClr val="tx1"/>
+                </a:solidFill>
+                <a:latin typeface="Calibri" panose="020F0502020204030204" pitchFamily="34" charset="0"/>
+                <a:cs typeface="Simplon BP Regular"/>
+              </a:rPr>
+              <a:t>Finalizado conteudo White paper</a:t>
+            </a:r>
+          </a:p>
+          <a:p>
+            <a:pPr marL="285750" lvl="1" indent="-285750" defTabSz="672130">
+              <a:buFont typeface="Arial" panose="020B0604020202020204" pitchFamily="34" charset="0"/>
+              <a:buChar char="•"/>
+            </a:pPr>
+            <a:endParaRPr lang="pt-BR" sz="1600" b="1" dirty="0">
+              <a:solidFill>
+                <a:schemeClr val="tx1"/>
+              </a:solidFill>
+              <a:latin typeface="Calibri" panose="020F0502020204030204" pitchFamily="34" charset="0"/>
+              <a:cs typeface="Simplon BP Regular"/>
+            </a:endParaRPr>
+          </a:p>
+          <a:p>
+            <a:pPr marL="285750" lvl="1" indent="-285750" defTabSz="672130">
+              <a:buFont typeface="Arial" panose="020B0604020202020204" pitchFamily="34" charset="0"/>
+              <a:buChar char="•"/>
+            </a:pPr>
+            <a:endParaRPr lang="pt-BR" sz="1600" b="1" dirty="0">
+              <a:solidFill>
+                <a:schemeClr val="tx1"/>
+              </a:solidFill>
+              <a:latin typeface="Calibri" panose="020F0502020204030204" pitchFamily="34" charset="0"/>
+              <a:cs typeface="Simplon BP Regular"/>
+            </a:endParaRPr>
+          </a:p>
+          <a:p>
+            <a:pPr marL="0" lvl="1" defTabSz="672130"/>
+            <a:endParaRPr lang="pt-BR" sz="1600" b="1" dirty="0">
+              <a:solidFill>
+                <a:schemeClr val="tx1"/>
+              </a:solidFill>
+              <a:latin typeface="Calibri" panose="020F0502020204030204" pitchFamily="34" charset="0"/>
+              <a:cs typeface="Simplon BP Regular"/>
+            </a:endParaRPr>
+          </a:p>
+          <a:p>
+            <a:pPr marL="252049" lvl="1" indent="-252049" fontAlgn="base">
+              <a:spcBef>
+                <a:spcPct val="0"/>
+              </a:spcBef>
+              <a:buFont typeface="Wingdings" panose="05000000000000000000" pitchFamily="2" charset="2"/>
+              <a:buChar char="ü"/>
+              <a:defRPr/>
+            </a:pPr>
+            <a:endParaRPr lang="pt-BR" sz="1323" b="1" dirty="0">
+              <a:solidFill>
+                <a:schemeClr val="tx1"/>
+              </a:solidFill>
+              <a:latin typeface="Calibri" panose="020F0502020204030204" pitchFamily="34" charset="0"/>
+              <a:cs typeface="Simplon BP Regular"/>
+            </a:endParaRPr>
+          </a:p>
+          <a:p>
+            <a:pPr marL="252049" lvl="1" indent="-252049" fontAlgn="base">
+              <a:spcBef>
+                <a:spcPct val="0"/>
+              </a:spcBef>
+              <a:buFont typeface="Wingdings" panose="05000000000000000000" pitchFamily="2" charset="2"/>
+              <a:buChar char="ü"/>
+              <a:defRPr/>
+            </a:pPr>
+            <a:endParaRPr lang="pt-BR" sz="1323" b="1" dirty="0">
+              <a:solidFill>
+                <a:schemeClr val="tx1"/>
+              </a:solidFill>
+              <a:latin typeface="Calibri" panose="020F0502020204030204" pitchFamily="34" charset="0"/>
+              <a:cs typeface="Simplon BP Regular"/>
+            </a:endParaRPr>
+          </a:p>
+          <a:p>
+            <a:pPr marL="252049" lvl="1" indent="-252049" fontAlgn="base">
+              <a:spcBef>
+                <a:spcPct val="0"/>
+              </a:spcBef>
+              <a:buFont typeface="Wingdings" panose="05000000000000000000" pitchFamily="2" charset="2"/>
+              <a:buChar char="ü"/>
+              <a:defRPr/>
+            </a:pPr>
+            <a:endParaRPr lang="pt-BR" sz="1323" b="1" dirty="0">
+              <a:solidFill>
+                <a:schemeClr val="tx1"/>
+              </a:solidFill>
+              <a:latin typeface="Calibri" panose="020F0502020204030204" pitchFamily="34" charset="0"/>
+              <a:cs typeface="Simplon BP Regular"/>
+            </a:endParaRPr>
+          </a:p>
+          <a:p>
+            <a:pPr marL="252049" indent="-252049" fontAlgn="base">
+              <a:spcBef>
+                <a:spcPct val="0"/>
+              </a:spcBef>
+              <a:buFont typeface="Wingdings" panose="05000000000000000000" pitchFamily="2" charset="2"/>
+              <a:buChar char="ü"/>
+              <a:defRPr/>
+            </a:pPr>
+            <a:endParaRPr lang="pt-BR" sz="1323" b="1" dirty="0">
+              <a:solidFill>
+                <a:schemeClr val="tx1"/>
+              </a:solidFill>
+              <a:latin typeface="Calibri" panose="020F0502020204030204" pitchFamily="34" charset="0"/>
+              <a:cs typeface="Simplon BP Regular"/>
+            </a:endParaRPr>
+          </a:p>
+          <a:p>
+            <a:pPr marL="252049" indent="-252049" fontAlgn="base">
+              <a:spcBef>
+                <a:spcPct val="0"/>
+              </a:spcBef>
+              <a:buFont typeface="Wingdings" panose="05000000000000000000" pitchFamily="2" charset="2"/>
+              <a:buChar char="ü"/>
+              <a:defRPr/>
+            </a:pPr>
+            <a:endParaRPr lang="pt-BR" sz="1323" b="1" dirty="0">
+              <a:solidFill>
+                <a:schemeClr val="tx1"/>
+              </a:solidFill>
+              <a:latin typeface="Calibri" panose="020F0502020204030204" pitchFamily="34" charset="0"/>
+              <a:cs typeface="Simplon BP Regular"/>
+            </a:endParaRPr>
+          </a:p>
+        </p:txBody>
+      </p:sp>
+      <p:sp>
+        <p:nvSpPr>
+          <p:cNvPr id="2" name="Rectangle 43">
+            <a:extLst>
+              <a:ext uri="{FF2B5EF4-FFF2-40B4-BE49-F238E27FC236}">
+                <a16:creationId xmlns:a16="http://schemas.microsoft.com/office/drawing/2014/main" id="{B15BA19F-C787-4E6A-ADAB-C0DFF09C66A8}"/>
+              </a:ext>
+            </a:extLst>
+          </p:cNvPr>
+          <p:cNvSpPr>
+            <a:spLocks/>
+          </p:cNvSpPr>
+          <p:nvPr/>
+        </p:nvSpPr>
+        <p:spPr>
+          <a:xfrm>
+            <a:off x="496765" y="3657025"/>
+            <a:ext cx="12496524" cy="3833059"/>
+          </a:xfrm>
+          <a:prstGeom prst="rect">
+            <a:avLst/>
+          </a:prstGeom>
+          <a:noFill/>
+          <a:ln w="12700">
+            <a:solidFill>
+              <a:schemeClr val="bg1">
+                <a:lumMod val="50000"/>
+              </a:schemeClr>
+            </a:solidFill>
+          </a:ln>
+        </p:spPr>
+        <p:style>
+          <a:lnRef idx="2">
+            <a:schemeClr val="accent4"/>
+          </a:lnRef>
+          <a:fillRef idx="1">
+            <a:schemeClr val="lt1"/>
+          </a:fillRef>
+          <a:effectRef idx="0">
+            <a:schemeClr val="accent4"/>
+          </a:effectRef>
+          <a:fontRef idx="minor">
+            <a:schemeClr val="dk1"/>
+          </a:fontRef>
+        </p:style>
+        <p:txBody>
+          <a:bodyPr wrap="square" tIns="105844" numCol="3" rtlCol="0" anchor="ctr"/>
+          <a:lstStyle/>
+          <a:p>
+            <a:pPr marL="0" lvl="1" defTabSz="672130"/>
+            <a:r>
+              <a:rPr lang="pt-BR" sz="1323" b="1" dirty="0">
+                <a:solidFill>
+                  <a:schemeClr val="tx1"/>
+                </a:solidFill>
+                <a:latin typeface="Calibri" panose="020F0502020204030204" pitchFamily="34" charset="0"/>
+                <a:cs typeface="Simplon BP Regular"/>
+              </a:rPr>
+              <a:t>Frente Plataforma</a:t>
+            </a:r>
+          </a:p>
+          <a:p>
+            <a:pPr marL="285750" lvl="1" indent="-285750" defTabSz="672130">
+              <a:buFont typeface="Arial" panose="020B0604020202020204" pitchFamily="34" charset="0"/>
+              <a:buChar char="•"/>
+            </a:pPr>
+            <a:r>
+              <a:rPr lang="pt-BR" sz="1323" b="1" dirty="0">
+                <a:solidFill>
+                  <a:schemeClr val="tx1"/>
+                </a:solidFill>
+                <a:latin typeface="Calibri" panose="020F0502020204030204" pitchFamily="34" charset="0"/>
+                <a:cs typeface="Simplon BP Regular"/>
+              </a:rPr>
+              <a:t>Subir os códigos do Front no azure.</a:t>
+            </a:r>
+          </a:p>
+          <a:p>
+            <a:pPr marL="285750" lvl="1" indent="-285750" defTabSz="672130">
+              <a:buFont typeface="Arial" panose="020B0604020202020204" pitchFamily="34" charset="0"/>
+              <a:buChar char="•"/>
+            </a:pPr>
+            <a:endParaRPr lang="pt-BR" sz="1323" b="1" dirty="0">
+              <a:solidFill>
+                <a:schemeClr val="tx1"/>
+              </a:solidFill>
+              <a:latin typeface="Calibri" panose="020F0502020204030204" pitchFamily="34" charset="0"/>
+              <a:cs typeface="Simplon BP Regular"/>
+            </a:endParaRPr>
+          </a:p>
+          <a:p>
+            <a:pPr marL="0" lvl="1" defTabSz="672130"/>
+            <a:r>
+              <a:rPr lang="pt-BR" sz="1323" b="1" dirty="0">
+                <a:solidFill>
+                  <a:schemeClr val="tx1"/>
+                </a:solidFill>
+                <a:latin typeface="Calibri" panose="020F0502020204030204" pitchFamily="34" charset="0"/>
+                <a:cs typeface="Simplon BP Regular"/>
+              </a:rPr>
+              <a:t>Frente Backend</a:t>
+            </a:r>
+          </a:p>
+          <a:p>
+            <a:pPr marL="285750" lvl="1" indent="-285750" defTabSz="672130">
+              <a:buFont typeface="Arial" panose="020B0604020202020204" pitchFamily="34" charset="0"/>
+              <a:buChar char="•"/>
+            </a:pPr>
+            <a:r>
+              <a:rPr lang="pt-BR" sz="1323" b="1" dirty="0">
+                <a:solidFill>
+                  <a:schemeClr val="tx1"/>
+                </a:solidFill>
+                <a:latin typeface="Calibri" panose="020F0502020204030204" pitchFamily="34" charset="0"/>
+                <a:cs typeface="Simplon BP Regular"/>
+              </a:rPr>
+              <a:t>Finalizar end-point de importação de arquivo.</a:t>
+            </a:r>
+          </a:p>
+          <a:p>
+            <a:pPr marL="285750" lvl="1" indent="-285750" defTabSz="672130">
+              <a:buFont typeface="Arial" panose="020B0604020202020204" pitchFamily="34" charset="0"/>
+              <a:buChar char="•"/>
+            </a:pPr>
+            <a:r>
+              <a:rPr lang="pt-BR" sz="1323" b="1" dirty="0">
+                <a:solidFill>
+                  <a:schemeClr val="tx1"/>
+                </a:solidFill>
+                <a:latin typeface="Calibri" panose="020F0502020204030204" pitchFamily="34" charset="0"/>
+                <a:cs typeface="Simplon BP Regular"/>
+              </a:rPr>
+              <a:t>Finalizar o tratamento de excessoes</a:t>
+            </a:r>
+          </a:p>
+          <a:p>
+            <a:pPr marL="0" lvl="1" defTabSz="672130"/>
+            <a:endParaRPr lang="pt-BR" sz="1323" b="1" dirty="0">
+              <a:solidFill>
+                <a:schemeClr val="tx1"/>
+              </a:solidFill>
+              <a:latin typeface="Calibri" panose="020F0502020204030204" pitchFamily="34" charset="0"/>
+              <a:cs typeface="Simplon BP Regular"/>
+            </a:endParaRPr>
+          </a:p>
+          <a:p>
+            <a:pPr marL="0" lvl="1" defTabSz="672130"/>
+            <a:r>
+              <a:rPr lang="pt-BR" sz="1323" b="1" dirty="0">
+                <a:solidFill>
+                  <a:schemeClr val="tx1"/>
+                </a:solidFill>
+                <a:latin typeface="Calibri" panose="020F0502020204030204" pitchFamily="34" charset="0"/>
+                <a:cs typeface="Simplon BP Regular"/>
+              </a:rPr>
+              <a:t>Frente Front end</a:t>
+            </a:r>
+          </a:p>
+          <a:p>
+            <a:pPr marL="285750" lvl="1" indent="-285750" defTabSz="672130">
+              <a:buFont typeface="Arial" panose="020B0604020202020204" pitchFamily="34" charset="0"/>
+              <a:buChar char="•"/>
+            </a:pPr>
+            <a:r>
+              <a:rPr lang="pt-BR" sz="1323" b="1" dirty="0">
+                <a:solidFill>
+                  <a:schemeClr val="tx1"/>
+                </a:solidFill>
+                <a:latin typeface="Calibri" panose="020F0502020204030204" pitchFamily="34" charset="0"/>
+                <a:cs typeface="Simplon BP Regular"/>
+              </a:rPr>
+              <a:t>Corrigir bugs fluxo de livros</a:t>
+            </a:r>
+          </a:p>
+          <a:p>
+            <a:pPr marL="285750" lvl="1" indent="-285750" defTabSz="672130">
+              <a:buFont typeface="Arial" panose="020B0604020202020204" pitchFamily="34" charset="0"/>
+              <a:buChar char="•"/>
+            </a:pPr>
+            <a:r>
+              <a:rPr lang="pt-BR" sz="1323" b="1" dirty="0">
+                <a:solidFill>
+                  <a:schemeClr val="tx1"/>
+                </a:solidFill>
+                <a:latin typeface="Calibri" panose="020F0502020204030204" pitchFamily="34" charset="0"/>
+                <a:cs typeface="Simplon BP Regular"/>
+              </a:rPr>
+              <a:t>Subir WebSite na Azure</a:t>
+            </a:r>
+          </a:p>
+          <a:p>
+            <a:pPr marL="285750" lvl="1" indent="-285750" defTabSz="672130">
+              <a:buFont typeface="Arial" panose="020B0604020202020204" pitchFamily="34" charset="0"/>
+              <a:buChar char="•"/>
+            </a:pPr>
+            <a:endParaRPr lang="pt-BR" sz="1400" b="1" dirty="0">
+              <a:solidFill>
+                <a:schemeClr val="tx1"/>
+              </a:solidFill>
+              <a:latin typeface="Calibri" panose="020F0502020204030204" pitchFamily="34" charset="0"/>
+              <a:cs typeface="Simplon BP Regular"/>
+            </a:endParaRPr>
+          </a:p>
+          <a:p>
+            <a:pPr marL="0" lvl="1" defTabSz="672130"/>
+            <a:r>
+              <a:rPr lang="pt-BR" sz="1400" b="1" dirty="0">
+                <a:solidFill>
+                  <a:schemeClr val="tx1"/>
+                </a:solidFill>
+                <a:latin typeface="Calibri" panose="020F0502020204030204" pitchFamily="34" charset="0"/>
+                <a:cs typeface="Simplon BP Regular"/>
+              </a:rPr>
+              <a:t>Frente Negócios</a:t>
+            </a:r>
+            <a:r>
+              <a:rPr lang="pt-BR" sz="1400" dirty="0">
+                <a:solidFill>
+                  <a:schemeClr val="tx1"/>
+                </a:solidFill>
+                <a:latin typeface="Calibri" panose="020F0502020204030204" pitchFamily="34" charset="0"/>
+                <a:cs typeface="Simplon BP Regular"/>
+              </a:rPr>
+              <a:t>;</a:t>
+            </a:r>
+          </a:p>
+          <a:p>
+            <a:pPr marL="285750" lvl="1" indent="-285750" defTabSz="672130">
+              <a:buFont typeface="Arial" panose="020B0604020202020204" pitchFamily="34" charset="0"/>
+              <a:buChar char="•"/>
+            </a:pPr>
+            <a:r>
+              <a:rPr lang="pt-BR" sz="1400" b="1" dirty="0">
+                <a:solidFill>
+                  <a:schemeClr val="tx1"/>
+                </a:solidFill>
+                <a:latin typeface="Calibri" panose="020F0502020204030204" pitchFamily="34" charset="0"/>
+                <a:cs typeface="Simplon BP Regular"/>
+              </a:rPr>
+              <a:t>Dar continuidade na planilha UAT.</a:t>
+            </a:r>
+          </a:p>
+          <a:p>
+            <a:pPr marL="285750" lvl="1" indent="-285750" defTabSz="672130">
+              <a:buFont typeface="Arial" panose="020B0604020202020204" pitchFamily="34" charset="0"/>
+              <a:buChar char="•"/>
+            </a:pPr>
+            <a:endParaRPr lang="pt-BR" sz="1400" b="1" dirty="0">
+              <a:solidFill>
+                <a:schemeClr val="tx1"/>
+              </a:solidFill>
+              <a:latin typeface="Calibri" panose="020F0502020204030204" pitchFamily="34" charset="0"/>
+              <a:cs typeface="Simplon BP Regular"/>
+            </a:endParaRPr>
+          </a:p>
+          <a:p>
+            <a:pPr marL="0" lvl="1"/>
+            <a:endParaRPr lang="pt-BR" sz="1400" b="1" dirty="0">
+              <a:solidFill>
+                <a:schemeClr val="tx1"/>
+              </a:solidFill>
+              <a:latin typeface="Calibri" panose="020F0502020204030204" pitchFamily="34" charset="0"/>
+              <a:cs typeface="Simplon BP Regular"/>
+            </a:endParaRPr>
+          </a:p>
+          <a:p>
+            <a:pPr marL="0" lvl="1"/>
+            <a:r>
+              <a:rPr lang="pt-BR" sz="1400" b="1" dirty="0">
+                <a:solidFill>
+                  <a:schemeClr val="tx1"/>
+                </a:solidFill>
+                <a:latin typeface="Calibri" panose="020F0502020204030204" pitchFamily="34" charset="0"/>
+                <a:cs typeface="Simplon BP Regular"/>
+              </a:rPr>
+              <a:t>Frente Gestão Organizacional</a:t>
+            </a:r>
+          </a:p>
+          <a:p>
+            <a:pPr marL="285750" lvl="1" indent="-285750">
+              <a:buFont typeface="Arial" panose="020B0604020202020204" pitchFamily="34" charset="0"/>
+              <a:buChar char="•"/>
+            </a:pPr>
+            <a:r>
+              <a:rPr lang="pt-BR" sz="1400" b="1" dirty="0">
+                <a:solidFill>
+                  <a:schemeClr val="tx1"/>
+                </a:solidFill>
+                <a:latin typeface="Calibri" panose="020F0502020204030204" pitchFamily="34" charset="0"/>
+                <a:cs typeface="Simplon BP Regular"/>
+              </a:rPr>
+              <a:t>Validar White paper.</a:t>
+            </a:r>
+          </a:p>
+          <a:p>
+            <a:pPr marL="0" lvl="1"/>
+            <a:endParaRPr lang="pt-BR" sz="1400" b="1" dirty="0">
+              <a:solidFill>
+                <a:schemeClr val="tx1"/>
+              </a:solidFill>
+              <a:latin typeface="Calibri" panose="020F0502020204030204" pitchFamily="34" charset="0"/>
+              <a:cs typeface="Simplon BP Regular"/>
+            </a:endParaRPr>
+          </a:p>
+          <a:p>
+            <a:pPr marL="285750" lvl="1" indent="-285750">
+              <a:buFont typeface="Arial" panose="020B0604020202020204" pitchFamily="34" charset="0"/>
+              <a:buChar char="•"/>
+            </a:pPr>
+            <a:r>
+              <a:rPr lang="pt-BR" sz="1400" dirty="0">
+                <a:solidFill>
+                  <a:schemeClr val="tx1"/>
+                </a:solidFill>
+                <a:latin typeface="Calibri" panose="020F0502020204030204" pitchFamily="34" charset="0"/>
+                <a:cs typeface="Simplon BP Regular"/>
+              </a:rPr>
+              <a:t>0044</a:t>
+            </a:r>
+          </a:p>
+        </p:txBody>
+      </p:sp>
+      <p:sp>
+        <p:nvSpPr>
+          <p:cNvPr id="6" name="Oval 134">
+            <a:extLst>
+              <a:ext uri="{FF2B5EF4-FFF2-40B4-BE49-F238E27FC236}">
+                <a16:creationId xmlns:a16="http://schemas.microsoft.com/office/drawing/2014/main" id="{70825C6F-9257-4CF5-8C62-1CA1EB2F8815}"/>
+              </a:ext>
+            </a:extLst>
+          </p:cNvPr>
+          <p:cNvSpPr>
+            <a:spLocks noChangeAspect="1"/>
+          </p:cNvSpPr>
+          <p:nvPr/>
+        </p:nvSpPr>
+        <p:spPr>
+          <a:xfrm>
+            <a:off x="9282214" y="282529"/>
+            <a:ext cx="211404" cy="211689"/>
+          </a:xfrm>
+          <a:prstGeom prst="ellipse">
+            <a:avLst/>
+          </a:prstGeom>
+          <a:solidFill>
+            <a:srgbClr val="00B050"/>
+          </a:solidFill>
+          <a:ln w="12700">
+            <a:solidFill>
+              <a:schemeClr val="accent3"/>
+            </a:solidFill>
+          </a:ln>
+        </p:spPr>
+        <p:style>
+          <a:lnRef idx="2">
+            <a:schemeClr val="accent1">
+              <a:shade val="50000"/>
+            </a:schemeClr>
+          </a:lnRef>
+          <a:fillRef idx="1">
+            <a:schemeClr val="accent1"/>
+          </a:fillRef>
+          <a:effectRef idx="0">
+            <a:schemeClr val="accent1"/>
+          </a:effectRef>
+          <a:fontRef idx="minor">
+            <a:schemeClr val="lt1"/>
+          </a:fontRef>
+        </p:style>
+        <p:txBody>
+          <a:bodyPr wrap="none" lIns="52922" tIns="52922" rIns="52922" rtlCol="0" anchor="ctr"/>
+          <a:lstStyle/>
+          <a:p>
+            <a:pPr algn="ctr" defTabSz="672130"/>
+            <a:endParaRPr lang="en-US" sz="1176" dirty="0">
+              <a:solidFill>
+                <a:srgbClr val="00B050"/>
+              </a:solidFill>
+              <a:latin typeface="Simplon BP Regular"/>
+              <a:cs typeface="Simplon BP Regular"/>
+            </a:endParaRPr>
+          </a:p>
+        </p:txBody>
+      </p:sp>
+      <p:sp>
+        <p:nvSpPr>
+          <p:cNvPr id="5" name="Retângulo 4">
+            <a:extLst>
+              <a:ext uri="{FF2B5EF4-FFF2-40B4-BE49-F238E27FC236}">
+                <a16:creationId xmlns:a16="http://schemas.microsoft.com/office/drawing/2014/main" id="{A1C14918-6027-46B3-96BF-C5F7FDEC3276}"/>
+              </a:ext>
+            </a:extLst>
+          </p:cNvPr>
+          <p:cNvSpPr/>
+          <p:nvPr/>
+        </p:nvSpPr>
+        <p:spPr>
+          <a:xfrm>
+            <a:off x="8017619" y="180231"/>
+            <a:ext cx="4937689" cy="618769"/>
+          </a:xfrm>
+          <a:prstGeom prst="rect">
+            <a:avLst/>
+          </a:prstGeom>
+          <a:noFill/>
+          <a:ln w="6350">
+            <a:solidFill>
+              <a:schemeClr val="bg1">
+                <a:lumMod val="75000"/>
+              </a:schemeClr>
+            </a:solidFill>
+          </a:ln>
+        </p:spPr>
+        <p:style>
+          <a:lnRef idx="2">
+            <a:schemeClr val="accent1">
+              <a:shade val="50000"/>
+            </a:schemeClr>
+          </a:lnRef>
+          <a:fillRef idx="1">
+            <a:schemeClr val="accent1"/>
+          </a:fillRef>
+          <a:effectRef idx="0">
+            <a:schemeClr val="accent1"/>
+          </a:effectRef>
+          <a:fontRef idx="minor">
+            <a:schemeClr val="lt1"/>
+          </a:fontRef>
+        </p:style>
+        <p:txBody>
+          <a:bodyPr rtlCol="0" anchor="ctr"/>
+          <a:lstStyle/>
+          <a:p>
+            <a:pPr algn="ctr"/>
+            <a:endParaRPr lang="pt-BR"/>
+          </a:p>
+        </p:txBody>
+      </p:sp>
+      <p:sp>
+        <p:nvSpPr>
+          <p:cNvPr id="8" name="TextBox 138">
+            <a:extLst>
+              <a:ext uri="{FF2B5EF4-FFF2-40B4-BE49-F238E27FC236}">
+                <a16:creationId xmlns:a16="http://schemas.microsoft.com/office/drawing/2014/main" id="{5CE7D08C-795B-4BF1-97F6-F9773F4E9F4C}"/>
+              </a:ext>
+            </a:extLst>
+          </p:cNvPr>
+          <p:cNvSpPr txBox="1"/>
+          <p:nvPr/>
+        </p:nvSpPr>
+        <p:spPr>
+          <a:xfrm>
+            <a:off x="9747419" y="-22583"/>
+            <a:ext cx="1478088" cy="211688"/>
+          </a:xfrm>
+          <a:prstGeom prst="rect">
+            <a:avLst/>
+          </a:prstGeom>
+          <a:solidFill>
+            <a:schemeClr val="bg1"/>
+          </a:solidFill>
+          <a:ln w="12700">
+            <a:noFill/>
+          </a:ln>
+        </p:spPr>
+        <p:style>
+          <a:lnRef idx="2">
+            <a:schemeClr val="accent4"/>
+          </a:lnRef>
+          <a:fillRef idx="1">
+            <a:schemeClr val="lt1"/>
+          </a:fillRef>
+          <a:effectRef idx="0">
+            <a:schemeClr val="accent4"/>
+          </a:effectRef>
+          <a:fontRef idx="minor">
+            <a:schemeClr val="dk1"/>
+          </a:fontRef>
+        </p:style>
+        <p:txBody>
+          <a:bodyPr wrap="none" lIns="52922" tIns="52922" rIns="52922" bIns="0" rtlCol="0" anchor="b"/>
+          <a:lstStyle>
+            <a:defPPr>
+              <a:defRPr lang="en-US"/>
+            </a:defPPr>
+            <a:lvl1pPr algn="ctr">
+              <a:defRPr sz="1000" b="1">
+                <a:latin typeface="Simplon BP Regular"/>
+                <a:cs typeface="Simplon BP Regular"/>
+              </a:defRPr>
+            </a:lvl1pPr>
+            <a:lvl2pPr>
+              <a:defRPr>
+                <a:solidFill>
+                  <a:schemeClr val="dk1"/>
+                </a:solidFill>
+              </a:defRPr>
+            </a:lvl2pPr>
+            <a:lvl3pPr>
+              <a:defRPr>
+                <a:solidFill>
+                  <a:schemeClr val="dk1"/>
+                </a:solidFill>
+              </a:defRPr>
+            </a:lvl3pPr>
+            <a:lvl4pPr>
+              <a:defRPr>
+                <a:solidFill>
+                  <a:schemeClr val="dk1"/>
+                </a:solidFill>
+              </a:defRPr>
+            </a:lvl4pPr>
+            <a:lvl5pPr>
+              <a:defRPr>
+                <a:solidFill>
+                  <a:schemeClr val="dk1"/>
+                </a:solidFill>
+              </a:defRPr>
+            </a:lvl5pPr>
+            <a:lvl6pPr>
+              <a:defRPr>
+                <a:solidFill>
+                  <a:schemeClr val="dk1"/>
+                </a:solidFill>
+              </a:defRPr>
+            </a:lvl6pPr>
+            <a:lvl7pPr>
+              <a:defRPr>
+                <a:solidFill>
+                  <a:schemeClr val="dk1"/>
+                </a:solidFill>
+              </a:defRPr>
+            </a:lvl7pPr>
+            <a:lvl8pPr>
+              <a:defRPr>
+                <a:solidFill>
+                  <a:schemeClr val="dk1"/>
+                </a:solidFill>
+              </a:defRPr>
+            </a:lvl8pPr>
+            <a:lvl9pPr>
+              <a:defRPr>
+                <a:solidFill>
+                  <a:schemeClr val="dk1"/>
+                </a:solidFill>
+              </a:defRPr>
+            </a:lvl9pPr>
+          </a:lstStyle>
+          <a:p>
+            <a:pPr defTabSz="672130"/>
+            <a:r>
+              <a:rPr lang="en-US" sz="1176" b="0" dirty="0">
+                <a:solidFill>
+                  <a:prstClr val="black"/>
+                </a:solidFill>
+                <a:latin typeface="Simplon BP Bold" pitchFamily="2" charset="0"/>
+              </a:rPr>
+              <a:t>    </a:t>
+            </a:r>
+            <a:r>
+              <a:rPr lang="en-US" sz="1176" b="0" dirty="0" err="1">
+                <a:solidFill>
+                  <a:prstClr val="black"/>
+                </a:solidFill>
+                <a:latin typeface="Simplon BP Bold" pitchFamily="2" charset="0"/>
+              </a:rPr>
+              <a:t>Farol</a:t>
+            </a:r>
+            <a:r>
+              <a:rPr lang="en-US" sz="1176" b="0" dirty="0">
+                <a:solidFill>
+                  <a:prstClr val="black"/>
+                </a:solidFill>
+                <a:latin typeface="Simplon BP Bold" pitchFamily="2" charset="0"/>
+              </a:rPr>
+              <a:t> do </a:t>
+            </a:r>
+            <a:r>
+              <a:rPr lang="en-US" sz="1176" b="0" dirty="0" err="1">
+                <a:solidFill>
+                  <a:prstClr val="black"/>
+                </a:solidFill>
+                <a:latin typeface="Simplon BP Bold" pitchFamily="2" charset="0"/>
+              </a:rPr>
+              <a:t>Projeto</a:t>
+            </a:r>
+            <a:r>
+              <a:rPr lang="en-US" sz="1176" b="0" dirty="0">
+                <a:solidFill>
+                  <a:prstClr val="black"/>
+                </a:solidFill>
+                <a:latin typeface="Simplon BP Bold" pitchFamily="2" charset="0"/>
+              </a:rPr>
+              <a:t>   </a:t>
+            </a:r>
+          </a:p>
+        </p:txBody>
+      </p:sp>
+      <p:sp>
+        <p:nvSpPr>
+          <p:cNvPr id="22" name="Oval 120">
+            <a:extLst>
+              <a:ext uri="{FF2B5EF4-FFF2-40B4-BE49-F238E27FC236}">
+                <a16:creationId xmlns:a16="http://schemas.microsoft.com/office/drawing/2014/main" id="{82942FCC-51D7-4B47-AB3E-6BD310106286}"/>
+              </a:ext>
+            </a:extLst>
+          </p:cNvPr>
+          <p:cNvSpPr>
+            <a:spLocks noChangeAspect="1"/>
+          </p:cNvSpPr>
+          <p:nvPr/>
+        </p:nvSpPr>
+        <p:spPr>
+          <a:xfrm>
+            <a:off x="11193898" y="297930"/>
+            <a:ext cx="211404" cy="211689"/>
+          </a:xfrm>
+          <a:prstGeom prst="ellipse">
+            <a:avLst/>
+          </a:prstGeom>
+          <a:solidFill>
+            <a:srgbClr val="00B050"/>
+          </a:solidFill>
+          <a:ln w="12700">
+            <a:solidFill>
+              <a:schemeClr val="accent3"/>
+            </a:solidFill>
+          </a:ln>
+        </p:spPr>
+        <p:style>
+          <a:lnRef idx="2">
+            <a:schemeClr val="accent1">
+              <a:shade val="50000"/>
+            </a:schemeClr>
+          </a:lnRef>
+          <a:fillRef idx="1">
+            <a:schemeClr val="accent1"/>
+          </a:fillRef>
+          <a:effectRef idx="0">
+            <a:schemeClr val="accent1"/>
+          </a:effectRef>
+          <a:fontRef idx="minor">
+            <a:schemeClr val="lt1"/>
+          </a:fontRef>
+        </p:style>
+        <p:txBody>
+          <a:bodyPr wrap="none" lIns="52922" tIns="52922" rIns="52922" rtlCol="0" anchor="ctr"/>
+          <a:lstStyle/>
+          <a:p>
+            <a:pPr algn="ctr" defTabSz="672130"/>
+            <a:endParaRPr lang="en-US" sz="1176" dirty="0">
+              <a:solidFill>
+                <a:prstClr val="black"/>
+              </a:solidFill>
+              <a:latin typeface="Simplon BP Regular"/>
+              <a:cs typeface="Simplon BP Regular"/>
+            </a:endParaRPr>
+          </a:p>
+        </p:txBody>
+      </p:sp>
+      <p:sp>
+        <p:nvSpPr>
+          <p:cNvPr id="24" name="Oval 134">
+            <a:extLst>
+              <a:ext uri="{FF2B5EF4-FFF2-40B4-BE49-F238E27FC236}">
+                <a16:creationId xmlns:a16="http://schemas.microsoft.com/office/drawing/2014/main" id="{634FAC8B-9591-4988-A983-E2A328DF8D53}"/>
+              </a:ext>
+            </a:extLst>
+          </p:cNvPr>
+          <p:cNvSpPr>
+            <a:spLocks noChangeAspect="1"/>
+          </p:cNvSpPr>
+          <p:nvPr/>
+        </p:nvSpPr>
+        <p:spPr>
+          <a:xfrm>
+            <a:off x="10194075" y="313264"/>
+            <a:ext cx="211404" cy="211689"/>
+          </a:xfrm>
+          <a:prstGeom prst="ellipse">
+            <a:avLst/>
+          </a:prstGeom>
+          <a:solidFill>
+            <a:srgbClr val="00B050"/>
+          </a:solidFill>
+          <a:ln w="12700">
+            <a:solidFill>
+              <a:schemeClr val="accent3"/>
+            </a:solidFill>
+          </a:ln>
+        </p:spPr>
+        <p:style>
+          <a:lnRef idx="2">
+            <a:schemeClr val="accent1">
+              <a:shade val="50000"/>
+            </a:schemeClr>
+          </a:lnRef>
+          <a:fillRef idx="1">
+            <a:schemeClr val="accent1"/>
+          </a:fillRef>
+          <a:effectRef idx="0">
+            <a:schemeClr val="accent1"/>
+          </a:effectRef>
+          <a:fontRef idx="minor">
+            <a:schemeClr val="lt1"/>
+          </a:fontRef>
+        </p:style>
+        <p:txBody>
+          <a:bodyPr wrap="none" lIns="52922" tIns="52922" rIns="52922" rtlCol="0" anchor="ctr"/>
+          <a:lstStyle/>
+          <a:p>
+            <a:pPr algn="ctr" defTabSz="672130"/>
+            <a:endParaRPr lang="en-US" sz="1176" dirty="0">
+              <a:solidFill>
+                <a:srgbClr val="FFFF00"/>
+              </a:solidFill>
+              <a:latin typeface="Simplon BP Regular"/>
+              <a:cs typeface="Simplon BP Regular"/>
+            </a:endParaRPr>
+          </a:p>
+        </p:txBody>
+      </p:sp>
+      <p:sp>
+        <p:nvSpPr>
+          <p:cNvPr id="23" name="Oval 120">
+            <a:extLst>
+              <a:ext uri="{FF2B5EF4-FFF2-40B4-BE49-F238E27FC236}">
+                <a16:creationId xmlns:a16="http://schemas.microsoft.com/office/drawing/2014/main" id="{6623B923-5FF4-4E18-A77A-CF635C9F50BB}"/>
+              </a:ext>
+            </a:extLst>
+          </p:cNvPr>
+          <p:cNvSpPr>
+            <a:spLocks noChangeAspect="1"/>
+          </p:cNvSpPr>
+          <p:nvPr/>
+        </p:nvSpPr>
+        <p:spPr>
+          <a:xfrm>
+            <a:off x="12088019" y="307486"/>
+            <a:ext cx="211404" cy="211689"/>
+          </a:xfrm>
+          <a:prstGeom prst="ellipse">
+            <a:avLst/>
+          </a:prstGeom>
+          <a:solidFill>
+            <a:srgbClr val="00B050"/>
+          </a:solidFill>
+          <a:ln w="12700">
+            <a:solidFill>
+              <a:schemeClr val="accent3"/>
+            </a:solidFill>
+          </a:ln>
+        </p:spPr>
+        <p:style>
+          <a:lnRef idx="2">
+            <a:schemeClr val="accent1">
+              <a:shade val="50000"/>
+            </a:schemeClr>
+          </a:lnRef>
+          <a:fillRef idx="1">
+            <a:schemeClr val="accent1"/>
+          </a:fillRef>
+          <a:effectRef idx="0">
+            <a:schemeClr val="accent1"/>
+          </a:effectRef>
+          <a:fontRef idx="minor">
+            <a:schemeClr val="lt1"/>
+          </a:fontRef>
+        </p:style>
+        <p:txBody>
+          <a:bodyPr wrap="none" lIns="52922" tIns="52922" rIns="52922" rtlCol="0" anchor="ctr"/>
+          <a:lstStyle/>
+          <a:p>
+            <a:pPr algn="ctr" defTabSz="672130"/>
+            <a:endParaRPr lang="en-US" sz="1176" dirty="0">
+              <a:solidFill>
+                <a:prstClr val="black"/>
+              </a:solidFill>
+              <a:highlight>
+                <a:srgbClr val="FFFF00"/>
+              </a:highlight>
+              <a:latin typeface="Simplon BP Regular"/>
+              <a:cs typeface="Simplon BP Regular"/>
+            </a:endParaRPr>
+          </a:p>
+        </p:txBody>
+      </p:sp>
+    </p:spTree>
+    <p:extLst>
+      <p:ext uri="{BB962C8B-B14F-4D97-AF65-F5344CB8AC3E}">
+        <p14:creationId xmlns:p14="http://schemas.microsoft.com/office/powerpoint/2010/main" val="729677904"/>
       </p:ext>
     </p:extLst>
   </p:cSld>
@@ -46941,6 +48976,15 @@
 </file>
 
 <file path=customXml/item1.xml><?xml version="1.0" encoding="utf-8"?>
+<?mso-contentType ?>
+<FormTemplates xmlns="http://schemas.microsoft.com/sharepoint/v3/contenttype/forms">
+  <Display>DocumentLibraryForm</Display>
+  <Edit>DocumentLibraryForm</Edit>
+  <New>DocumentLibraryForm</New>
+</FormTemplates>
+</file>
+
+<file path=customXml/item2.xml><?xml version="1.0" encoding="utf-8"?>
 <p:properties xmlns:p="http://schemas.microsoft.com/office/2006/metadata/properties" xmlns:xsi="http://www.w3.org/2001/XMLSchema-instance" xmlns:pc="http://schemas.microsoft.com/office/infopath/2007/PartnerControls">
   <documentManagement>
     <Is_Collaboration_Space_Locked xmlns="bbcd8c33-6940-4d4c-a587-bbc736ca1e4d" xsi:nil="true"/>
@@ -46990,15 +49034,6 @@
     <CultureName xmlns="bbcd8c33-6940-4d4c-a587-bbc736ca1e4d" xsi:nil="true"/>
   </documentManagement>
 </p:properties>
-</file>
-
-<file path=customXml/item2.xml><?xml version="1.0" encoding="utf-8"?>
-<?mso-contentType ?>
-<FormTemplates xmlns="http://schemas.microsoft.com/sharepoint/v3/contenttype/forms">
-  <Display>DocumentLibraryForm</Display>
-  <Edit>DocumentLibraryForm</Edit>
-  <New>DocumentLibraryForm</New>
-</FormTemplates>
 </file>
 
 <file path=customXml/item3.xml><?xml version="1.0" encoding="utf-8"?>
@@ -47419,6 +49454,14 @@
 </file>
 
 <file path=customXml/itemProps1.xml><?xml version="1.0" encoding="utf-8"?>
+<ds:datastoreItem xmlns:ds="http://schemas.openxmlformats.org/officeDocument/2006/customXml" ds:itemID="{E2481852-F24E-4532-AF30-C154D705D105}">
+  <ds:schemaRefs>
+    <ds:schemaRef ds:uri="http://schemas.microsoft.com/sharepoint/v3/contenttype/forms"/>
+  </ds:schemaRefs>
+</ds:datastoreItem>
+</file>
+
+<file path=customXml/itemProps2.xml><?xml version="1.0" encoding="utf-8"?>
 <ds:datastoreItem xmlns:ds="http://schemas.openxmlformats.org/officeDocument/2006/customXml" ds:itemID="{4B31267F-D399-4A8A-87F8-B75F56828412}">
   <ds:schemaRefs>
     <ds:schemaRef ds:uri="http://www.w3.org/XML/1998/namespace"/>
@@ -47431,14 +49474,6 @@
     <ds:schemaRef ds:uri="http://schemas.openxmlformats.org/package/2006/metadata/core-properties"/>
     <ds:schemaRef ds:uri="http://schemas.microsoft.com/office/2006/metadata/properties"/>
     <ds:schemaRef ds:uri="http://purl.org/dc/terms/"/>
-  </ds:schemaRefs>
-</ds:datastoreItem>
-</file>
-
-<file path=customXml/itemProps2.xml><?xml version="1.0" encoding="utf-8"?>
-<ds:datastoreItem xmlns:ds="http://schemas.openxmlformats.org/officeDocument/2006/customXml" ds:itemID="{E2481852-F24E-4532-AF30-C154D705D105}">
-  <ds:schemaRefs>
-    <ds:schemaRef ds:uri="http://schemas.microsoft.com/sharepoint/v3/contenttype/forms"/>
   </ds:schemaRefs>
 </ds:datastoreItem>
 </file>

</xml_diff>